<commit_message>
Updates variables specification in presentation
</commit_message>
<xml_diff>
--- a/BAN440 – Term Paper Idea.pptx
+++ b/BAN440 – Term Paper Idea.pptx
@@ -10,13 +10,14 @@
     <p:sldId id="259" r:id="rId4"/>
     <p:sldId id="258" r:id="rId5"/>
     <p:sldId id="260" r:id="rId6"/>
-    <p:sldId id="264" r:id="rId7"/>
-    <p:sldId id="261" r:id="rId8"/>
-    <p:sldId id="265" r:id="rId9"/>
-    <p:sldId id="262" r:id="rId10"/>
-    <p:sldId id="266" r:id="rId11"/>
-    <p:sldId id="263" r:id="rId12"/>
-    <p:sldId id="267" r:id="rId13"/>
+    <p:sldId id="268" r:id="rId7"/>
+    <p:sldId id="264" r:id="rId8"/>
+    <p:sldId id="261" r:id="rId9"/>
+    <p:sldId id="265" r:id="rId10"/>
+    <p:sldId id="262" r:id="rId11"/>
+    <p:sldId id="266" r:id="rId12"/>
+    <p:sldId id="263" r:id="rId13"/>
+    <p:sldId id="267" r:id="rId14"/>
   </p:sldIdLst>
   <p:sldSz cx="12192000" cy="6858000"/>
   <p:notesSz cx="6858000" cy="9144000"/>
@@ -125,6 +126,7 @@
             <p14:sldId id="259"/>
             <p14:sldId id="258"/>
             <p14:sldId id="260"/>
+            <p14:sldId id="268"/>
             <p14:sldId id="264"/>
             <p14:sldId id="261"/>
             <p14:sldId id="265"/>
@@ -136,6 +138,9 @@
         </p14:section>
       </p14:sectionLst>
     </p:ext>
+    <p:ext uri="{EFAFB233-063F-42B5-8137-9DF3F51BA10A}">
+      <p15:sldGuideLst xmlns:p15="http://schemas.microsoft.com/office/powerpoint/2012/main"/>
+    </p:ext>
   </p:extLst>
 </p:presentation>
 </file>
@@ -145,7 +150,7 @@
   <pc:docChgLst>
     <pc:chgData name="Sander Sævig Eriksen" userId="2da4b7b7-d8b8-4b75-9017-f672d4ad080d" providerId="ADAL" clId="{69F880E9-B167-4345-A5E8-21D432C122E3}"/>
     <pc:docChg chg="custSel addSld modSld sldOrd addSection delSection modSection">
-      <pc:chgData name="Sander Sævig Eriksen" userId="2da4b7b7-d8b8-4b75-9017-f672d4ad080d" providerId="ADAL" clId="{69F880E9-B167-4345-A5E8-21D432C122E3}" dt="2025-03-26T08:19:53.983" v="1785" actId="20577"/>
+      <pc:chgData name="Sander Sævig Eriksen" userId="2da4b7b7-d8b8-4b75-9017-f672d4ad080d" providerId="ADAL" clId="{69F880E9-B167-4345-A5E8-21D432C122E3}" dt="2025-03-26T10:04:58.261" v="1798" actId="27614"/>
       <pc:docMkLst>
         <pc:docMk/>
       </pc:docMkLst>
@@ -457,6 +462,45 @@
             <ac:spMk id="3" creationId="{1F65876D-FF8F-FEE5-2E3F-BE52B30FE241}"/>
           </ac:spMkLst>
         </pc:spChg>
+      </pc:sldChg>
+      <pc:sldChg chg="addSp delSp modSp new mod setBg">
+        <pc:chgData name="Sander Sævig Eriksen" userId="2da4b7b7-d8b8-4b75-9017-f672d4ad080d" providerId="ADAL" clId="{69F880E9-B167-4345-A5E8-21D432C122E3}" dt="2025-03-26T10:04:58.261" v="1798" actId="27614"/>
+        <pc:sldMkLst>
+          <pc:docMk/>
+          <pc:sldMk cId="4071188664" sldId="268"/>
+        </pc:sldMkLst>
+        <pc:spChg chg="mod">
+          <ac:chgData name="Sander Sævig Eriksen" userId="2da4b7b7-d8b8-4b75-9017-f672d4ad080d" providerId="ADAL" clId="{69F880E9-B167-4345-A5E8-21D432C122E3}" dt="2025-03-26T10:04:53.634" v="1797" actId="26606"/>
+          <ac:spMkLst>
+            <pc:docMk/>
+            <pc:sldMk cId="4071188664" sldId="268"/>
+            <ac:spMk id="2" creationId="{1C829CF7-8E24-C132-1C37-76865ADB96FE}"/>
+          </ac:spMkLst>
+        </pc:spChg>
+        <pc:spChg chg="del">
+          <ac:chgData name="Sander Sævig Eriksen" userId="2da4b7b7-d8b8-4b75-9017-f672d4ad080d" providerId="ADAL" clId="{69F880E9-B167-4345-A5E8-21D432C122E3}" dt="2025-03-26T10:04:48.904" v="1796" actId="22"/>
+          <ac:spMkLst>
+            <pc:docMk/>
+            <pc:sldMk cId="4071188664" sldId="268"/>
+            <ac:spMk id="3" creationId="{E45DB675-2AEB-BD3D-B868-21CB16D6B656}"/>
+          </ac:spMkLst>
+        </pc:spChg>
+        <pc:spChg chg="add">
+          <ac:chgData name="Sander Sævig Eriksen" userId="2da4b7b7-d8b8-4b75-9017-f672d4ad080d" providerId="ADAL" clId="{69F880E9-B167-4345-A5E8-21D432C122E3}" dt="2025-03-26T10:04:53.634" v="1797" actId="26606"/>
+          <ac:spMkLst>
+            <pc:docMk/>
+            <pc:sldMk cId="4071188664" sldId="268"/>
+            <ac:spMk id="10" creationId="{D4771268-CB57-404A-9271-370EB28F6090}"/>
+          </ac:spMkLst>
+        </pc:spChg>
+        <pc:picChg chg="add mod ord">
+          <ac:chgData name="Sander Sævig Eriksen" userId="2da4b7b7-d8b8-4b75-9017-f672d4ad080d" providerId="ADAL" clId="{69F880E9-B167-4345-A5E8-21D432C122E3}" dt="2025-03-26T10:04:58.261" v="1798" actId="27614"/>
+          <ac:picMkLst>
+            <pc:docMk/>
+            <pc:sldMk cId="4071188664" sldId="268"/>
+            <ac:picMk id="5" creationId="{12E88783-F84F-9BC3-12BA-6C2CC84E648B}"/>
+          </ac:picMkLst>
+        </pc:picChg>
       </pc:sldChg>
     </pc:docChg>
   </pc:docChgLst>
@@ -4011,7 +4055,7 @@
           <p:cNvPr id="2" name="Title 1">
             <a:extLst>
               <a:ext uri="{FF2B5EF4-FFF2-40B4-BE49-F238E27FC236}">
-                <a16:creationId xmlns:a16="http://schemas.microsoft.com/office/drawing/2014/main" id="{8F7DE2C9-4028-BD3B-031A-5F24D0CFF9FD}"/>
+                <a16:creationId xmlns:a16="http://schemas.microsoft.com/office/drawing/2014/main" id="{EDEC6D8A-B3ED-C6D2-8995-11FFFA77FFB4}"/>
               </a:ext>
             </a:extLst>
           </p:cNvPr>
@@ -4029,7 +4073,7 @@
           <a:p>
             <a:r>
               <a:rPr lang="nb-NO" dirty="0" err="1"/>
-              <a:t>Showcasing</a:t>
+              <a:t>Empirical</a:t>
             </a:r>
             <a:r>
               <a:rPr lang="nb-NO" dirty="0"/>
@@ -4037,6 +4081,74 @@
             </a:r>
             <a:r>
               <a:rPr lang="nb-NO" dirty="0" err="1"/>
+              <a:t>model</a:t>
+            </a:r>
+            <a:r>
+              <a:rPr lang="nb-NO" dirty="0"/>
+              <a:t>: </a:t>
+            </a:r>
+            <a:r>
+              <a:rPr lang="nb-NO" dirty="0" err="1"/>
+              <a:t>Bresnahan</a:t>
+            </a:r>
+            <a:r>
+              <a:rPr lang="nb-NO" dirty="0"/>
+              <a:t> &amp; Reiss</a:t>
+            </a:r>
+          </a:p>
+        </p:txBody>
+      </p:sp>
+      <p:sp>
+        <p:nvSpPr>
+          <p:cNvPr id="3" name="Content Placeholder 2">
+            <a:extLst>
+              <a:ext uri="{FF2B5EF4-FFF2-40B4-BE49-F238E27FC236}">
+                <a16:creationId xmlns:a16="http://schemas.microsoft.com/office/drawing/2014/main" id="{CE41D449-0059-29E8-257A-B1EEA512E592}"/>
+              </a:ext>
+            </a:extLst>
+          </p:cNvPr>
+          <p:cNvSpPr>
+            <a:spLocks noGrp="1"/>
+          </p:cNvSpPr>
+          <p:nvPr>
+            <p:ph idx="1"/>
+          </p:nvPr>
+        </p:nvSpPr>
+        <p:spPr/>
+        <p:txBody>
+          <a:bodyPr/>
+          <a:lstStyle/>
+          <a:p>
+            <a:r>
+              <a:rPr lang="nb-NO" dirty="0"/>
+              <a:t>The </a:t>
+            </a:r>
+            <a:r>
+              <a:rPr lang="nb-NO" dirty="0" err="1"/>
+              <a:t>alcohol</a:t>
+            </a:r>
+            <a:r>
+              <a:rPr lang="nb-NO" dirty="0"/>
+              <a:t> </a:t>
+            </a:r>
+            <a:r>
+              <a:rPr lang="nb-NO" dirty="0" err="1"/>
+              <a:t>market</a:t>
+            </a:r>
+            <a:r>
+              <a:rPr lang="nb-NO" dirty="0"/>
+              <a:t> in Norway </a:t>
+            </a:r>
+            <a:r>
+              <a:rPr lang="nb-NO" dirty="0" err="1"/>
+              <a:t>violates</a:t>
+            </a:r>
+            <a:r>
+              <a:rPr lang="nb-NO" dirty="0"/>
+              <a:t> </a:t>
+            </a:r>
+            <a:r>
+              <a:rPr lang="nb-NO" dirty="0" err="1"/>
               <a:t>some</a:t>
             </a:r>
             <a:r>
@@ -4045,41 +4157,131 @@
             </a:r>
             <a:r>
               <a:rPr lang="nb-NO" dirty="0" err="1"/>
-              <a:t>results</a:t>
+              <a:t>of</a:t>
+            </a:r>
+            <a:r>
+              <a:rPr lang="nb-NO" dirty="0"/>
+              <a:t> </a:t>
+            </a:r>
+            <a:r>
+              <a:rPr lang="nb-NO" dirty="0" err="1"/>
+              <a:t>the</a:t>
+            </a:r>
+            <a:r>
+              <a:rPr lang="nb-NO" dirty="0"/>
+              <a:t> </a:t>
+            </a:r>
+            <a:r>
+              <a:rPr lang="nb-NO" dirty="0" err="1"/>
+              <a:t>assumptions</a:t>
+            </a:r>
+            <a:r>
+              <a:rPr lang="nb-NO" dirty="0"/>
+              <a:t> </a:t>
+            </a:r>
+            <a:r>
+              <a:rPr lang="nb-NO" dirty="0" err="1"/>
+              <a:t>of</a:t>
+            </a:r>
+            <a:r>
+              <a:rPr lang="nb-NO" dirty="0"/>
+              <a:t> </a:t>
+            </a:r>
+            <a:r>
+              <a:rPr lang="nb-NO" dirty="0" err="1"/>
+              <a:t>the</a:t>
+            </a:r>
+            <a:r>
+              <a:rPr lang="nb-NO" dirty="0"/>
+              <a:t> B&amp;R </a:t>
+            </a:r>
+            <a:r>
+              <a:rPr lang="nb-NO" dirty="0" err="1"/>
+              <a:t>framework</a:t>
             </a:r>
             <a:endParaRPr lang="nb-NO" dirty="0"/>
           </a:p>
-        </p:txBody>
-      </p:sp>
-      <p:sp>
-        <p:nvSpPr>
-          <p:cNvPr id="3" name="Content Placeholder 2">
-            <a:extLst>
-              <a:ext uri="{FF2B5EF4-FFF2-40B4-BE49-F238E27FC236}">
-                <a16:creationId xmlns:a16="http://schemas.microsoft.com/office/drawing/2014/main" id="{3D9FD236-4914-52D9-9FD5-3495F556678D}"/>
-              </a:ext>
-            </a:extLst>
-          </p:cNvPr>
-          <p:cNvSpPr>
-            <a:spLocks noGrp="1"/>
-          </p:cNvSpPr>
-          <p:nvPr>
-            <p:ph idx="1"/>
-          </p:nvPr>
-        </p:nvSpPr>
-        <p:spPr/>
-        <p:txBody>
-          <a:bodyPr/>
-          <a:lstStyle/>
-          <a:p>
-            <a:endParaRPr lang="nb-NO"/>
+          <a:p>
+            <a:pPr lvl="1"/>
+            <a:r>
+              <a:rPr lang="nb-NO" dirty="0" err="1"/>
+              <a:t>Could</a:t>
+            </a:r>
+            <a:r>
+              <a:rPr lang="nb-NO" dirty="0"/>
+              <a:t> </a:t>
+            </a:r>
+            <a:r>
+              <a:rPr lang="nb-NO" dirty="0" err="1"/>
+              <a:t>we</a:t>
+            </a:r>
+            <a:r>
+              <a:rPr lang="nb-NO" dirty="0"/>
+              <a:t> still </a:t>
+            </a:r>
+            <a:r>
+              <a:rPr lang="nb-NO" dirty="0" err="1"/>
+              <a:t>use</a:t>
+            </a:r>
+            <a:r>
+              <a:rPr lang="nb-NO" dirty="0"/>
+              <a:t> it, or parts </a:t>
+            </a:r>
+            <a:r>
+              <a:rPr lang="nb-NO" dirty="0" err="1"/>
+              <a:t>of</a:t>
+            </a:r>
+            <a:r>
+              <a:rPr lang="nb-NO" dirty="0"/>
+              <a:t> it?</a:t>
+            </a:r>
+          </a:p>
+          <a:p>
+            <a:pPr lvl="1"/>
+            <a:r>
+              <a:rPr lang="nb-NO" dirty="0" err="1"/>
+              <a:t>Modify</a:t>
+            </a:r>
+            <a:r>
+              <a:rPr lang="nb-NO" dirty="0"/>
+              <a:t> to </a:t>
+            </a:r>
+            <a:r>
+              <a:rPr lang="nb-NO" dirty="0" err="1"/>
+              <a:t>reflect</a:t>
+            </a:r>
+            <a:r>
+              <a:rPr lang="nb-NO" dirty="0"/>
+              <a:t> policy </a:t>
+            </a:r>
+            <a:r>
+              <a:rPr lang="nb-NO" dirty="0" err="1"/>
+              <a:t>instead</a:t>
+            </a:r>
+            <a:r>
+              <a:rPr lang="nb-NO" dirty="0"/>
+              <a:t> </a:t>
+            </a:r>
+            <a:r>
+              <a:rPr lang="nb-NO" dirty="0" err="1"/>
+              <a:t>of</a:t>
+            </a:r>
+            <a:r>
+              <a:rPr lang="nb-NO" dirty="0"/>
+              <a:t> </a:t>
+            </a:r>
+            <a:r>
+              <a:rPr lang="nb-NO" dirty="0" err="1"/>
+              <a:t>profit</a:t>
+            </a:r>
+            <a:endParaRPr lang="nb-NO" dirty="0"/>
           </a:p>
         </p:txBody>
       </p:sp>
     </p:spTree>
     <p:extLst>
       <p:ext uri="{BB962C8B-B14F-4D97-AF65-F5344CB8AC3E}">
-        <p14:creationId xmlns:p14="http://schemas.microsoft.com/office/powerpoint/2010/main" val="2354535279"/>
+        <p14:creationId xmlns:p14="http://schemas.microsoft.com/office/powerpoint/2010/main" val="1617147414"/>
       </p:ext>
     </p:extLst>
   </p:cSld>
@@ -4111,6 +4313,106 @@
           <p:cNvPr id="2" name="Title 1">
             <a:extLst>
               <a:ext uri="{FF2B5EF4-FFF2-40B4-BE49-F238E27FC236}">
+                <a16:creationId xmlns:a16="http://schemas.microsoft.com/office/drawing/2014/main" id="{8F7DE2C9-4028-BD3B-031A-5F24D0CFF9FD}"/>
+              </a:ext>
+            </a:extLst>
+          </p:cNvPr>
+          <p:cNvSpPr>
+            <a:spLocks noGrp="1"/>
+          </p:cNvSpPr>
+          <p:nvPr>
+            <p:ph type="title"/>
+          </p:nvPr>
+        </p:nvSpPr>
+        <p:spPr/>
+        <p:txBody>
+          <a:bodyPr/>
+          <a:lstStyle/>
+          <a:p>
+            <a:r>
+              <a:rPr lang="nb-NO" dirty="0" err="1"/>
+              <a:t>Showcasing</a:t>
+            </a:r>
+            <a:r>
+              <a:rPr lang="nb-NO" dirty="0"/>
+              <a:t> </a:t>
+            </a:r>
+            <a:r>
+              <a:rPr lang="nb-NO" dirty="0" err="1"/>
+              <a:t>some</a:t>
+            </a:r>
+            <a:r>
+              <a:rPr lang="nb-NO" dirty="0"/>
+              <a:t> </a:t>
+            </a:r>
+            <a:r>
+              <a:rPr lang="nb-NO" dirty="0" err="1"/>
+              <a:t>results</a:t>
+            </a:r>
+            <a:endParaRPr lang="nb-NO" dirty="0"/>
+          </a:p>
+        </p:txBody>
+      </p:sp>
+      <p:sp>
+        <p:nvSpPr>
+          <p:cNvPr id="3" name="Content Placeholder 2">
+            <a:extLst>
+              <a:ext uri="{FF2B5EF4-FFF2-40B4-BE49-F238E27FC236}">
+                <a16:creationId xmlns:a16="http://schemas.microsoft.com/office/drawing/2014/main" id="{3D9FD236-4914-52D9-9FD5-3495F556678D}"/>
+              </a:ext>
+            </a:extLst>
+          </p:cNvPr>
+          <p:cNvSpPr>
+            <a:spLocks noGrp="1"/>
+          </p:cNvSpPr>
+          <p:nvPr>
+            <p:ph idx="1"/>
+          </p:nvPr>
+        </p:nvSpPr>
+        <p:spPr/>
+        <p:txBody>
+          <a:bodyPr/>
+          <a:lstStyle/>
+          <a:p>
+            <a:endParaRPr lang="nb-NO"/>
+          </a:p>
+        </p:txBody>
+      </p:sp>
+    </p:spTree>
+    <p:extLst>
+      <p:ext uri="{BB962C8B-B14F-4D97-AF65-F5344CB8AC3E}">
+        <p14:creationId xmlns:p14="http://schemas.microsoft.com/office/powerpoint/2010/main" val="2354535279"/>
+      </p:ext>
+    </p:extLst>
+  </p:cSld>
+  <p:clrMapOvr>
+    <a:masterClrMapping/>
+  </p:clrMapOvr>
+</p:sld>
+</file>
+
+<file path=ppt/slides/slide12.xml><?xml version="1.0" encoding="utf-8"?>
+<p:sld xmlns:a="http://schemas.openxmlformats.org/drawingml/2006/main" xmlns:r="http://schemas.openxmlformats.org/officeDocument/2006/relationships" xmlns:p="http://schemas.openxmlformats.org/presentationml/2006/main">
+  <p:cSld>
+    <p:spTree>
+      <p:nvGrpSpPr>
+        <p:cNvPr id="1" name=""/>
+        <p:cNvGrpSpPr/>
+        <p:nvPr/>
+      </p:nvGrpSpPr>
+      <p:grpSpPr>
+        <a:xfrm>
+          <a:off x="0" y="0"/>
+          <a:ext cx="0" cy="0"/>
+          <a:chOff x="0" y="0"/>
+          <a:chExt cx="0" cy="0"/>
+        </a:xfrm>
+      </p:grpSpPr>
+      <p:sp>
+        <p:nvSpPr>
+          <p:cNvPr id="2" name="Title 1">
+            <a:extLst>
+              <a:ext uri="{FF2B5EF4-FFF2-40B4-BE49-F238E27FC236}">
                 <a16:creationId xmlns:a16="http://schemas.microsoft.com/office/drawing/2014/main" id="{10397AED-9578-36B3-9AF2-2B41FB4267AA}"/>
               </a:ext>
             </a:extLst>
@@ -4249,7 +4551,7 @@
 </p:sld>
 </file>
 
-<file path=ppt/slides/slide12.xml><?xml version="1.0" encoding="utf-8"?>
+<file path=ppt/slides/slide13.xml><?xml version="1.0" encoding="utf-8"?>
 <p:sld xmlns:a="http://schemas.openxmlformats.org/drawingml/2006/main" xmlns:r="http://schemas.openxmlformats.org/officeDocument/2006/relationships" xmlns:p="http://schemas.openxmlformats.org/presentationml/2006/main">
   <p:cSld>
     <p:spTree>
@@ -5175,6 +5477,14 @@
 <file path=ppt/slides/slide6.xml><?xml version="1.0" encoding="utf-8"?>
 <p:sld xmlns:a="http://schemas.openxmlformats.org/drawingml/2006/main" xmlns:r="http://schemas.openxmlformats.org/officeDocument/2006/relationships" xmlns:p="http://schemas.openxmlformats.org/presentationml/2006/main">
   <p:cSld>
+    <p:bg>
+      <p:bgPr>
+        <a:solidFill>
+          <a:schemeClr val="bg1"/>
+        </a:solidFill>
+        <a:effectLst/>
+      </p:bgPr>
+    </p:bg>
     <p:spTree>
       <p:nvGrpSpPr>
         <p:cNvPr id="1" name=""/>
@@ -5191,70 +5501,150 @@
       </p:grpSpPr>
       <p:sp>
         <p:nvSpPr>
-          <p:cNvPr id="4" name="Title 3">
-            <a:extLst>
-              <a:ext uri="{FF2B5EF4-FFF2-40B4-BE49-F238E27FC236}">
-                <a16:creationId xmlns:a16="http://schemas.microsoft.com/office/drawing/2014/main" id="{EA752597-B865-FB65-BB6A-954488D04043}"/>
-              </a:ext>
-            </a:extLst>
-          </p:cNvPr>
-          <p:cNvSpPr>
-            <a:spLocks noGrp="1"/>
-          </p:cNvSpPr>
-          <p:nvPr>
-            <p:ph type="ctrTitle"/>
-          </p:nvPr>
-        </p:nvSpPr>
-        <p:spPr/>
-        <p:txBody>
-          <a:bodyPr/>
-          <a:lstStyle/>
-          <a:p>
-            <a:r>
-              <a:rPr lang="nb-NO" dirty="0" err="1"/>
-              <a:t>Topic</a:t>
-            </a:r>
-            <a:r>
-              <a:rPr lang="nb-NO" dirty="0"/>
-              <a:t> / Research </a:t>
-            </a:r>
-            <a:r>
-              <a:rPr lang="nb-NO" dirty="0" err="1"/>
-              <a:t>Question</a:t>
-            </a:r>
-            <a:endParaRPr lang="nb-NO" dirty="0"/>
-          </a:p>
-        </p:txBody>
-      </p:sp>
-      <p:sp>
-        <p:nvSpPr>
-          <p:cNvPr id="5" name="Subtitle 4">
-            <a:extLst>
-              <a:ext uri="{FF2B5EF4-FFF2-40B4-BE49-F238E27FC236}">
-                <a16:creationId xmlns:a16="http://schemas.microsoft.com/office/drawing/2014/main" id="{98927FA5-0387-B270-4DFC-5F99766521CF}"/>
-              </a:ext>
-            </a:extLst>
-          </p:cNvPr>
-          <p:cNvSpPr>
-            <a:spLocks noGrp="1"/>
-          </p:cNvSpPr>
-          <p:nvPr>
-            <p:ph type="subTitle" idx="1"/>
-          </p:nvPr>
-        </p:nvSpPr>
-        <p:spPr/>
-        <p:txBody>
-          <a:bodyPr/>
-          <a:lstStyle/>
-          <a:p>
-            <a:endParaRPr lang="nb-NO"/>
-          </a:p>
-        </p:txBody>
-      </p:sp>
+          <p:cNvPr id="10" name="Down Arrow 7">
+            <a:extLst>
+              <a:ext uri="{FF2B5EF4-FFF2-40B4-BE49-F238E27FC236}">
+                <a16:creationId xmlns:a16="http://schemas.microsoft.com/office/drawing/2014/main" id="{D4771268-CB57-404A-9271-370EB28F6090}"/>
+              </a:ext>
+              <a:ext uri="{C183D7F6-B498-43B3-948B-1728B52AA6E4}">
+                <adec:decorative xmlns:adec="http://schemas.microsoft.com/office/drawing/2017/decorative" val="1"/>
+              </a:ext>
+            </a:extLst>
+          </p:cNvPr>
+          <p:cNvSpPr>
+            <a:spLocks noGrp="1" noRot="1" noChangeAspect="1" noMove="1" noResize="1" noEditPoints="1" noAdjustHandles="1" noChangeArrowheads="1" noChangeShapeType="1" noTextEdit="1"/>
+          </p:cNvSpPr>
+          <p:nvPr>
+            <p:extLst>
+              <p:ext uri="{386F3935-93C4-4BCD-93E2-E3B085C9AB24}">
+                <p16:designElem xmlns:p16="http://schemas.microsoft.com/office/powerpoint/2015/main" val="1"/>
+              </p:ext>
+            </p:extLst>
+          </p:nvPr>
+        </p:nvSpPr>
+        <p:spPr>
+          <a:xfrm rot="16200000">
+            <a:off x="800100" y="1491343"/>
+            <a:ext cx="3333749" cy="3499103"/>
+          </a:xfrm>
+          <a:prstGeom prst="downArrow">
+            <a:avLst>
+              <a:gd name="adj1" fmla="val 100000"/>
+              <a:gd name="adj2" fmla="val 15788"/>
+            </a:avLst>
+          </a:prstGeom>
+          <a:solidFill>
+            <a:srgbClr val="404040"/>
+          </a:solidFill>
+          <a:ln w="53975">
+            <a:noFill/>
+          </a:ln>
+        </p:spPr>
+        <p:style>
+          <a:lnRef idx="2">
+            <a:schemeClr val="accent1">
+              <a:shade val="50000"/>
+            </a:schemeClr>
+          </a:lnRef>
+          <a:fillRef idx="1">
+            <a:schemeClr val="accent1"/>
+          </a:fillRef>
+          <a:effectRef idx="0">
+            <a:schemeClr val="accent1"/>
+          </a:effectRef>
+          <a:fontRef idx="minor">
+            <a:schemeClr val="lt1"/>
+          </a:fontRef>
+        </p:style>
+        <p:txBody>
+          <a:bodyPr rtlCol="0" anchor="ctr"/>
+          <a:lstStyle/>
+          <a:p>
+            <a:pPr algn="ctr"/>
+            <a:endParaRPr lang="en-US"/>
+          </a:p>
+        </p:txBody>
+      </p:sp>
+      <p:sp>
+        <p:nvSpPr>
+          <p:cNvPr id="2" name="Title 1">
+            <a:extLst>
+              <a:ext uri="{FF2B5EF4-FFF2-40B4-BE49-F238E27FC236}">
+                <a16:creationId xmlns:a16="http://schemas.microsoft.com/office/drawing/2014/main" id="{1C829CF7-8E24-C132-1C37-76865ADB96FE}"/>
+              </a:ext>
+            </a:extLst>
+          </p:cNvPr>
+          <p:cNvSpPr>
+            <a:spLocks noGrp="1"/>
+          </p:cNvSpPr>
+          <p:nvPr>
+            <p:ph type="title"/>
+          </p:nvPr>
+        </p:nvSpPr>
+        <p:spPr>
+          <a:xfrm>
+            <a:off x="1028700" y="1967266"/>
+            <a:ext cx="2628900" cy="2547257"/>
+          </a:xfrm>
+          <a:noFill/>
+        </p:spPr>
+        <p:txBody>
+          <a:bodyPr vert="horz" lIns="91440" tIns="45720" rIns="91440" bIns="45720" rtlCol="0" anchor="ctr">
+            <a:normAutofit/>
+          </a:bodyPr>
+          <a:lstStyle/>
+          <a:p>
+            <a:pPr algn="ctr"/>
+            <a:r>
+              <a:rPr lang="en-US" sz="3600" kern="1200">
+                <a:solidFill>
+                  <a:srgbClr val="FFFFFF"/>
+                </a:solidFill>
+                <a:latin typeface="+mj-lt"/>
+                <a:ea typeface="+mj-ea"/>
+                <a:cs typeface="+mj-cs"/>
+              </a:rPr>
+              <a:t>Variables</a:t>
+            </a:r>
+          </a:p>
+        </p:txBody>
+      </p:sp>
+      <p:pic>
+        <p:nvPicPr>
+          <p:cNvPr id="5" name="Content Placeholder 4" descr="A white text with black text&#10;&#10;AI-generated content may be incorrect.">
+            <a:extLst>
+              <a:ext uri="{FF2B5EF4-FFF2-40B4-BE49-F238E27FC236}">
+                <a16:creationId xmlns:a16="http://schemas.microsoft.com/office/drawing/2014/main" id="{12E88783-F84F-9BC3-12BA-6C2CC84E648B}"/>
+              </a:ext>
+            </a:extLst>
+          </p:cNvPr>
+          <p:cNvPicPr>
+            <a:picLocks noGrp="1" noChangeAspect="1"/>
+          </p:cNvPicPr>
+          <p:nvPr>
+            <p:ph idx="1"/>
+          </p:nvPr>
+        </p:nvPicPr>
+        <p:blipFill>
+          <a:blip r:embed="rId2"/>
+          <a:stretch>
+            <a:fillRect/>
+          </a:stretch>
+        </p:blipFill>
+        <p:spPr>
+          <a:xfrm>
+            <a:off x="4777316" y="1351246"/>
+            <a:ext cx="6780700" cy="4153179"/>
+          </a:xfrm>
+          <a:prstGeom prst="rect">
+            <a:avLst/>
+          </a:prstGeom>
+        </p:spPr>
+      </p:pic>
     </p:spTree>
     <p:extLst>
       <p:ext uri="{BB962C8B-B14F-4D97-AF65-F5344CB8AC3E}">
-        <p14:creationId xmlns:p14="http://schemas.microsoft.com/office/powerpoint/2010/main" val="3088668381"/>
+        <p14:creationId xmlns:p14="http://schemas.microsoft.com/office/powerpoint/2010/main" val="4071188664"/>
       </p:ext>
     </p:extLst>
   </p:cSld>
@@ -5283,18 +5673,18 @@
       </p:grpSpPr>
       <p:sp>
         <p:nvSpPr>
-          <p:cNvPr id="2" name="Title 1">
-            <a:extLst>
-              <a:ext uri="{FF2B5EF4-FFF2-40B4-BE49-F238E27FC236}">
-                <a16:creationId xmlns:a16="http://schemas.microsoft.com/office/drawing/2014/main" id="{D6E08181-FD15-78CC-D56A-C3D5B4331E16}"/>
-              </a:ext>
-            </a:extLst>
-          </p:cNvPr>
-          <p:cNvSpPr>
-            <a:spLocks noGrp="1"/>
-          </p:cNvSpPr>
-          <p:nvPr>
-            <p:ph type="title"/>
+          <p:cNvPr id="4" name="Title 3">
+            <a:extLst>
+              <a:ext uri="{FF2B5EF4-FFF2-40B4-BE49-F238E27FC236}">
+                <a16:creationId xmlns:a16="http://schemas.microsoft.com/office/drawing/2014/main" id="{EA752597-B865-FB65-BB6A-954488D04043}"/>
+              </a:ext>
+            </a:extLst>
+          </p:cNvPr>
+          <p:cNvSpPr>
+            <a:spLocks noGrp="1"/>
+          </p:cNvSpPr>
+          <p:nvPr>
+            <p:ph type="ctrTitle"/>
           </p:nvPr>
         </p:nvSpPr>
         <p:spPr/>
@@ -5303,34 +5693,35 @@
           <a:lstStyle/>
           <a:p>
             <a:r>
-              <a:rPr lang="nb-NO" dirty="0"/>
-              <a:t>Research </a:t>
-            </a:r>
-            <a:r>
-              <a:rPr lang="nb-NO" dirty="0" err="1"/>
-              <a:t>question</a:t>
-            </a:r>
-            <a:r>
-              <a:rPr lang="nb-NO" dirty="0"/>
-              <a:t> </a:t>
-            </a:r>
-          </a:p>
-        </p:txBody>
-      </p:sp>
-      <p:sp>
-        <p:nvSpPr>
-          <p:cNvPr id="3" name="Content Placeholder 2">
-            <a:extLst>
-              <a:ext uri="{FF2B5EF4-FFF2-40B4-BE49-F238E27FC236}">
-                <a16:creationId xmlns:a16="http://schemas.microsoft.com/office/drawing/2014/main" id="{7A4AB9B8-0D4F-4050-030E-6769AC5A4B93}"/>
-              </a:ext>
-            </a:extLst>
-          </p:cNvPr>
-          <p:cNvSpPr>
-            <a:spLocks noGrp="1"/>
-          </p:cNvSpPr>
-          <p:nvPr>
-            <p:ph idx="1"/>
+              <a:rPr lang="nb-NO" dirty="0" err="1"/>
+              <a:t>Topic</a:t>
+            </a:r>
+            <a:r>
+              <a:rPr lang="nb-NO" dirty="0"/>
+              <a:t> / Research </a:t>
+            </a:r>
+            <a:r>
+              <a:rPr lang="nb-NO" dirty="0" err="1"/>
+              <a:t>Question</a:t>
+            </a:r>
+            <a:endParaRPr lang="nb-NO" dirty="0"/>
+          </a:p>
+        </p:txBody>
+      </p:sp>
+      <p:sp>
+        <p:nvSpPr>
+          <p:cNvPr id="5" name="Subtitle 4">
+            <a:extLst>
+              <a:ext uri="{FF2B5EF4-FFF2-40B4-BE49-F238E27FC236}">
+                <a16:creationId xmlns:a16="http://schemas.microsoft.com/office/drawing/2014/main" id="{98927FA5-0387-B270-4DFC-5F99766521CF}"/>
+              </a:ext>
+            </a:extLst>
+          </p:cNvPr>
+          <p:cNvSpPr>
+            <a:spLocks noGrp="1"/>
+          </p:cNvSpPr>
+          <p:nvPr>
+            <p:ph type="subTitle" idx="1"/>
           </p:nvPr>
         </p:nvSpPr>
         <p:spPr/>
@@ -5338,178 +5729,14 @@
           <a:bodyPr/>
           <a:lstStyle/>
           <a:p>
-            <a:r>
-              <a:rPr lang="nb-NO" dirty="0" err="1"/>
-              <a:t>We</a:t>
-            </a:r>
-            <a:r>
-              <a:rPr lang="nb-NO" dirty="0"/>
-              <a:t> </a:t>
-            </a:r>
-            <a:r>
-              <a:rPr lang="nb-NO" dirty="0" err="1"/>
-              <a:t>need</a:t>
-            </a:r>
-            <a:r>
-              <a:rPr lang="nb-NO" dirty="0"/>
-              <a:t> feedback </a:t>
-            </a:r>
-            <a:r>
-              <a:rPr lang="nb-NO" dirty="0" err="1"/>
-              <a:t>on</a:t>
-            </a:r>
-            <a:r>
-              <a:rPr lang="nb-NO" dirty="0"/>
-              <a:t> </a:t>
-            </a:r>
-            <a:r>
-              <a:rPr lang="nb-NO" dirty="0" err="1"/>
-              <a:t>this</a:t>
-            </a:r>
-            <a:r>
-              <a:rPr lang="nb-NO" dirty="0"/>
-              <a:t>, </a:t>
-            </a:r>
-            <a:r>
-              <a:rPr lang="nb-NO" dirty="0" err="1"/>
-              <a:t>but</a:t>
-            </a:r>
-            <a:r>
-              <a:rPr lang="nb-NO" dirty="0"/>
-              <a:t> </a:t>
-            </a:r>
-            <a:r>
-              <a:rPr lang="nb-NO" dirty="0" err="1"/>
-              <a:t>we</a:t>
-            </a:r>
-            <a:r>
-              <a:rPr lang="nb-NO" dirty="0"/>
-              <a:t> have </a:t>
-            </a:r>
-            <a:r>
-              <a:rPr lang="nb-NO" dirty="0" err="1"/>
-              <a:t>some</a:t>
-            </a:r>
-            <a:r>
-              <a:rPr lang="nb-NO" dirty="0"/>
-              <a:t> </a:t>
-            </a:r>
-            <a:r>
-              <a:rPr lang="nb-NO" dirty="0" err="1"/>
-              <a:t>suggestions</a:t>
-            </a:r>
-            <a:r>
-              <a:rPr lang="nb-NO" dirty="0"/>
-              <a:t>:</a:t>
-            </a:r>
-          </a:p>
-          <a:p>
-            <a:pPr lvl="1"/>
-            <a:r>
-              <a:rPr lang="nb-NO" dirty="0" err="1"/>
-              <a:t>Can</a:t>
-            </a:r>
-            <a:r>
-              <a:rPr lang="nb-NO" dirty="0"/>
-              <a:t> </a:t>
-            </a:r>
-            <a:r>
-              <a:rPr lang="nb-NO" dirty="0" err="1"/>
-              <a:t>market</a:t>
-            </a:r>
-            <a:r>
-              <a:rPr lang="nb-NO" dirty="0"/>
-              <a:t> </a:t>
-            </a:r>
-            <a:r>
-              <a:rPr lang="nb-NO" dirty="0" err="1"/>
-              <a:t>entry</a:t>
-            </a:r>
-            <a:r>
-              <a:rPr lang="nb-NO" dirty="0"/>
-              <a:t> </a:t>
-            </a:r>
-            <a:r>
-              <a:rPr lang="nb-NO" dirty="0" err="1"/>
-              <a:t>models</a:t>
-            </a:r>
-            <a:r>
-              <a:rPr lang="nb-NO" dirty="0"/>
-              <a:t> assist Vinmonopolet in </a:t>
-            </a:r>
-            <a:r>
-              <a:rPr lang="nb-NO" dirty="0" err="1"/>
-              <a:t>deciding</a:t>
-            </a:r>
-            <a:r>
-              <a:rPr lang="nb-NO" dirty="0"/>
-              <a:t> </a:t>
-            </a:r>
-            <a:r>
-              <a:rPr lang="nb-NO" dirty="0" err="1"/>
-              <a:t>on</a:t>
-            </a:r>
-            <a:r>
-              <a:rPr lang="nb-NO" dirty="0"/>
-              <a:t> </a:t>
-            </a:r>
-            <a:r>
-              <a:rPr lang="nb-NO" dirty="0" err="1"/>
-              <a:t>their</a:t>
-            </a:r>
-            <a:r>
-              <a:rPr lang="nb-NO" dirty="0"/>
-              <a:t> </a:t>
-            </a:r>
-            <a:r>
-              <a:rPr lang="nb-NO" dirty="0" err="1"/>
-              <a:t>next</a:t>
-            </a:r>
-            <a:r>
-              <a:rPr lang="nb-NO" dirty="0"/>
-              <a:t> store location?</a:t>
-            </a:r>
-          </a:p>
-          <a:p>
-            <a:pPr lvl="1"/>
-            <a:r>
-              <a:rPr lang="en-US" dirty="0"/>
-              <a:t> What is the minimum market size required to support different numbers of </a:t>
-            </a:r>
-            <a:r>
-              <a:rPr lang="en-US" dirty="0" err="1"/>
-              <a:t>Vinmonopolet</a:t>
-            </a:r>
-            <a:r>
-              <a:rPr lang="en-US" dirty="0"/>
-              <a:t> stores, and how do these thresholds change as the number of stores increases?</a:t>
-            </a:r>
-          </a:p>
-          <a:p>
-            <a:pPr lvl="1"/>
-            <a:r>
-              <a:rPr lang="en-US" dirty="0"/>
-              <a:t>To what extent does the presence of cross-border shopping opportunities affect entry thresholds for </a:t>
-            </a:r>
-            <a:r>
-              <a:rPr lang="en-US" dirty="0" err="1"/>
-              <a:t>Vinmonopolet</a:t>
-            </a:r>
-            <a:r>
-              <a:rPr lang="en-US" dirty="0"/>
-              <a:t> stores in border regions, and how should this inform store placement policies?</a:t>
-            </a:r>
-          </a:p>
-          <a:p>
-            <a:pPr lvl="1"/>
-            <a:endParaRPr lang="nb-NO" dirty="0"/>
+            <a:endParaRPr lang="nb-NO"/>
           </a:p>
         </p:txBody>
       </p:sp>
     </p:spTree>
     <p:extLst>
       <p:ext uri="{BB962C8B-B14F-4D97-AF65-F5344CB8AC3E}">
-        <p14:creationId xmlns:p14="http://schemas.microsoft.com/office/powerpoint/2010/main" val="216445117"/>
+        <p14:creationId xmlns:p14="http://schemas.microsoft.com/office/powerpoint/2010/main" val="3088668381"/>
       </p:ext>
     </p:extLst>
   </p:cSld>
@@ -5538,18 +5765,18 @@
       </p:grpSpPr>
       <p:sp>
         <p:nvSpPr>
-          <p:cNvPr id="6" name="Title 5">
-            <a:extLst>
-              <a:ext uri="{FF2B5EF4-FFF2-40B4-BE49-F238E27FC236}">
-                <a16:creationId xmlns:a16="http://schemas.microsoft.com/office/drawing/2014/main" id="{4D92AF9F-815E-ADC7-8F68-211BEDD7FA01}"/>
-              </a:ext>
-            </a:extLst>
-          </p:cNvPr>
-          <p:cNvSpPr>
-            <a:spLocks noGrp="1"/>
-          </p:cNvSpPr>
-          <p:nvPr>
-            <p:ph type="ctrTitle"/>
+          <p:cNvPr id="2" name="Title 1">
+            <a:extLst>
+              <a:ext uri="{FF2B5EF4-FFF2-40B4-BE49-F238E27FC236}">
+                <a16:creationId xmlns:a16="http://schemas.microsoft.com/office/drawing/2014/main" id="{D6E08181-FD15-78CC-D56A-C3D5B4331E16}"/>
+              </a:ext>
+            </a:extLst>
+          </p:cNvPr>
+          <p:cNvSpPr>
+            <a:spLocks noGrp="1"/>
+          </p:cNvSpPr>
+          <p:nvPr>
+            <p:ph type="title"/>
           </p:nvPr>
         </p:nvSpPr>
         <p:spPr/>
@@ -5558,85 +5785,213 @@
           <a:lstStyle/>
           <a:p>
             <a:r>
-              <a:rPr lang="nb-NO" dirty="0" err="1"/>
-              <a:t>Empirical</a:t>
+              <a:rPr lang="nb-NO" dirty="0"/>
+              <a:t>Research </a:t>
+            </a:r>
+            <a:r>
+              <a:rPr lang="nb-NO" dirty="0" err="1"/>
+              <a:t>question</a:t>
             </a:r>
             <a:r>
               <a:rPr lang="nb-NO" dirty="0"/>
               <a:t> </a:t>
             </a:r>
-            <a:r>
-              <a:rPr lang="nb-NO" dirty="0" err="1"/>
-              <a:t>model</a:t>
-            </a:r>
+          </a:p>
+        </p:txBody>
+      </p:sp>
+      <p:sp>
+        <p:nvSpPr>
+          <p:cNvPr id="3" name="Content Placeholder 2">
+            <a:extLst>
+              <a:ext uri="{FF2B5EF4-FFF2-40B4-BE49-F238E27FC236}">
+                <a16:creationId xmlns:a16="http://schemas.microsoft.com/office/drawing/2014/main" id="{7A4AB9B8-0D4F-4050-030E-6769AC5A4B93}"/>
+              </a:ext>
+            </a:extLst>
+          </p:cNvPr>
+          <p:cNvSpPr>
+            <a:spLocks noGrp="1"/>
+          </p:cNvSpPr>
+          <p:nvPr>
+            <p:ph idx="1"/>
+          </p:nvPr>
+        </p:nvSpPr>
+        <p:spPr/>
+        <p:txBody>
+          <a:bodyPr/>
+          <a:lstStyle/>
+          <a:p>
+            <a:r>
+              <a:rPr lang="nb-NO" dirty="0" err="1"/>
+              <a:t>We</a:t>
+            </a:r>
+            <a:r>
+              <a:rPr lang="nb-NO" dirty="0"/>
+              <a:t> </a:t>
+            </a:r>
+            <a:r>
+              <a:rPr lang="nb-NO" dirty="0" err="1"/>
+              <a:t>need</a:t>
+            </a:r>
+            <a:r>
+              <a:rPr lang="nb-NO" dirty="0"/>
+              <a:t> feedback </a:t>
+            </a:r>
+            <a:r>
+              <a:rPr lang="nb-NO" dirty="0" err="1"/>
+              <a:t>on</a:t>
+            </a:r>
+            <a:r>
+              <a:rPr lang="nb-NO" dirty="0"/>
+              <a:t> </a:t>
+            </a:r>
+            <a:r>
+              <a:rPr lang="nb-NO" dirty="0" err="1"/>
+              <a:t>this</a:t>
+            </a:r>
+            <a:r>
+              <a:rPr lang="nb-NO" dirty="0"/>
+              <a:t>, </a:t>
+            </a:r>
+            <a:r>
+              <a:rPr lang="nb-NO" dirty="0" err="1"/>
+              <a:t>but</a:t>
+            </a:r>
+            <a:r>
+              <a:rPr lang="nb-NO" dirty="0"/>
+              <a:t> </a:t>
+            </a:r>
+            <a:r>
+              <a:rPr lang="nb-NO" dirty="0" err="1"/>
+              <a:t>we</a:t>
+            </a:r>
+            <a:r>
+              <a:rPr lang="nb-NO" dirty="0"/>
+              <a:t> have </a:t>
+            </a:r>
+            <a:r>
+              <a:rPr lang="nb-NO" dirty="0" err="1"/>
+              <a:t>some</a:t>
+            </a:r>
+            <a:r>
+              <a:rPr lang="nb-NO" dirty="0"/>
+              <a:t> </a:t>
+            </a:r>
+            <a:r>
+              <a:rPr lang="nb-NO" dirty="0" err="1"/>
+              <a:t>suggestions</a:t>
+            </a:r>
+            <a:r>
+              <a:rPr lang="nb-NO" dirty="0"/>
+              <a:t>:</a:t>
+            </a:r>
+          </a:p>
+          <a:p>
+            <a:pPr lvl="1"/>
+            <a:r>
+              <a:rPr lang="nb-NO" dirty="0" err="1"/>
+              <a:t>Can</a:t>
+            </a:r>
+            <a:r>
+              <a:rPr lang="nb-NO" dirty="0"/>
+              <a:t> </a:t>
+            </a:r>
+            <a:r>
+              <a:rPr lang="nb-NO" dirty="0" err="1"/>
+              <a:t>market</a:t>
+            </a:r>
+            <a:r>
+              <a:rPr lang="nb-NO" dirty="0"/>
+              <a:t> </a:t>
+            </a:r>
+            <a:r>
+              <a:rPr lang="nb-NO" dirty="0" err="1"/>
+              <a:t>entry</a:t>
+            </a:r>
+            <a:r>
+              <a:rPr lang="nb-NO" dirty="0"/>
+              <a:t> </a:t>
+            </a:r>
+            <a:r>
+              <a:rPr lang="nb-NO" dirty="0" err="1"/>
+              <a:t>models</a:t>
+            </a:r>
+            <a:r>
+              <a:rPr lang="nb-NO" dirty="0"/>
+              <a:t> assist Vinmonopolet in </a:t>
+            </a:r>
+            <a:r>
+              <a:rPr lang="nb-NO" dirty="0" err="1"/>
+              <a:t>deciding</a:t>
+            </a:r>
+            <a:r>
+              <a:rPr lang="nb-NO" dirty="0"/>
+              <a:t> </a:t>
+            </a:r>
+            <a:r>
+              <a:rPr lang="nb-NO" dirty="0" err="1"/>
+              <a:t>on</a:t>
+            </a:r>
+            <a:r>
+              <a:rPr lang="nb-NO" dirty="0"/>
+              <a:t> </a:t>
+            </a:r>
+            <a:r>
+              <a:rPr lang="nb-NO" dirty="0" err="1"/>
+              <a:t>their</a:t>
+            </a:r>
+            <a:r>
+              <a:rPr lang="nb-NO" dirty="0"/>
+              <a:t> </a:t>
+            </a:r>
+            <a:r>
+              <a:rPr lang="nb-NO" dirty="0" err="1"/>
+              <a:t>next</a:t>
+            </a:r>
+            <a:r>
+              <a:rPr lang="nb-NO" dirty="0"/>
+              <a:t> store location?</a:t>
+            </a:r>
+          </a:p>
+          <a:p>
+            <a:pPr lvl="1"/>
+            <a:r>
+              <a:rPr lang="en-US" dirty="0"/>
+              <a:t> What is the minimum market size required to support different numbers of </a:t>
+            </a:r>
+            <a:r>
+              <a:rPr lang="en-US" dirty="0" err="1"/>
+              <a:t>Vinmonopolet</a:t>
+            </a:r>
+            <a:r>
+              <a:rPr lang="en-US" dirty="0"/>
+              <a:t> stores, and how do these thresholds change as the number of stores increases?</a:t>
+            </a:r>
+          </a:p>
+          <a:p>
+            <a:pPr lvl="1"/>
+            <a:r>
+              <a:rPr lang="en-US" dirty="0"/>
+              <a:t>To what extent does the presence of cross-border shopping opportunities affect entry thresholds for </a:t>
+            </a:r>
+            <a:r>
+              <a:rPr lang="en-US" dirty="0" err="1"/>
+              <a:t>Vinmonopolet</a:t>
+            </a:r>
+            <a:r>
+              <a:rPr lang="en-US" dirty="0"/>
+              <a:t> stores in border regions, and how should this inform store placement policies?</a:t>
+            </a:r>
+          </a:p>
+          <a:p>
+            <a:pPr lvl="1"/>
             <a:endParaRPr lang="nb-NO" dirty="0"/>
-          </a:p>
-        </p:txBody>
-      </p:sp>
-      <p:sp>
-        <p:nvSpPr>
-          <p:cNvPr id="7" name="Subtitle 6">
-            <a:extLst>
-              <a:ext uri="{FF2B5EF4-FFF2-40B4-BE49-F238E27FC236}">
-                <a16:creationId xmlns:a16="http://schemas.microsoft.com/office/drawing/2014/main" id="{6804B1B4-4E4B-2487-3EB7-78C16D8E92A6}"/>
-              </a:ext>
-            </a:extLst>
-          </p:cNvPr>
-          <p:cNvSpPr>
-            <a:spLocks noGrp="1"/>
-          </p:cNvSpPr>
-          <p:nvPr>
-            <p:ph type="subTitle" idx="1"/>
-          </p:nvPr>
-        </p:nvSpPr>
-        <p:spPr/>
-        <p:txBody>
-          <a:bodyPr/>
-          <a:lstStyle/>
-          <a:p>
-            <a:r>
-              <a:rPr lang="nb-NO" dirty="0"/>
-              <a:t>Are </a:t>
-            </a:r>
-            <a:r>
-              <a:rPr lang="nb-NO" dirty="0" err="1"/>
-              <a:t>we</a:t>
-            </a:r>
-            <a:r>
-              <a:rPr lang="nb-NO" dirty="0"/>
-              <a:t> </a:t>
-            </a:r>
-            <a:r>
-              <a:rPr lang="nb-NO" dirty="0" err="1"/>
-              <a:t>using</a:t>
-            </a:r>
-            <a:r>
-              <a:rPr lang="nb-NO" dirty="0"/>
-              <a:t> </a:t>
-            </a:r>
-            <a:r>
-              <a:rPr lang="nb-NO" dirty="0" err="1"/>
-              <a:t>the</a:t>
-            </a:r>
-            <a:r>
-              <a:rPr lang="nb-NO" dirty="0"/>
-              <a:t> right </a:t>
-            </a:r>
-            <a:r>
-              <a:rPr lang="nb-NO" dirty="0" err="1"/>
-              <a:t>one</a:t>
-            </a:r>
-            <a:r>
-              <a:rPr lang="nb-NO" dirty="0"/>
-              <a:t>?</a:t>
-            </a:r>
           </a:p>
         </p:txBody>
       </p:sp>
     </p:spTree>
     <p:extLst>
       <p:ext uri="{BB962C8B-B14F-4D97-AF65-F5344CB8AC3E}">
-        <p14:creationId xmlns:p14="http://schemas.microsoft.com/office/powerpoint/2010/main" val="2984399082"/>
+        <p14:creationId xmlns:p14="http://schemas.microsoft.com/office/powerpoint/2010/main" val="216445117"/>
       </p:ext>
     </p:extLst>
   </p:cSld>
@@ -5665,18 +6020,18 @@
       </p:grpSpPr>
       <p:sp>
         <p:nvSpPr>
-          <p:cNvPr id="2" name="Title 1">
-            <a:extLst>
-              <a:ext uri="{FF2B5EF4-FFF2-40B4-BE49-F238E27FC236}">
-                <a16:creationId xmlns:a16="http://schemas.microsoft.com/office/drawing/2014/main" id="{EDEC6D8A-B3ED-C6D2-8995-11FFFA77FFB4}"/>
-              </a:ext>
-            </a:extLst>
-          </p:cNvPr>
-          <p:cNvSpPr>
-            <a:spLocks noGrp="1"/>
-          </p:cNvSpPr>
-          <p:nvPr>
-            <p:ph type="title"/>
+          <p:cNvPr id="6" name="Title 5">
+            <a:extLst>
+              <a:ext uri="{FF2B5EF4-FFF2-40B4-BE49-F238E27FC236}">
+                <a16:creationId xmlns:a16="http://schemas.microsoft.com/office/drawing/2014/main" id="{4D92AF9F-815E-ADC7-8F68-211BEDD7FA01}"/>
+              </a:ext>
+            </a:extLst>
+          </p:cNvPr>
+          <p:cNvSpPr>
+            <a:spLocks noGrp="1"/>
+          </p:cNvSpPr>
+          <p:nvPr>
+            <p:ph type="ctrTitle"/>
           </p:nvPr>
         </p:nvSpPr>
         <p:spPr/>
@@ -5696,35 +6051,24 @@
               <a:rPr lang="nb-NO" dirty="0" err="1"/>
               <a:t>model</a:t>
             </a:r>
-            <a:r>
-              <a:rPr lang="nb-NO" dirty="0"/>
-              <a:t>: </a:t>
-            </a:r>
-            <a:r>
-              <a:rPr lang="nb-NO" dirty="0" err="1"/>
-              <a:t>Bresnahan</a:t>
-            </a:r>
-            <a:r>
-              <a:rPr lang="nb-NO" dirty="0"/>
-              <a:t> &amp; Reiss</a:t>
-            </a:r>
-          </a:p>
-        </p:txBody>
-      </p:sp>
-      <p:sp>
-        <p:nvSpPr>
-          <p:cNvPr id="3" name="Content Placeholder 2">
-            <a:extLst>
-              <a:ext uri="{FF2B5EF4-FFF2-40B4-BE49-F238E27FC236}">
-                <a16:creationId xmlns:a16="http://schemas.microsoft.com/office/drawing/2014/main" id="{CE41D449-0059-29E8-257A-B1EEA512E592}"/>
-              </a:ext>
-            </a:extLst>
-          </p:cNvPr>
-          <p:cNvSpPr>
-            <a:spLocks noGrp="1"/>
-          </p:cNvSpPr>
-          <p:nvPr>
-            <p:ph idx="1"/>
+            <a:endParaRPr lang="nb-NO" dirty="0"/>
+          </a:p>
+        </p:txBody>
+      </p:sp>
+      <p:sp>
+        <p:nvSpPr>
+          <p:cNvPr id="7" name="Subtitle 6">
+            <a:extLst>
+              <a:ext uri="{FF2B5EF4-FFF2-40B4-BE49-F238E27FC236}">
+                <a16:creationId xmlns:a16="http://schemas.microsoft.com/office/drawing/2014/main" id="{6804B1B4-4E4B-2487-3EB7-78C16D8E92A6}"/>
+              </a:ext>
+            </a:extLst>
+          </p:cNvPr>
+          <p:cNvSpPr>
+            <a:spLocks noGrp="1"/>
+          </p:cNvSpPr>
+          <p:nvPr>
+            <p:ph type="subTitle" idx="1"/>
           </p:nvPr>
         </p:nvSpPr>
         <p:spPr/>
@@ -5734,11 +6078,11 @@
           <a:p>
             <a:r>
               <a:rPr lang="nb-NO" dirty="0"/>
-              <a:t>The </a:t>
-            </a:r>
-            <a:r>
-              <a:rPr lang="nb-NO" dirty="0" err="1"/>
-              <a:t>alcohol</a:t>
+              <a:t>Are </a:t>
+            </a:r>
+            <a:r>
+              <a:rPr lang="nb-NO" dirty="0" err="1"/>
+              <a:t>we</a:t>
             </a:r>
             <a:r>
               <a:rPr lang="nb-NO" dirty="0"/>
@@ -5746,15 +6090,7 @@
             </a:r>
             <a:r>
               <a:rPr lang="nb-NO" dirty="0" err="1"/>
-              <a:t>market</a:t>
-            </a:r>
-            <a:r>
-              <a:rPr lang="nb-NO" dirty="0"/>
-              <a:t> in Norway </a:t>
-            </a:r>
-            <a:r>
-              <a:rPr lang="nb-NO" dirty="0" err="1"/>
-              <a:t>violates</a:t>
+              <a:t>using</a:t>
             </a:r>
             <a:r>
               <a:rPr lang="nb-NO" dirty="0"/>
@@ -5762,139 +6098,27 @@
             </a:r>
             <a:r>
               <a:rPr lang="nb-NO" dirty="0" err="1"/>
-              <a:t>some</a:t>
-            </a:r>
-            <a:r>
-              <a:rPr lang="nb-NO" dirty="0"/>
-              <a:t> </a:t>
-            </a:r>
-            <a:r>
-              <a:rPr lang="nb-NO" dirty="0" err="1"/>
-              <a:t>of</a:t>
-            </a:r>
-            <a:r>
-              <a:rPr lang="nb-NO" dirty="0"/>
-              <a:t> </a:t>
-            </a:r>
-            <a:r>
-              <a:rPr lang="nb-NO" dirty="0" err="1"/>
               <a:t>the</a:t>
             </a:r>
             <a:r>
               <a:rPr lang="nb-NO" dirty="0"/>
-              <a:t> </a:t>
-            </a:r>
-            <a:r>
-              <a:rPr lang="nb-NO" dirty="0" err="1"/>
-              <a:t>assumptions</a:t>
-            </a:r>
-            <a:r>
-              <a:rPr lang="nb-NO" dirty="0"/>
-              <a:t> </a:t>
-            </a:r>
-            <a:r>
-              <a:rPr lang="nb-NO" dirty="0" err="1"/>
-              <a:t>of</a:t>
-            </a:r>
-            <a:r>
-              <a:rPr lang="nb-NO" dirty="0"/>
-              <a:t> </a:t>
-            </a:r>
-            <a:r>
-              <a:rPr lang="nb-NO" dirty="0" err="1"/>
-              <a:t>the</a:t>
-            </a:r>
-            <a:r>
-              <a:rPr lang="nb-NO" dirty="0"/>
-              <a:t> B&amp;R </a:t>
-            </a:r>
-            <a:r>
-              <a:rPr lang="nb-NO" dirty="0" err="1"/>
-              <a:t>framework</a:t>
-            </a:r>
-            <a:endParaRPr lang="nb-NO" dirty="0"/>
-          </a:p>
-          <a:p>
-            <a:pPr lvl="1"/>
-            <a:r>
-              <a:rPr lang="nb-NO" dirty="0" err="1"/>
-              <a:t>Could</a:t>
-            </a:r>
-            <a:r>
-              <a:rPr lang="nb-NO" dirty="0"/>
-              <a:t> </a:t>
-            </a:r>
-            <a:r>
-              <a:rPr lang="nb-NO" dirty="0" err="1"/>
-              <a:t>we</a:t>
-            </a:r>
-            <a:r>
-              <a:rPr lang="nb-NO" dirty="0"/>
-              <a:t> still </a:t>
-            </a:r>
-            <a:r>
-              <a:rPr lang="nb-NO" dirty="0" err="1"/>
-              <a:t>use</a:t>
-            </a:r>
-            <a:r>
-              <a:rPr lang="nb-NO" dirty="0"/>
-              <a:t> it, or parts </a:t>
-            </a:r>
-            <a:r>
-              <a:rPr lang="nb-NO" dirty="0" err="1"/>
-              <a:t>of</a:t>
-            </a:r>
-            <a:r>
-              <a:rPr lang="nb-NO" dirty="0"/>
-              <a:t> it?</a:t>
-            </a:r>
-          </a:p>
-          <a:p>
-            <a:pPr lvl="1"/>
-            <a:r>
-              <a:rPr lang="nb-NO" dirty="0" err="1"/>
-              <a:t>Modify</a:t>
-            </a:r>
-            <a:r>
-              <a:rPr lang="nb-NO" dirty="0"/>
-              <a:t> to </a:t>
-            </a:r>
-            <a:r>
-              <a:rPr lang="nb-NO" dirty="0" err="1"/>
-              <a:t>reflect</a:t>
-            </a:r>
-            <a:r>
-              <a:rPr lang="nb-NO" dirty="0"/>
-              <a:t> policy </a:t>
-            </a:r>
-            <a:r>
-              <a:rPr lang="nb-NO" dirty="0" err="1"/>
-              <a:t>instead</a:t>
-            </a:r>
-            <a:r>
-              <a:rPr lang="nb-NO" dirty="0"/>
-              <a:t> </a:t>
-            </a:r>
-            <a:r>
-              <a:rPr lang="nb-NO" dirty="0" err="1"/>
-              <a:t>of</a:t>
-            </a:r>
-            <a:r>
-              <a:rPr lang="nb-NO" dirty="0"/>
-              <a:t> </a:t>
-            </a:r>
-            <a:r>
-              <a:rPr lang="nb-NO" dirty="0" err="1"/>
-              <a:t>profit</a:t>
-            </a:r>
-            <a:endParaRPr lang="nb-NO" dirty="0"/>
+              <a:t> right </a:t>
+            </a:r>
+            <a:r>
+              <a:rPr lang="nb-NO" dirty="0" err="1"/>
+              <a:t>one</a:t>
+            </a:r>
+            <a:r>
+              <a:rPr lang="nb-NO" dirty="0"/>
+              <a:t>?</a:t>
+            </a:r>
           </a:p>
         </p:txBody>
       </p:sp>
     </p:spTree>
     <p:extLst>
       <p:ext uri="{BB962C8B-B14F-4D97-AF65-F5344CB8AC3E}">
-        <p14:creationId xmlns:p14="http://schemas.microsoft.com/office/powerpoint/2010/main" val="1617147414"/>
+        <p14:creationId xmlns:p14="http://schemas.microsoft.com/office/powerpoint/2010/main" val="2984399082"/>
       </p:ext>
     </p:extLst>
   </p:cSld>

</xml_diff>

<commit_message>
Update BAN440 – Term Paper Idea.pptx
</commit_message>
<xml_diff>
--- a/BAN440 – Term Paper Idea.pptx
+++ b/BAN440 – Term Paper Idea.pptx
@@ -7,18 +7,19 @@
   <p:sldIdLst>
     <p:sldId id="256" r:id="rId2"/>
     <p:sldId id="257" r:id="rId3"/>
-    <p:sldId id="259" r:id="rId4"/>
-    <p:sldId id="258" r:id="rId5"/>
-    <p:sldId id="260" r:id="rId6"/>
-    <p:sldId id="268" r:id="rId7"/>
-    <p:sldId id="269" r:id="rId8"/>
-    <p:sldId id="264" r:id="rId9"/>
-    <p:sldId id="261" r:id="rId10"/>
-    <p:sldId id="265" r:id="rId11"/>
-    <p:sldId id="262" r:id="rId12"/>
-    <p:sldId id="266" r:id="rId13"/>
-    <p:sldId id="263" r:id="rId14"/>
-    <p:sldId id="267" r:id="rId15"/>
+    <p:sldId id="270" r:id="rId4"/>
+    <p:sldId id="259" r:id="rId5"/>
+    <p:sldId id="258" r:id="rId6"/>
+    <p:sldId id="260" r:id="rId7"/>
+    <p:sldId id="268" r:id="rId8"/>
+    <p:sldId id="269" r:id="rId9"/>
+    <p:sldId id="264" r:id="rId10"/>
+    <p:sldId id="261" r:id="rId11"/>
+    <p:sldId id="265" r:id="rId12"/>
+    <p:sldId id="262" r:id="rId13"/>
+    <p:sldId id="266" r:id="rId14"/>
+    <p:sldId id="263" r:id="rId15"/>
+    <p:sldId id="267" r:id="rId16"/>
   </p:sldIdLst>
   <p:sldSz cx="12192000" cy="6858000"/>
   <p:notesSz cx="6858000" cy="9144000"/>
@@ -124,6 +125,7 @@
           <p14:sldIdLst>
             <p14:sldId id="256"/>
             <p14:sldId id="257"/>
+            <p14:sldId id="270"/>
             <p14:sldId id="259"/>
             <p14:sldId id="258"/>
             <p14:sldId id="260"/>
@@ -150,7 +152,7 @@
 <file path=ppt/revisionInfo.xml><?xml version="1.0" encoding="utf-8"?>
 <p1510:revInfo xmlns:a="http://schemas.openxmlformats.org/drawingml/2006/main" xmlns:r="http://schemas.openxmlformats.org/officeDocument/2006/relationships" xmlns:p1510="http://schemas.microsoft.com/office/powerpoint/2015/10/main">
   <p1510:revLst>
-    <p1510:client id="{0E703ED3-66B7-498C-B9F6-DC315DA9A883}" v="3" dt="2025-03-26T09:46:41.094"/>
+    <p1510:client id="{0E703ED3-66B7-498C-B9F6-DC315DA9A883}" v="5" dt="2025-03-26T10:34:52.938"/>
   </p1510:revLst>
 </p1510:revInfo>
 </file>
@@ -516,13 +518,13 @@
   </pc:docChgLst>
   <pc:docChgLst>
     <pc:chgData name="Øyvind Odland" userId="9884e02f7050b840" providerId="LiveId" clId="{0E703ED3-66B7-498C-B9F6-DC315DA9A883}"/>
-    <pc:docChg chg="undo custSel addSld delSld modSld modSection">
-      <pc:chgData name="Øyvind Odland" userId="9884e02f7050b840" providerId="LiveId" clId="{0E703ED3-66B7-498C-B9F6-DC315DA9A883}" dt="2025-03-26T10:00:52.703" v="277" actId="2696"/>
+    <pc:docChg chg="undo custSel addSld delSld modSld sldOrd modSection">
+      <pc:chgData name="Øyvind Odland" userId="9884e02f7050b840" providerId="LiveId" clId="{0E703ED3-66B7-498C-B9F6-DC315DA9A883}" dt="2025-03-26T10:35:31.970" v="532" actId="14100"/>
       <pc:docMkLst>
         <pc:docMk/>
       </pc:docMkLst>
       <pc:sldChg chg="addSp delSp modSp new mod setBg">
-        <pc:chgData name="Øyvind Odland" userId="9884e02f7050b840" providerId="LiveId" clId="{0E703ED3-66B7-498C-B9F6-DC315DA9A883}" dt="2025-03-26T09:50:02.990" v="274" actId="20577"/>
+        <pc:chgData name="Øyvind Odland" userId="9884e02f7050b840" providerId="LiveId" clId="{0E703ED3-66B7-498C-B9F6-DC315DA9A883}" dt="2025-03-26T10:35:31.970" v="532" actId="14100"/>
         <pc:sldMkLst>
           <pc:docMk/>
           <pc:sldMk cId="3529371865" sldId="268"/>
@@ -616,7 +618,7 @@
           </ac:spMkLst>
         </pc:spChg>
         <pc:spChg chg="add mod">
-          <ac:chgData name="Øyvind Odland" userId="9884e02f7050b840" providerId="LiveId" clId="{0E703ED3-66B7-498C-B9F6-DC315DA9A883}" dt="2025-03-26T09:50:02.990" v="274" actId="20577"/>
+          <ac:chgData name="Øyvind Odland" userId="9884e02f7050b840" providerId="LiveId" clId="{0E703ED3-66B7-498C-B9F6-DC315DA9A883}" dt="2025-03-26T10:35:31.970" v="532" actId="14100"/>
           <ac:spMkLst>
             <pc:docMk/>
             <pc:sldMk cId="3529371865" sldId="268"/>
@@ -638,6 +640,69 @@
           <pc:docMk/>
           <pc:sldMk cId="4218672297" sldId="269"/>
         </pc:sldMkLst>
+      </pc:sldChg>
+      <pc:sldChg chg="addSp modSp new mod ord setBg">
+        <pc:chgData name="Øyvind Odland" userId="9884e02f7050b840" providerId="LiveId" clId="{0E703ED3-66B7-498C-B9F6-DC315DA9A883}" dt="2025-03-26T10:35:18.271" v="530"/>
+        <pc:sldMkLst>
+          <pc:docMk/>
+          <pc:sldMk cId="4048774490" sldId="270"/>
+        </pc:sldMkLst>
+        <pc:spChg chg="mod">
+          <ac:chgData name="Øyvind Odland" userId="9884e02f7050b840" providerId="LiveId" clId="{0E703ED3-66B7-498C-B9F6-DC315DA9A883}" dt="2025-03-26T10:34:55.567" v="528" actId="26606"/>
+          <ac:spMkLst>
+            <pc:docMk/>
+            <pc:sldMk cId="4048774490" sldId="270"/>
+            <ac:spMk id="2" creationId="{58BEC9C7-917F-944A-4D33-396D64C26F81}"/>
+          </ac:spMkLst>
+        </pc:spChg>
+        <pc:spChg chg="mod ord">
+          <ac:chgData name="Øyvind Odland" userId="9884e02f7050b840" providerId="LiveId" clId="{0E703ED3-66B7-498C-B9F6-DC315DA9A883}" dt="2025-03-26T10:34:55.567" v="528" actId="26606"/>
+          <ac:spMkLst>
+            <pc:docMk/>
+            <pc:sldMk cId="4048774490" sldId="270"/>
+            <ac:spMk id="3" creationId="{10E9193C-458A-D503-2225-877AA9272DCF}"/>
+          </ac:spMkLst>
+        </pc:spChg>
+        <pc:spChg chg="add">
+          <ac:chgData name="Øyvind Odland" userId="9884e02f7050b840" providerId="LiveId" clId="{0E703ED3-66B7-498C-B9F6-DC315DA9A883}" dt="2025-03-26T10:34:55.567" v="528" actId="26606"/>
+          <ac:spMkLst>
+            <pc:docMk/>
+            <pc:sldMk cId="4048774490" sldId="270"/>
+            <ac:spMk id="1031" creationId="{84ECDE7A-6944-466D-8FFE-149A29BA6BAE}"/>
+          </ac:spMkLst>
+        </pc:spChg>
+        <pc:spChg chg="add">
+          <ac:chgData name="Øyvind Odland" userId="9884e02f7050b840" providerId="LiveId" clId="{0E703ED3-66B7-498C-B9F6-DC315DA9A883}" dt="2025-03-26T10:34:55.567" v="528" actId="26606"/>
+          <ac:spMkLst>
+            <pc:docMk/>
+            <pc:sldMk cId="4048774490" sldId="270"/>
+            <ac:spMk id="1033" creationId="{B3420082-9415-44EC-802E-C77D71D59C57}"/>
+          </ac:spMkLst>
+        </pc:spChg>
+        <pc:spChg chg="add">
+          <ac:chgData name="Øyvind Odland" userId="9884e02f7050b840" providerId="LiveId" clId="{0E703ED3-66B7-498C-B9F6-DC315DA9A883}" dt="2025-03-26T10:34:55.567" v="528" actId="26606"/>
+          <ac:spMkLst>
+            <pc:docMk/>
+            <pc:sldMk cId="4048774490" sldId="270"/>
+            <ac:spMk id="1035" creationId="{55A52C45-1FCB-4636-A80F-2849B8226C01}"/>
+          </ac:spMkLst>
+        </pc:spChg>
+        <pc:spChg chg="add">
+          <ac:chgData name="Øyvind Odland" userId="9884e02f7050b840" providerId="LiveId" clId="{0E703ED3-66B7-498C-B9F6-DC315DA9A883}" dt="2025-03-26T10:34:55.567" v="528" actId="26606"/>
+          <ac:spMkLst>
+            <pc:docMk/>
+            <pc:sldMk cId="4048774490" sldId="270"/>
+            <ac:spMk id="1037" creationId="{768EB4DD-3704-43AD-92B3-C4E0C6EA92CB}"/>
+          </ac:spMkLst>
+        </pc:spChg>
+        <pc:picChg chg="add mod">
+          <ac:chgData name="Øyvind Odland" userId="9884e02f7050b840" providerId="LiveId" clId="{0E703ED3-66B7-498C-B9F6-DC315DA9A883}" dt="2025-03-26T10:34:55.567" v="528" actId="26606"/>
+          <ac:picMkLst>
+            <pc:docMk/>
+            <pc:sldMk cId="4048774490" sldId="270"/>
+            <ac:picMk id="1026" creationId="{A685B1E2-F26E-4E1D-A853-60031C33ACBB}"/>
+          </ac:picMkLst>
+        </pc:picChg>
       </pc:sldChg>
     </pc:docChg>
   </pc:docChgLst>
@@ -4189,18 +4254,18 @@
       </p:grpSpPr>
       <p:sp>
         <p:nvSpPr>
-          <p:cNvPr id="6" name="Title 5">
-            <a:extLst>
-              <a:ext uri="{FF2B5EF4-FFF2-40B4-BE49-F238E27FC236}">
-                <a16:creationId xmlns:a16="http://schemas.microsoft.com/office/drawing/2014/main" id="{4D92AF9F-815E-ADC7-8F68-211BEDD7FA01}"/>
-              </a:ext>
-            </a:extLst>
-          </p:cNvPr>
-          <p:cNvSpPr>
-            <a:spLocks noGrp="1"/>
-          </p:cNvSpPr>
-          <p:nvPr>
-            <p:ph type="ctrTitle"/>
+          <p:cNvPr id="2" name="Title 1">
+            <a:extLst>
+              <a:ext uri="{FF2B5EF4-FFF2-40B4-BE49-F238E27FC236}">
+                <a16:creationId xmlns:a16="http://schemas.microsoft.com/office/drawing/2014/main" id="{D6E08181-FD15-78CC-D56A-C3D5B4331E16}"/>
+              </a:ext>
+            </a:extLst>
+          </p:cNvPr>
+          <p:cNvSpPr>
+            <a:spLocks noGrp="1"/>
+          </p:cNvSpPr>
+          <p:nvPr>
+            <p:ph type="title"/>
           </p:nvPr>
         </p:nvSpPr>
         <p:spPr/>
@@ -4209,85 +4274,213 @@
           <a:lstStyle/>
           <a:p>
             <a:r>
-              <a:rPr lang="nb-NO" dirty="0" err="1"/>
-              <a:t>Empirical</a:t>
+              <a:rPr lang="nb-NO" dirty="0"/>
+              <a:t>Research </a:t>
+            </a:r>
+            <a:r>
+              <a:rPr lang="nb-NO" dirty="0" err="1"/>
+              <a:t>question</a:t>
             </a:r>
             <a:r>
               <a:rPr lang="nb-NO" dirty="0"/>
               <a:t> </a:t>
             </a:r>
-            <a:r>
-              <a:rPr lang="nb-NO" dirty="0" err="1"/>
-              <a:t>model</a:t>
-            </a:r>
+          </a:p>
+        </p:txBody>
+      </p:sp>
+      <p:sp>
+        <p:nvSpPr>
+          <p:cNvPr id="3" name="Content Placeholder 2">
+            <a:extLst>
+              <a:ext uri="{FF2B5EF4-FFF2-40B4-BE49-F238E27FC236}">
+                <a16:creationId xmlns:a16="http://schemas.microsoft.com/office/drawing/2014/main" id="{7A4AB9B8-0D4F-4050-030E-6769AC5A4B93}"/>
+              </a:ext>
+            </a:extLst>
+          </p:cNvPr>
+          <p:cNvSpPr>
+            <a:spLocks noGrp="1"/>
+          </p:cNvSpPr>
+          <p:nvPr>
+            <p:ph idx="1"/>
+          </p:nvPr>
+        </p:nvSpPr>
+        <p:spPr/>
+        <p:txBody>
+          <a:bodyPr/>
+          <a:lstStyle/>
+          <a:p>
+            <a:r>
+              <a:rPr lang="nb-NO" dirty="0" err="1"/>
+              <a:t>We</a:t>
+            </a:r>
+            <a:r>
+              <a:rPr lang="nb-NO" dirty="0"/>
+              <a:t> </a:t>
+            </a:r>
+            <a:r>
+              <a:rPr lang="nb-NO" dirty="0" err="1"/>
+              <a:t>need</a:t>
+            </a:r>
+            <a:r>
+              <a:rPr lang="nb-NO" dirty="0"/>
+              <a:t> feedback </a:t>
+            </a:r>
+            <a:r>
+              <a:rPr lang="nb-NO" dirty="0" err="1"/>
+              <a:t>on</a:t>
+            </a:r>
+            <a:r>
+              <a:rPr lang="nb-NO" dirty="0"/>
+              <a:t> </a:t>
+            </a:r>
+            <a:r>
+              <a:rPr lang="nb-NO" dirty="0" err="1"/>
+              <a:t>this</a:t>
+            </a:r>
+            <a:r>
+              <a:rPr lang="nb-NO" dirty="0"/>
+              <a:t>, </a:t>
+            </a:r>
+            <a:r>
+              <a:rPr lang="nb-NO" dirty="0" err="1"/>
+              <a:t>but</a:t>
+            </a:r>
+            <a:r>
+              <a:rPr lang="nb-NO" dirty="0"/>
+              <a:t> </a:t>
+            </a:r>
+            <a:r>
+              <a:rPr lang="nb-NO" dirty="0" err="1"/>
+              <a:t>we</a:t>
+            </a:r>
+            <a:r>
+              <a:rPr lang="nb-NO" dirty="0"/>
+              <a:t> have </a:t>
+            </a:r>
+            <a:r>
+              <a:rPr lang="nb-NO" dirty="0" err="1"/>
+              <a:t>some</a:t>
+            </a:r>
+            <a:r>
+              <a:rPr lang="nb-NO" dirty="0"/>
+              <a:t> </a:t>
+            </a:r>
+            <a:r>
+              <a:rPr lang="nb-NO" dirty="0" err="1"/>
+              <a:t>suggestions</a:t>
+            </a:r>
+            <a:r>
+              <a:rPr lang="nb-NO" dirty="0"/>
+              <a:t>:</a:t>
+            </a:r>
+          </a:p>
+          <a:p>
+            <a:pPr lvl="1"/>
+            <a:r>
+              <a:rPr lang="nb-NO" dirty="0" err="1"/>
+              <a:t>Can</a:t>
+            </a:r>
+            <a:r>
+              <a:rPr lang="nb-NO" dirty="0"/>
+              <a:t> </a:t>
+            </a:r>
+            <a:r>
+              <a:rPr lang="nb-NO" dirty="0" err="1"/>
+              <a:t>market</a:t>
+            </a:r>
+            <a:r>
+              <a:rPr lang="nb-NO" dirty="0"/>
+              <a:t> </a:t>
+            </a:r>
+            <a:r>
+              <a:rPr lang="nb-NO" dirty="0" err="1"/>
+              <a:t>entry</a:t>
+            </a:r>
+            <a:r>
+              <a:rPr lang="nb-NO" dirty="0"/>
+              <a:t> </a:t>
+            </a:r>
+            <a:r>
+              <a:rPr lang="nb-NO" dirty="0" err="1"/>
+              <a:t>models</a:t>
+            </a:r>
+            <a:r>
+              <a:rPr lang="nb-NO" dirty="0"/>
+              <a:t> assist Vinmonopolet in </a:t>
+            </a:r>
+            <a:r>
+              <a:rPr lang="nb-NO" dirty="0" err="1"/>
+              <a:t>deciding</a:t>
+            </a:r>
+            <a:r>
+              <a:rPr lang="nb-NO" dirty="0"/>
+              <a:t> </a:t>
+            </a:r>
+            <a:r>
+              <a:rPr lang="nb-NO" dirty="0" err="1"/>
+              <a:t>on</a:t>
+            </a:r>
+            <a:r>
+              <a:rPr lang="nb-NO" dirty="0"/>
+              <a:t> </a:t>
+            </a:r>
+            <a:r>
+              <a:rPr lang="nb-NO" dirty="0" err="1"/>
+              <a:t>their</a:t>
+            </a:r>
+            <a:r>
+              <a:rPr lang="nb-NO" dirty="0"/>
+              <a:t> </a:t>
+            </a:r>
+            <a:r>
+              <a:rPr lang="nb-NO" dirty="0" err="1"/>
+              <a:t>next</a:t>
+            </a:r>
+            <a:r>
+              <a:rPr lang="nb-NO" dirty="0"/>
+              <a:t> store location?</a:t>
+            </a:r>
+          </a:p>
+          <a:p>
+            <a:pPr lvl="1"/>
+            <a:r>
+              <a:rPr lang="en-US" dirty="0"/>
+              <a:t> What is the minimum market size required to support different numbers of </a:t>
+            </a:r>
+            <a:r>
+              <a:rPr lang="en-US" dirty="0" err="1"/>
+              <a:t>Vinmonopolet</a:t>
+            </a:r>
+            <a:r>
+              <a:rPr lang="en-US" dirty="0"/>
+              <a:t> stores, and how do these thresholds change as the number of stores increases?</a:t>
+            </a:r>
+          </a:p>
+          <a:p>
+            <a:pPr lvl="1"/>
+            <a:r>
+              <a:rPr lang="en-US" dirty="0"/>
+              <a:t>To what extent does the presence of cross-border shopping opportunities affect entry thresholds for </a:t>
+            </a:r>
+            <a:r>
+              <a:rPr lang="en-US" dirty="0" err="1"/>
+              <a:t>Vinmonopolet</a:t>
+            </a:r>
+            <a:r>
+              <a:rPr lang="en-US" dirty="0"/>
+              <a:t> stores in border regions, and how should this inform store placement policies?</a:t>
+            </a:r>
+          </a:p>
+          <a:p>
+            <a:pPr lvl="1"/>
             <a:endParaRPr lang="nb-NO" dirty="0"/>
-          </a:p>
-        </p:txBody>
-      </p:sp>
-      <p:sp>
-        <p:nvSpPr>
-          <p:cNvPr id="7" name="Subtitle 6">
-            <a:extLst>
-              <a:ext uri="{FF2B5EF4-FFF2-40B4-BE49-F238E27FC236}">
-                <a16:creationId xmlns:a16="http://schemas.microsoft.com/office/drawing/2014/main" id="{6804B1B4-4E4B-2487-3EB7-78C16D8E92A6}"/>
-              </a:ext>
-            </a:extLst>
-          </p:cNvPr>
-          <p:cNvSpPr>
-            <a:spLocks noGrp="1"/>
-          </p:cNvSpPr>
-          <p:nvPr>
-            <p:ph type="subTitle" idx="1"/>
-          </p:nvPr>
-        </p:nvSpPr>
-        <p:spPr/>
-        <p:txBody>
-          <a:bodyPr/>
-          <a:lstStyle/>
-          <a:p>
-            <a:r>
-              <a:rPr lang="nb-NO" dirty="0"/>
-              <a:t>Are </a:t>
-            </a:r>
-            <a:r>
-              <a:rPr lang="nb-NO" dirty="0" err="1"/>
-              <a:t>we</a:t>
-            </a:r>
-            <a:r>
-              <a:rPr lang="nb-NO" dirty="0"/>
-              <a:t> </a:t>
-            </a:r>
-            <a:r>
-              <a:rPr lang="nb-NO" dirty="0" err="1"/>
-              <a:t>using</a:t>
-            </a:r>
-            <a:r>
-              <a:rPr lang="nb-NO" dirty="0"/>
-              <a:t> </a:t>
-            </a:r>
-            <a:r>
-              <a:rPr lang="nb-NO" dirty="0" err="1"/>
-              <a:t>the</a:t>
-            </a:r>
-            <a:r>
-              <a:rPr lang="nb-NO" dirty="0"/>
-              <a:t> right </a:t>
-            </a:r>
-            <a:r>
-              <a:rPr lang="nb-NO" dirty="0" err="1"/>
-              <a:t>one</a:t>
-            </a:r>
-            <a:r>
-              <a:rPr lang="nb-NO" dirty="0"/>
-              <a:t>?</a:t>
-            </a:r>
           </a:p>
         </p:txBody>
       </p:sp>
     </p:spTree>
     <p:extLst>
       <p:ext uri="{BB962C8B-B14F-4D97-AF65-F5344CB8AC3E}">
-        <p14:creationId xmlns:p14="http://schemas.microsoft.com/office/powerpoint/2010/main" val="2984399082"/>
+        <p14:creationId xmlns:p14="http://schemas.microsoft.com/office/powerpoint/2010/main" val="216445117"/>
       </p:ext>
     </p:extLst>
   </p:cSld>
@@ -4316,18 +4509,18 @@
       </p:grpSpPr>
       <p:sp>
         <p:nvSpPr>
-          <p:cNvPr id="2" name="Title 1">
-            <a:extLst>
-              <a:ext uri="{FF2B5EF4-FFF2-40B4-BE49-F238E27FC236}">
-                <a16:creationId xmlns:a16="http://schemas.microsoft.com/office/drawing/2014/main" id="{EDEC6D8A-B3ED-C6D2-8995-11FFFA77FFB4}"/>
-              </a:ext>
-            </a:extLst>
-          </p:cNvPr>
-          <p:cNvSpPr>
-            <a:spLocks noGrp="1"/>
-          </p:cNvSpPr>
-          <p:nvPr>
-            <p:ph type="title"/>
+          <p:cNvPr id="6" name="Title 5">
+            <a:extLst>
+              <a:ext uri="{FF2B5EF4-FFF2-40B4-BE49-F238E27FC236}">
+                <a16:creationId xmlns:a16="http://schemas.microsoft.com/office/drawing/2014/main" id="{4D92AF9F-815E-ADC7-8F68-211BEDD7FA01}"/>
+              </a:ext>
+            </a:extLst>
+          </p:cNvPr>
+          <p:cNvSpPr>
+            <a:spLocks noGrp="1"/>
+          </p:cNvSpPr>
+          <p:nvPr>
+            <p:ph type="ctrTitle"/>
           </p:nvPr>
         </p:nvSpPr>
         <p:spPr/>
@@ -4347,35 +4540,24 @@
               <a:rPr lang="nb-NO" dirty="0" err="1"/>
               <a:t>model</a:t>
             </a:r>
-            <a:r>
-              <a:rPr lang="nb-NO" dirty="0"/>
-              <a:t>: </a:t>
-            </a:r>
-            <a:r>
-              <a:rPr lang="nb-NO" dirty="0" err="1"/>
-              <a:t>Bresnahan</a:t>
-            </a:r>
-            <a:r>
-              <a:rPr lang="nb-NO" dirty="0"/>
-              <a:t> &amp; Reiss</a:t>
-            </a:r>
-          </a:p>
-        </p:txBody>
-      </p:sp>
-      <p:sp>
-        <p:nvSpPr>
-          <p:cNvPr id="3" name="Content Placeholder 2">
-            <a:extLst>
-              <a:ext uri="{FF2B5EF4-FFF2-40B4-BE49-F238E27FC236}">
-                <a16:creationId xmlns:a16="http://schemas.microsoft.com/office/drawing/2014/main" id="{CE41D449-0059-29E8-257A-B1EEA512E592}"/>
-              </a:ext>
-            </a:extLst>
-          </p:cNvPr>
-          <p:cNvSpPr>
-            <a:spLocks noGrp="1"/>
-          </p:cNvSpPr>
-          <p:nvPr>
-            <p:ph idx="1"/>
+            <a:endParaRPr lang="nb-NO" dirty="0"/>
+          </a:p>
+        </p:txBody>
+      </p:sp>
+      <p:sp>
+        <p:nvSpPr>
+          <p:cNvPr id="7" name="Subtitle 6">
+            <a:extLst>
+              <a:ext uri="{FF2B5EF4-FFF2-40B4-BE49-F238E27FC236}">
+                <a16:creationId xmlns:a16="http://schemas.microsoft.com/office/drawing/2014/main" id="{6804B1B4-4E4B-2487-3EB7-78C16D8E92A6}"/>
+              </a:ext>
+            </a:extLst>
+          </p:cNvPr>
+          <p:cNvSpPr>
+            <a:spLocks noGrp="1"/>
+          </p:cNvSpPr>
+          <p:nvPr>
+            <p:ph type="subTitle" idx="1"/>
           </p:nvPr>
         </p:nvSpPr>
         <p:spPr/>
@@ -4385,11 +4567,11 @@
           <a:p>
             <a:r>
               <a:rPr lang="nb-NO" dirty="0"/>
-              <a:t>The </a:t>
-            </a:r>
-            <a:r>
-              <a:rPr lang="nb-NO" dirty="0" err="1"/>
-              <a:t>alcohol</a:t>
+              <a:t>Are </a:t>
+            </a:r>
+            <a:r>
+              <a:rPr lang="nb-NO" dirty="0" err="1"/>
+              <a:t>we</a:t>
             </a:r>
             <a:r>
               <a:rPr lang="nb-NO" dirty="0"/>
@@ -4397,15 +4579,7 @@
             </a:r>
             <a:r>
               <a:rPr lang="nb-NO" dirty="0" err="1"/>
-              <a:t>market</a:t>
-            </a:r>
-            <a:r>
-              <a:rPr lang="nb-NO" dirty="0"/>
-              <a:t> in Norway </a:t>
-            </a:r>
-            <a:r>
-              <a:rPr lang="nb-NO" dirty="0" err="1"/>
-              <a:t>violates</a:t>
+              <a:t>using</a:t>
             </a:r>
             <a:r>
               <a:rPr lang="nb-NO" dirty="0"/>
@@ -4413,139 +4587,27 @@
             </a:r>
             <a:r>
               <a:rPr lang="nb-NO" dirty="0" err="1"/>
-              <a:t>some</a:t>
-            </a:r>
-            <a:r>
-              <a:rPr lang="nb-NO" dirty="0"/>
-              <a:t> </a:t>
-            </a:r>
-            <a:r>
-              <a:rPr lang="nb-NO" dirty="0" err="1"/>
-              <a:t>of</a:t>
-            </a:r>
-            <a:r>
-              <a:rPr lang="nb-NO" dirty="0"/>
-              <a:t> </a:t>
-            </a:r>
-            <a:r>
-              <a:rPr lang="nb-NO" dirty="0" err="1"/>
               <a:t>the</a:t>
             </a:r>
             <a:r>
               <a:rPr lang="nb-NO" dirty="0"/>
-              <a:t> </a:t>
-            </a:r>
-            <a:r>
-              <a:rPr lang="nb-NO" dirty="0" err="1"/>
-              <a:t>assumptions</a:t>
-            </a:r>
-            <a:r>
-              <a:rPr lang="nb-NO" dirty="0"/>
-              <a:t> </a:t>
-            </a:r>
-            <a:r>
-              <a:rPr lang="nb-NO" dirty="0" err="1"/>
-              <a:t>of</a:t>
-            </a:r>
-            <a:r>
-              <a:rPr lang="nb-NO" dirty="0"/>
-              <a:t> </a:t>
-            </a:r>
-            <a:r>
-              <a:rPr lang="nb-NO" dirty="0" err="1"/>
-              <a:t>the</a:t>
-            </a:r>
-            <a:r>
-              <a:rPr lang="nb-NO" dirty="0"/>
-              <a:t> B&amp;R </a:t>
-            </a:r>
-            <a:r>
-              <a:rPr lang="nb-NO" dirty="0" err="1"/>
-              <a:t>framework</a:t>
-            </a:r>
-            <a:endParaRPr lang="nb-NO" dirty="0"/>
-          </a:p>
-          <a:p>
-            <a:pPr lvl="1"/>
-            <a:r>
-              <a:rPr lang="nb-NO" dirty="0" err="1"/>
-              <a:t>Could</a:t>
-            </a:r>
-            <a:r>
-              <a:rPr lang="nb-NO" dirty="0"/>
-              <a:t> </a:t>
-            </a:r>
-            <a:r>
-              <a:rPr lang="nb-NO" dirty="0" err="1"/>
-              <a:t>we</a:t>
-            </a:r>
-            <a:r>
-              <a:rPr lang="nb-NO" dirty="0"/>
-              <a:t> still </a:t>
-            </a:r>
-            <a:r>
-              <a:rPr lang="nb-NO" dirty="0" err="1"/>
-              <a:t>use</a:t>
-            </a:r>
-            <a:r>
-              <a:rPr lang="nb-NO" dirty="0"/>
-              <a:t> it, or parts </a:t>
-            </a:r>
-            <a:r>
-              <a:rPr lang="nb-NO" dirty="0" err="1"/>
-              <a:t>of</a:t>
-            </a:r>
-            <a:r>
-              <a:rPr lang="nb-NO" dirty="0"/>
-              <a:t> it?</a:t>
-            </a:r>
-          </a:p>
-          <a:p>
-            <a:pPr lvl="1"/>
-            <a:r>
-              <a:rPr lang="nb-NO" dirty="0" err="1"/>
-              <a:t>Modify</a:t>
-            </a:r>
-            <a:r>
-              <a:rPr lang="nb-NO" dirty="0"/>
-              <a:t> to </a:t>
-            </a:r>
-            <a:r>
-              <a:rPr lang="nb-NO" dirty="0" err="1"/>
-              <a:t>reflect</a:t>
-            </a:r>
-            <a:r>
-              <a:rPr lang="nb-NO" dirty="0"/>
-              <a:t> policy </a:t>
-            </a:r>
-            <a:r>
-              <a:rPr lang="nb-NO" dirty="0" err="1"/>
-              <a:t>instead</a:t>
-            </a:r>
-            <a:r>
-              <a:rPr lang="nb-NO" dirty="0"/>
-              <a:t> </a:t>
-            </a:r>
-            <a:r>
-              <a:rPr lang="nb-NO" dirty="0" err="1"/>
-              <a:t>of</a:t>
-            </a:r>
-            <a:r>
-              <a:rPr lang="nb-NO" dirty="0"/>
-              <a:t> </a:t>
-            </a:r>
-            <a:r>
-              <a:rPr lang="nb-NO" dirty="0" err="1"/>
-              <a:t>profit</a:t>
-            </a:r>
-            <a:endParaRPr lang="nb-NO" dirty="0"/>
+              <a:t> right </a:t>
+            </a:r>
+            <a:r>
+              <a:rPr lang="nb-NO" dirty="0" err="1"/>
+              <a:t>one</a:t>
+            </a:r>
+            <a:r>
+              <a:rPr lang="nb-NO" dirty="0"/>
+              <a:t>?</a:t>
+            </a:r>
           </a:p>
         </p:txBody>
       </p:sp>
     </p:spTree>
     <p:extLst>
       <p:ext uri="{BB962C8B-B14F-4D97-AF65-F5344CB8AC3E}">
-        <p14:creationId xmlns:p14="http://schemas.microsoft.com/office/powerpoint/2010/main" val="1617147414"/>
+        <p14:creationId xmlns:p14="http://schemas.microsoft.com/office/powerpoint/2010/main" val="2984399082"/>
       </p:ext>
     </p:extLst>
   </p:cSld>
@@ -4577,7 +4639,7 @@
           <p:cNvPr id="2" name="Title 1">
             <a:extLst>
               <a:ext uri="{FF2B5EF4-FFF2-40B4-BE49-F238E27FC236}">
-                <a16:creationId xmlns:a16="http://schemas.microsoft.com/office/drawing/2014/main" id="{8F7DE2C9-4028-BD3B-031A-5F24D0CFF9FD}"/>
+                <a16:creationId xmlns:a16="http://schemas.microsoft.com/office/drawing/2014/main" id="{EDEC6D8A-B3ED-C6D2-8995-11FFFA77FFB4}"/>
               </a:ext>
             </a:extLst>
           </p:cNvPr>
@@ -4595,7 +4657,7 @@
           <a:p>
             <a:r>
               <a:rPr lang="nb-NO" dirty="0" err="1"/>
-              <a:t>Showcasing</a:t>
+              <a:t>Empirical</a:t>
             </a:r>
             <a:r>
               <a:rPr lang="nb-NO" dirty="0"/>
@@ -4603,6 +4665,74 @@
             </a:r>
             <a:r>
               <a:rPr lang="nb-NO" dirty="0" err="1"/>
+              <a:t>model</a:t>
+            </a:r>
+            <a:r>
+              <a:rPr lang="nb-NO" dirty="0"/>
+              <a:t>: </a:t>
+            </a:r>
+            <a:r>
+              <a:rPr lang="nb-NO" dirty="0" err="1"/>
+              <a:t>Bresnahan</a:t>
+            </a:r>
+            <a:r>
+              <a:rPr lang="nb-NO" dirty="0"/>
+              <a:t> &amp; Reiss</a:t>
+            </a:r>
+          </a:p>
+        </p:txBody>
+      </p:sp>
+      <p:sp>
+        <p:nvSpPr>
+          <p:cNvPr id="3" name="Content Placeholder 2">
+            <a:extLst>
+              <a:ext uri="{FF2B5EF4-FFF2-40B4-BE49-F238E27FC236}">
+                <a16:creationId xmlns:a16="http://schemas.microsoft.com/office/drawing/2014/main" id="{CE41D449-0059-29E8-257A-B1EEA512E592}"/>
+              </a:ext>
+            </a:extLst>
+          </p:cNvPr>
+          <p:cNvSpPr>
+            <a:spLocks noGrp="1"/>
+          </p:cNvSpPr>
+          <p:nvPr>
+            <p:ph idx="1"/>
+          </p:nvPr>
+        </p:nvSpPr>
+        <p:spPr/>
+        <p:txBody>
+          <a:bodyPr/>
+          <a:lstStyle/>
+          <a:p>
+            <a:r>
+              <a:rPr lang="nb-NO" dirty="0"/>
+              <a:t>The </a:t>
+            </a:r>
+            <a:r>
+              <a:rPr lang="nb-NO" dirty="0" err="1"/>
+              <a:t>alcohol</a:t>
+            </a:r>
+            <a:r>
+              <a:rPr lang="nb-NO" dirty="0"/>
+              <a:t> </a:t>
+            </a:r>
+            <a:r>
+              <a:rPr lang="nb-NO" dirty="0" err="1"/>
+              <a:t>market</a:t>
+            </a:r>
+            <a:r>
+              <a:rPr lang="nb-NO" dirty="0"/>
+              <a:t> in Norway </a:t>
+            </a:r>
+            <a:r>
+              <a:rPr lang="nb-NO" dirty="0" err="1"/>
+              <a:t>violates</a:t>
+            </a:r>
+            <a:r>
+              <a:rPr lang="nb-NO" dirty="0"/>
+              <a:t> </a:t>
+            </a:r>
+            <a:r>
+              <a:rPr lang="nb-NO" dirty="0" err="1"/>
               <a:t>some</a:t>
             </a:r>
             <a:r>
@@ -4611,33 +4741,123 @@
             </a:r>
             <a:r>
               <a:rPr lang="nb-NO" dirty="0" err="1"/>
-              <a:t>results</a:t>
+              <a:t>of</a:t>
+            </a:r>
+            <a:r>
+              <a:rPr lang="nb-NO" dirty="0"/>
+              <a:t> </a:t>
+            </a:r>
+            <a:r>
+              <a:rPr lang="nb-NO" dirty="0" err="1"/>
+              <a:t>the</a:t>
+            </a:r>
+            <a:r>
+              <a:rPr lang="nb-NO" dirty="0"/>
+              <a:t> </a:t>
+            </a:r>
+            <a:r>
+              <a:rPr lang="nb-NO" dirty="0" err="1"/>
+              <a:t>assumptions</a:t>
+            </a:r>
+            <a:r>
+              <a:rPr lang="nb-NO" dirty="0"/>
+              <a:t> </a:t>
+            </a:r>
+            <a:r>
+              <a:rPr lang="nb-NO" dirty="0" err="1"/>
+              <a:t>of</a:t>
+            </a:r>
+            <a:r>
+              <a:rPr lang="nb-NO" dirty="0"/>
+              <a:t> </a:t>
+            </a:r>
+            <a:r>
+              <a:rPr lang="nb-NO" dirty="0" err="1"/>
+              <a:t>the</a:t>
+            </a:r>
+            <a:r>
+              <a:rPr lang="nb-NO" dirty="0"/>
+              <a:t> B&amp;R </a:t>
+            </a:r>
+            <a:r>
+              <a:rPr lang="nb-NO" dirty="0" err="1"/>
+              <a:t>framework</a:t>
             </a:r>
             <a:endParaRPr lang="nb-NO" dirty="0"/>
           </a:p>
-        </p:txBody>
-      </p:sp>
-      <p:sp>
-        <p:nvSpPr>
-          <p:cNvPr id="3" name="Content Placeholder 2">
-            <a:extLst>
-              <a:ext uri="{FF2B5EF4-FFF2-40B4-BE49-F238E27FC236}">
-                <a16:creationId xmlns:a16="http://schemas.microsoft.com/office/drawing/2014/main" id="{3D9FD236-4914-52D9-9FD5-3495F556678D}"/>
-              </a:ext>
-            </a:extLst>
-          </p:cNvPr>
-          <p:cNvSpPr>
-            <a:spLocks noGrp="1"/>
-          </p:cNvSpPr>
-          <p:nvPr>
-            <p:ph idx="1"/>
-          </p:nvPr>
-        </p:nvSpPr>
-        <p:spPr/>
-        <p:txBody>
-          <a:bodyPr/>
-          <a:lstStyle/>
-          <a:p>
+          <a:p>
+            <a:pPr lvl="1"/>
+            <a:r>
+              <a:rPr lang="nb-NO" dirty="0" err="1"/>
+              <a:t>Could</a:t>
+            </a:r>
+            <a:r>
+              <a:rPr lang="nb-NO" dirty="0"/>
+              <a:t> </a:t>
+            </a:r>
+            <a:r>
+              <a:rPr lang="nb-NO" dirty="0" err="1"/>
+              <a:t>we</a:t>
+            </a:r>
+            <a:r>
+              <a:rPr lang="nb-NO" dirty="0"/>
+              <a:t> still </a:t>
+            </a:r>
+            <a:r>
+              <a:rPr lang="nb-NO" dirty="0" err="1"/>
+              <a:t>use</a:t>
+            </a:r>
+            <a:r>
+              <a:rPr lang="nb-NO" dirty="0"/>
+              <a:t> it, or parts </a:t>
+            </a:r>
+            <a:r>
+              <a:rPr lang="nb-NO" dirty="0" err="1"/>
+              <a:t>of</a:t>
+            </a:r>
+            <a:r>
+              <a:rPr lang="nb-NO" dirty="0"/>
+              <a:t> it?</a:t>
+            </a:r>
+          </a:p>
+          <a:p>
+            <a:pPr lvl="1"/>
+            <a:r>
+              <a:rPr lang="nb-NO" dirty="0" err="1"/>
+              <a:t>Modify</a:t>
+            </a:r>
+            <a:r>
+              <a:rPr lang="nb-NO" dirty="0"/>
+              <a:t> to </a:t>
+            </a:r>
+            <a:r>
+              <a:rPr lang="nb-NO" dirty="0" err="1"/>
+              <a:t>reflect</a:t>
+            </a:r>
+            <a:r>
+              <a:rPr lang="nb-NO" dirty="0"/>
+              <a:t> policy </a:t>
+            </a:r>
+            <a:r>
+              <a:rPr lang="nb-NO" dirty="0" err="1"/>
+              <a:t>instead</a:t>
+            </a:r>
+            <a:r>
+              <a:rPr lang="nb-NO" dirty="0"/>
+              <a:t> </a:t>
+            </a:r>
+            <a:r>
+              <a:rPr lang="nb-NO" dirty="0" err="1"/>
+              <a:t>of</a:t>
+            </a:r>
+            <a:r>
+              <a:rPr lang="nb-NO" dirty="0"/>
+              <a:t> </a:t>
+            </a:r>
+            <a:r>
+              <a:rPr lang="nb-NO" dirty="0" err="1"/>
+              <a:t>profit</a:t>
+            </a:r>
             <a:endParaRPr lang="nb-NO" dirty="0"/>
           </a:p>
         </p:txBody>
@@ -4645,7 +4865,7 @@
     </p:spTree>
     <p:extLst>
       <p:ext uri="{BB962C8B-B14F-4D97-AF65-F5344CB8AC3E}">
-        <p14:creationId xmlns:p14="http://schemas.microsoft.com/office/powerpoint/2010/main" val="2354535279"/>
+        <p14:creationId xmlns:p14="http://schemas.microsoft.com/office/powerpoint/2010/main" val="1617147414"/>
       </p:ext>
     </p:extLst>
   </p:cSld>
@@ -4677,6 +4897,106 @@
           <p:cNvPr id="2" name="Title 1">
             <a:extLst>
               <a:ext uri="{FF2B5EF4-FFF2-40B4-BE49-F238E27FC236}">
+                <a16:creationId xmlns:a16="http://schemas.microsoft.com/office/drawing/2014/main" id="{8F7DE2C9-4028-BD3B-031A-5F24D0CFF9FD}"/>
+              </a:ext>
+            </a:extLst>
+          </p:cNvPr>
+          <p:cNvSpPr>
+            <a:spLocks noGrp="1"/>
+          </p:cNvSpPr>
+          <p:nvPr>
+            <p:ph type="title"/>
+          </p:nvPr>
+        </p:nvSpPr>
+        <p:spPr/>
+        <p:txBody>
+          <a:bodyPr/>
+          <a:lstStyle/>
+          <a:p>
+            <a:r>
+              <a:rPr lang="nb-NO" dirty="0" err="1"/>
+              <a:t>Showcasing</a:t>
+            </a:r>
+            <a:r>
+              <a:rPr lang="nb-NO" dirty="0"/>
+              <a:t> </a:t>
+            </a:r>
+            <a:r>
+              <a:rPr lang="nb-NO" dirty="0" err="1"/>
+              <a:t>some</a:t>
+            </a:r>
+            <a:r>
+              <a:rPr lang="nb-NO" dirty="0"/>
+              <a:t> </a:t>
+            </a:r>
+            <a:r>
+              <a:rPr lang="nb-NO" dirty="0" err="1"/>
+              <a:t>results</a:t>
+            </a:r>
+            <a:endParaRPr lang="nb-NO" dirty="0"/>
+          </a:p>
+        </p:txBody>
+      </p:sp>
+      <p:sp>
+        <p:nvSpPr>
+          <p:cNvPr id="3" name="Content Placeholder 2">
+            <a:extLst>
+              <a:ext uri="{FF2B5EF4-FFF2-40B4-BE49-F238E27FC236}">
+                <a16:creationId xmlns:a16="http://schemas.microsoft.com/office/drawing/2014/main" id="{3D9FD236-4914-52D9-9FD5-3495F556678D}"/>
+              </a:ext>
+            </a:extLst>
+          </p:cNvPr>
+          <p:cNvSpPr>
+            <a:spLocks noGrp="1"/>
+          </p:cNvSpPr>
+          <p:nvPr>
+            <p:ph idx="1"/>
+          </p:nvPr>
+        </p:nvSpPr>
+        <p:spPr/>
+        <p:txBody>
+          <a:bodyPr/>
+          <a:lstStyle/>
+          <a:p>
+            <a:endParaRPr lang="nb-NO" dirty="0"/>
+          </a:p>
+        </p:txBody>
+      </p:sp>
+    </p:spTree>
+    <p:extLst>
+      <p:ext uri="{BB962C8B-B14F-4D97-AF65-F5344CB8AC3E}">
+        <p14:creationId xmlns:p14="http://schemas.microsoft.com/office/powerpoint/2010/main" val="2354535279"/>
+      </p:ext>
+    </p:extLst>
+  </p:cSld>
+  <p:clrMapOvr>
+    <a:masterClrMapping/>
+  </p:clrMapOvr>
+</p:sld>
+</file>
+
+<file path=ppt/slides/slide14.xml><?xml version="1.0" encoding="utf-8"?>
+<p:sld xmlns:a="http://schemas.openxmlformats.org/drawingml/2006/main" xmlns:r="http://schemas.openxmlformats.org/officeDocument/2006/relationships" xmlns:p="http://schemas.openxmlformats.org/presentationml/2006/main">
+  <p:cSld>
+    <p:spTree>
+      <p:nvGrpSpPr>
+        <p:cNvPr id="1" name=""/>
+        <p:cNvGrpSpPr/>
+        <p:nvPr/>
+      </p:nvGrpSpPr>
+      <p:grpSpPr>
+        <a:xfrm>
+          <a:off x="0" y="0"/>
+          <a:ext cx="0" cy="0"/>
+          <a:chOff x="0" y="0"/>
+          <a:chExt cx="0" cy="0"/>
+        </a:xfrm>
+      </p:grpSpPr>
+      <p:sp>
+        <p:nvSpPr>
+          <p:cNvPr id="2" name="Title 1">
+            <a:extLst>
+              <a:ext uri="{FF2B5EF4-FFF2-40B4-BE49-F238E27FC236}">
                 <a16:creationId xmlns:a16="http://schemas.microsoft.com/office/drawing/2014/main" id="{10397AED-9578-36B3-9AF2-2B41FB4267AA}"/>
               </a:ext>
             </a:extLst>
@@ -4815,7 +5135,7 @@
 </p:sld>
 </file>
 
-<file path=ppt/slides/slide14.xml><?xml version="1.0" encoding="utf-8"?>
+<file path=ppt/slides/slide15.xml><?xml version="1.0" encoding="utf-8"?>
 <p:sld xmlns:a="http://schemas.openxmlformats.org/drawingml/2006/main" xmlns:r="http://schemas.openxmlformats.org/officeDocument/2006/relationships" xmlns:p="http://schemas.openxmlformats.org/presentationml/2006/main">
   <p:cSld>
     <p:spTree>
@@ -5242,513 +5562,6 @@
 <file path=ppt/slides/slide3.xml><?xml version="1.0" encoding="utf-8"?>
 <p:sld xmlns:a="http://schemas.openxmlformats.org/drawingml/2006/main" xmlns:r="http://schemas.openxmlformats.org/officeDocument/2006/relationships" xmlns:p="http://schemas.openxmlformats.org/presentationml/2006/main">
   <p:cSld>
-    <p:spTree>
-      <p:nvGrpSpPr>
-        <p:cNvPr id="1" name=""/>
-        <p:cNvGrpSpPr/>
-        <p:nvPr/>
-      </p:nvGrpSpPr>
-      <p:grpSpPr>
-        <a:xfrm>
-          <a:off x="0" y="0"/>
-          <a:ext cx="0" cy="0"/>
-          <a:chOff x="0" y="0"/>
-          <a:chExt cx="0" cy="0"/>
-        </a:xfrm>
-      </p:grpSpPr>
-      <p:sp>
-        <p:nvSpPr>
-          <p:cNvPr id="4" name="Title 3">
-            <a:extLst>
-              <a:ext uri="{FF2B5EF4-FFF2-40B4-BE49-F238E27FC236}">
-                <a16:creationId xmlns:a16="http://schemas.microsoft.com/office/drawing/2014/main" id="{3FB6D529-D066-ABCB-A37B-F711A64CDBEE}"/>
-              </a:ext>
-            </a:extLst>
-          </p:cNvPr>
-          <p:cNvSpPr>
-            <a:spLocks noGrp="1"/>
-          </p:cNvSpPr>
-          <p:nvPr>
-            <p:ph type="ctrTitle"/>
-          </p:nvPr>
-        </p:nvSpPr>
-        <p:spPr/>
-        <p:txBody>
-          <a:bodyPr/>
-          <a:lstStyle/>
-          <a:p>
-            <a:r>
-              <a:rPr lang="nb-NO" dirty="0"/>
-              <a:t>Data(</a:t>
-            </a:r>
-            <a:r>
-              <a:rPr lang="nb-NO" dirty="0" err="1"/>
-              <a:t>gathering</a:t>
-            </a:r>
-            <a:r>
-              <a:rPr lang="nb-NO" dirty="0"/>
-              <a:t>)</a:t>
-            </a:r>
-          </a:p>
-        </p:txBody>
-      </p:sp>
-      <p:sp>
-        <p:nvSpPr>
-          <p:cNvPr id="5" name="Subtitle 4">
-            <a:extLst>
-              <a:ext uri="{FF2B5EF4-FFF2-40B4-BE49-F238E27FC236}">
-                <a16:creationId xmlns:a16="http://schemas.microsoft.com/office/drawing/2014/main" id="{6BBC60DC-0B26-C772-B3C9-179505A29F80}"/>
-              </a:ext>
-            </a:extLst>
-          </p:cNvPr>
-          <p:cNvSpPr>
-            <a:spLocks noGrp="1"/>
-          </p:cNvSpPr>
-          <p:nvPr>
-            <p:ph type="subTitle" idx="1"/>
-          </p:nvPr>
-        </p:nvSpPr>
-        <p:spPr/>
-        <p:txBody>
-          <a:bodyPr/>
-          <a:lstStyle/>
-          <a:p>
-            <a:endParaRPr lang="nb-NO"/>
-          </a:p>
-        </p:txBody>
-      </p:sp>
-    </p:spTree>
-    <p:extLst>
-      <p:ext uri="{BB962C8B-B14F-4D97-AF65-F5344CB8AC3E}">
-        <p14:creationId xmlns:p14="http://schemas.microsoft.com/office/powerpoint/2010/main" val="2764983961"/>
-      </p:ext>
-    </p:extLst>
-  </p:cSld>
-  <p:clrMapOvr>
-    <a:masterClrMapping/>
-  </p:clrMapOvr>
-</p:sld>
-</file>
-
-<file path=ppt/slides/slide4.xml><?xml version="1.0" encoding="utf-8"?>
-<p:sld xmlns:a="http://schemas.openxmlformats.org/drawingml/2006/main" xmlns:r="http://schemas.openxmlformats.org/officeDocument/2006/relationships" xmlns:p="http://schemas.openxmlformats.org/presentationml/2006/main">
-  <p:cSld>
-    <p:spTree>
-      <p:nvGrpSpPr>
-        <p:cNvPr id="1" name=""/>
-        <p:cNvGrpSpPr/>
-        <p:nvPr/>
-      </p:nvGrpSpPr>
-      <p:grpSpPr>
-        <a:xfrm>
-          <a:off x="0" y="0"/>
-          <a:ext cx="0" cy="0"/>
-          <a:chOff x="0" y="0"/>
-          <a:chExt cx="0" cy="0"/>
-        </a:xfrm>
-      </p:grpSpPr>
-      <p:sp>
-        <p:nvSpPr>
-          <p:cNvPr id="2" name="Title 1">
-            <a:extLst>
-              <a:ext uri="{FF2B5EF4-FFF2-40B4-BE49-F238E27FC236}">
-                <a16:creationId xmlns:a16="http://schemas.microsoft.com/office/drawing/2014/main" id="{2EC69C85-C969-1BC5-6AE7-AD2165DD9C13}"/>
-              </a:ext>
-            </a:extLst>
-          </p:cNvPr>
-          <p:cNvSpPr>
-            <a:spLocks noGrp="1"/>
-          </p:cNvSpPr>
-          <p:nvPr>
-            <p:ph type="title"/>
-          </p:nvPr>
-        </p:nvSpPr>
-        <p:spPr/>
-        <p:txBody>
-          <a:bodyPr/>
-          <a:lstStyle/>
-          <a:p>
-            <a:r>
-              <a:rPr lang="nb-NO" dirty="0"/>
-              <a:t>Main data </a:t>
-            </a:r>
-            <a:r>
-              <a:rPr lang="nb-NO" dirty="0" err="1"/>
-              <a:t>set</a:t>
-            </a:r>
-            <a:endParaRPr lang="nb-NO" dirty="0"/>
-          </a:p>
-        </p:txBody>
-      </p:sp>
-      <p:sp>
-        <p:nvSpPr>
-          <p:cNvPr id="3" name="Content Placeholder 2">
-            <a:extLst>
-              <a:ext uri="{FF2B5EF4-FFF2-40B4-BE49-F238E27FC236}">
-                <a16:creationId xmlns:a16="http://schemas.microsoft.com/office/drawing/2014/main" id="{89D8E8A5-B69A-78FD-101C-8E29EC420823}"/>
-              </a:ext>
-            </a:extLst>
-          </p:cNvPr>
-          <p:cNvSpPr>
-            <a:spLocks noGrp="1"/>
-          </p:cNvSpPr>
-          <p:nvPr>
-            <p:ph idx="1"/>
-          </p:nvPr>
-        </p:nvSpPr>
-        <p:spPr/>
-        <p:txBody>
-          <a:bodyPr/>
-          <a:lstStyle/>
-          <a:p>
-            <a:r>
-              <a:rPr lang="nb-NO" dirty="0"/>
-              <a:t>2024 data</a:t>
-            </a:r>
-          </a:p>
-          <a:p>
-            <a:pPr lvl="1"/>
-            <a:r>
-              <a:rPr lang="nb-NO" dirty="0"/>
-              <a:t>Total sales (liters) per store</a:t>
-            </a:r>
-          </a:p>
-          <a:p>
-            <a:pPr lvl="1"/>
-            <a:r>
-              <a:rPr lang="nb-NO" dirty="0" err="1"/>
-              <a:t>There</a:t>
-            </a:r>
-            <a:r>
-              <a:rPr lang="nb-NO" dirty="0"/>
-              <a:t> is </a:t>
-            </a:r>
-            <a:r>
-              <a:rPr lang="nb-NO" dirty="0" err="1"/>
-              <a:t>also</a:t>
-            </a:r>
-            <a:r>
-              <a:rPr lang="nb-NO" dirty="0"/>
-              <a:t> data for </a:t>
-            </a:r>
-            <a:r>
-              <a:rPr lang="nb-NO" dirty="0" err="1"/>
-              <a:t>each</a:t>
-            </a:r>
-            <a:r>
-              <a:rPr lang="nb-NO" dirty="0"/>
-              <a:t> </a:t>
-            </a:r>
-            <a:r>
-              <a:rPr lang="nb-NO" dirty="0" err="1"/>
-              <a:t>alcohol</a:t>
-            </a:r>
-            <a:r>
-              <a:rPr lang="nb-NO" dirty="0"/>
-              <a:t> type</a:t>
-            </a:r>
-          </a:p>
-          <a:p>
-            <a:r>
-              <a:rPr lang="nb-NO" dirty="0" err="1"/>
-              <a:t>Individual</a:t>
-            </a:r>
-            <a:r>
-              <a:rPr lang="nb-NO" dirty="0"/>
-              <a:t> store data</a:t>
-            </a:r>
-          </a:p>
-          <a:p>
-            <a:pPr lvl="1"/>
-            <a:r>
-              <a:rPr lang="nb-NO" dirty="0"/>
-              <a:t>Location </a:t>
-            </a:r>
-            <a:r>
-              <a:rPr lang="nb-NO" dirty="0" err="1"/>
-              <a:t>name</a:t>
-            </a:r>
-            <a:endParaRPr lang="nb-NO" dirty="0"/>
-          </a:p>
-          <a:p>
-            <a:pPr lvl="1"/>
-            <a:r>
-              <a:rPr lang="nb-NO" dirty="0" err="1"/>
-              <a:t>Geo</a:t>
-            </a:r>
-            <a:r>
-              <a:rPr lang="nb-NO" dirty="0"/>
-              <a:t>-location</a:t>
-            </a:r>
-          </a:p>
-          <a:p>
-            <a:pPr lvl="1"/>
-            <a:r>
-              <a:rPr lang="nb-NO" dirty="0" err="1"/>
-              <a:t>Municipality</a:t>
-            </a:r>
-            <a:r>
-              <a:rPr lang="nb-NO" dirty="0"/>
-              <a:t>(?)</a:t>
-            </a:r>
-          </a:p>
-          <a:p>
-            <a:pPr lvl="1"/>
-            <a:r>
-              <a:rPr lang="nb-NO" dirty="0"/>
-              <a:t>Store type (</a:t>
-            </a:r>
-            <a:r>
-              <a:rPr lang="nb-NO" dirty="0" err="1"/>
-              <a:t>size</a:t>
-            </a:r>
-            <a:r>
-              <a:rPr lang="nb-NO" dirty="0"/>
-              <a:t> and sortiment)</a:t>
-            </a:r>
-          </a:p>
-        </p:txBody>
-      </p:sp>
-    </p:spTree>
-    <p:extLst>
-      <p:ext uri="{BB962C8B-B14F-4D97-AF65-F5344CB8AC3E}">
-        <p14:creationId xmlns:p14="http://schemas.microsoft.com/office/powerpoint/2010/main" val="2243722391"/>
-      </p:ext>
-    </p:extLst>
-  </p:cSld>
-  <p:clrMapOvr>
-    <a:masterClrMapping/>
-  </p:clrMapOvr>
-</p:sld>
-</file>
-
-<file path=ppt/slides/slide5.xml><?xml version="1.0" encoding="utf-8"?>
-<p:sld xmlns:a="http://schemas.openxmlformats.org/drawingml/2006/main" xmlns:r="http://schemas.openxmlformats.org/officeDocument/2006/relationships" xmlns:p="http://schemas.openxmlformats.org/presentationml/2006/main">
-  <p:cSld>
-    <p:spTree>
-      <p:nvGrpSpPr>
-        <p:cNvPr id="1" name=""/>
-        <p:cNvGrpSpPr/>
-        <p:nvPr/>
-      </p:nvGrpSpPr>
-      <p:grpSpPr>
-        <a:xfrm>
-          <a:off x="0" y="0"/>
-          <a:ext cx="0" cy="0"/>
-          <a:chOff x="0" y="0"/>
-          <a:chExt cx="0" cy="0"/>
-        </a:xfrm>
-      </p:grpSpPr>
-      <p:sp>
-        <p:nvSpPr>
-          <p:cNvPr id="2" name="Title 1">
-            <a:extLst>
-              <a:ext uri="{FF2B5EF4-FFF2-40B4-BE49-F238E27FC236}">
-                <a16:creationId xmlns:a16="http://schemas.microsoft.com/office/drawing/2014/main" id="{2335B545-4F73-4B53-9535-464A5303CECC}"/>
-              </a:ext>
-            </a:extLst>
-          </p:cNvPr>
-          <p:cNvSpPr>
-            <a:spLocks noGrp="1"/>
-          </p:cNvSpPr>
-          <p:nvPr>
-            <p:ph type="title"/>
-          </p:nvPr>
-        </p:nvSpPr>
-        <p:spPr/>
-        <p:txBody>
-          <a:bodyPr/>
-          <a:lstStyle/>
-          <a:p>
-            <a:r>
-              <a:rPr lang="nb-NO" dirty="0" err="1"/>
-              <a:t>Merged</a:t>
-            </a:r>
-            <a:r>
-              <a:rPr lang="nb-NO" dirty="0"/>
-              <a:t> data</a:t>
-            </a:r>
-          </a:p>
-        </p:txBody>
-      </p:sp>
-      <p:sp>
-        <p:nvSpPr>
-          <p:cNvPr id="3" name="Content Placeholder 2">
-            <a:extLst>
-              <a:ext uri="{FF2B5EF4-FFF2-40B4-BE49-F238E27FC236}">
-                <a16:creationId xmlns:a16="http://schemas.microsoft.com/office/drawing/2014/main" id="{7129C30A-33B3-B867-0E57-84817D5FD976}"/>
-              </a:ext>
-            </a:extLst>
-          </p:cNvPr>
-          <p:cNvSpPr>
-            <a:spLocks noGrp="1"/>
-          </p:cNvSpPr>
-          <p:nvPr>
-            <p:ph idx="1"/>
-          </p:nvPr>
-        </p:nvSpPr>
-        <p:spPr/>
-        <p:txBody>
-          <a:bodyPr/>
-          <a:lstStyle/>
-          <a:p>
-            <a:r>
-              <a:rPr lang="nb-NO" dirty="0" err="1"/>
-              <a:t>Municipality</a:t>
-            </a:r>
-            <a:r>
-              <a:rPr lang="nb-NO" dirty="0"/>
-              <a:t> data (area, </a:t>
-            </a:r>
-            <a:r>
-              <a:rPr lang="nb-NO" dirty="0" err="1"/>
-              <a:t>population</a:t>
-            </a:r>
-            <a:r>
-              <a:rPr lang="nb-NO" dirty="0"/>
-              <a:t>)</a:t>
-            </a:r>
-          </a:p>
-          <a:p>
-            <a:r>
-              <a:rPr lang="nb-NO" dirty="0"/>
-              <a:t>Grensehandel (</a:t>
-            </a:r>
-            <a:r>
-              <a:rPr lang="nb-NO" dirty="0" err="1"/>
-              <a:t>calculated</a:t>
-            </a:r>
-            <a:r>
-              <a:rPr lang="nb-NO" dirty="0"/>
-              <a:t> </a:t>
-            </a:r>
-            <a:r>
-              <a:rPr lang="nb-NO" dirty="0" err="1"/>
-              <a:t>spending</a:t>
-            </a:r>
-            <a:r>
-              <a:rPr lang="nb-NO" dirty="0"/>
-              <a:t> </a:t>
-            </a:r>
-            <a:r>
-              <a:rPr lang="nb-NO" dirty="0" err="1"/>
-              <a:t>on</a:t>
-            </a:r>
-            <a:r>
-              <a:rPr lang="nb-NO" dirty="0"/>
-              <a:t> </a:t>
-            </a:r>
-            <a:r>
-              <a:rPr lang="nb-NO" dirty="0" err="1"/>
-              <a:t>day</a:t>
-            </a:r>
-            <a:r>
-              <a:rPr lang="nb-NO" dirty="0"/>
-              <a:t> trips </a:t>
-            </a:r>
-            <a:r>
-              <a:rPr lang="nb-NO" dirty="0" err="1"/>
-              <a:t>abroad</a:t>
-            </a:r>
-            <a:r>
-              <a:rPr lang="nb-NO" dirty="0"/>
-              <a:t>)</a:t>
-            </a:r>
-          </a:p>
-          <a:p>
-            <a:r>
-              <a:rPr lang="nb-NO" dirty="0" err="1"/>
-              <a:t>Tourism</a:t>
-            </a:r>
-            <a:r>
-              <a:rPr lang="nb-NO" dirty="0"/>
-              <a:t> (</a:t>
-            </a:r>
-            <a:r>
-              <a:rPr lang="nb-NO" dirty="0" err="1"/>
-              <a:t>Number</a:t>
-            </a:r>
-            <a:r>
-              <a:rPr lang="nb-NO" dirty="0"/>
-              <a:t> </a:t>
-            </a:r>
-            <a:r>
-              <a:rPr lang="nb-NO" dirty="0" err="1"/>
-              <a:t>of</a:t>
-            </a:r>
-            <a:r>
-              <a:rPr lang="nb-NO" dirty="0"/>
-              <a:t> </a:t>
-            </a:r>
-            <a:r>
-              <a:rPr lang="nb-NO" dirty="0" err="1"/>
-              <a:t>stays</a:t>
-            </a:r>
-            <a:r>
-              <a:rPr lang="nb-NO" dirty="0"/>
-              <a:t> in a </a:t>
-            </a:r>
-            <a:r>
-              <a:rPr lang="nb-NO" dirty="0" err="1"/>
-              <a:t>municipality</a:t>
-            </a:r>
-            <a:r>
-              <a:rPr lang="nb-NO" dirty="0"/>
-              <a:t>)</a:t>
-            </a:r>
-          </a:p>
-          <a:p>
-            <a:r>
-              <a:rPr lang="nb-NO" dirty="0" err="1"/>
-              <a:t>Distance</a:t>
-            </a:r>
-            <a:r>
-              <a:rPr lang="nb-NO" dirty="0"/>
-              <a:t> (</a:t>
-            </a:r>
-            <a:r>
-              <a:rPr lang="nb-NO" dirty="0" err="1"/>
-              <a:t>municipality</a:t>
-            </a:r>
-            <a:r>
-              <a:rPr lang="nb-NO" dirty="0"/>
-              <a:t> </a:t>
-            </a:r>
-            <a:r>
-              <a:rPr lang="nb-NO" dirty="0" err="1"/>
-              <a:t>admin</a:t>
-            </a:r>
-            <a:r>
-              <a:rPr lang="nb-NO" dirty="0"/>
-              <a:t> </a:t>
-            </a:r>
-            <a:r>
-              <a:rPr lang="nb-NO" dirty="0" err="1"/>
-              <a:t>centers</a:t>
-            </a:r>
-            <a:r>
-              <a:rPr lang="nb-NO" dirty="0"/>
-              <a:t> – store locations)</a:t>
-            </a:r>
-          </a:p>
-        </p:txBody>
-      </p:sp>
-    </p:spTree>
-    <p:extLst>
-      <p:ext uri="{BB962C8B-B14F-4D97-AF65-F5344CB8AC3E}">
-        <p14:creationId xmlns:p14="http://schemas.microsoft.com/office/powerpoint/2010/main" val="2090806150"/>
-      </p:ext>
-    </p:extLst>
-  </p:cSld>
-  <p:clrMapOvr>
-    <a:masterClrMapping/>
-  </p:clrMapOvr>
-</p:sld>
-</file>
-
-<file path=ppt/slides/slide6.xml><?xml version="1.0" encoding="utf-8"?>
-<p:sld xmlns:a="http://schemas.openxmlformats.org/drawingml/2006/main" xmlns:r="http://schemas.openxmlformats.org/officeDocument/2006/relationships" xmlns:p="http://schemas.openxmlformats.org/presentationml/2006/main">
-  <p:cSld>
     <p:bg>
       <p:bgPr>
         <a:solidFill>
@@ -5773,7 +5586,7 @@
       </p:grpSpPr>
       <p:sp useBgFill="1">
         <p:nvSpPr>
-          <p:cNvPr id="18" name="Rectangle 12">
+          <p:cNvPr id="1031" name="Rectangle 1030">
             <a:extLst>
               <a:ext uri="{FF2B5EF4-FFF2-40B4-BE49-F238E27FC236}">
                 <a16:creationId xmlns:a16="http://schemas.microsoft.com/office/drawing/2014/main" id="{84ECDE7A-6944-466D-8FFE-149A29BA6BAE}"/>
@@ -5833,7 +5646,7 @@
       </p:sp>
       <p:sp useBgFill="1">
         <p:nvSpPr>
-          <p:cNvPr id="20" name="Rectangle 14">
+          <p:cNvPr id="1033" name="Rectangle 1032">
             <a:extLst>
               <a:ext uri="{FF2B5EF4-FFF2-40B4-BE49-F238E27FC236}">
                 <a16:creationId xmlns:a16="http://schemas.microsoft.com/office/drawing/2014/main" id="{B3420082-9415-44EC-802E-C77D71D59C57}"/>
@@ -5932,7 +5745,7 @@
       </p:sp>
       <p:sp useBgFill="1">
         <p:nvSpPr>
-          <p:cNvPr id="17" name="Rectangle 16">
+          <p:cNvPr id="1035" name="Rectangle 1034">
             <a:extLst>
               <a:ext uri="{FF2B5EF4-FFF2-40B4-BE49-F238E27FC236}">
                 <a16:creationId xmlns:a16="http://schemas.microsoft.com/office/drawing/2014/main" id="{55A52C45-1FCB-4636-A80F-2849B8226C01}"/>
@@ -6025,7 +5838,7 @@
           <p:cNvPr id="2" name="Tittel 1">
             <a:extLst>
               <a:ext uri="{FF2B5EF4-FFF2-40B4-BE49-F238E27FC236}">
-                <a16:creationId xmlns:a16="http://schemas.microsoft.com/office/drawing/2014/main" id="{116FC789-2B4A-7758-FFF4-714F4FA31302}"/>
+                <a16:creationId xmlns:a16="http://schemas.microsoft.com/office/drawing/2014/main" id="{58BEC9C7-917F-944A-4D33-396D64C26F81}"/>
               </a:ext>
             </a:extLst>
           </p:cNvPr>
@@ -6049,20 +5862,15 @@
           <a:lstStyle/>
           <a:p>
             <a:r>
-              <a:rPr lang="nb-NO" sz="4000" dirty="0"/>
-              <a:t>Stores by </a:t>
-            </a:r>
-            <a:r>
-              <a:rPr lang="nb-NO" sz="4000" dirty="0" err="1"/>
-              <a:t>municipalities</a:t>
-            </a:r>
-            <a:endParaRPr lang="nb-NO" sz="4000" dirty="0"/>
-          </a:p>
-        </p:txBody>
-      </p:sp>
-      <p:sp>
-        <p:nvSpPr>
-          <p:cNvPr id="19" name="Rectangle 18">
+              <a:rPr lang="nb-NO" sz="4000"/>
+              <a:t>What is Vinmonopolet?</a:t>
+            </a:r>
+          </a:p>
+        </p:txBody>
+      </p:sp>
+      <p:sp>
+        <p:nvSpPr>
+          <p:cNvPr id="1037" name="Rectangle 1036">
             <a:extLst>
               <a:ext uri="{FF2B5EF4-FFF2-40B4-BE49-F238E27FC236}">
                 <a16:creationId xmlns:a16="http://schemas.microsoft.com/office/drawing/2014/main" id="{768EB4DD-3704-43AD-92B3-C4E0C6EA92CB}"/>
@@ -6154,24 +5962,30 @@
       </p:sp>
       <p:pic>
         <p:nvPicPr>
-          <p:cNvPr id="6" name="Plassholder for innhold 5">
-            <a:extLst>
-              <a:ext uri="{FF2B5EF4-FFF2-40B4-BE49-F238E27FC236}">
-                <a16:creationId xmlns:a16="http://schemas.microsoft.com/office/drawing/2014/main" id="{AB942D65-C62D-36F7-5535-2762F08DB111}"/>
+          <p:cNvPr id="1026" name="Picture 2">
+            <a:extLst>
+              <a:ext uri="{FF2B5EF4-FFF2-40B4-BE49-F238E27FC236}">
+                <a16:creationId xmlns:a16="http://schemas.microsoft.com/office/drawing/2014/main" id="{A685B1E2-F26E-4E1D-A853-60031C33ACBB}"/>
               </a:ext>
             </a:extLst>
           </p:cNvPr>
           <p:cNvPicPr>
-            <a:picLocks noChangeAspect="1"/>
+            <a:picLocks noChangeAspect="1" noChangeArrowheads="1"/>
           </p:cNvPicPr>
           <p:nvPr/>
         </p:nvPicPr>
         <p:blipFill>
-          <a:blip r:embed="rId2"/>
-          <a:srcRect t="6866" r="2" b="2"/>
+          <a:blip r:embed="rId2">
+            <a:extLst>
+              <a:ext uri="{28A0092B-C50C-407E-A947-70E740481C1C}">
+                <a14:useLocalDpi xmlns:a14="http://schemas.microsoft.com/office/drawing/2010/main" val="0"/>
+              </a:ext>
+            </a:extLst>
+          </a:blip>
+          <a:srcRect t="12021" r="2" b="26512"/>
           <a:stretch/>
         </p:blipFill>
-        <p:spPr>
+        <p:spPr bwMode="auto">
           <a:xfrm>
             <a:off x="908304" y="2478024"/>
             <a:ext cx="6009855" cy="3694176"/>
@@ -6179,14 +5993,24 @@
           <a:prstGeom prst="rect">
             <a:avLst/>
           </a:prstGeom>
+          <a:noFill/>
+          <a:extLst>
+            <a:ext uri="{909E8E84-426E-40DD-AFC4-6F175D3DCCD1}">
+              <a14:hiddenFill xmlns:a14="http://schemas.microsoft.com/office/drawing/2010/main">
+                <a:solidFill>
+                  <a:srgbClr val="FFFFFF"/>
+                </a:solidFill>
+              </a14:hiddenFill>
+            </a:ext>
+          </a:extLst>
         </p:spPr>
       </p:pic>
       <p:sp>
         <p:nvSpPr>
-          <p:cNvPr id="21" name="Content Placeholder 9">
-            <a:extLst>
-              <a:ext uri="{FF2B5EF4-FFF2-40B4-BE49-F238E27FC236}">
-                <a16:creationId xmlns:a16="http://schemas.microsoft.com/office/drawing/2014/main" id="{A5CC1BB1-90C2-C0D7-230E-874FC27FCEB2}"/>
+          <p:cNvPr id="3" name="Plassholder for innhold 2">
+            <a:extLst>
+              <a:ext uri="{FF2B5EF4-FFF2-40B4-BE49-F238E27FC236}">
+                <a16:creationId xmlns:a16="http://schemas.microsoft.com/office/drawing/2014/main" id="{10E9193C-458A-D503-2225-877AA9272DCF}"/>
               </a:ext>
             </a:extLst>
           </p:cNvPr>
@@ -6210,41 +6034,547 @@
           <a:lstStyle/>
           <a:p>
             <a:r>
-              <a:rPr lang="en-US" sz="1800" b="1" u="sng" dirty="0"/>
-              <a:t>Key takeaways</a:t>
-            </a:r>
-            <a:r>
-              <a:rPr lang="en-US" sz="1800" dirty="0"/>
-              <a:t>: </a:t>
-            </a:r>
-          </a:p>
-          <a:p>
-            <a:r>
-              <a:rPr lang="en-US" sz="1800" dirty="0"/>
-              <a:t>A lot of municipals with 1 store</a:t>
-            </a:r>
-          </a:p>
-          <a:p>
-            <a:r>
-              <a:rPr lang="en-US" sz="1800" dirty="0"/>
-              <a:t>Some areas with multiple no-store-municipals. </a:t>
-            </a:r>
-          </a:p>
-          <a:p>
-            <a:r>
-              <a:rPr lang="en-US" sz="1800" dirty="0"/>
-              <a:t>Big number heavily centered around big cities</a:t>
-            </a:r>
-          </a:p>
-          <a:p>
-            <a:endParaRPr lang="en-US" sz="1800" dirty="0"/>
+              <a:rPr lang="en-US" sz="1800"/>
+              <a:t>Monopoly on retail sale of alcoholic beverages above 4.7% </a:t>
+            </a:r>
+          </a:p>
+          <a:p>
+            <a:r>
+              <a:rPr lang="en-US" sz="1800"/>
+              <a:t>No profit motive – the state earns money on taxes and fees</a:t>
+            </a:r>
+          </a:p>
+          <a:p>
+            <a:r>
+              <a:rPr lang="en-US" sz="1800"/>
+              <a:t>Controlled distribution and availability</a:t>
+            </a:r>
+          </a:p>
+          <a:p>
+            <a:r>
+              <a:rPr lang="en-US" sz="1800"/>
+              <a:t>Covers 98% of the population within 30km</a:t>
+            </a:r>
+          </a:p>
+          <a:p>
+            <a:endParaRPr lang="en-US" sz="1800"/>
+          </a:p>
+          <a:p>
+            <a:endParaRPr lang="nb-NO" sz="1800"/>
           </a:p>
         </p:txBody>
       </p:sp>
     </p:spTree>
     <p:extLst>
       <p:ext uri="{BB962C8B-B14F-4D97-AF65-F5344CB8AC3E}">
-        <p14:creationId xmlns:p14="http://schemas.microsoft.com/office/powerpoint/2010/main" val="3529371865"/>
+        <p14:creationId xmlns:p14="http://schemas.microsoft.com/office/powerpoint/2010/main" val="4048774490"/>
+      </p:ext>
+    </p:extLst>
+  </p:cSld>
+  <p:clrMapOvr>
+    <a:masterClrMapping/>
+  </p:clrMapOvr>
+</p:sld>
+</file>
+
+<file path=ppt/slides/slide4.xml><?xml version="1.0" encoding="utf-8"?>
+<p:sld xmlns:a="http://schemas.openxmlformats.org/drawingml/2006/main" xmlns:r="http://schemas.openxmlformats.org/officeDocument/2006/relationships" xmlns:p="http://schemas.openxmlformats.org/presentationml/2006/main">
+  <p:cSld>
+    <p:spTree>
+      <p:nvGrpSpPr>
+        <p:cNvPr id="1" name=""/>
+        <p:cNvGrpSpPr/>
+        <p:nvPr/>
+      </p:nvGrpSpPr>
+      <p:grpSpPr>
+        <a:xfrm>
+          <a:off x="0" y="0"/>
+          <a:ext cx="0" cy="0"/>
+          <a:chOff x="0" y="0"/>
+          <a:chExt cx="0" cy="0"/>
+        </a:xfrm>
+      </p:grpSpPr>
+      <p:sp>
+        <p:nvSpPr>
+          <p:cNvPr id="4" name="Title 3">
+            <a:extLst>
+              <a:ext uri="{FF2B5EF4-FFF2-40B4-BE49-F238E27FC236}">
+                <a16:creationId xmlns:a16="http://schemas.microsoft.com/office/drawing/2014/main" id="{3FB6D529-D066-ABCB-A37B-F711A64CDBEE}"/>
+              </a:ext>
+            </a:extLst>
+          </p:cNvPr>
+          <p:cNvSpPr>
+            <a:spLocks noGrp="1"/>
+          </p:cNvSpPr>
+          <p:nvPr>
+            <p:ph type="ctrTitle"/>
+          </p:nvPr>
+        </p:nvSpPr>
+        <p:spPr/>
+        <p:txBody>
+          <a:bodyPr/>
+          <a:lstStyle/>
+          <a:p>
+            <a:r>
+              <a:rPr lang="nb-NO" dirty="0"/>
+              <a:t>Data(</a:t>
+            </a:r>
+            <a:r>
+              <a:rPr lang="nb-NO" dirty="0" err="1"/>
+              <a:t>gathering</a:t>
+            </a:r>
+            <a:r>
+              <a:rPr lang="nb-NO" dirty="0"/>
+              <a:t>)</a:t>
+            </a:r>
+          </a:p>
+        </p:txBody>
+      </p:sp>
+      <p:sp>
+        <p:nvSpPr>
+          <p:cNvPr id="5" name="Subtitle 4">
+            <a:extLst>
+              <a:ext uri="{FF2B5EF4-FFF2-40B4-BE49-F238E27FC236}">
+                <a16:creationId xmlns:a16="http://schemas.microsoft.com/office/drawing/2014/main" id="{6BBC60DC-0B26-C772-B3C9-179505A29F80}"/>
+              </a:ext>
+            </a:extLst>
+          </p:cNvPr>
+          <p:cNvSpPr>
+            <a:spLocks noGrp="1"/>
+          </p:cNvSpPr>
+          <p:nvPr>
+            <p:ph type="subTitle" idx="1"/>
+          </p:nvPr>
+        </p:nvSpPr>
+        <p:spPr/>
+        <p:txBody>
+          <a:bodyPr/>
+          <a:lstStyle/>
+          <a:p>
+            <a:endParaRPr lang="nb-NO"/>
+          </a:p>
+        </p:txBody>
+      </p:sp>
+    </p:spTree>
+    <p:extLst>
+      <p:ext uri="{BB962C8B-B14F-4D97-AF65-F5344CB8AC3E}">
+        <p14:creationId xmlns:p14="http://schemas.microsoft.com/office/powerpoint/2010/main" val="2764983961"/>
+      </p:ext>
+    </p:extLst>
+  </p:cSld>
+  <p:clrMapOvr>
+    <a:masterClrMapping/>
+  </p:clrMapOvr>
+</p:sld>
+</file>
+
+<file path=ppt/slides/slide5.xml><?xml version="1.0" encoding="utf-8"?>
+<p:sld xmlns:a="http://schemas.openxmlformats.org/drawingml/2006/main" xmlns:r="http://schemas.openxmlformats.org/officeDocument/2006/relationships" xmlns:p="http://schemas.openxmlformats.org/presentationml/2006/main">
+  <p:cSld>
+    <p:spTree>
+      <p:nvGrpSpPr>
+        <p:cNvPr id="1" name=""/>
+        <p:cNvGrpSpPr/>
+        <p:nvPr/>
+      </p:nvGrpSpPr>
+      <p:grpSpPr>
+        <a:xfrm>
+          <a:off x="0" y="0"/>
+          <a:ext cx="0" cy="0"/>
+          <a:chOff x="0" y="0"/>
+          <a:chExt cx="0" cy="0"/>
+        </a:xfrm>
+      </p:grpSpPr>
+      <p:sp>
+        <p:nvSpPr>
+          <p:cNvPr id="2" name="Title 1">
+            <a:extLst>
+              <a:ext uri="{FF2B5EF4-FFF2-40B4-BE49-F238E27FC236}">
+                <a16:creationId xmlns:a16="http://schemas.microsoft.com/office/drawing/2014/main" id="{2EC69C85-C969-1BC5-6AE7-AD2165DD9C13}"/>
+              </a:ext>
+            </a:extLst>
+          </p:cNvPr>
+          <p:cNvSpPr>
+            <a:spLocks noGrp="1"/>
+          </p:cNvSpPr>
+          <p:nvPr>
+            <p:ph type="title"/>
+          </p:nvPr>
+        </p:nvSpPr>
+        <p:spPr/>
+        <p:txBody>
+          <a:bodyPr/>
+          <a:lstStyle/>
+          <a:p>
+            <a:r>
+              <a:rPr lang="nb-NO" dirty="0"/>
+              <a:t>Main data </a:t>
+            </a:r>
+            <a:r>
+              <a:rPr lang="nb-NO" dirty="0" err="1"/>
+              <a:t>set</a:t>
+            </a:r>
+            <a:endParaRPr lang="nb-NO" dirty="0"/>
+          </a:p>
+        </p:txBody>
+      </p:sp>
+      <p:sp>
+        <p:nvSpPr>
+          <p:cNvPr id="3" name="Content Placeholder 2">
+            <a:extLst>
+              <a:ext uri="{FF2B5EF4-FFF2-40B4-BE49-F238E27FC236}">
+                <a16:creationId xmlns:a16="http://schemas.microsoft.com/office/drawing/2014/main" id="{89D8E8A5-B69A-78FD-101C-8E29EC420823}"/>
+              </a:ext>
+            </a:extLst>
+          </p:cNvPr>
+          <p:cNvSpPr>
+            <a:spLocks noGrp="1"/>
+          </p:cNvSpPr>
+          <p:nvPr>
+            <p:ph idx="1"/>
+          </p:nvPr>
+        </p:nvSpPr>
+        <p:spPr/>
+        <p:txBody>
+          <a:bodyPr/>
+          <a:lstStyle/>
+          <a:p>
+            <a:r>
+              <a:rPr lang="nb-NO" dirty="0"/>
+              <a:t>2024 data</a:t>
+            </a:r>
+          </a:p>
+          <a:p>
+            <a:pPr lvl="1"/>
+            <a:r>
+              <a:rPr lang="nb-NO" dirty="0"/>
+              <a:t>Total sales (liters) per store</a:t>
+            </a:r>
+          </a:p>
+          <a:p>
+            <a:pPr lvl="1"/>
+            <a:r>
+              <a:rPr lang="nb-NO" dirty="0" err="1"/>
+              <a:t>There</a:t>
+            </a:r>
+            <a:r>
+              <a:rPr lang="nb-NO" dirty="0"/>
+              <a:t> is </a:t>
+            </a:r>
+            <a:r>
+              <a:rPr lang="nb-NO" dirty="0" err="1"/>
+              <a:t>also</a:t>
+            </a:r>
+            <a:r>
+              <a:rPr lang="nb-NO" dirty="0"/>
+              <a:t> data for </a:t>
+            </a:r>
+            <a:r>
+              <a:rPr lang="nb-NO" dirty="0" err="1"/>
+              <a:t>each</a:t>
+            </a:r>
+            <a:r>
+              <a:rPr lang="nb-NO" dirty="0"/>
+              <a:t> </a:t>
+            </a:r>
+            <a:r>
+              <a:rPr lang="nb-NO" dirty="0" err="1"/>
+              <a:t>alcohol</a:t>
+            </a:r>
+            <a:r>
+              <a:rPr lang="nb-NO" dirty="0"/>
+              <a:t> type</a:t>
+            </a:r>
+          </a:p>
+          <a:p>
+            <a:r>
+              <a:rPr lang="nb-NO" dirty="0" err="1"/>
+              <a:t>Individual</a:t>
+            </a:r>
+            <a:r>
+              <a:rPr lang="nb-NO" dirty="0"/>
+              <a:t> store data</a:t>
+            </a:r>
+          </a:p>
+          <a:p>
+            <a:pPr lvl="1"/>
+            <a:r>
+              <a:rPr lang="nb-NO" dirty="0"/>
+              <a:t>Location </a:t>
+            </a:r>
+            <a:r>
+              <a:rPr lang="nb-NO" dirty="0" err="1"/>
+              <a:t>name</a:t>
+            </a:r>
+            <a:endParaRPr lang="nb-NO" dirty="0"/>
+          </a:p>
+          <a:p>
+            <a:pPr lvl="1"/>
+            <a:r>
+              <a:rPr lang="nb-NO" dirty="0" err="1"/>
+              <a:t>Geo</a:t>
+            </a:r>
+            <a:r>
+              <a:rPr lang="nb-NO" dirty="0"/>
+              <a:t>-location</a:t>
+            </a:r>
+          </a:p>
+          <a:p>
+            <a:pPr lvl="1"/>
+            <a:r>
+              <a:rPr lang="nb-NO" dirty="0" err="1"/>
+              <a:t>Municipality</a:t>
+            </a:r>
+            <a:r>
+              <a:rPr lang="nb-NO" dirty="0"/>
+              <a:t>(?)</a:t>
+            </a:r>
+          </a:p>
+          <a:p>
+            <a:pPr lvl="1"/>
+            <a:r>
+              <a:rPr lang="nb-NO" dirty="0"/>
+              <a:t>Store type (</a:t>
+            </a:r>
+            <a:r>
+              <a:rPr lang="nb-NO" dirty="0" err="1"/>
+              <a:t>size</a:t>
+            </a:r>
+            <a:r>
+              <a:rPr lang="nb-NO" dirty="0"/>
+              <a:t> and sortiment)</a:t>
+            </a:r>
+          </a:p>
+        </p:txBody>
+      </p:sp>
+    </p:spTree>
+    <p:extLst>
+      <p:ext uri="{BB962C8B-B14F-4D97-AF65-F5344CB8AC3E}">
+        <p14:creationId xmlns:p14="http://schemas.microsoft.com/office/powerpoint/2010/main" val="2243722391"/>
+      </p:ext>
+    </p:extLst>
+  </p:cSld>
+  <p:clrMapOvr>
+    <a:masterClrMapping/>
+  </p:clrMapOvr>
+</p:sld>
+</file>
+
+<file path=ppt/slides/slide6.xml><?xml version="1.0" encoding="utf-8"?>
+<p:sld xmlns:a="http://schemas.openxmlformats.org/drawingml/2006/main" xmlns:r="http://schemas.openxmlformats.org/officeDocument/2006/relationships" xmlns:p="http://schemas.openxmlformats.org/presentationml/2006/main">
+  <p:cSld>
+    <p:spTree>
+      <p:nvGrpSpPr>
+        <p:cNvPr id="1" name=""/>
+        <p:cNvGrpSpPr/>
+        <p:nvPr/>
+      </p:nvGrpSpPr>
+      <p:grpSpPr>
+        <a:xfrm>
+          <a:off x="0" y="0"/>
+          <a:ext cx="0" cy="0"/>
+          <a:chOff x="0" y="0"/>
+          <a:chExt cx="0" cy="0"/>
+        </a:xfrm>
+      </p:grpSpPr>
+      <p:sp>
+        <p:nvSpPr>
+          <p:cNvPr id="2" name="Title 1">
+            <a:extLst>
+              <a:ext uri="{FF2B5EF4-FFF2-40B4-BE49-F238E27FC236}">
+                <a16:creationId xmlns:a16="http://schemas.microsoft.com/office/drawing/2014/main" id="{2335B545-4F73-4B53-9535-464A5303CECC}"/>
+              </a:ext>
+            </a:extLst>
+          </p:cNvPr>
+          <p:cNvSpPr>
+            <a:spLocks noGrp="1"/>
+          </p:cNvSpPr>
+          <p:nvPr>
+            <p:ph type="title"/>
+          </p:nvPr>
+        </p:nvSpPr>
+        <p:spPr/>
+        <p:txBody>
+          <a:bodyPr/>
+          <a:lstStyle/>
+          <a:p>
+            <a:r>
+              <a:rPr lang="nb-NO" dirty="0" err="1"/>
+              <a:t>Merged</a:t>
+            </a:r>
+            <a:r>
+              <a:rPr lang="nb-NO" dirty="0"/>
+              <a:t> data</a:t>
+            </a:r>
+          </a:p>
+        </p:txBody>
+      </p:sp>
+      <p:sp>
+        <p:nvSpPr>
+          <p:cNvPr id="3" name="Content Placeholder 2">
+            <a:extLst>
+              <a:ext uri="{FF2B5EF4-FFF2-40B4-BE49-F238E27FC236}">
+                <a16:creationId xmlns:a16="http://schemas.microsoft.com/office/drawing/2014/main" id="{7129C30A-33B3-B867-0E57-84817D5FD976}"/>
+              </a:ext>
+            </a:extLst>
+          </p:cNvPr>
+          <p:cNvSpPr>
+            <a:spLocks noGrp="1"/>
+          </p:cNvSpPr>
+          <p:nvPr>
+            <p:ph idx="1"/>
+          </p:nvPr>
+        </p:nvSpPr>
+        <p:spPr/>
+        <p:txBody>
+          <a:bodyPr/>
+          <a:lstStyle/>
+          <a:p>
+            <a:r>
+              <a:rPr lang="nb-NO" dirty="0" err="1"/>
+              <a:t>Municipality</a:t>
+            </a:r>
+            <a:r>
+              <a:rPr lang="nb-NO" dirty="0"/>
+              <a:t> data (area, </a:t>
+            </a:r>
+            <a:r>
+              <a:rPr lang="nb-NO" dirty="0" err="1"/>
+              <a:t>population</a:t>
+            </a:r>
+            <a:r>
+              <a:rPr lang="nb-NO" dirty="0"/>
+              <a:t>)</a:t>
+            </a:r>
+          </a:p>
+          <a:p>
+            <a:r>
+              <a:rPr lang="nb-NO" dirty="0"/>
+              <a:t>Grensehandel (</a:t>
+            </a:r>
+            <a:r>
+              <a:rPr lang="nb-NO" dirty="0" err="1"/>
+              <a:t>calculated</a:t>
+            </a:r>
+            <a:r>
+              <a:rPr lang="nb-NO" dirty="0"/>
+              <a:t> </a:t>
+            </a:r>
+            <a:r>
+              <a:rPr lang="nb-NO" dirty="0" err="1"/>
+              <a:t>spending</a:t>
+            </a:r>
+            <a:r>
+              <a:rPr lang="nb-NO" dirty="0"/>
+              <a:t> </a:t>
+            </a:r>
+            <a:r>
+              <a:rPr lang="nb-NO" dirty="0" err="1"/>
+              <a:t>on</a:t>
+            </a:r>
+            <a:r>
+              <a:rPr lang="nb-NO" dirty="0"/>
+              <a:t> </a:t>
+            </a:r>
+            <a:r>
+              <a:rPr lang="nb-NO" dirty="0" err="1"/>
+              <a:t>day</a:t>
+            </a:r>
+            <a:r>
+              <a:rPr lang="nb-NO" dirty="0"/>
+              <a:t> trips </a:t>
+            </a:r>
+            <a:r>
+              <a:rPr lang="nb-NO" dirty="0" err="1"/>
+              <a:t>abroad</a:t>
+            </a:r>
+            <a:r>
+              <a:rPr lang="nb-NO" dirty="0"/>
+              <a:t>)</a:t>
+            </a:r>
+          </a:p>
+          <a:p>
+            <a:r>
+              <a:rPr lang="nb-NO" dirty="0" err="1"/>
+              <a:t>Tourism</a:t>
+            </a:r>
+            <a:r>
+              <a:rPr lang="nb-NO" dirty="0"/>
+              <a:t> (</a:t>
+            </a:r>
+            <a:r>
+              <a:rPr lang="nb-NO" dirty="0" err="1"/>
+              <a:t>Number</a:t>
+            </a:r>
+            <a:r>
+              <a:rPr lang="nb-NO" dirty="0"/>
+              <a:t> </a:t>
+            </a:r>
+            <a:r>
+              <a:rPr lang="nb-NO" dirty="0" err="1"/>
+              <a:t>of</a:t>
+            </a:r>
+            <a:r>
+              <a:rPr lang="nb-NO" dirty="0"/>
+              <a:t> </a:t>
+            </a:r>
+            <a:r>
+              <a:rPr lang="nb-NO" dirty="0" err="1"/>
+              <a:t>stays</a:t>
+            </a:r>
+            <a:r>
+              <a:rPr lang="nb-NO" dirty="0"/>
+              <a:t> in a </a:t>
+            </a:r>
+            <a:r>
+              <a:rPr lang="nb-NO" dirty="0" err="1"/>
+              <a:t>municipality</a:t>
+            </a:r>
+            <a:r>
+              <a:rPr lang="nb-NO" dirty="0"/>
+              <a:t>)</a:t>
+            </a:r>
+          </a:p>
+          <a:p>
+            <a:r>
+              <a:rPr lang="nb-NO" dirty="0" err="1"/>
+              <a:t>Distance</a:t>
+            </a:r>
+            <a:r>
+              <a:rPr lang="nb-NO" dirty="0"/>
+              <a:t> (</a:t>
+            </a:r>
+            <a:r>
+              <a:rPr lang="nb-NO" dirty="0" err="1"/>
+              <a:t>municipality</a:t>
+            </a:r>
+            <a:r>
+              <a:rPr lang="nb-NO" dirty="0"/>
+              <a:t> </a:t>
+            </a:r>
+            <a:r>
+              <a:rPr lang="nb-NO" dirty="0" err="1"/>
+              <a:t>admin</a:t>
+            </a:r>
+            <a:r>
+              <a:rPr lang="nb-NO" dirty="0"/>
+              <a:t> </a:t>
+            </a:r>
+            <a:r>
+              <a:rPr lang="nb-NO" dirty="0" err="1"/>
+              <a:t>centers</a:t>
+            </a:r>
+            <a:r>
+              <a:rPr lang="nb-NO" dirty="0"/>
+              <a:t> – store locations)</a:t>
+            </a:r>
+          </a:p>
+        </p:txBody>
+      </p:sp>
+    </p:spTree>
+    <p:extLst>
+      <p:ext uri="{BB962C8B-B14F-4D97-AF65-F5344CB8AC3E}">
+        <p14:creationId xmlns:p14="http://schemas.microsoft.com/office/powerpoint/2010/main" val="2090806150"/>
       </p:ext>
     </p:extLst>
   </p:cSld>
@@ -6279,6 +6609,514 @@
           <a:chExt cx="0" cy="0"/>
         </a:xfrm>
       </p:grpSpPr>
+      <p:sp useBgFill="1">
+        <p:nvSpPr>
+          <p:cNvPr id="18" name="Rectangle 12">
+            <a:extLst>
+              <a:ext uri="{FF2B5EF4-FFF2-40B4-BE49-F238E27FC236}">
+                <a16:creationId xmlns:a16="http://schemas.microsoft.com/office/drawing/2014/main" id="{84ECDE7A-6944-466D-8FFE-149A29BA6BAE}"/>
+              </a:ext>
+              <a:ext uri="{C183D7F6-B498-43B3-948B-1728B52AA6E4}">
+                <adec:decorative xmlns:adec="http://schemas.microsoft.com/office/drawing/2017/decorative" val="1"/>
+              </a:ext>
+            </a:extLst>
+          </p:cNvPr>
+          <p:cNvSpPr>
+            <a:spLocks noGrp="1" noRot="1" noChangeAspect="1" noMove="1" noResize="1" noEditPoints="1" noAdjustHandles="1" noChangeArrowheads="1" noChangeShapeType="1" noTextEdit="1"/>
+          </p:cNvSpPr>
+          <p:nvPr>
+            <p:extLst>
+              <p:ext uri="{386F3935-93C4-4BCD-93E2-E3B085C9AB24}">
+                <p16:designElem xmlns:p16="http://schemas.microsoft.com/office/powerpoint/2015/main" val="1"/>
+              </p:ext>
+            </p:extLst>
+          </p:nvPr>
+        </p:nvSpPr>
+        <p:spPr>
+          <a:xfrm>
+            <a:off x="0" y="0"/>
+            <a:ext cx="12192000" cy="6858000"/>
+          </a:xfrm>
+          <a:prstGeom prst="rect">
+            <a:avLst/>
+          </a:prstGeom>
+          <a:ln>
+            <a:noFill/>
+          </a:ln>
+        </p:spPr>
+        <p:style>
+          <a:lnRef idx="2">
+            <a:schemeClr val="accent1">
+              <a:shade val="50000"/>
+            </a:schemeClr>
+          </a:lnRef>
+          <a:fillRef idx="1">
+            <a:schemeClr val="accent1"/>
+          </a:fillRef>
+          <a:effectRef idx="0">
+            <a:schemeClr val="accent1"/>
+          </a:effectRef>
+          <a:fontRef idx="minor">
+            <a:schemeClr val="lt1"/>
+          </a:fontRef>
+        </p:style>
+        <p:txBody>
+          <a:bodyPr rtlCol="0" anchor="ctr"/>
+          <a:lstStyle/>
+          <a:p>
+            <a:pPr algn="ctr"/>
+            <a:endParaRPr lang="en-US"/>
+          </a:p>
+        </p:txBody>
+      </p:sp>
+      <p:sp useBgFill="1">
+        <p:nvSpPr>
+          <p:cNvPr id="20" name="Rectangle 14">
+            <a:extLst>
+              <a:ext uri="{FF2B5EF4-FFF2-40B4-BE49-F238E27FC236}">
+                <a16:creationId xmlns:a16="http://schemas.microsoft.com/office/drawing/2014/main" id="{B3420082-9415-44EC-802E-C77D71D59C57}"/>
+              </a:ext>
+              <a:ext uri="{C183D7F6-B498-43B3-948B-1728B52AA6E4}">
+                <adec:decorative xmlns:adec="http://schemas.microsoft.com/office/drawing/2017/decorative" val="1"/>
+              </a:ext>
+            </a:extLst>
+          </p:cNvPr>
+          <p:cNvSpPr>
+            <a:spLocks noGrp="1" noRot="1" noChangeAspect="1" noMove="1" noResize="1" noEditPoints="1" noAdjustHandles="1" noChangeArrowheads="1" noChangeShapeType="1" noTextEdit="1"/>
+          </p:cNvSpPr>
+          <p:nvPr>
+            <p:extLst>
+              <p:ext uri="{386F3935-93C4-4BCD-93E2-E3B085C9AB24}">
+                <p16:designElem xmlns:p16="http://schemas.microsoft.com/office/powerpoint/2015/main" val="1"/>
+              </p:ext>
+            </p:extLst>
+          </p:nvPr>
+        </p:nvSpPr>
+        <p:spPr>
+          <a:xfrm>
+            <a:off x="558209" y="0"/>
+            <a:ext cx="11167447" cy="2018806"/>
+          </a:xfrm>
+          <a:prstGeom prst="rect">
+            <a:avLst/>
+          </a:prstGeom>
+          <a:ln w="12700">
+            <a:solidFill>
+              <a:srgbClr val="E1E1E1"/>
+            </a:solidFill>
+          </a:ln>
+          <a:effectLst>
+            <a:outerShdw blurRad="50800" dist="38100" dir="2700000" algn="tl" rotWithShape="0">
+              <a:schemeClr val="bg1">
+                <a:lumMod val="85000"/>
+                <a:alpha val="50000"/>
+              </a:schemeClr>
+            </a:outerShdw>
+          </a:effectLst>
+        </p:spPr>
+        <p:style>
+          <a:lnRef idx="2">
+            <a:schemeClr val="accent1">
+              <a:shade val="50000"/>
+            </a:schemeClr>
+          </a:lnRef>
+          <a:fillRef idx="1">
+            <a:schemeClr val="accent1"/>
+          </a:fillRef>
+          <a:effectRef idx="0">
+            <a:schemeClr val="accent1"/>
+          </a:effectRef>
+          <a:fontRef idx="minor">
+            <a:schemeClr val="lt1"/>
+          </a:fontRef>
+        </p:style>
+        <p:txBody>
+          <a:bodyPr rtlCol="0" anchor="ctr"/>
+          <a:lstStyle/>
+          <a:p>
+            <a:pPr marL="0" marR="0" lvl="0" indent="0" algn="ctr" defTabSz="914400" rtl="0" eaLnBrk="1" fontAlgn="auto" latinLnBrk="0" hangingPunct="1">
+              <a:lnSpc>
+                <a:spcPct val="100000"/>
+              </a:lnSpc>
+              <a:spcBef>
+                <a:spcPts val="0"/>
+              </a:spcBef>
+              <a:spcAft>
+                <a:spcPts val="0"/>
+              </a:spcAft>
+              <a:buClrTx/>
+              <a:buSzTx/>
+              <a:buFontTx/>
+              <a:buNone/>
+              <a:tabLst/>
+              <a:defRPr/>
+            </a:pPr>
+            <a:endParaRPr kumimoji="0" lang="en-US" sz="1800" b="0" i="0" u="none" strike="noStrike" kern="1200" cap="none" spc="0" normalizeH="0" baseline="0" noProof="0">
+              <a:ln>
+                <a:noFill/>
+              </a:ln>
+              <a:solidFill>
+                <a:prstClr val="white"/>
+              </a:solidFill>
+              <a:effectLst/>
+              <a:uLnTx/>
+              <a:uFillTx/>
+              <a:latin typeface="Calibri" panose="020F0502020204030204"/>
+              <a:ea typeface="+mn-ea"/>
+              <a:cs typeface="+mn-cs"/>
+            </a:endParaRPr>
+          </a:p>
+        </p:txBody>
+      </p:sp>
+      <p:sp useBgFill="1">
+        <p:nvSpPr>
+          <p:cNvPr id="17" name="Rectangle 16">
+            <a:extLst>
+              <a:ext uri="{FF2B5EF4-FFF2-40B4-BE49-F238E27FC236}">
+                <a16:creationId xmlns:a16="http://schemas.microsoft.com/office/drawing/2014/main" id="{55A52C45-1FCB-4636-A80F-2849B8226C01}"/>
+              </a:ext>
+              <a:ext uri="{C183D7F6-B498-43B3-948B-1728B52AA6E4}">
+                <adec:decorative xmlns:adec="http://schemas.microsoft.com/office/drawing/2017/decorative" val="1"/>
+              </a:ext>
+            </a:extLst>
+          </p:cNvPr>
+          <p:cNvSpPr>
+            <a:spLocks noGrp="1" noRot="1" noChangeAspect="1" noMove="1" noResize="1" noEditPoints="1" noAdjustHandles="1" noChangeArrowheads="1" noChangeShapeType="1" noTextEdit="1"/>
+          </p:cNvSpPr>
+          <p:nvPr>
+            <p:extLst>
+              <p:ext uri="{386F3935-93C4-4BCD-93E2-E3B085C9AB24}">
+                <p16:designElem xmlns:p16="http://schemas.microsoft.com/office/powerpoint/2015/main" val="1"/>
+              </p:ext>
+            </p:extLst>
+          </p:nvPr>
+        </p:nvSpPr>
+        <p:spPr>
+          <a:xfrm>
+            <a:off x="566928" y="0"/>
+            <a:ext cx="11155680" cy="2011680"/>
+          </a:xfrm>
+          <a:prstGeom prst="rect">
+            <a:avLst/>
+          </a:prstGeom>
+          <a:ln w="12700">
+            <a:noFill/>
+          </a:ln>
+          <a:effectLst/>
+        </p:spPr>
+        <p:style>
+          <a:lnRef idx="2">
+            <a:schemeClr val="accent1">
+              <a:shade val="50000"/>
+            </a:schemeClr>
+          </a:lnRef>
+          <a:fillRef idx="1">
+            <a:schemeClr val="accent1"/>
+          </a:fillRef>
+          <a:effectRef idx="0">
+            <a:schemeClr val="accent1"/>
+          </a:effectRef>
+          <a:fontRef idx="minor">
+            <a:schemeClr val="lt1"/>
+          </a:fontRef>
+        </p:style>
+        <p:txBody>
+          <a:bodyPr rtlCol="0" anchor="ctr"/>
+          <a:lstStyle/>
+          <a:p>
+            <a:pPr marL="0" marR="0" lvl="0" indent="0" algn="ctr" defTabSz="914400" rtl="0" eaLnBrk="1" fontAlgn="auto" latinLnBrk="0" hangingPunct="1">
+              <a:lnSpc>
+                <a:spcPct val="100000"/>
+              </a:lnSpc>
+              <a:spcBef>
+                <a:spcPts val="0"/>
+              </a:spcBef>
+              <a:spcAft>
+                <a:spcPts val="0"/>
+              </a:spcAft>
+              <a:buClrTx/>
+              <a:buSzTx/>
+              <a:buFontTx/>
+              <a:buNone/>
+              <a:tabLst/>
+              <a:defRPr/>
+            </a:pPr>
+            <a:endParaRPr kumimoji="0" lang="en-US" sz="1800" b="0" i="0" u="none" strike="noStrike" kern="1200" cap="none" spc="0" normalizeH="0" baseline="0" noProof="0">
+              <a:ln>
+                <a:noFill/>
+              </a:ln>
+              <a:solidFill>
+                <a:prstClr val="white"/>
+              </a:solidFill>
+              <a:effectLst/>
+              <a:uLnTx/>
+              <a:uFillTx/>
+              <a:latin typeface="Calibri" panose="020F0502020204030204"/>
+              <a:ea typeface="+mn-ea"/>
+              <a:cs typeface="+mn-cs"/>
+            </a:endParaRPr>
+          </a:p>
+        </p:txBody>
+      </p:sp>
+      <p:sp>
+        <p:nvSpPr>
+          <p:cNvPr id="2" name="Tittel 1">
+            <a:extLst>
+              <a:ext uri="{FF2B5EF4-FFF2-40B4-BE49-F238E27FC236}">
+                <a16:creationId xmlns:a16="http://schemas.microsoft.com/office/drawing/2014/main" id="{116FC789-2B4A-7758-FFF4-714F4FA31302}"/>
+              </a:ext>
+            </a:extLst>
+          </p:cNvPr>
+          <p:cNvSpPr>
+            <a:spLocks noGrp="1"/>
+          </p:cNvSpPr>
+          <p:nvPr>
+            <p:ph type="title"/>
+          </p:nvPr>
+        </p:nvSpPr>
+        <p:spPr>
+          <a:xfrm>
+            <a:off x="1115568" y="548640"/>
+            <a:ext cx="10168128" cy="1179576"/>
+          </a:xfrm>
+        </p:spPr>
+        <p:txBody>
+          <a:bodyPr>
+            <a:normAutofit/>
+          </a:bodyPr>
+          <a:lstStyle/>
+          <a:p>
+            <a:r>
+              <a:rPr lang="nb-NO" sz="4000" dirty="0"/>
+              <a:t>Stores by </a:t>
+            </a:r>
+            <a:r>
+              <a:rPr lang="nb-NO" sz="4000" dirty="0" err="1"/>
+              <a:t>municipalities</a:t>
+            </a:r>
+            <a:endParaRPr lang="nb-NO" sz="4000" dirty="0"/>
+          </a:p>
+        </p:txBody>
+      </p:sp>
+      <p:sp>
+        <p:nvSpPr>
+          <p:cNvPr id="19" name="Rectangle 18">
+            <a:extLst>
+              <a:ext uri="{FF2B5EF4-FFF2-40B4-BE49-F238E27FC236}">
+                <a16:creationId xmlns:a16="http://schemas.microsoft.com/office/drawing/2014/main" id="{768EB4DD-3704-43AD-92B3-C4E0C6EA92CB}"/>
+              </a:ext>
+              <a:ext uri="{C183D7F6-B498-43B3-948B-1728B52AA6E4}">
+                <adec:decorative xmlns:adec="http://schemas.microsoft.com/office/drawing/2017/decorative" val="1"/>
+              </a:ext>
+            </a:extLst>
+          </p:cNvPr>
+          <p:cNvSpPr>
+            <a:spLocks noGrp="1" noRot="1" noChangeAspect="1" noMove="1" noResize="1" noEditPoints="1" noAdjustHandles="1" noChangeArrowheads="1" noChangeShapeType="1" noTextEdit="1"/>
+          </p:cNvSpPr>
+          <p:nvPr>
+            <p:extLst>
+              <p:ext uri="{386F3935-93C4-4BCD-93E2-E3B085C9AB24}">
+                <p16:designElem xmlns:p16="http://schemas.microsoft.com/office/powerpoint/2015/main" val="1"/>
+              </p:ext>
+            </p:extLst>
+          </p:nvPr>
+        </p:nvSpPr>
+        <p:spPr>
+          <a:xfrm>
+            <a:off x="498834" y="770799"/>
+            <a:ext cx="128016" cy="704088"/>
+          </a:xfrm>
+          <a:prstGeom prst="rect">
+            <a:avLst/>
+          </a:prstGeom>
+          <a:solidFill>
+            <a:schemeClr val="accent2"/>
+          </a:solidFill>
+          <a:ln>
+            <a:noFill/>
+          </a:ln>
+        </p:spPr>
+        <p:style>
+          <a:lnRef idx="2">
+            <a:schemeClr val="accent1">
+              <a:shade val="50000"/>
+            </a:schemeClr>
+          </a:lnRef>
+          <a:fillRef idx="1">
+            <a:schemeClr val="accent1"/>
+          </a:fillRef>
+          <a:effectRef idx="0">
+            <a:schemeClr val="accent1"/>
+          </a:effectRef>
+          <a:fontRef idx="minor">
+            <a:schemeClr val="lt1"/>
+          </a:fontRef>
+        </p:style>
+        <p:txBody>
+          <a:bodyPr rtlCol="0" anchor="ctr"/>
+          <a:lstStyle/>
+          <a:p>
+            <a:pPr marL="0" marR="0" lvl="0" indent="0" algn="ctr" defTabSz="914400" rtl="0" eaLnBrk="1" fontAlgn="auto" latinLnBrk="0" hangingPunct="1">
+              <a:lnSpc>
+                <a:spcPct val="100000"/>
+              </a:lnSpc>
+              <a:spcBef>
+                <a:spcPts val="0"/>
+              </a:spcBef>
+              <a:spcAft>
+                <a:spcPts val="0"/>
+              </a:spcAft>
+              <a:buClrTx/>
+              <a:buSzTx/>
+              <a:buFontTx/>
+              <a:buNone/>
+              <a:tabLst/>
+              <a:defRPr/>
+            </a:pPr>
+            <a:endParaRPr kumimoji="0" lang="en-US" sz="1800" b="0" i="0" u="none" strike="noStrike" kern="1200" cap="none" spc="0" normalizeH="0" baseline="0" noProof="0">
+              <a:ln>
+                <a:noFill/>
+              </a:ln>
+              <a:solidFill>
+                <a:prstClr val="white"/>
+              </a:solidFill>
+              <a:effectLst/>
+              <a:uLnTx/>
+              <a:uFillTx/>
+              <a:latin typeface="Calibri" panose="020F0502020204030204"/>
+              <a:ea typeface="+mn-ea"/>
+              <a:cs typeface="+mn-cs"/>
+            </a:endParaRPr>
+          </a:p>
+        </p:txBody>
+      </p:sp>
+      <p:pic>
+        <p:nvPicPr>
+          <p:cNvPr id="6" name="Plassholder for innhold 5">
+            <a:extLst>
+              <a:ext uri="{FF2B5EF4-FFF2-40B4-BE49-F238E27FC236}">
+                <a16:creationId xmlns:a16="http://schemas.microsoft.com/office/drawing/2014/main" id="{AB942D65-C62D-36F7-5535-2762F08DB111}"/>
+              </a:ext>
+            </a:extLst>
+          </p:cNvPr>
+          <p:cNvPicPr>
+            <a:picLocks noChangeAspect="1"/>
+          </p:cNvPicPr>
+          <p:nvPr/>
+        </p:nvPicPr>
+        <p:blipFill>
+          <a:blip r:embed="rId2"/>
+          <a:srcRect t="6866" r="2" b="2"/>
+          <a:stretch/>
+        </p:blipFill>
+        <p:spPr>
+          <a:xfrm>
+            <a:off x="908304" y="2478024"/>
+            <a:ext cx="6009855" cy="3694176"/>
+          </a:xfrm>
+          <a:prstGeom prst="rect">
+            <a:avLst/>
+          </a:prstGeom>
+        </p:spPr>
+      </p:pic>
+      <p:sp>
+        <p:nvSpPr>
+          <p:cNvPr id="21" name="Content Placeholder 9">
+            <a:extLst>
+              <a:ext uri="{FF2B5EF4-FFF2-40B4-BE49-F238E27FC236}">
+                <a16:creationId xmlns:a16="http://schemas.microsoft.com/office/drawing/2014/main" id="{A5CC1BB1-90C2-C0D7-230E-874FC27FCEB2}"/>
+              </a:ext>
+            </a:extLst>
+          </p:cNvPr>
+          <p:cNvSpPr>
+            <a:spLocks noGrp="1"/>
+          </p:cNvSpPr>
+          <p:nvPr>
+            <p:ph idx="1"/>
+          </p:nvPr>
+        </p:nvSpPr>
+        <p:spPr>
+          <a:xfrm>
+            <a:off x="7052441" y="2276856"/>
+            <a:ext cx="4231255" cy="3895344"/>
+          </a:xfrm>
+        </p:spPr>
+        <p:txBody>
+          <a:bodyPr anchor="ctr">
+            <a:normAutofit/>
+          </a:bodyPr>
+          <a:lstStyle/>
+          <a:p>
+            <a:r>
+              <a:rPr lang="en-US" sz="2400" b="1" u="sng" dirty="0"/>
+              <a:t>Key takeaways</a:t>
+            </a:r>
+            <a:r>
+              <a:rPr lang="en-US" sz="2400" dirty="0"/>
+              <a:t>: </a:t>
+            </a:r>
+          </a:p>
+          <a:p>
+            <a:r>
+              <a:rPr lang="en-US" sz="2400" dirty="0"/>
+              <a:t>A lot of municipals with 1 store</a:t>
+            </a:r>
+          </a:p>
+          <a:p>
+            <a:r>
+              <a:rPr lang="en-US" sz="2400" dirty="0"/>
+              <a:t>Some areas with multiple no-store-municipals. </a:t>
+            </a:r>
+          </a:p>
+          <a:p>
+            <a:r>
+              <a:rPr lang="en-US" sz="2400" dirty="0"/>
+              <a:t>Big number heavily centered around big cities</a:t>
+            </a:r>
+          </a:p>
+          <a:p>
+            <a:endParaRPr lang="en-US" sz="1800" dirty="0"/>
+          </a:p>
+        </p:txBody>
+      </p:sp>
+    </p:spTree>
+    <p:extLst>
+      <p:ext uri="{BB962C8B-B14F-4D97-AF65-F5344CB8AC3E}">
+        <p14:creationId xmlns:p14="http://schemas.microsoft.com/office/powerpoint/2010/main" val="3529371865"/>
+      </p:ext>
+    </p:extLst>
+  </p:cSld>
+  <p:clrMapOvr>
+    <a:masterClrMapping/>
+  </p:clrMapOvr>
+</p:sld>
+</file>
+
+<file path=ppt/slides/slide8.xml><?xml version="1.0" encoding="utf-8"?>
+<p:sld xmlns:a="http://schemas.openxmlformats.org/drawingml/2006/main" xmlns:r="http://schemas.openxmlformats.org/officeDocument/2006/relationships" xmlns:p="http://schemas.openxmlformats.org/presentationml/2006/main">
+  <p:cSld>
+    <p:bg>
+      <p:bgPr>
+        <a:solidFill>
+          <a:schemeClr val="bg1"/>
+        </a:solidFill>
+        <a:effectLst/>
+      </p:bgPr>
+    </p:bg>
+    <p:spTree>
+      <p:nvGrpSpPr>
+        <p:cNvPr id="1" name=""/>
+        <p:cNvGrpSpPr/>
+        <p:nvPr/>
+      </p:nvGrpSpPr>
+      <p:grpSpPr>
+        <a:xfrm>
+          <a:off x="0" y="0"/>
+          <a:ext cx="0" cy="0"/>
+          <a:chOff x="0" y="0"/>
+          <a:chExt cx="0" cy="0"/>
+        </a:xfrm>
+      </p:grpSpPr>
       <p:sp>
         <p:nvSpPr>
           <p:cNvPr id="10" name="Down Arrow 7">
@@ -6434,98 +7272,6 @@
 </p:sld>
 </file>
 
-<file path=ppt/slides/slide8.xml><?xml version="1.0" encoding="utf-8"?>
-<p:sld xmlns:a="http://schemas.openxmlformats.org/drawingml/2006/main" xmlns:r="http://schemas.openxmlformats.org/officeDocument/2006/relationships" xmlns:p="http://schemas.openxmlformats.org/presentationml/2006/main">
-  <p:cSld>
-    <p:spTree>
-      <p:nvGrpSpPr>
-        <p:cNvPr id="1" name=""/>
-        <p:cNvGrpSpPr/>
-        <p:nvPr/>
-      </p:nvGrpSpPr>
-      <p:grpSpPr>
-        <a:xfrm>
-          <a:off x="0" y="0"/>
-          <a:ext cx="0" cy="0"/>
-          <a:chOff x="0" y="0"/>
-          <a:chExt cx="0" cy="0"/>
-        </a:xfrm>
-      </p:grpSpPr>
-      <p:sp>
-        <p:nvSpPr>
-          <p:cNvPr id="4" name="Title 3">
-            <a:extLst>
-              <a:ext uri="{FF2B5EF4-FFF2-40B4-BE49-F238E27FC236}">
-                <a16:creationId xmlns:a16="http://schemas.microsoft.com/office/drawing/2014/main" id="{EA752597-B865-FB65-BB6A-954488D04043}"/>
-              </a:ext>
-            </a:extLst>
-          </p:cNvPr>
-          <p:cNvSpPr>
-            <a:spLocks noGrp="1"/>
-          </p:cNvSpPr>
-          <p:nvPr>
-            <p:ph type="ctrTitle"/>
-          </p:nvPr>
-        </p:nvSpPr>
-        <p:spPr/>
-        <p:txBody>
-          <a:bodyPr/>
-          <a:lstStyle/>
-          <a:p>
-            <a:r>
-              <a:rPr lang="nb-NO" dirty="0" err="1"/>
-              <a:t>Topic</a:t>
-            </a:r>
-            <a:r>
-              <a:rPr lang="nb-NO" dirty="0"/>
-              <a:t> / Research </a:t>
-            </a:r>
-            <a:r>
-              <a:rPr lang="nb-NO" dirty="0" err="1"/>
-              <a:t>Question</a:t>
-            </a:r>
-            <a:endParaRPr lang="nb-NO" dirty="0"/>
-          </a:p>
-        </p:txBody>
-      </p:sp>
-      <p:sp>
-        <p:nvSpPr>
-          <p:cNvPr id="5" name="Subtitle 4">
-            <a:extLst>
-              <a:ext uri="{FF2B5EF4-FFF2-40B4-BE49-F238E27FC236}">
-                <a16:creationId xmlns:a16="http://schemas.microsoft.com/office/drawing/2014/main" id="{98927FA5-0387-B270-4DFC-5F99766521CF}"/>
-              </a:ext>
-            </a:extLst>
-          </p:cNvPr>
-          <p:cNvSpPr>
-            <a:spLocks noGrp="1"/>
-          </p:cNvSpPr>
-          <p:nvPr>
-            <p:ph type="subTitle" idx="1"/>
-          </p:nvPr>
-        </p:nvSpPr>
-        <p:spPr/>
-        <p:txBody>
-          <a:bodyPr/>
-          <a:lstStyle/>
-          <a:p>
-            <a:endParaRPr lang="nb-NO"/>
-          </a:p>
-        </p:txBody>
-      </p:sp>
-    </p:spTree>
-    <p:extLst>
-      <p:ext uri="{BB962C8B-B14F-4D97-AF65-F5344CB8AC3E}">
-        <p14:creationId xmlns:p14="http://schemas.microsoft.com/office/powerpoint/2010/main" val="3088668381"/>
-      </p:ext>
-    </p:extLst>
-  </p:cSld>
-  <p:clrMapOvr>
-    <a:masterClrMapping/>
-  </p:clrMapOvr>
-</p:sld>
-</file>
-
 <file path=ppt/slides/slide9.xml><?xml version="1.0" encoding="utf-8"?>
 <p:sld xmlns:a="http://schemas.openxmlformats.org/drawingml/2006/main" xmlns:r="http://schemas.openxmlformats.org/officeDocument/2006/relationships" xmlns:p="http://schemas.openxmlformats.org/presentationml/2006/main">
   <p:cSld>
@@ -6545,18 +7291,18 @@
       </p:grpSpPr>
       <p:sp>
         <p:nvSpPr>
-          <p:cNvPr id="2" name="Title 1">
-            <a:extLst>
-              <a:ext uri="{FF2B5EF4-FFF2-40B4-BE49-F238E27FC236}">
-                <a16:creationId xmlns:a16="http://schemas.microsoft.com/office/drawing/2014/main" id="{D6E08181-FD15-78CC-D56A-C3D5B4331E16}"/>
-              </a:ext>
-            </a:extLst>
-          </p:cNvPr>
-          <p:cNvSpPr>
-            <a:spLocks noGrp="1"/>
-          </p:cNvSpPr>
-          <p:nvPr>
-            <p:ph type="title"/>
+          <p:cNvPr id="4" name="Title 3">
+            <a:extLst>
+              <a:ext uri="{FF2B5EF4-FFF2-40B4-BE49-F238E27FC236}">
+                <a16:creationId xmlns:a16="http://schemas.microsoft.com/office/drawing/2014/main" id="{EA752597-B865-FB65-BB6A-954488D04043}"/>
+              </a:ext>
+            </a:extLst>
+          </p:cNvPr>
+          <p:cNvSpPr>
+            <a:spLocks noGrp="1"/>
+          </p:cNvSpPr>
+          <p:nvPr>
+            <p:ph type="ctrTitle"/>
           </p:nvPr>
         </p:nvSpPr>
         <p:spPr/>
@@ -6565,34 +7311,35 @@
           <a:lstStyle/>
           <a:p>
             <a:r>
-              <a:rPr lang="nb-NO" dirty="0"/>
-              <a:t>Research </a:t>
-            </a:r>
-            <a:r>
-              <a:rPr lang="nb-NO" dirty="0" err="1"/>
-              <a:t>question</a:t>
-            </a:r>
-            <a:r>
-              <a:rPr lang="nb-NO" dirty="0"/>
-              <a:t> </a:t>
-            </a:r>
-          </a:p>
-        </p:txBody>
-      </p:sp>
-      <p:sp>
-        <p:nvSpPr>
-          <p:cNvPr id="3" name="Content Placeholder 2">
-            <a:extLst>
-              <a:ext uri="{FF2B5EF4-FFF2-40B4-BE49-F238E27FC236}">
-                <a16:creationId xmlns:a16="http://schemas.microsoft.com/office/drawing/2014/main" id="{7A4AB9B8-0D4F-4050-030E-6769AC5A4B93}"/>
-              </a:ext>
-            </a:extLst>
-          </p:cNvPr>
-          <p:cNvSpPr>
-            <a:spLocks noGrp="1"/>
-          </p:cNvSpPr>
-          <p:nvPr>
-            <p:ph idx="1"/>
+              <a:rPr lang="nb-NO" dirty="0" err="1"/>
+              <a:t>Topic</a:t>
+            </a:r>
+            <a:r>
+              <a:rPr lang="nb-NO" dirty="0"/>
+              <a:t> / Research </a:t>
+            </a:r>
+            <a:r>
+              <a:rPr lang="nb-NO" dirty="0" err="1"/>
+              <a:t>Question</a:t>
+            </a:r>
+            <a:endParaRPr lang="nb-NO" dirty="0"/>
+          </a:p>
+        </p:txBody>
+      </p:sp>
+      <p:sp>
+        <p:nvSpPr>
+          <p:cNvPr id="5" name="Subtitle 4">
+            <a:extLst>
+              <a:ext uri="{FF2B5EF4-FFF2-40B4-BE49-F238E27FC236}">
+                <a16:creationId xmlns:a16="http://schemas.microsoft.com/office/drawing/2014/main" id="{98927FA5-0387-B270-4DFC-5F99766521CF}"/>
+              </a:ext>
+            </a:extLst>
+          </p:cNvPr>
+          <p:cNvSpPr>
+            <a:spLocks noGrp="1"/>
+          </p:cNvSpPr>
+          <p:nvPr>
+            <p:ph type="subTitle" idx="1"/>
           </p:nvPr>
         </p:nvSpPr>
         <p:spPr/>
@@ -6600,178 +7347,14 @@
           <a:bodyPr/>
           <a:lstStyle/>
           <a:p>
-            <a:r>
-              <a:rPr lang="nb-NO" dirty="0" err="1"/>
-              <a:t>We</a:t>
-            </a:r>
-            <a:r>
-              <a:rPr lang="nb-NO" dirty="0"/>
-              <a:t> </a:t>
-            </a:r>
-            <a:r>
-              <a:rPr lang="nb-NO" dirty="0" err="1"/>
-              <a:t>need</a:t>
-            </a:r>
-            <a:r>
-              <a:rPr lang="nb-NO" dirty="0"/>
-              <a:t> feedback </a:t>
-            </a:r>
-            <a:r>
-              <a:rPr lang="nb-NO" dirty="0" err="1"/>
-              <a:t>on</a:t>
-            </a:r>
-            <a:r>
-              <a:rPr lang="nb-NO" dirty="0"/>
-              <a:t> </a:t>
-            </a:r>
-            <a:r>
-              <a:rPr lang="nb-NO" dirty="0" err="1"/>
-              <a:t>this</a:t>
-            </a:r>
-            <a:r>
-              <a:rPr lang="nb-NO" dirty="0"/>
-              <a:t>, </a:t>
-            </a:r>
-            <a:r>
-              <a:rPr lang="nb-NO" dirty="0" err="1"/>
-              <a:t>but</a:t>
-            </a:r>
-            <a:r>
-              <a:rPr lang="nb-NO" dirty="0"/>
-              <a:t> </a:t>
-            </a:r>
-            <a:r>
-              <a:rPr lang="nb-NO" dirty="0" err="1"/>
-              <a:t>we</a:t>
-            </a:r>
-            <a:r>
-              <a:rPr lang="nb-NO" dirty="0"/>
-              <a:t> have </a:t>
-            </a:r>
-            <a:r>
-              <a:rPr lang="nb-NO" dirty="0" err="1"/>
-              <a:t>some</a:t>
-            </a:r>
-            <a:r>
-              <a:rPr lang="nb-NO" dirty="0"/>
-              <a:t> </a:t>
-            </a:r>
-            <a:r>
-              <a:rPr lang="nb-NO" dirty="0" err="1"/>
-              <a:t>suggestions</a:t>
-            </a:r>
-            <a:r>
-              <a:rPr lang="nb-NO" dirty="0"/>
-              <a:t>:</a:t>
-            </a:r>
-          </a:p>
-          <a:p>
-            <a:pPr lvl="1"/>
-            <a:r>
-              <a:rPr lang="nb-NO" dirty="0" err="1"/>
-              <a:t>Can</a:t>
-            </a:r>
-            <a:r>
-              <a:rPr lang="nb-NO" dirty="0"/>
-              <a:t> </a:t>
-            </a:r>
-            <a:r>
-              <a:rPr lang="nb-NO" dirty="0" err="1"/>
-              <a:t>market</a:t>
-            </a:r>
-            <a:r>
-              <a:rPr lang="nb-NO" dirty="0"/>
-              <a:t> </a:t>
-            </a:r>
-            <a:r>
-              <a:rPr lang="nb-NO" dirty="0" err="1"/>
-              <a:t>entry</a:t>
-            </a:r>
-            <a:r>
-              <a:rPr lang="nb-NO" dirty="0"/>
-              <a:t> </a:t>
-            </a:r>
-            <a:r>
-              <a:rPr lang="nb-NO" dirty="0" err="1"/>
-              <a:t>models</a:t>
-            </a:r>
-            <a:r>
-              <a:rPr lang="nb-NO" dirty="0"/>
-              <a:t> assist Vinmonopolet in </a:t>
-            </a:r>
-            <a:r>
-              <a:rPr lang="nb-NO" dirty="0" err="1"/>
-              <a:t>deciding</a:t>
-            </a:r>
-            <a:r>
-              <a:rPr lang="nb-NO" dirty="0"/>
-              <a:t> </a:t>
-            </a:r>
-            <a:r>
-              <a:rPr lang="nb-NO" dirty="0" err="1"/>
-              <a:t>on</a:t>
-            </a:r>
-            <a:r>
-              <a:rPr lang="nb-NO" dirty="0"/>
-              <a:t> </a:t>
-            </a:r>
-            <a:r>
-              <a:rPr lang="nb-NO" dirty="0" err="1"/>
-              <a:t>their</a:t>
-            </a:r>
-            <a:r>
-              <a:rPr lang="nb-NO" dirty="0"/>
-              <a:t> </a:t>
-            </a:r>
-            <a:r>
-              <a:rPr lang="nb-NO" dirty="0" err="1"/>
-              <a:t>next</a:t>
-            </a:r>
-            <a:r>
-              <a:rPr lang="nb-NO" dirty="0"/>
-              <a:t> store location?</a:t>
-            </a:r>
-          </a:p>
-          <a:p>
-            <a:pPr lvl="1"/>
-            <a:r>
-              <a:rPr lang="en-US" dirty="0"/>
-              <a:t> What is the minimum market size required to support different numbers of </a:t>
-            </a:r>
-            <a:r>
-              <a:rPr lang="en-US" dirty="0" err="1"/>
-              <a:t>Vinmonopolet</a:t>
-            </a:r>
-            <a:r>
-              <a:rPr lang="en-US" dirty="0"/>
-              <a:t> stores, and how do these thresholds change as the number of stores increases?</a:t>
-            </a:r>
-          </a:p>
-          <a:p>
-            <a:pPr lvl="1"/>
-            <a:r>
-              <a:rPr lang="en-US" dirty="0"/>
-              <a:t>To what extent does the presence of cross-border shopping opportunities affect entry thresholds for </a:t>
-            </a:r>
-            <a:r>
-              <a:rPr lang="en-US" dirty="0" err="1"/>
-              <a:t>Vinmonopolet</a:t>
-            </a:r>
-            <a:r>
-              <a:rPr lang="en-US" dirty="0"/>
-              <a:t> stores in border regions, and how should this inform store placement policies?</a:t>
-            </a:r>
-          </a:p>
-          <a:p>
-            <a:pPr lvl="1"/>
-            <a:endParaRPr lang="nb-NO" dirty="0"/>
+            <a:endParaRPr lang="nb-NO"/>
           </a:p>
         </p:txBody>
       </p:sp>
     </p:spTree>
     <p:extLst>
       <p:ext uri="{BB962C8B-B14F-4D97-AF65-F5344CB8AC3E}">
-        <p14:creationId xmlns:p14="http://schemas.microsoft.com/office/powerpoint/2010/main" val="216445117"/>
+        <p14:creationId xmlns:p14="http://schemas.microsoft.com/office/powerpoint/2010/main" val="3088668381"/>
       </p:ext>
     </p:extLst>
   </p:cSld>

</xml_diff>

<commit_message>
Added reg outputs to presentation
</commit_message>
<xml_diff>
--- a/BAN440 – Term Paper Idea.pptx
+++ b/BAN440 – Term Paper Idea.pptx
@@ -18,8 +18,9 @@
     <p:sldId id="265" r:id="rId12"/>
     <p:sldId id="262" r:id="rId13"/>
     <p:sldId id="266" r:id="rId14"/>
-    <p:sldId id="263" r:id="rId15"/>
-    <p:sldId id="267" r:id="rId16"/>
+    <p:sldId id="271" r:id="rId15"/>
+    <p:sldId id="263" r:id="rId16"/>
+    <p:sldId id="267" r:id="rId17"/>
   </p:sldIdLst>
   <p:sldSz cx="12192000" cy="6858000"/>
   <p:notesSz cx="6858000" cy="9144000"/>
@@ -136,6 +137,7 @@
             <p14:sldId id="265"/>
             <p14:sldId id="262"/>
             <p14:sldId id="266"/>
+            <p14:sldId id="271"/>
             <p14:sldId id="263"/>
             <p14:sldId id="267"/>
           </p14:sldIdLst>
@@ -162,7 +164,7 @@
   <pc:docChgLst>
     <pc:chgData name="Sander Sævig Eriksen" userId="2da4b7b7-d8b8-4b75-9017-f672d4ad080d" providerId="ADAL" clId="{69F880E9-B167-4345-A5E8-21D432C122E3}"/>
     <pc:docChg chg="custSel addSld modSld sldOrd addSection delSection modSection">
-      <pc:chgData name="Sander Sævig Eriksen" userId="2da4b7b7-d8b8-4b75-9017-f672d4ad080d" providerId="ADAL" clId="{69F880E9-B167-4345-A5E8-21D432C122E3}" dt="2025-03-26T10:09:18.305" v="1807" actId="26606"/>
+      <pc:chgData name="Sander Sævig Eriksen" userId="2da4b7b7-d8b8-4b75-9017-f672d4ad080d" providerId="ADAL" clId="{69F880E9-B167-4345-A5E8-21D432C122E3}" dt="2025-03-26T11:23:15.156" v="2022" actId="27614"/>
       <pc:docMkLst>
         <pc:docMk/>
       </pc:docMkLst>
@@ -437,18 +439,42 @@
           </ac:spMkLst>
         </pc:spChg>
       </pc:sldChg>
-      <pc:sldChg chg="modSp new mod">
-        <pc:chgData name="Sander Sævig Eriksen" userId="2da4b7b7-d8b8-4b75-9017-f672d4ad080d" providerId="ADAL" clId="{69F880E9-B167-4345-A5E8-21D432C122E3}" dt="2025-03-26T08:13:11.196" v="1274" actId="120"/>
+      <pc:sldChg chg="addSp delSp modSp new mod modClrScheme chgLayout">
+        <pc:chgData name="Sander Sævig Eriksen" userId="2da4b7b7-d8b8-4b75-9017-f672d4ad080d" providerId="ADAL" clId="{69F880E9-B167-4345-A5E8-21D432C122E3}" dt="2025-03-26T11:20:33.294" v="1809" actId="700"/>
         <pc:sldMkLst>
           <pc:docMk/>
           <pc:sldMk cId="2354535279" sldId="266"/>
         </pc:sldMkLst>
-        <pc:spChg chg="mod">
-          <ac:chgData name="Sander Sævig Eriksen" userId="2da4b7b7-d8b8-4b75-9017-f672d4ad080d" providerId="ADAL" clId="{69F880E9-B167-4345-A5E8-21D432C122E3}" dt="2025-03-26T08:13:11.196" v="1274" actId="120"/>
+        <pc:spChg chg="mod ord">
+          <ac:chgData name="Sander Sævig Eriksen" userId="2da4b7b7-d8b8-4b75-9017-f672d4ad080d" providerId="ADAL" clId="{69F880E9-B167-4345-A5E8-21D432C122E3}" dt="2025-03-26T11:20:33.294" v="1809" actId="700"/>
           <ac:spMkLst>
             <pc:docMk/>
             <pc:sldMk cId="2354535279" sldId="266"/>
             <ac:spMk id="2" creationId="{8F7DE2C9-4028-BD3B-031A-5F24D0CFF9FD}"/>
+          </ac:spMkLst>
+        </pc:spChg>
+        <pc:spChg chg="del">
+          <ac:chgData name="Sander Sævig Eriksen" userId="2da4b7b7-d8b8-4b75-9017-f672d4ad080d" providerId="ADAL" clId="{69F880E9-B167-4345-A5E8-21D432C122E3}" dt="2025-03-26T11:20:29.072" v="1808" actId="700"/>
+          <ac:spMkLst>
+            <pc:docMk/>
+            <pc:sldMk cId="2354535279" sldId="266"/>
+            <ac:spMk id="3" creationId="{3D9FD236-4914-52D9-9FD5-3495F556678D}"/>
+          </ac:spMkLst>
+        </pc:spChg>
+        <pc:spChg chg="add del mod ord">
+          <ac:chgData name="Sander Sævig Eriksen" userId="2da4b7b7-d8b8-4b75-9017-f672d4ad080d" providerId="ADAL" clId="{69F880E9-B167-4345-A5E8-21D432C122E3}" dt="2025-03-26T11:20:33.294" v="1809" actId="700"/>
+          <ac:spMkLst>
+            <pc:docMk/>
+            <pc:sldMk cId="2354535279" sldId="266"/>
+            <ac:spMk id="4" creationId="{19C6C69D-56C9-AD39-7BF2-3782B3ED4E07}"/>
+          </ac:spMkLst>
+        </pc:spChg>
+        <pc:spChg chg="add mod ord">
+          <ac:chgData name="Sander Sævig Eriksen" userId="2da4b7b7-d8b8-4b75-9017-f672d4ad080d" providerId="ADAL" clId="{69F880E9-B167-4345-A5E8-21D432C122E3}" dt="2025-03-26T11:20:33.294" v="1809" actId="700"/>
+          <ac:spMkLst>
+            <pc:docMk/>
+            <pc:sldMk cId="2354535279" sldId="266"/>
+            <ac:spMk id="5" creationId="{48FD0C09-8EFC-4C06-622E-779371764896}"/>
           </ac:spMkLst>
         </pc:spChg>
       </pc:sldChg>
@@ -511,6 +537,101 @@
             <pc:docMk/>
             <pc:sldMk cId="2604389372" sldId="269"/>
             <ac:picMk id="5" creationId="{E72D1B28-29B3-4310-F233-C8C371334D66}"/>
+          </ac:picMkLst>
+        </pc:picChg>
+      </pc:sldChg>
+      <pc:sldChg chg="addSp delSp modSp new mod setBg">
+        <pc:chgData name="Sander Sævig Eriksen" userId="2da4b7b7-d8b8-4b75-9017-f672d4ad080d" providerId="ADAL" clId="{69F880E9-B167-4345-A5E8-21D432C122E3}" dt="2025-03-26T11:23:15.156" v="2022" actId="27614"/>
+        <pc:sldMkLst>
+          <pc:docMk/>
+          <pc:sldMk cId="3591823627" sldId="271"/>
+        </pc:sldMkLst>
+        <pc:spChg chg="mod">
+          <ac:chgData name="Sander Sævig Eriksen" userId="2da4b7b7-d8b8-4b75-9017-f672d4ad080d" providerId="ADAL" clId="{69F880E9-B167-4345-A5E8-21D432C122E3}" dt="2025-03-26T11:23:00.700" v="2021" actId="26606"/>
+          <ac:spMkLst>
+            <pc:docMk/>
+            <pc:sldMk cId="3591823627" sldId="271"/>
+            <ac:spMk id="2" creationId="{DA83A18E-F38B-FEA7-A82C-9FDADD548F88}"/>
+          </ac:spMkLst>
+        </pc:spChg>
+        <pc:spChg chg="mod">
+          <ac:chgData name="Sander Sævig Eriksen" userId="2da4b7b7-d8b8-4b75-9017-f672d4ad080d" providerId="ADAL" clId="{69F880E9-B167-4345-A5E8-21D432C122E3}" dt="2025-03-26T11:23:00.700" v="2021" actId="26606"/>
+          <ac:spMkLst>
+            <pc:docMk/>
+            <pc:sldMk cId="3591823627" sldId="271"/>
+            <ac:spMk id="3" creationId="{1052C69E-F9FD-C41B-D5C3-DE7535BDA7C4}"/>
+          </ac:spMkLst>
+        </pc:spChg>
+        <pc:spChg chg="add del">
+          <ac:chgData name="Sander Sævig Eriksen" userId="2da4b7b7-d8b8-4b75-9017-f672d4ad080d" providerId="ADAL" clId="{69F880E9-B167-4345-A5E8-21D432C122E3}" dt="2025-03-26T11:23:00.700" v="2021" actId="26606"/>
+          <ac:spMkLst>
+            <pc:docMk/>
+            <pc:sldMk cId="3591823627" sldId="271"/>
+            <ac:spMk id="10" creationId="{6EFC920F-B85A-4068-BD93-41064EDE93D3}"/>
+          </ac:spMkLst>
+        </pc:spChg>
+        <pc:spChg chg="add del">
+          <ac:chgData name="Sander Sævig Eriksen" userId="2da4b7b7-d8b8-4b75-9017-f672d4ad080d" providerId="ADAL" clId="{69F880E9-B167-4345-A5E8-21D432C122E3}" dt="2025-03-26T11:23:00.700" v="2021" actId="26606"/>
+          <ac:spMkLst>
+            <pc:docMk/>
+            <pc:sldMk cId="3591823627" sldId="271"/>
+            <ac:spMk id="16" creationId="{CBC4F608-B4B8-48C3-9572-C0F061B1CD99}"/>
+          </ac:spMkLst>
+        </pc:spChg>
+        <pc:spChg chg="add del">
+          <ac:chgData name="Sander Sævig Eriksen" userId="2da4b7b7-d8b8-4b75-9017-f672d4ad080d" providerId="ADAL" clId="{69F880E9-B167-4345-A5E8-21D432C122E3}" dt="2025-03-26T11:23:00.700" v="2021" actId="26606"/>
+          <ac:spMkLst>
+            <pc:docMk/>
+            <pc:sldMk cId="3591823627" sldId="271"/>
+            <ac:spMk id="18" creationId="{1382A32C-5B0C-4B1C-A074-76C6DBCC9F87}"/>
+          </ac:spMkLst>
+        </pc:spChg>
+        <pc:spChg chg="add">
+          <ac:chgData name="Sander Sævig Eriksen" userId="2da4b7b7-d8b8-4b75-9017-f672d4ad080d" providerId="ADAL" clId="{69F880E9-B167-4345-A5E8-21D432C122E3}" dt="2025-03-26T11:23:00.700" v="2021" actId="26606"/>
+          <ac:spMkLst>
+            <pc:docMk/>
+            <pc:sldMk cId="3591823627" sldId="271"/>
+            <ac:spMk id="23" creationId="{201CC55D-ED54-4C5C-95E6-10947BD1103B}"/>
+          </ac:spMkLst>
+        </pc:spChg>
+        <pc:spChg chg="add">
+          <ac:chgData name="Sander Sævig Eriksen" userId="2da4b7b7-d8b8-4b75-9017-f672d4ad080d" providerId="ADAL" clId="{69F880E9-B167-4345-A5E8-21D432C122E3}" dt="2025-03-26T11:23:00.700" v="2021" actId="26606"/>
+          <ac:spMkLst>
+            <pc:docMk/>
+            <pc:sldMk cId="3591823627" sldId="271"/>
+            <ac:spMk id="29" creationId="{3873B707-463F-40B0-8227-E8CC6C67EB25}"/>
+          </ac:spMkLst>
+        </pc:spChg>
+        <pc:spChg chg="add">
+          <ac:chgData name="Sander Sævig Eriksen" userId="2da4b7b7-d8b8-4b75-9017-f672d4ad080d" providerId="ADAL" clId="{69F880E9-B167-4345-A5E8-21D432C122E3}" dt="2025-03-26T11:23:00.700" v="2021" actId="26606"/>
+          <ac:spMkLst>
+            <pc:docMk/>
+            <pc:sldMk cId="3591823627" sldId="271"/>
+            <ac:spMk id="31" creationId="{C13237C8-E62C-4F0D-A318-BD6FB6C2D138}"/>
+          </ac:spMkLst>
+        </pc:spChg>
+        <pc:spChg chg="add">
+          <ac:chgData name="Sander Sævig Eriksen" userId="2da4b7b7-d8b8-4b75-9017-f672d4ad080d" providerId="ADAL" clId="{69F880E9-B167-4345-A5E8-21D432C122E3}" dt="2025-03-26T11:23:00.700" v="2021" actId="26606"/>
+          <ac:spMkLst>
+            <pc:docMk/>
+            <pc:sldMk cId="3591823627" sldId="271"/>
+            <ac:spMk id="33" creationId="{19C9EAEA-39D0-4B0E-A0EB-51E7B26740B1}"/>
+          </ac:spMkLst>
+        </pc:spChg>
+        <pc:grpChg chg="add">
+          <ac:chgData name="Sander Sævig Eriksen" userId="2da4b7b7-d8b8-4b75-9017-f672d4ad080d" providerId="ADAL" clId="{69F880E9-B167-4345-A5E8-21D432C122E3}" dt="2025-03-26T11:21:47.108" v="1862" actId="26606"/>
+          <ac:grpSpMkLst>
+            <pc:docMk/>
+            <pc:sldMk cId="3591823627" sldId="271"/>
+            <ac:grpSpMk id="12" creationId="{1C559108-BBAE-426C-8564-051D2BA6DDC8}"/>
+          </ac:grpSpMkLst>
+        </pc:grpChg>
+        <pc:picChg chg="add mod">
+          <ac:chgData name="Sander Sævig Eriksen" userId="2da4b7b7-d8b8-4b75-9017-f672d4ad080d" providerId="ADAL" clId="{69F880E9-B167-4345-A5E8-21D432C122E3}" dt="2025-03-26T11:23:15.156" v="2022" actId="27614"/>
+          <ac:picMkLst>
+            <pc:docMk/>
+            <pc:sldMk cId="3591823627" sldId="271"/>
+            <ac:picMk id="5" creationId="{74116548-A549-AE85-4D6F-DBBFE4A50B2F}"/>
           </ac:picMkLst>
         </pc:picChg>
       </pc:sldChg>
@@ -10708,7 +10829,7 @@
             <a:spLocks noGrp="1"/>
           </p:cNvSpPr>
           <p:nvPr>
-            <p:ph type="title"/>
+            <p:ph type="ctrTitle"/>
           </p:nvPr>
         </p:nvSpPr>
         <p:spPr/>
@@ -10742,10 +10863,10 @@
       </p:sp>
       <p:sp>
         <p:nvSpPr>
-          <p:cNvPr id="3" name="Content Placeholder 2">
+          <p:cNvPr id="5" name="Subtitle 4">
             <a:extLst>
               <a:ext uri="{FF2B5EF4-FFF2-40B4-BE49-F238E27FC236}">
-                <a16:creationId xmlns:a16="http://schemas.microsoft.com/office/drawing/2014/main" id="{3D9FD236-4914-52D9-9FD5-3495F556678D}"/>
+                <a16:creationId xmlns:a16="http://schemas.microsoft.com/office/drawing/2014/main" id="{48FD0C09-8EFC-4C06-622E-779371764896}"/>
               </a:ext>
             </a:extLst>
           </p:cNvPr>
@@ -10753,7 +10874,7 @@
             <a:spLocks noGrp="1"/>
           </p:cNvSpPr>
           <p:nvPr>
-            <p:ph idx="1"/>
+            <p:ph type="subTitle" idx="1"/>
           </p:nvPr>
         </p:nvSpPr>
         <p:spPr/>
@@ -10761,7 +10882,7 @@
           <a:bodyPr/>
           <a:lstStyle/>
           <a:p>
-            <a:endParaRPr lang="nb-NO" dirty="0"/>
+            <a:endParaRPr lang="nb-NO"/>
           </a:p>
         </p:txBody>
       </p:sp>
@@ -10779,6 +10900,672 @@
 </file>
 
 <file path=ppt/slides/slide14.xml><?xml version="1.0" encoding="utf-8"?>
+<p:sld xmlns:a="http://schemas.openxmlformats.org/drawingml/2006/main" xmlns:r="http://schemas.openxmlformats.org/officeDocument/2006/relationships" xmlns:p="http://schemas.openxmlformats.org/presentationml/2006/main">
+  <p:cSld>
+    <p:bg>
+      <p:bgPr>
+        <a:solidFill>
+          <a:schemeClr val="bg1"/>
+        </a:solidFill>
+        <a:effectLst/>
+      </p:bgPr>
+    </p:bg>
+    <p:spTree>
+      <p:nvGrpSpPr>
+        <p:cNvPr id="1" name=""/>
+        <p:cNvGrpSpPr/>
+        <p:nvPr/>
+      </p:nvGrpSpPr>
+      <p:grpSpPr>
+        <a:xfrm>
+          <a:off x="0" y="0"/>
+          <a:ext cx="0" cy="0"/>
+          <a:chOff x="0" y="0"/>
+          <a:chExt cx="0" cy="0"/>
+        </a:xfrm>
+      </p:grpSpPr>
+      <p:sp useBgFill="1">
+        <p:nvSpPr>
+          <p:cNvPr id="23" name="Rectangle 22">
+            <a:extLst>
+              <a:ext uri="{FF2B5EF4-FFF2-40B4-BE49-F238E27FC236}">
+                <a16:creationId xmlns:a16="http://schemas.microsoft.com/office/drawing/2014/main" id="{201CC55D-ED54-4C5C-95E6-10947BD1103B}"/>
+              </a:ext>
+              <a:ext uri="{C183D7F6-B498-43B3-948B-1728B52AA6E4}">
+                <adec:decorative xmlns:adec="http://schemas.microsoft.com/office/drawing/2017/decorative" val="1"/>
+              </a:ext>
+            </a:extLst>
+          </p:cNvPr>
+          <p:cNvSpPr>
+            <a:spLocks noGrp="1" noRot="1" noChangeAspect="1" noMove="1" noResize="1" noEditPoints="1" noAdjustHandles="1" noChangeArrowheads="1" noChangeShapeType="1" noTextEdit="1"/>
+          </p:cNvSpPr>
+          <p:nvPr>
+            <p:extLst>
+              <p:ext uri="{386F3935-93C4-4BCD-93E2-E3B085C9AB24}">
+                <p16:designElem xmlns:p16="http://schemas.microsoft.com/office/powerpoint/2015/main" val="1"/>
+              </p:ext>
+            </p:extLst>
+          </p:nvPr>
+        </p:nvSpPr>
+        <p:spPr>
+          <a:xfrm>
+            <a:off x="0" y="0"/>
+            <a:ext cx="12191999" cy="6857365"/>
+          </a:xfrm>
+          <a:prstGeom prst="rect">
+            <a:avLst/>
+          </a:prstGeom>
+          <a:ln>
+            <a:noFill/>
+          </a:ln>
+        </p:spPr>
+        <p:style>
+          <a:lnRef idx="2">
+            <a:schemeClr val="accent1">
+              <a:shade val="50000"/>
+            </a:schemeClr>
+          </a:lnRef>
+          <a:fillRef idx="1">
+            <a:schemeClr val="accent1"/>
+          </a:fillRef>
+          <a:effectRef idx="0">
+            <a:schemeClr val="accent1"/>
+          </a:effectRef>
+          <a:fontRef idx="minor">
+            <a:schemeClr val="lt1"/>
+          </a:fontRef>
+        </p:style>
+        <p:txBody>
+          <a:bodyPr rtlCol="0" anchor="ctr"/>
+          <a:lstStyle/>
+          <a:p>
+            <a:pPr algn="ctr"/>
+            <a:endParaRPr lang="en-US"/>
+          </a:p>
+        </p:txBody>
+      </p:sp>
+      <p:sp>
+        <p:nvSpPr>
+          <p:cNvPr id="2" name="Title 1">
+            <a:extLst>
+              <a:ext uri="{FF2B5EF4-FFF2-40B4-BE49-F238E27FC236}">
+                <a16:creationId xmlns:a16="http://schemas.microsoft.com/office/drawing/2014/main" id="{DA83A18E-F38B-FEA7-A82C-9FDADD548F88}"/>
+              </a:ext>
+            </a:extLst>
+          </p:cNvPr>
+          <p:cNvSpPr>
+            <a:spLocks noGrp="1"/>
+          </p:cNvSpPr>
+          <p:nvPr>
+            <p:ph type="title"/>
+          </p:nvPr>
+        </p:nvSpPr>
+        <p:spPr>
+          <a:xfrm>
+            <a:off x="589560" y="856180"/>
+            <a:ext cx="4560584" cy="1128068"/>
+          </a:xfrm>
+        </p:spPr>
+        <p:txBody>
+          <a:bodyPr anchor="ctr">
+            <a:normAutofit/>
+          </a:bodyPr>
+          <a:lstStyle/>
+          <a:p>
+            <a:r>
+              <a:rPr lang="nb-NO" sz="3700"/>
+              <a:t>Linear regression, full and constricted data</a:t>
+            </a:r>
+          </a:p>
+        </p:txBody>
+      </p:sp>
+      <p:grpSp>
+        <p:nvGrpSpPr>
+          <p:cNvPr id="25" name="Group 24">
+            <a:extLst>
+              <a:ext uri="{FF2B5EF4-FFF2-40B4-BE49-F238E27FC236}">
+                <a16:creationId xmlns:a16="http://schemas.microsoft.com/office/drawing/2014/main" id="{1DE889C7-FAD6-4397-98E2-05D503484459}"/>
+              </a:ext>
+              <a:ext uri="{C183D7F6-B498-43B3-948B-1728B52AA6E4}">
+                <adec:decorative xmlns:adec="http://schemas.microsoft.com/office/drawing/2017/decorative" val="1"/>
+              </a:ext>
+            </a:extLst>
+          </p:cNvPr>
+          <p:cNvGrpSpPr>
+            <a:grpSpLocks noGrp="1" noUngrp="1" noRot="1" noChangeAspect="1" noMove="1" noResize="1"/>
+          </p:cNvGrpSpPr>
+          <p:nvPr>
+            <p:extLst>
+              <p:ext uri="{386F3935-93C4-4BCD-93E2-E3B085C9AB24}">
+                <p16:designElem xmlns:p16="http://schemas.microsoft.com/office/powerpoint/2015/main" val="1"/>
+              </p:ext>
+            </p:extLst>
+          </p:nvPr>
+        </p:nvGrpSpPr>
+        <p:grpSpPr>
+          <a:xfrm>
+            <a:off x="0" y="1083484"/>
+            <a:ext cx="355196" cy="673460"/>
+            <a:chOff x="0" y="823811"/>
+            <a:chExt cx="355196" cy="673460"/>
+          </a:xfrm>
+        </p:grpSpPr>
+        <p:sp>
+          <p:nvSpPr>
+            <p:cNvPr id="26" name="Rectangle 25">
+              <a:extLst>
+                <a:ext uri="{FF2B5EF4-FFF2-40B4-BE49-F238E27FC236}">
+                  <a16:creationId xmlns:a16="http://schemas.microsoft.com/office/drawing/2014/main" id="{F399A70F-F8CD-4992-9EF5-6CF15472E73F}"/>
+                </a:ext>
+                <a:ext uri="{C183D7F6-B498-43B3-948B-1728B52AA6E4}">
+                  <adec:decorative xmlns:adec="http://schemas.microsoft.com/office/drawing/2017/decorative" val="1"/>
+                </a:ext>
+              </a:extLst>
+            </p:cNvPr>
+            <p:cNvSpPr/>
+            <p:nvPr>
+              <p:extLst>
+                <p:ext uri="{386F3935-93C4-4BCD-93E2-E3B085C9AB24}">
+                  <p16:designElem xmlns:p16="http://schemas.microsoft.com/office/powerpoint/2015/main" val="1"/>
+                </p:ext>
+              </p:extLst>
+            </p:nvPr>
+          </p:nvSpPr>
+          <p:spPr>
+            <a:xfrm>
+              <a:off x="0" y="823811"/>
+              <a:ext cx="87363" cy="673460"/>
+            </a:xfrm>
+            <a:prstGeom prst="rect">
+              <a:avLst/>
+            </a:prstGeom>
+            <a:solidFill>
+              <a:schemeClr val="accent4"/>
+            </a:solidFill>
+            <a:ln>
+              <a:noFill/>
+            </a:ln>
+          </p:spPr>
+          <p:style>
+            <a:lnRef idx="2">
+              <a:schemeClr val="accent1">
+                <a:shade val="50000"/>
+              </a:schemeClr>
+            </a:lnRef>
+            <a:fillRef idx="1">
+              <a:schemeClr val="accent1"/>
+            </a:fillRef>
+            <a:effectRef idx="0">
+              <a:schemeClr val="accent1"/>
+            </a:effectRef>
+            <a:fontRef idx="minor">
+              <a:schemeClr val="lt1"/>
+            </a:fontRef>
+          </p:style>
+          <p:txBody>
+            <a:bodyPr rtlCol="0" anchor="ctr"/>
+            <a:lstStyle/>
+            <a:p>
+              <a:pPr algn="ctr"/>
+              <a:endParaRPr lang="en-US"/>
+            </a:p>
+          </p:txBody>
+        </p:sp>
+        <p:sp>
+          <p:nvSpPr>
+            <p:cNvPr id="27" name="Rectangle 26">
+              <a:extLst>
+                <a:ext uri="{FF2B5EF4-FFF2-40B4-BE49-F238E27FC236}">
+                  <a16:creationId xmlns:a16="http://schemas.microsoft.com/office/drawing/2014/main" id="{48F4FEDC-6D80-458C-A665-075D9B9500FD}"/>
+                </a:ext>
+                <a:ext uri="{C183D7F6-B498-43B3-948B-1728B52AA6E4}">
+                  <adec:decorative xmlns:adec="http://schemas.microsoft.com/office/drawing/2017/decorative" val="1"/>
+                </a:ext>
+              </a:extLst>
+            </p:cNvPr>
+            <p:cNvSpPr/>
+            <p:nvPr>
+              <p:extLst>
+                <p:ext uri="{386F3935-93C4-4BCD-93E2-E3B085C9AB24}">
+                  <p16:designElem xmlns:p16="http://schemas.microsoft.com/office/powerpoint/2015/main" val="1"/>
+                </p:ext>
+              </p:extLst>
+            </p:nvPr>
+          </p:nvSpPr>
+          <p:spPr>
+            <a:xfrm>
+              <a:off x="159341" y="823811"/>
+              <a:ext cx="195855" cy="673460"/>
+            </a:xfrm>
+            <a:prstGeom prst="rect">
+              <a:avLst/>
+            </a:prstGeom>
+            <a:solidFill>
+              <a:schemeClr val="accent4"/>
+            </a:solidFill>
+            <a:ln>
+              <a:noFill/>
+            </a:ln>
+          </p:spPr>
+          <p:style>
+            <a:lnRef idx="2">
+              <a:schemeClr val="accent1">
+                <a:shade val="50000"/>
+              </a:schemeClr>
+            </a:lnRef>
+            <a:fillRef idx="1">
+              <a:schemeClr val="accent1"/>
+            </a:fillRef>
+            <a:effectRef idx="0">
+              <a:schemeClr val="accent1"/>
+            </a:effectRef>
+            <a:fontRef idx="minor">
+              <a:schemeClr val="lt1"/>
+            </a:fontRef>
+          </p:style>
+          <p:txBody>
+            <a:bodyPr rtlCol="0" anchor="ctr"/>
+            <a:lstStyle/>
+            <a:p>
+              <a:pPr algn="ctr"/>
+              <a:endParaRPr lang="en-US"/>
+            </a:p>
+          </p:txBody>
+        </p:sp>
+      </p:grpSp>
+      <p:sp>
+        <p:nvSpPr>
+          <p:cNvPr id="29" name="Rectangle 28">
+            <a:extLst>
+              <a:ext uri="{FF2B5EF4-FFF2-40B4-BE49-F238E27FC236}">
+                <a16:creationId xmlns:a16="http://schemas.microsoft.com/office/drawing/2014/main" id="{3873B707-463F-40B0-8227-E8CC6C67EB25}"/>
+              </a:ext>
+              <a:ext uri="{C183D7F6-B498-43B3-948B-1728B52AA6E4}">
+                <adec:decorative xmlns:adec="http://schemas.microsoft.com/office/drawing/2017/decorative" val="1"/>
+              </a:ext>
+            </a:extLst>
+          </p:cNvPr>
+          <p:cNvSpPr>
+            <a:spLocks noGrp="1" noRot="1" noChangeAspect="1" noMove="1" noResize="1" noEditPoints="1" noAdjustHandles="1" noChangeArrowheads="1" noChangeShapeType="1" noTextEdit="1"/>
+          </p:cNvSpPr>
+          <p:nvPr>
+            <p:extLst>
+              <p:ext uri="{386F3935-93C4-4BCD-93E2-E3B085C9AB24}">
+                <p16:designElem xmlns:p16="http://schemas.microsoft.com/office/powerpoint/2015/main" val="1"/>
+              </p:ext>
+            </p:extLst>
+          </p:nvPr>
+        </p:nvSpPr>
+        <p:spPr>
+          <a:xfrm flipH="1">
+            <a:off x="665085" y="2090569"/>
+            <a:ext cx="4297680" cy="27432"/>
+          </a:xfrm>
+          <a:prstGeom prst="rect">
+            <a:avLst/>
+          </a:prstGeom>
+          <a:solidFill>
+            <a:schemeClr val="accent4"/>
+          </a:solidFill>
+          <a:ln>
+            <a:noFill/>
+          </a:ln>
+        </p:spPr>
+        <p:style>
+          <a:lnRef idx="2">
+            <a:schemeClr val="accent1">
+              <a:shade val="50000"/>
+            </a:schemeClr>
+          </a:lnRef>
+          <a:fillRef idx="1">
+            <a:schemeClr val="accent1"/>
+          </a:fillRef>
+          <a:effectRef idx="0">
+            <a:schemeClr val="accent1"/>
+          </a:effectRef>
+          <a:fontRef idx="minor">
+            <a:schemeClr val="lt1"/>
+          </a:fontRef>
+        </p:style>
+        <p:txBody>
+          <a:bodyPr rtlCol="0" anchor="ctr"/>
+          <a:lstStyle/>
+          <a:p>
+            <a:pPr algn="ctr"/>
+            <a:endParaRPr lang="en-US"/>
+          </a:p>
+        </p:txBody>
+      </p:sp>
+      <p:sp>
+        <p:nvSpPr>
+          <p:cNvPr id="3" name="Content Placeholder 2">
+            <a:extLst>
+              <a:ext uri="{FF2B5EF4-FFF2-40B4-BE49-F238E27FC236}">
+                <a16:creationId xmlns:a16="http://schemas.microsoft.com/office/drawing/2014/main" id="{1052C69E-F9FD-C41B-D5C3-DE7535BDA7C4}"/>
+              </a:ext>
+            </a:extLst>
+          </p:cNvPr>
+          <p:cNvSpPr>
+            <a:spLocks noGrp="1"/>
+          </p:cNvSpPr>
+          <p:nvPr>
+            <p:ph idx="1"/>
+          </p:nvPr>
+        </p:nvSpPr>
+        <p:spPr>
+          <a:xfrm>
+            <a:off x="590719" y="2330505"/>
+            <a:ext cx="4559425" cy="3979585"/>
+          </a:xfrm>
+        </p:spPr>
+        <p:txBody>
+          <a:bodyPr anchor="ctr">
+            <a:normAutofit/>
+          </a:bodyPr>
+          <a:lstStyle/>
+          <a:p>
+            <a:r>
+              <a:rPr lang="nb-NO" sz="2000" dirty="0"/>
+              <a:t>R^2 </a:t>
+            </a:r>
+            <a:r>
+              <a:rPr lang="nb-NO" sz="2000"/>
+              <a:t>decreases</a:t>
+            </a:r>
+            <a:r>
+              <a:rPr lang="nb-NO" sz="2000" dirty="0"/>
+              <a:t> </a:t>
+            </a:r>
+            <a:r>
+              <a:rPr lang="nb-NO" sz="2000"/>
+              <a:t>significantly</a:t>
+            </a:r>
+            <a:r>
+              <a:rPr lang="nb-NO" sz="2000" dirty="0"/>
+              <a:t> </a:t>
+            </a:r>
+            <a:r>
+              <a:rPr lang="nb-NO" sz="2000"/>
+              <a:t>after</a:t>
+            </a:r>
+            <a:r>
+              <a:rPr lang="nb-NO" sz="2000" dirty="0"/>
+              <a:t> </a:t>
+            </a:r>
+            <a:r>
+              <a:rPr lang="nb-NO" sz="2000"/>
+              <a:t>removing</a:t>
+            </a:r>
+            <a:r>
+              <a:rPr lang="nb-NO" sz="2000" dirty="0"/>
+              <a:t> </a:t>
+            </a:r>
+            <a:r>
+              <a:rPr lang="nb-NO" sz="2000"/>
+              <a:t>the</a:t>
+            </a:r>
+            <a:r>
+              <a:rPr lang="nb-NO" sz="2000" dirty="0"/>
+              <a:t> 4 </a:t>
+            </a:r>
+            <a:r>
+              <a:rPr lang="nb-NO" sz="2000"/>
+              <a:t>largest</a:t>
+            </a:r>
+            <a:r>
+              <a:rPr lang="nb-NO" sz="2000" dirty="0"/>
+              <a:t> </a:t>
+            </a:r>
+            <a:r>
+              <a:rPr lang="nb-NO" sz="2000"/>
+              <a:t>cities</a:t>
+            </a:r>
+            <a:endParaRPr lang="nb-NO" sz="2000" dirty="0"/>
+          </a:p>
+          <a:p>
+            <a:r>
+              <a:rPr lang="nb-NO" sz="2000" dirty="0"/>
+              <a:t>Variables </a:t>
+            </a:r>
+            <a:r>
+              <a:rPr lang="nb-NO" sz="2000"/>
+              <a:t>other</a:t>
+            </a:r>
+            <a:r>
+              <a:rPr lang="nb-NO" sz="2000" dirty="0"/>
+              <a:t> </a:t>
+            </a:r>
+            <a:r>
+              <a:rPr lang="nb-NO" sz="2000"/>
+              <a:t>than</a:t>
+            </a:r>
+            <a:r>
+              <a:rPr lang="nb-NO" sz="2000" dirty="0"/>
+              <a:t> </a:t>
+            </a:r>
+            <a:r>
+              <a:rPr lang="nb-NO" sz="2000"/>
+              <a:t>population</a:t>
+            </a:r>
+            <a:r>
+              <a:rPr lang="nb-NO" sz="2000" dirty="0"/>
+              <a:t> </a:t>
+            </a:r>
+            <a:r>
+              <a:rPr lang="nb-NO" sz="2000"/>
+              <a:t>can</a:t>
+            </a:r>
+            <a:r>
+              <a:rPr lang="nb-NO" sz="2000" dirty="0"/>
+              <a:t> have an </a:t>
+            </a:r>
+            <a:r>
+              <a:rPr lang="nb-NO" sz="2000"/>
+              <a:t>effect</a:t>
+            </a:r>
+            <a:endParaRPr lang="nb-NO" sz="2000" dirty="0"/>
+          </a:p>
+          <a:p>
+            <a:r>
+              <a:rPr lang="nb-NO" sz="2000"/>
+              <a:t>Tourism</a:t>
+            </a:r>
+            <a:r>
+              <a:rPr lang="nb-NO" sz="2000" dirty="0"/>
+              <a:t> has a positive </a:t>
+            </a:r>
+            <a:r>
+              <a:rPr lang="nb-NO" sz="2000"/>
+              <a:t>significant</a:t>
+            </a:r>
+            <a:r>
+              <a:rPr lang="nb-NO" sz="2000" dirty="0"/>
+              <a:t> </a:t>
+            </a:r>
+            <a:r>
+              <a:rPr lang="nb-NO" sz="2000" dirty="0" err="1"/>
+              <a:t>effect</a:t>
+            </a:r>
+            <a:endParaRPr lang="nb-NO" sz="2000" dirty="0"/>
+          </a:p>
+        </p:txBody>
+      </p:sp>
+      <p:sp>
+        <p:nvSpPr>
+          <p:cNvPr id="31" name="Rectangle 30">
+            <a:extLst>
+              <a:ext uri="{FF2B5EF4-FFF2-40B4-BE49-F238E27FC236}">
+                <a16:creationId xmlns:a16="http://schemas.microsoft.com/office/drawing/2014/main" id="{C13237C8-E62C-4F0D-A318-BD6FB6C2D138}"/>
+              </a:ext>
+              <a:ext uri="{C183D7F6-B498-43B3-948B-1728B52AA6E4}">
+                <adec:decorative xmlns:adec="http://schemas.microsoft.com/office/drawing/2017/decorative" val="1"/>
+              </a:ext>
+            </a:extLst>
+          </p:cNvPr>
+          <p:cNvSpPr>
+            <a:spLocks noGrp="1" noRot="1" noChangeAspect="1" noMove="1" noResize="1" noEditPoints="1" noAdjustHandles="1" noChangeArrowheads="1" noChangeShapeType="1" noTextEdit="1"/>
+          </p:cNvSpPr>
+          <p:nvPr>
+            <p:extLst>
+              <p:ext uri="{386F3935-93C4-4BCD-93E2-E3B085C9AB24}">
+                <p16:designElem xmlns:p16="http://schemas.microsoft.com/office/powerpoint/2015/main" val="1"/>
+              </p:ext>
+            </p:extLst>
+          </p:nvPr>
+        </p:nvSpPr>
+        <p:spPr>
+          <a:xfrm flipH="1">
+            <a:off x="10697670" y="0"/>
+            <a:ext cx="1494330" cy="6858000"/>
+          </a:xfrm>
+          <a:prstGeom prst="rect">
+            <a:avLst/>
+          </a:prstGeom>
+          <a:solidFill>
+            <a:schemeClr val="accent4"/>
+          </a:solidFill>
+          <a:ln>
+            <a:noFill/>
+          </a:ln>
+        </p:spPr>
+        <p:style>
+          <a:lnRef idx="2">
+            <a:schemeClr val="accent1">
+              <a:shade val="50000"/>
+            </a:schemeClr>
+          </a:lnRef>
+          <a:fillRef idx="1">
+            <a:schemeClr val="accent1"/>
+          </a:fillRef>
+          <a:effectRef idx="0">
+            <a:schemeClr val="accent1"/>
+          </a:effectRef>
+          <a:fontRef idx="minor">
+            <a:schemeClr val="lt1"/>
+          </a:fontRef>
+        </p:style>
+        <p:txBody>
+          <a:bodyPr rtlCol="0" anchor="ctr"/>
+          <a:lstStyle/>
+          <a:p>
+            <a:pPr algn="ctr"/>
+            <a:endParaRPr lang="en-US"/>
+          </a:p>
+        </p:txBody>
+      </p:sp>
+      <p:sp>
+        <p:nvSpPr>
+          <p:cNvPr id="33" name="Rectangle 32">
+            <a:extLst>
+              <a:ext uri="{FF2B5EF4-FFF2-40B4-BE49-F238E27FC236}">
+                <a16:creationId xmlns:a16="http://schemas.microsoft.com/office/drawing/2014/main" id="{19C9EAEA-39D0-4B0E-A0EB-51E7B26740B1}"/>
+              </a:ext>
+              <a:ext uri="{C183D7F6-B498-43B3-948B-1728B52AA6E4}">
+                <adec:decorative xmlns:adec="http://schemas.microsoft.com/office/drawing/2017/decorative" val="1"/>
+              </a:ext>
+            </a:extLst>
+          </p:cNvPr>
+          <p:cNvSpPr>
+            <a:spLocks noGrp="1" noRot="1" noChangeAspect="1" noMove="1" noResize="1" noEditPoints="1" noAdjustHandles="1" noChangeArrowheads="1" noChangeShapeType="1" noTextEdit="1"/>
+          </p:cNvSpPr>
+          <p:nvPr>
+            <p:extLst>
+              <p:ext uri="{386F3935-93C4-4BCD-93E2-E3B085C9AB24}">
+                <p16:designElem xmlns:p16="http://schemas.microsoft.com/office/powerpoint/2015/main" val="1"/>
+              </p:ext>
+            </p:extLst>
+          </p:nvPr>
+        </p:nvSpPr>
+        <p:spPr>
+          <a:xfrm>
+            <a:off x="5685810" y="513853"/>
+            <a:ext cx="6009366" cy="5834577"/>
+          </a:xfrm>
+          <a:prstGeom prst="rect">
+            <a:avLst/>
+          </a:prstGeom>
+          <a:solidFill>
+            <a:schemeClr val="bg1"/>
+          </a:solidFill>
+          <a:ln>
+            <a:noFill/>
+          </a:ln>
+          <a:effectLst>
+            <a:outerShdw blurRad="139700" dist="127000" dir="5400000" algn="t" rotWithShape="0">
+              <a:prstClr val="black">
+                <a:alpha val="15000"/>
+              </a:prstClr>
+            </a:outerShdw>
+          </a:effectLst>
+        </p:spPr>
+        <p:style>
+          <a:lnRef idx="2">
+            <a:schemeClr val="accent1">
+              <a:shade val="50000"/>
+            </a:schemeClr>
+          </a:lnRef>
+          <a:fillRef idx="1">
+            <a:schemeClr val="accent1"/>
+          </a:fillRef>
+          <a:effectRef idx="0">
+            <a:schemeClr val="accent1"/>
+          </a:effectRef>
+          <a:fontRef idx="minor">
+            <a:schemeClr val="lt1"/>
+          </a:fontRef>
+        </p:style>
+        <p:txBody>
+          <a:bodyPr rtlCol="0" anchor="ctr"/>
+          <a:lstStyle/>
+          <a:p>
+            <a:pPr algn="ctr"/>
+            <a:endParaRPr lang="en-US"/>
+          </a:p>
+        </p:txBody>
+      </p:sp>
+      <p:pic>
+        <p:nvPicPr>
+          <p:cNvPr id="5" name="Picture 4" descr="A screenshot of a computer screen&#10;&#10;AI-generated content may be incorrect.">
+            <a:extLst>
+              <a:ext uri="{FF2B5EF4-FFF2-40B4-BE49-F238E27FC236}">
+                <a16:creationId xmlns:a16="http://schemas.microsoft.com/office/drawing/2014/main" id="{74116548-A549-AE85-4D6F-DBBFE4A50B2F}"/>
+              </a:ext>
+            </a:extLst>
+          </p:cNvPr>
+          <p:cNvPicPr>
+            <a:picLocks noChangeAspect="1"/>
+          </p:cNvPicPr>
+          <p:nvPr/>
+        </p:nvPicPr>
+        <p:blipFill>
+          <a:blip r:embed="rId2"/>
+          <a:srcRect l="511"/>
+          <a:stretch/>
+        </p:blipFill>
+        <p:spPr>
+          <a:xfrm>
+            <a:off x="5977788" y="799352"/>
+            <a:ext cx="5425410" cy="5259296"/>
+          </a:xfrm>
+          <a:prstGeom prst="rect">
+            <a:avLst/>
+          </a:prstGeom>
+        </p:spPr>
+      </p:pic>
+    </p:spTree>
+    <p:extLst>
+      <p:ext uri="{BB962C8B-B14F-4D97-AF65-F5344CB8AC3E}">
+        <p14:creationId xmlns:p14="http://schemas.microsoft.com/office/powerpoint/2010/main" val="3591823627"/>
+      </p:ext>
+    </p:extLst>
+  </p:cSld>
+  <p:clrMapOvr>
+    <a:masterClrMapping/>
+  </p:clrMapOvr>
+</p:sld>
+</file>
+
+<file path=ppt/slides/slide15.xml><?xml version="1.0" encoding="utf-8"?>
 <p:sld xmlns:a="http://schemas.openxmlformats.org/drawingml/2006/main" xmlns:r="http://schemas.openxmlformats.org/officeDocument/2006/relationships" xmlns:p="http://schemas.openxmlformats.org/presentationml/2006/main">
   <p:cSld>
     <p:spTree>
@@ -10938,7 +11725,7 @@
 </p:sld>
 </file>
 
-<file path=ppt/slides/slide15.xml><?xml version="1.0" encoding="utf-8"?>
+<file path=ppt/slides/slide16.xml><?xml version="1.0" encoding="utf-8"?>
 <p:sld xmlns:a="http://schemas.openxmlformats.org/drawingml/2006/main" xmlns:r="http://schemas.openxmlformats.org/officeDocument/2006/relationships" xmlns:p="http://schemas.openxmlformats.org/presentationml/2006/main">
   <p:cSld>
     <p:spTree>

</xml_diff>

<commit_message>
Model output in the presentation
</commit_message>
<xml_diff>
--- a/BAN440 – Term Paper Idea.pptx
+++ b/BAN440 – Term Paper Idea.pptx
@@ -19,8 +19,11 @@
     <p:sldId id="262" r:id="rId13"/>
     <p:sldId id="266" r:id="rId14"/>
     <p:sldId id="271" r:id="rId15"/>
-    <p:sldId id="263" r:id="rId16"/>
-    <p:sldId id="267" r:id="rId17"/>
+    <p:sldId id="272" r:id="rId16"/>
+    <p:sldId id="273" r:id="rId17"/>
+    <p:sldId id="274" r:id="rId18"/>
+    <p:sldId id="263" r:id="rId19"/>
+    <p:sldId id="267" r:id="rId20"/>
   </p:sldIdLst>
   <p:sldSz cx="12192000" cy="6858000"/>
   <p:notesSz cx="6858000" cy="9144000"/>
@@ -138,6 +141,9 @@
             <p14:sldId id="262"/>
             <p14:sldId id="266"/>
             <p14:sldId id="271"/>
+            <p14:sldId id="272"/>
+            <p14:sldId id="273"/>
+            <p14:sldId id="274"/>
             <p14:sldId id="263"/>
             <p14:sldId id="267"/>
           </p14:sldIdLst>
@@ -163,8 +169,8 @@
 <pc:chgInfo xmlns:a="http://schemas.openxmlformats.org/drawingml/2006/main" xmlns:r="http://schemas.openxmlformats.org/officeDocument/2006/relationships" xmlns:ac="http://schemas.microsoft.com/office/drawing/2013/main/command" xmlns:pc="http://schemas.microsoft.com/office/powerpoint/2013/main/command">
   <pc:docChgLst>
     <pc:chgData name="Sander Sævig Eriksen" userId="2da4b7b7-d8b8-4b75-9017-f672d4ad080d" providerId="ADAL" clId="{69F880E9-B167-4345-A5E8-21D432C122E3}"/>
-    <pc:docChg chg="custSel addSld modSld sldOrd addSection delSection modSection">
-      <pc:chgData name="Sander Sævig Eriksen" userId="2da4b7b7-d8b8-4b75-9017-f672d4ad080d" providerId="ADAL" clId="{69F880E9-B167-4345-A5E8-21D432C122E3}" dt="2025-03-26T11:23:15.156" v="2022" actId="27614"/>
+    <pc:docChg chg="undo custSel addSld modSld sldOrd addSection delSection modSection">
+      <pc:chgData name="Sander Sævig Eriksen" userId="2da4b7b7-d8b8-4b75-9017-f672d4ad080d" providerId="ADAL" clId="{69F880E9-B167-4345-A5E8-21D432C122E3}" dt="2025-03-26T12:45:58.087" v="2173" actId="14100"/>
       <pc:docMkLst>
         <pc:docMk/>
       </pc:docMkLst>
@@ -541,13 +547,13 @@
         </pc:picChg>
       </pc:sldChg>
       <pc:sldChg chg="addSp delSp modSp new mod setBg">
-        <pc:chgData name="Sander Sævig Eriksen" userId="2da4b7b7-d8b8-4b75-9017-f672d4ad080d" providerId="ADAL" clId="{69F880E9-B167-4345-A5E8-21D432C122E3}" dt="2025-03-26T11:23:15.156" v="2022" actId="27614"/>
+        <pc:chgData name="Sander Sævig Eriksen" userId="2da4b7b7-d8b8-4b75-9017-f672d4ad080d" providerId="ADAL" clId="{69F880E9-B167-4345-A5E8-21D432C122E3}" dt="2025-03-26T12:18:47.482" v="2063" actId="20577"/>
         <pc:sldMkLst>
           <pc:docMk/>
           <pc:sldMk cId="3591823627" sldId="271"/>
         </pc:sldMkLst>
         <pc:spChg chg="mod">
-          <ac:chgData name="Sander Sævig Eriksen" userId="2da4b7b7-d8b8-4b75-9017-f672d4ad080d" providerId="ADAL" clId="{69F880E9-B167-4345-A5E8-21D432C122E3}" dt="2025-03-26T11:23:00.700" v="2021" actId="26606"/>
+          <ac:chgData name="Sander Sævig Eriksen" userId="2da4b7b7-d8b8-4b75-9017-f672d4ad080d" providerId="ADAL" clId="{69F880E9-B167-4345-A5E8-21D432C122E3}" dt="2025-03-26T12:15:37.445" v="2027" actId="26606"/>
           <ac:spMkLst>
             <pc:docMk/>
             <pc:sldMk cId="3591823627" sldId="271"/>
@@ -555,7 +561,7 @@
           </ac:spMkLst>
         </pc:spChg>
         <pc:spChg chg="mod">
-          <ac:chgData name="Sander Sævig Eriksen" userId="2da4b7b7-d8b8-4b75-9017-f672d4ad080d" providerId="ADAL" clId="{69F880E9-B167-4345-A5E8-21D432C122E3}" dt="2025-03-26T11:23:00.700" v="2021" actId="26606"/>
+          <ac:chgData name="Sander Sævig Eriksen" userId="2da4b7b7-d8b8-4b75-9017-f672d4ad080d" providerId="ADAL" clId="{69F880E9-B167-4345-A5E8-21D432C122E3}" dt="2025-03-26T12:18:47.482" v="2063" actId="20577"/>
           <ac:spMkLst>
             <pc:docMk/>
             <pc:sldMk cId="3591823627" sldId="271"/>
@@ -586,36 +592,116 @@
             <ac:spMk id="18" creationId="{1382A32C-5B0C-4B1C-A074-76C6DBCC9F87}"/>
           </ac:spMkLst>
         </pc:spChg>
-        <pc:spChg chg="add">
-          <ac:chgData name="Sander Sævig Eriksen" userId="2da4b7b7-d8b8-4b75-9017-f672d4ad080d" providerId="ADAL" clId="{69F880E9-B167-4345-A5E8-21D432C122E3}" dt="2025-03-26T11:23:00.700" v="2021" actId="26606"/>
+        <pc:spChg chg="add del">
+          <ac:chgData name="Sander Sævig Eriksen" userId="2da4b7b7-d8b8-4b75-9017-f672d4ad080d" providerId="ADAL" clId="{69F880E9-B167-4345-A5E8-21D432C122E3}" dt="2025-03-26T12:15:37.445" v="2027" actId="26606"/>
           <ac:spMkLst>
             <pc:docMk/>
             <pc:sldMk cId="3591823627" sldId="271"/>
             <ac:spMk id="23" creationId="{201CC55D-ED54-4C5C-95E6-10947BD1103B}"/>
           </ac:spMkLst>
         </pc:spChg>
-        <pc:spChg chg="add">
-          <ac:chgData name="Sander Sævig Eriksen" userId="2da4b7b7-d8b8-4b75-9017-f672d4ad080d" providerId="ADAL" clId="{69F880E9-B167-4345-A5E8-21D432C122E3}" dt="2025-03-26T11:23:00.700" v="2021" actId="26606"/>
+        <pc:spChg chg="add del">
+          <ac:chgData name="Sander Sævig Eriksen" userId="2da4b7b7-d8b8-4b75-9017-f672d4ad080d" providerId="ADAL" clId="{69F880E9-B167-4345-A5E8-21D432C122E3}" dt="2025-03-26T12:15:37.445" v="2027" actId="26606"/>
           <ac:spMkLst>
             <pc:docMk/>
             <pc:sldMk cId="3591823627" sldId="271"/>
             <ac:spMk id="29" creationId="{3873B707-463F-40B0-8227-E8CC6C67EB25}"/>
           </ac:spMkLst>
         </pc:spChg>
-        <pc:spChg chg="add">
-          <ac:chgData name="Sander Sævig Eriksen" userId="2da4b7b7-d8b8-4b75-9017-f672d4ad080d" providerId="ADAL" clId="{69F880E9-B167-4345-A5E8-21D432C122E3}" dt="2025-03-26T11:23:00.700" v="2021" actId="26606"/>
+        <pc:spChg chg="add del">
+          <ac:chgData name="Sander Sævig Eriksen" userId="2da4b7b7-d8b8-4b75-9017-f672d4ad080d" providerId="ADAL" clId="{69F880E9-B167-4345-A5E8-21D432C122E3}" dt="2025-03-26T12:15:37.445" v="2027" actId="26606"/>
           <ac:spMkLst>
             <pc:docMk/>
             <pc:sldMk cId="3591823627" sldId="271"/>
             <ac:spMk id="31" creationId="{C13237C8-E62C-4F0D-A318-BD6FB6C2D138}"/>
           </ac:spMkLst>
         </pc:spChg>
-        <pc:spChg chg="add">
-          <ac:chgData name="Sander Sævig Eriksen" userId="2da4b7b7-d8b8-4b75-9017-f672d4ad080d" providerId="ADAL" clId="{69F880E9-B167-4345-A5E8-21D432C122E3}" dt="2025-03-26T11:23:00.700" v="2021" actId="26606"/>
+        <pc:spChg chg="add del">
+          <ac:chgData name="Sander Sævig Eriksen" userId="2da4b7b7-d8b8-4b75-9017-f672d4ad080d" providerId="ADAL" clId="{69F880E9-B167-4345-A5E8-21D432C122E3}" dt="2025-03-26T12:15:37.445" v="2027" actId="26606"/>
           <ac:spMkLst>
             <pc:docMk/>
             <pc:sldMk cId="3591823627" sldId="271"/>
             <ac:spMk id="33" creationId="{19C9EAEA-39D0-4B0E-A0EB-51E7B26740B1}"/>
+          </ac:spMkLst>
+        </pc:spChg>
+        <pc:spChg chg="add del">
+          <ac:chgData name="Sander Sævig Eriksen" userId="2da4b7b7-d8b8-4b75-9017-f672d4ad080d" providerId="ADAL" clId="{69F880E9-B167-4345-A5E8-21D432C122E3}" dt="2025-03-26T12:15:37.436" v="2026" actId="26606"/>
+          <ac:spMkLst>
+            <pc:docMk/>
+            <pc:sldMk cId="3591823627" sldId="271"/>
+            <ac:spMk id="38" creationId="{201CC55D-ED54-4C5C-95E6-10947BD1103B}"/>
+          </ac:spMkLst>
+        </pc:spChg>
+        <pc:spChg chg="add del">
+          <ac:chgData name="Sander Sævig Eriksen" userId="2da4b7b7-d8b8-4b75-9017-f672d4ad080d" providerId="ADAL" clId="{69F880E9-B167-4345-A5E8-21D432C122E3}" dt="2025-03-26T12:15:37.436" v="2026" actId="26606"/>
+          <ac:spMkLst>
+            <pc:docMk/>
+            <pc:sldMk cId="3591823627" sldId="271"/>
+            <ac:spMk id="44" creationId="{3873B707-463F-40B0-8227-E8CC6C67EB25}"/>
+          </ac:spMkLst>
+        </pc:spChg>
+        <pc:spChg chg="add del">
+          <ac:chgData name="Sander Sævig Eriksen" userId="2da4b7b7-d8b8-4b75-9017-f672d4ad080d" providerId="ADAL" clId="{69F880E9-B167-4345-A5E8-21D432C122E3}" dt="2025-03-26T12:15:37.436" v="2026" actId="26606"/>
+          <ac:spMkLst>
+            <pc:docMk/>
+            <pc:sldMk cId="3591823627" sldId="271"/>
+            <ac:spMk id="46" creationId="{C13237C8-E62C-4F0D-A318-BD6FB6C2D138}"/>
+          </ac:spMkLst>
+        </pc:spChg>
+        <pc:spChg chg="add del">
+          <ac:chgData name="Sander Sævig Eriksen" userId="2da4b7b7-d8b8-4b75-9017-f672d4ad080d" providerId="ADAL" clId="{69F880E9-B167-4345-A5E8-21D432C122E3}" dt="2025-03-26T12:15:37.436" v="2026" actId="26606"/>
+          <ac:spMkLst>
+            <pc:docMk/>
+            <pc:sldMk cId="3591823627" sldId="271"/>
+            <ac:spMk id="48" creationId="{19C9EAEA-39D0-4B0E-A0EB-51E7B26740B1}"/>
+          </ac:spMkLst>
+        </pc:spChg>
+        <pc:spChg chg="add del">
+          <ac:chgData name="Sander Sævig Eriksen" userId="2da4b7b7-d8b8-4b75-9017-f672d4ad080d" providerId="ADAL" clId="{69F880E9-B167-4345-A5E8-21D432C122E3}" dt="2025-03-26T12:16:08.647" v="2031" actId="26606"/>
+          <ac:spMkLst>
+            <pc:docMk/>
+            <pc:sldMk cId="3591823627" sldId="271"/>
+            <ac:spMk id="50" creationId="{6EFC920F-B85A-4068-BD93-41064EDE93D3}"/>
+          </ac:spMkLst>
+        </pc:spChg>
+        <pc:spChg chg="add del">
+          <ac:chgData name="Sander Sævig Eriksen" userId="2da4b7b7-d8b8-4b75-9017-f672d4ad080d" providerId="ADAL" clId="{69F880E9-B167-4345-A5E8-21D432C122E3}" dt="2025-03-26T12:16:08.647" v="2031" actId="26606"/>
+          <ac:spMkLst>
+            <pc:docMk/>
+            <pc:sldMk cId="3591823627" sldId="271"/>
+            <ac:spMk id="54" creationId="{CBC4F608-B4B8-48C3-9572-C0F061B1CD99}"/>
+          </ac:spMkLst>
+        </pc:spChg>
+        <pc:spChg chg="add del">
+          <ac:chgData name="Sander Sævig Eriksen" userId="2da4b7b7-d8b8-4b75-9017-f672d4ad080d" providerId="ADAL" clId="{69F880E9-B167-4345-A5E8-21D432C122E3}" dt="2025-03-26T12:16:08.647" v="2031" actId="26606"/>
+          <ac:spMkLst>
+            <pc:docMk/>
+            <pc:sldMk cId="3591823627" sldId="271"/>
+            <ac:spMk id="55" creationId="{1382A32C-5B0C-4B1C-A074-76C6DBCC9F87}"/>
+          </ac:spMkLst>
+        </pc:spChg>
+        <pc:spChg chg="add">
+          <ac:chgData name="Sander Sævig Eriksen" userId="2da4b7b7-d8b8-4b75-9017-f672d4ad080d" providerId="ADAL" clId="{69F880E9-B167-4345-A5E8-21D432C122E3}" dt="2025-03-26T12:16:08.647" v="2031" actId="26606"/>
+          <ac:spMkLst>
+            <pc:docMk/>
+            <pc:sldMk cId="3591823627" sldId="271"/>
+            <ac:spMk id="60" creationId="{6EFC920F-B85A-4068-BD93-41064EDE93D3}"/>
+          </ac:spMkLst>
+        </pc:spChg>
+        <pc:spChg chg="add">
+          <ac:chgData name="Sander Sævig Eriksen" userId="2da4b7b7-d8b8-4b75-9017-f672d4ad080d" providerId="ADAL" clId="{69F880E9-B167-4345-A5E8-21D432C122E3}" dt="2025-03-26T12:16:08.647" v="2031" actId="26606"/>
+          <ac:spMkLst>
+            <pc:docMk/>
+            <pc:sldMk cId="3591823627" sldId="271"/>
+            <ac:spMk id="66" creationId="{CBC4F608-B4B8-48C3-9572-C0F061B1CD99}"/>
+          </ac:spMkLst>
+        </pc:spChg>
+        <pc:spChg chg="add">
+          <ac:chgData name="Sander Sævig Eriksen" userId="2da4b7b7-d8b8-4b75-9017-f672d4ad080d" providerId="ADAL" clId="{69F880E9-B167-4345-A5E8-21D432C122E3}" dt="2025-03-26T12:16:08.647" v="2031" actId="26606"/>
+          <ac:spMkLst>
+            <pc:docMk/>
+            <pc:sldMk cId="3591823627" sldId="271"/>
+            <ac:spMk id="68" creationId="{1382A32C-5B0C-4B1C-A074-76C6DBCC9F87}"/>
           </ac:spMkLst>
         </pc:spChg>
         <pc:grpChg chg="add">
@@ -626,12 +712,409 @@
             <ac:grpSpMk id="12" creationId="{1C559108-BBAE-426C-8564-051D2BA6DDC8}"/>
           </ac:grpSpMkLst>
         </pc:grpChg>
-        <pc:picChg chg="add mod">
-          <ac:chgData name="Sander Sævig Eriksen" userId="2da4b7b7-d8b8-4b75-9017-f672d4ad080d" providerId="ADAL" clId="{69F880E9-B167-4345-A5E8-21D432C122E3}" dt="2025-03-26T11:23:15.156" v="2022" actId="27614"/>
+        <pc:grpChg chg="del">
+          <ac:chgData name="Sander Sævig Eriksen" userId="2da4b7b7-d8b8-4b75-9017-f672d4ad080d" providerId="ADAL" clId="{69F880E9-B167-4345-A5E8-21D432C122E3}" dt="2025-03-26T12:16:08.647" v="2031" actId="26606"/>
+          <ac:grpSpMkLst>
+            <pc:docMk/>
+            <pc:sldMk cId="3591823627" sldId="271"/>
+            <ac:grpSpMk id="51" creationId="{1C559108-BBAE-426C-8564-051D2BA6DDC8}"/>
+          </ac:grpSpMkLst>
+        </pc:grpChg>
+        <pc:grpChg chg="add">
+          <ac:chgData name="Sander Sævig Eriksen" userId="2da4b7b7-d8b8-4b75-9017-f672d4ad080d" providerId="ADAL" clId="{69F880E9-B167-4345-A5E8-21D432C122E3}" dt="2025-03-26T12:16:08.647" v="2031" actId="26606"/>
+          <ac:grpSpMkLst>
+            <pc:docMk/>
+            <pc:sldMk cId="3591823627" sldId="271"/>
+            <ac:grpSpMk id="62" creationId="{1C559108-BBAE-426C-8564-051D2BA6DDC8}"/>
+          </ac:grpSpMkLst>
+        </pc:grpChg>
+        <pc:picChg chg="add del mod">
+          <ac:chgData name="Sander Sævig Eriksen" userId="2da4b7b7-d8b8-4b75-9017-f672d4ad080d" providerId="ADAL" clId="{69F880E9-B167-4345-A5E8-21D432C122E3}" dt="2025-03-26T12:15:31.456" v="2023" actId="478"/>
           <ac:picMkLst>
             <pc:docMk/>
             <pc:sldMk cId="3591823627" sldId="271"/>
             <ac:picMk id="5" creationId="{74116548-A549-AE85-4D6F-DBBFE4A50B2F}"/>
+          </ac:picMkLst>
+        </pc:picChg>
+        <pc:picChg chg="add del mod">
+          <ac:chgData name="Sander Sævig Eriksen" userId="2da4b7b7-d8b8-4b75-9017-f672d4ad080d" providerId="ADAL" clId="{69F880E9-B167-4345-A5E8-21D432C122E3}" dt="2025-03-26T12:16:04.490" v="2029" actId="478"/>
+          <ac:picMkLst>
+            <pc:docMk/>
+            <pc:sldMk cId="3591823627" sldId="271"/>
+            <ac:picMk id="6" creationId="{F04174C5-FD0B-E020-C68D-207D8948F65E}"/>
+          </ac:picMkLst>
+        </pc:picChg>
+        <pc:picChg chg="add mod">
+          <ac:chgData name="Sander Sævig Eriksen" userId="2da4b7b7-d8b8-4b75-9017-f672d4ad080d" providerId="ADAL" clId="{69F880E9-B167-4345-A5E8-21D432C122E3}" dt="2025-03-26T12:16:08.647" v="2031" actId="26606"/>
+          <ac:picMkLst>
+            <pc:docMk/>
+            <pc:sldMk cId="3591823627" sldId="271"/>
+            <ac:picMk id="8" creationId="{A277001E-0B3D-7535-8820-C747854E9D1A}"/>
+          </ac:picMkLst>
+        </pc:picChg>
+      </pc:sldChg>
+      <pc:sldChg chg="addSp delSp modSp new mod setBg delDesignElem chgLayout">
+        <pc:chgData name="Sander Sævig Eriksen" userId="2da4b7b7-d8b8-4b75-9017-f672d4ad080d" providerId="ADAL" clId="{69F880E9-B167-4345-A5E8-21D432C122E3}" dt="2025-03-26T12:39:45.934" v="2124" actId="14100"/>
+        <pc:sldMkLst>
+          <pc:docMk/>
+          <pc:sldMk cId="1551153413" sldId="272"/>
+        </pc:sldMkLst>
+        <pc:spChg chg="mod ord">
+          <ac:chgData name="Sander Sævig Eriksen" userId="2da4b7b7-d8b8-4b75-9017-f672d4ad080d" providerId="ADAL" clId="{69F880E9-B167-4345-A5E8-21D432C122E3}" dt="2025-03-26T12:38:50.673" v="2113" actId="700"/>
+          <ac:spMkLst>
+            <pc:docMk/>
+            <pc:sldMk cId="1551153413" sldId="272"/>
+            <ac:spMk id="2" creationId="{586468F2-1082-7B9D-3FF3-8F6403F0C13C}"/>
+          </ac:spMkLst>
+        </pc:spChg>
+        <pc:spChg chg="del">
+          <ac:chgData name="Sander Sævig Eriksen" userId="2da4b7b7-d8b8-4b75-9017-f672d4ad080d" providerId="ADAL" clId="{69F880E9-B167-4345-A5E8-21D432C122E3}" dt="2025-03-26T12:34:30.905" v="2098" actId="22"/>
+          <ac:spMkLst>
+            <pc:docMk/>
+            <pc:sldMk cId="1551153413" sldId="272"/>
+            <ac:spMk id="3" creationId="{4A4BF30A-ECEA-A9A4-103B-71D9E72E6E1F}"/>
+          </ac:spMkLst>
+        </pc:spChg>
+        <pc:spChg chg="add del mod ord">
+          <ac:chgData name="Sander Sævig Eriksen" userId="2da4b7b7-d8b8-4b75-9017-f672d4ad080d" providerId="ADAL" clId="{69F880E9-B167-4345-A5E8-21D432C122E3}" dt="2025-03-26T12:39:08.349" v="2116" actId="21"/>
+          <ac:spMkLst>
+            <pc:docMk/>
+            <pc:sldMk cId="1551153413" sldId="272"/>
+            <ac:spMk id="12" creationId="{90B8AB00-042A-E450-238C-CC0828A4000E}"/>
+          </ac:spMkLst>
+        </pc:spChg>
+        <pc:spChg chg="add del">
+          <ac:chgData name="Sander Sævig Eriksen" userId="2da4b7b7-d8b8-4b75-9017-f672d4ad080d" providerId="ADAL" clId="{69F880E9-B167-4345-A5E8-21D432C122E3}" dt="2025-03-26T12:35:54.239" v="2105" actId="26606"/>
+          <ac:spMkLst>
+            <pc:docMk/>
+            <pc:sldMk cId="1551153413" sldId="272"/>
+            <ac:spMk id="13" creationId="{4729D1DF-0659-90E5-186B-7248AA4C28EC}"/>
+          </ac:spMkLst>
+        </pc:spChg>
+        <pc:spChg chg="add del">
+          <ac:chgData name="Sander Sævig Eriksen" userId="2da4b7b7-d8b8-4b75-9017-f672d4ad080d" providerId="ADAL" clId="{69F880E9-B167-4345-A5E8-21D432C122E3}" dt="2025-03-26T12:35:53.412" v="2103" actId="26606"/>
+          <ac:spMkLst>
+            <pc:docMk/>
+            <pc:sldMk cId="1551153413" sldId="272"/>
+            <ac:spMk id="14" creationId="{A448A164-3723-4399-833C-B546CB043CF9}"/>
+          </ac:spMkLst>
+        </pc:spChg>
+        <pc:spChg chg="add del">
+          <ac:chgData name="Sander Sævig Eriksen" userId="2da4b7b7-d8b8-4b75-9017-f672d4ad080d" providerId="ADAL" clId="{69F880E9-B167-4345-A5E8-21D432C122E3}" dt="2025-03-26T12:35:53.412" v="2103" actId="26606"/>
+          <ac:spMkLst>
+            <pc:docMk/>
+            <pc:sldMk cId="1551153413" sldId="272"/>
+            <ac:spMk id="18" creationId="{1AE2FDE4-8ECB-4D0B-B871-D4EE526064C4}"/>
+          </ac:spMkLst>
+        </pc:spChg>
+        <pc:spChg chg="add del">
+          <ac:chgData name="Sander Sævig Eriksen" userId="2da4b7b7-d8b8-4b75-9017-f672d4ad080d" providerId="ADAL" clId="{69F880E9-B167-4345-A5E8-21D432C122E3}" dt="2025-03-26T12:35:54.239" v="2105" actId="26606"/>
+          <ac:spMkLst>
+            <pc:docMk/>
+            <pc:sldMk cId="1551153413" sldId="272"/>
+            <ac:spMk id="22" creationId="{866718AF-9359-4BEF-9584-028A3072A16A}"/>
+          </ac:spMkLst>
+        </pc:spChg>
+        <pc:spChg chg="add del">
+          <ac:chgData name="Sander Sævig Eriksen" userId="2da4b7b7-d8b8-4b75-9017-f672d4ad080d" providerId="ADAL" clId="{69F880E9-B167-4345-A5E8-21D432C122E3}" dt="2025-03-26T12:35:54.239" v="2105" actId="26606"/>
+          <ac:spMkLst>
+            <pc:docMk/>
+            <pc:sldMk cId="1551153413" sldId="272"/>
+            <ac:spMk id="30" creationId="{15F40E44-6E4F-461E-B676-41D4FD94DD90}"/>
+          </ac:spMkLst>
+        </pc:spChg>
+        <pc:spChg chg="add del">
+          <ac:chgData name="Sander Sævig Eriksen" userId="2da4b7b7-d8b8-4b75-9017-f672d4ad080d" providerId="ADAL" clId="{69F880E9-B167-4345-A5E8-21D432C122E3}" dt="2025-03-26T12:35:54.239" v="2105" actId="26606"/>
+          <ac:spMkLst>
+            <pc:docMk/>
+            <pc:sldMk cId="1551153413" sldId="272"/>
+            <ac:spMk id="31" creationId="{68FD15E8-8B40-4424-82F2-DA107F7F9F2B}"/>
+          </ac:spMkLst>
+        </pc:spChg>
+        <pc:spChg chg="add del">
+          <ac:chgData name="Sander Sævig Eriksen" userId="2da4b7b7-d8b8-4b75-9017-f672d4ad080d" providerId="ADAL" clId="{69F880E9-B167-4345-A5E8-21D432C122E3}" dt="2025-03-26T12:35:54.239" v="2105" actId="26606"/>
+          <ac:spMkLst>
+            <pc:docMk/>
+            <pc:sldMk cId="1551153413" sldId="272"/>
+            <ac:spMk id="33" creationId="{53033F67-95C8-49C5-9DF9-F7F6764ADBE2}"/>
+          </ac:spMkLst>
+        </pc:spChg>
+        <pc:spChg chg="add del">
+          <ac:chgData name="Sander Sævig Eriksen" userId="2da4b7b7-d8b8-4b75-9017-f672d4ad080d" providerId="ADAL" clId="{69F880E9-B167-4345-A5E8-21D432C122E3}" dt="2025-03-26T12:35:55.019" v="2107" actId="26606"/>
+          <ac:spMkLst>
+            <pc:docMk/>
+            <pc:sldMk cId="1551153413" sldId="272"/>
+            <ac:spMk id="35" creationId="{3203E4BD-30E1-42F5-9949-FF7CA56A91DF}"/>
+          </ac:spMkLst>
+        </pc:spChg>
+        <pc:spChg chg="add del">
+          <ac:chgData name="Sander Sævig Eriksen" userId="2da4b7b7-d8b8-4b75-9017-f672d4ad080d" providerId="ADAL" clId="{69F880E9-B167-4345-A5E8-21D432C122E3}" dt="2025-03-26T12:35:55.019" v="2107" actId="26606"/>
+          <ac:spMkLst>
+            <pc:docMk/>
+            <pc:sldMk cId="1551153413" sldId="272"/>
+            <ac:spMk id="36" creationId="{90464369-70FA-42AF-948F-80664CA7BFE5}"/>
+          </ac:spMkLst>
+        </pc:spChg>
+        <pc:spChg chg="add del">
+          <ac:chgData name="Sander Sævig Eriksen" userId="2da4b7b7-d8b8-4b75-9017-f672d4ad080d" providerId="ADAL" clId="{69F880E9-B167-4345-A5E8-21D432C122E3}" dt="2025-03-26T12:35:55.019" v="2107" actId="26606"/>
+          <ac:spMkLst>
+            <pc:docMk/>
+            <pc:sldMk cId="1551153413" sldId="272"/>
+            <ac:spMk id="37" creationId="{A648176E-454C-437C-B0FC-9B82FCF32B24}"/>
+          </ac:spMkLst>
+        </pc:spChg>
+        <pc:spChg chg="add del">
+          <ac:chgData name="Sander Sævig Eriksen" userId="2da4b7b7-d8b8-4b75-9017-f672d4ad080d" providerId="ADAL" clId="{69F880E9-B167-4345-A5E8-21D432C122E3}" dt="2025-03-26T12:35:55.019" v="2107" actId="26606"/>
+          <ac:spMkLst>
+            <pc:docMk/>
+            <pc:sldMk cId="1551153413" sldId="272"/>
+            <ac:spMk id="38" creationId="{A6604B49-AD5C-4590-B051-06C8222ECD99}"/>
+          </ac:spMkLst>
+        </pc:spChg>
+        <pc:spChg chg="add del">
+          <ac:chgData name="Sander Sævig Eriksen" userId="2da4b7b7-d8b8-4b75-9017-f672d4ad080d" providerId="ADAL" clId="{69F880E9-B167-4345-A5E8-21D432C122E3}" dt="2025-03-26T12:35:55.019" v="2107" actId="26606"/>
+          <ac:spMkLst>
+            <pc:docMk/>
+            <pc:sldMk cId="1551153413" sldId="272"/>
+            <ac:spMk id="39" creationId="{CC552A98-EF7D-4D42-AB69-066B786AB55B}"/>
+          </ac:spMkLst>
+        </pc:spChg>
+        <pc:spChg chg="add del">
+          <ac:chgData name="Sander Sævig Eriksen" userId="2da4b7b7-d8b8-4b75-9017-f672d4ad080d" providerId="ADAL" clId="{69F880E9-B167-4345-A5E8-21D432C122E3}" dt="2025-03-26T12:35:55.019" v="2107" actId="26606"/>
+          <ac:spMkLst>
+            <pc:docMk/>
+            <pc:sldMk cId="1551153413" sldId="272"/>
+            <ac:spMk id="40" creationId="{468DBFF1-11CE-A818-D158-137E227022F3}"/>
+          </ac:spMkLst>
+        </pc:spChg>
+        <pc:spChg chg="add del">
+          <ac:chgData name="Sander Sævig Eriksen" userId="2da4b7b7-d8b8-4b75-9017-f672d4ad080d" providerId="ADAL" clId="{69F880E9-B167-4345-A5E8-21D432C122E3}" dt="2025-03-26T12:35:57.381" v="2109" actId="26606"/>
+          <ac:spMkLst>
+            <pc:docMk/>
+            <pc:sldMk cId="1551153413" sldId="272"/>
+            <ac:spMk id="42" creationId="{FB5B0058-AF13-4859-B429-4EDDE2A26F7F}"/>
+          </ac:spMkLst>
+        </pc:spChg>
+        <pc:spChg chg="add del">
+          <ac:chgData name="Sander Sævig Eriksen" userId="2da4b7b7-d8b8-4b75-9017-f672d4ad080d" providerId="ADAL" clId="{69F880E9-B167-4345-A5E8-21D432C122E3}" dt="2025-03-26T12:35:57.381" v="2109" actId="26606"/>
+          <ac:spMkLst>
+            <pc:docMk/>
+            <pc:sldMk cId="1551153413" sldId="272"/>
+            <ac:spMk id="44" creationId="{81BD432D-FAB3-4B5D-BF27-4DA7C75B3238}"/>
+          </ac:spMkLst>
+        </pc:spChg>
+        <pc:spChg chg="add del">
+          <ac:chgData name="Sander Sævig Eriksen" userId="2da4b7b7-d8b8-4b75-9017-f672d4ad080d" providerId="ADAL" clId="{69F880E9-B167-4345-A5E8-21D432C122E3}" dt="2025-03-26T12:38:50.673" v="2113" actId="700"/>
+          <ac:spMkLst>
+            <pc:docMk/>
+            <pc:sldMk cId="1551153413" sldId="272"/>
+            <ac:spMk id="46" creationId="{9D25F302-27C5-414F-97F8-6EA0A6C028BA}"/>
+          </ac:spMkLst>
+        </pc:spChg>
+        <pc:spChg chg="add del">
+          <ac:chgData name="Sander Sævig Eriksen" userId="2da4b7b7-d8b8-4b75-9017-f672d4ad080d" providerId="ADAL" clId="{69F880E9-B167-4345-A5E8-21D432C122E3}" dt="2025-03-26T12:38:50.673" v="2113" actId="700"/>
+          <ac:spMkLst>
+            <pc:docMk/>
+            <pc:sldMk cId="1551153413" sldId="272"/>
+            <ac:spMk id="47" creationId="{041C67D0-A496-4B86-BF61-263FF9EFD7F0}"/>
+          </ac:spMkLst>
+        </pc:spChg>
+        <pc:spChg chg="add del">
+          <ac:chgData name="Sander Sævig Eriksen" userId="2da4b7b7-d8b8-4b75-9017-f672d4ad080d" providerId="ADAL" clId="{69F880E9-B167-4345-A5E8-21D432C122E3}" dt="2025-03-26T12:38:50.673" v="2113" actId="700"/>
+          <ac:spMkLst>
+            <pc:docMk/>
+            <pc:sldMk cId="1551153413" sldId="272"/>
+            <ac:spMk id="48" creationId="{830A36F8-48C2-4842-A87B-8CE8DF4E7FD2}"/>
+          </ac:spMkLst>
+        </pc:spChg>
+        <pc:spChg chg="add del">
+          <ac:chgData name="Sander Sævig Eriksen" userId="2da4b7b7-d8b8-4b75-9017-f672d4ad080d" providerId="ADAL" clId="{69F880E9-B167-4345-A5E8-21D432C122E3}" dt="2025-03-26T12:38:50.673" v="2113" actId="700"/>
+          <ac:spMkLst>
+            <pc:docMk/>
+            <pc:sldMk cId="1551153413" sldId="272"/>
+            <ac:spMk id="49" creationId="{8F451A30-466B-4996-9BA5-CD6ABCC6D558}"/>
+          </ac:spMkLst>
+        </pc:spChg>
+        <pc:spChg chg="add del">
+          <ac:chgData name="Sander Sævig Eriksen" userId="2da4b7b7-d8b8-4b75-9017-f672d4ad080d" providerId="ADAL" clId="{69F880E9-B167-4345-A5E8-21D432C122E3}" dt="2025-03-26T12:38:50.673" v="2113" actId="700"/>
+          <ac:spMkLst>
+            <pc:docMk/>
+            <pc:sldMk cId="1551153413" sldId="272"/>
+            <ac:spMk id="50" creationId="{04166F77-0901-B7A9-2B1D-20B7BA133ACD}"/>
+          </ac:spMkLst>
+        </pc:spChg>
+        <pc:grpChg chg="add del">
+          <ac:chgData name="Sander Sævig Eriksen" userId="2da4b7b7-d8b8-4b75-9017-f672d4ad080d" providerId="ADAL" clId="{69F880E9-B167-4345-A5E8-21D432C122E3}" dt="2025-03-26T12:35:53.412" v="2103" actId="26606"/>
+          <ac:grpSpMkLst>
+            <pc:docMk/>
+            <pc:sldMk cId="1551153413" sldId="272"/>
+            <ac:grpSpMk id="20" creationId="{C5E445D8-2A23-4F9B-999F-7574202DE3D3}"/>
+          </ac:grpSpMkLst>
+        </pc:grpChg>
+        <pc:grpChg chg="add del">
+          <ac:chgData name="Sander Sævig Eriksen" userId="2da4b7b7-d8b8-4b75-9017-f672d4ad080d" providerId="ADAL" clId="{69F880E9-B167-4345-A5E8-21D432C122E3}" dt="2025-03-26T12:35:53.412" v="2103" actId="26606"/>
+          <ac:grpSpMkLst>
+            <pc:docMk/>
+            <pc:sldMk cId="1551153413" sldId="272"/>
+            <ac:grpSpMk id="26" creationId="{A1FFFF00-7846-4DD3-A411-14A5989D56A1}"/>
+          </ac:grpSpMkLst>
+        </pc:grpChg>
+        <pc:picChg chg="add mod ord">
+          <ac:chgData name="Sander Sævig Eriksen" userId="2da4b7b7-d8b8-4b75-9017-f672d4ad080d" providerId="ADAL" clId="{69F880E9-B167-4345-A5E8-21D432C122E3}" dt="2025-03-26T12:39:38.861" v="2123" actId="14100"/>
+          <ac:picMkLst>
+            <pc:docMk/>
+            <pc:sldMk cId="1551153413" sldId="272"/>
+            <ac:picMk id="5" creationId="{7BFE482F-5D53-EF29-102A-F9A4912C0AD2}"/>
+          </ac:picMkLst>
+        </pc:picChg>
+        <pc:picChg chg="add del mod">
+          <ac:chgData name="Sander Sævig Eriksen" userId="2da4b7b7-d8b8-4b75-9017-f672d4ad080d" providerId="ADAL" clId="{69F880E9-B167-4345-A5E8-21D432C122E3}" dt="2025-03-26T12:38:01.576" v="2111" actId="478"/>
+          <ac:picMkLst>
+            <pc:docMk/>
+            <pc:sldMk cId="1551153413" sldId="272"/>
+            <ac:picMk id="7" creationId="{A37E7AB0-F2CE-7887-144B-2FBE2954541B}"/>
+          </ac:picMkLst>
+        </pc:picChg>
+        <pc:picChg chg="add mod ord">
+          <ac:chgData name="Sander Sævig Eriksen" userId="2da4b7b7-d8b8-4b75-9017-f672d4ad080d" providerId="ADAL" clId="{69F880E9-B167-4345-A5E8-21D432C122E3}" dt="2025-03-26T12:39:45.934" v="2124" actId="14100"/>
+          <ac:picMkLst>
+            <pc:docMk/>
+            <pc:sldMk cId="1551153413" sldId="272"/>
+            <ac:picMk id="9" creationId="{E1FF8A9B-4CFB-9C90-C5F4-95B4D5ED0691}"/>
+          </ac:picMkLst>
+        </pc:picChg>
+        <pc:picChg chg="add mod">
+          <ac:chgData name="Sander Sævig Eriksen" userId="2da4b7b7-d8b8-4b75-9017-f672d4ad080d" providerId="ADAL" clId="{69F880E9-B167-4345-A5E8-21D432C122E3}" dt="2025-03-26T12:39:01.382" v="2115" actId="14100"/>
+          <ac:picMkLst>
+            <pc:docMk/>
+            <pc:sldMk cId="1551153413" sldId="272"/>
+            <ac:picMk id="11" creationId="{579F6FF7-EE8F-7858-5FD1-32AB11BB8B20}"/>
+          </ac:picMkLst>
+        </pc:picChg>
+        <pc:picChg chg="add del">
+          <ac:chgData name="Sander Sævig Eriksen" userId="2da4b7b7-d8b8-4b75-9017-f672d4ad080d" providerId="ADAL" clId="{69F880E9-B167-4345-A5E8-21D432C122E3}" dt="2025-03-26T12:35:54.239" v="2105" actId="26606"/>
+          <ac:picMkLst>
+            <pc:docMk/>
+            <pc:sldMk cId="1551153413" sldId="272"/>
+            <ac:picMk id="32" creationId="{FCF80E2F-2954-485B-B1B5-DCB9F153FBA3}"/>
+          </ac:picMkLst>
+        </pc:picChg>
+        <pc:cxnChg chg="add del">
+          <ac:chgData name="Sander Sævig Eriksen" userId="2da4b7b7-d8b8-4b75-9017-f672d4ad080d" providerId="ADAL" clId="{69F880E9-B167-4345-A5E8-21D432C122E3}" dt="2025-03-26T12:35:53.412" v="2103" actId="26606"/>
+          <ac:cxnSpMkLst>
+            <pc:docMk/>
+            <pc:sldMk cId="1551153413" sldId="272"/>
+            <ac:cxnSpMk id="16" creationId="{5CD17E7E-AAA5-4965-A374-00AB01A503CD}"/>
+          </ac:cxnSpMkLst>
+        </pc:cxnChg>
+        <pc:cxnChg chg="add del">
+          <ac:chgData name="Sander Sævig Eriksen" userId="2da4b7b7-d8b8-4b75-9017-f672d4ad080d" providerId="ADAL" clId="{69F880E9-B167-4345-A5E8-21D432C122E3}" dt="2025-03-26T12:35:53.412" v="2103" actId="26606"/>
+          <ac:cxnSpMkLst>
+            <pc:docMk/>
+            <pc:sldMk cId="1551153413" sldId="272"/>
+            <ac:cxnSpMk id="24" creationId="{675CB220-8054-4559-8C9A-06EB11D2D496}"/>
+          </ac:cxnSpMkLst>
+        </pc:cxnChg>
+        <pc:cxnChg chg="add del">
+          <ac:chgData name="Sander Sævig Eriksen" userId="2da4b7b7-d8b8-4b75-9017-f672d4ad080d" providerId="ADAL" clId="{69F880E9-B167-4345-A5E8-21D432C122E3}" dt="2025-03-26T12:35:57.381" v="2109" actId="26606"/>
+          <ac:cxnSpMkLst>
+            <pc:docMk/>
+            <pc:sldMk cId="1551153413" sldId="272"/>
+            <ac:cxnSpMk id="43" creationId="{07A9243D-8FC3-4B36-874B-55906B03F484}"/>
+          </ac:cxnSpMkLst>
+        </pc:cxnChg>
+      </pc:sldChg>
+      <pc:sldChg chg="addSp delSp modSp new mod">
+        <pc:chgData name="Sander Sævig Eriksen" userId="2da4b7b7-d8b8-4b75-9017-f672d4ad080d" providerId="ADAL" clId="{69F880E9-B167-4345-A5E8-21D432C122E3}" dt="2025-03-26T12:43:37.306" v="2152" actId="14100"/>
+        <pc:sldMkLst>
+          <pc:docMk/>
+          <pc:sldMk cId="4284492900" sldId="273"/>
+        </pc:sldMkLst>
+        <pc:spChg chg="mod">
+          <ac:chgData name="Sander Sævig Eriksen" userId="2da4b7b7-d8b8-4b75-9017-f672d4ad080d" providerId="ADAL" clId="{69F880E9-B167-4345-A5E8-21D432C122E3}" dt="2025-03-26T12:40:06.088" v="2138" actId="20577"/>
+          <ac:spMkLst>
+            <pc:docMk/>
+            <pc:sldMk cId="4284492900" sldId="273"/>
+            <ac:spMk id="2" creationId="{5FACCF24-4C9F-5722-7036-7DF1AB4EBB30}"/>
+          </ac:spMkLst>
+        </pc:spChg>
+        <pc:spChg chg="del">
+          <ac:chgData name="Sander Sævig Eriksen" userId="2da4b7b7-d8b8-4b75-9017-f672d4ad080d" providerId="ADAL" clId="{69F880E9-B167-4345-A5E8-21D432C122E3}" dt="2025-03-26T12:43:05.476" v="2143" actId="22"/>
+          <ac:spMkLst>
+            <pc:docMk/>
+            <pc:sldMk cId="4284492900" sldId="273"/>
+            <ac:spMk id="3" creationId="{AAD79BAA-C217-1260-E686-5A5EC15104F3}"/>
+          </ac:spMkLst>
+        </pc:spChg>
+        <pc:picChg chg="add mod">
+          <ac:chgData name="Sander Sævig Eriksen" userId="2da4b7b7-d8b8-4b75-9017-f672d4ad080d" providerId="ADAL" clId="{69F880E9-B167-4345-A5E8-21D432C122E3}" dt="2025-03-26T12:43:12.840" v="2146" actId="1076"/>
+          <ac:picMkLst>
+            <pc:docMk/>
+            <pc:sldMk cId="4284492900" sldId="273"/>
+            <ac:picMk id="5" creationId="{5A15F497-98C6-6B4A-D96A-4F8C4D7D4437}"/>
+          </ac:picMkLst>
+        </pc:picChg>
+        <pc:picChg chg="add mod ord">
+          <ac:chgData name="Sander Sævig Eriksen" userId="2da4b7b7-d8b8-4b75-9017-f672d4ad080d" providerId="ADAL" clId="{69F880E9-B167-4345-A5E8-21D432C122E3}" dt="2025-03-26T12:43:18.585" v="2148" actId="14100"/>
+          <ac:picMkLst>
+            <pc:docMk/>
+            <pc:sldMk cId="4284492900" sldId="273"/>
+            <ac:picMk id="7" creationId="{971C3772-577C-4EE3-EB00-E5D63DB46D60}"/>
+          </ac:picMkLst>
+        </pc:picChg>
+        <pc:picChg chg="add mod">
+          <ac:chgData name="Sander Sævig Eriksen" userId="2da4b7b7-d8b8-4b75-9017-f672d4ad080d" providerId="ADAL" clId="{69F880E9-B167-4345-A5E8-21D432C122E3}" dt="2025-03-26T12:43:37.306" v="2152" actId="14100"/>
+          <ac:picMkLst>
+            <pc:docMk/>
+            <pc:sldMk cId="4284492900" sldId="273"/>
+            <ac:picMk id="9" creationId="{B071E38B-6570-1A31-AA4A-42620735A41D}"/>
+          </ac:picMkLst>
+        </pc:picChg>
+      </pc:sldChg>
+      <pc:sldChg chg="addSp delSp modSp new mod">
+        <pc:chgData name="Sander Sævig Eriksen" userId="2da4b7b7-d8b8-4b75-9017-f672d4ad080d" providerId="ADAL" clId="{69F880E9-B167-4345-A5E8-21D432C122E3}" dt="2025-03-26T12:45:58.087" v="2173" actId="14100"/>
+        <pc:sldMkLst>
+          <pc:docMk/>
+          <pc:sldMk cId="113336720" sldId="274"/>
+        </pc:sldMkLst>
+        <pc:spChg chg="mod">
+          <ac:chgData name="Sander Sævig Eriksen" userId="2da4b7b7-d8b8-4b75-9017-f672d4ad080d" providerId="ADAL" clId="{69F880E9-B167-4345-A5E8-21D432C122E3}" dt="2025-03-26T12:44:06.230" v="2160" actId="20577"/>
+          <ac:spMkLst>
+            <pc:docMk/>
+            <pc:sldMk cId="113336720" sldId="274"/>
+            <ac:spMk id="2" creationId="{D0162F17-AD87-36F4-DAA8-106CA8DA08EB}"/>
+          </ac:spMkLst>
+        </pc:spChg>
+        <pc:spChg chg="del">
+          <ac:chgData name="Sander Sævig Eriksen" userId="2da4b7b7-d8b8-4b75-9017-f672d4ad080d" providerId="ADAL" clId="{69F880E9-B167-4345-A5E8-21D432C122E3}" dt="2025-03-26T12:44:52.024" v="2161" actId="22"/>
+          <ac:spMkLst>
+            <pc:docMk/>
+            <pc:sldMk cId="113336720" sldId="274"/>
+            <ac:spMk id="3" creationId="{0D690928-3B93-A094-6C54-F2F782C39BBB}"/>
+          </ac:spMkLst>
+        </pc:spChg>
+        <pc:picChg chg="add mod ord">
+          <ac:chgData name="Sander Sævig Eriksen" userId="2da4b7b7-d8b8-4b75-9017-f672d4ad080d" providerId="ADAL" clId="{69F880E9-B167-4345-A5E8-21D432C122E3}" dt="2025-03-26T12:45:13.911" v="2166" actId="1076"/>
+          <ac:picMkLst>
+            <pc:docMk/>
+            <pc:sldMk cId="113336720" sldId="274"/>
+            <ac:picMk id="5" creationId="{E5BBA3B7-9629-A0AE-699F-C89144F6B6CC}"/>
+          </ac:picMkLst>
+        </pc:picChg>
+        <pc:picChg chg="add mod">
+          <ac:chgData name="Sander Sævig Eriksen" userId="2da4b7b7-d8b8-4b75-9017-f672d4ad080d" providerId="ADAL" clId="{69F880E9-B167-4345-A5E8-21D432C122E3}" dt="2025-03-26T12:45:58.087" v="2173" actId="14100"/>
+          <ac:picMkLst>
+            <pc:docMk/>
+            <pc:sldMk cId="113336720" sldId="274"/>
+            <ac:picMk id="7" creationId="{68C2923F-9297-15C3-FE89-9AB6F6C39C25}"/>
+          </ac:picMkLst>
+        </pc:picChg>
+        <pc:picChg chg="add mod">
+          <ac:chgData name="Sander Sævig Eriksen" userId="2da4b7b7-d8b8-4b75-9017-f672d4ad080d" providerId="ADAL" clId="{69F880E9-B167-4345-A5E8-21D432C122E3}" dt="2025-03-26T12:45:49.949" v="2171" actId="14100"/>
+          <ac:picMkLst>
+            <pc:docMk/>
+            <pc:sldMk cId="113336720" sldId="274"/>
+            <ac:picMk id="9" creationId="{7E058767-46EB-8C2F-BDDC-55E685DD68D3}"/>
           </ac:picMkLst>
         </pc:picChg>
       </pc:sldChg>
@@ -10926,10 +11409,10 @@
       </p:grpSpPr>
       <p:sp useBgFill="1">
         <p:nvSpPr>
-          <p:cNvPr id="23" name="Rectangle 22">
+          <p:cNvPr id="60" name="Rectangle 59">
             <a:extLst>
               <a:ext uri="{FF2B5EF4-FFF2-40B4-BE49-F238E27FC236}">
-                <a16:creationId xmlns:a16="http://schemas.microsoft.com/office/drawing/2014/main" id="{201CC55D-ED54-4C5C-95E6-10947BD1103B}"/>
+                <a16:creationId xmlns:a16="http://schemas.microsoft.com/office/drawing/2014/main" id="{6EFC920F-B85A-4068-BD93-41064EDE93D3}"/>
               </a:ext>
               <a:ext uri="{C183D7F6-B498-43B3-948B-1728B52AA6E4}">
                 <adec:decorative xmlns:adec="http://schemas.microsoft.com/office/drawing/2017/decorative" val="1"/>
@@ -10984,47 +11467,12 @@
           </a:p>
         </p:txBody>
       </p:sp>
-      <p:sp>
-        <p:nvSpPr>
-          <p:cNvPr id="2" name="Title 1">
+      <p:grpSp>
+        <p:nvGrpSpPr>
+          <p:cNvPr id="62" name="Group 61">
             <a:extLst>
               <a:ext uri="{FF2B5EF4-FFF2-40B4-BE49-F238E27FC236}">
-                <a16:creationId xmlns:a16="http://schemas.microsoft.com/office/drawing/2014/main" id="{DA83A18E-F38B-FEA7-A82C-9FDADD548F88}"/>
-              </a:ext>
-            </a:extLst>
-          </p:cNvPr>
-          <p:cNvSpPr>
-            <a:spLocks noGrp="1"/>
-          </p:cNvSpPr>
-          <p:nvPr>
-            <p:ph type="title"/>
-          </p:nvPr>
-        </p:nvSpPr>
-        <p:spPr>
-          <a:xfrm>
-            <a:off x="589560" y="856180"/>
-            <a:ext cx="4560584" cy="1128068"/>
-          </a:xfrm>
-        </p:spPr>
-        <p:txBody>
-          <a:bodyPr anchor="ctr">
-            <a:normAutofit/>
-          </a:bodyPr>
-          <a:lstStyle/>
-          <a:p>
-            <a:r>
-              <a:rPr lang="nb-NO" sz="3700"/>
-              <a:t>Linear regression, full and constricted data</a:t>
-            </a:r>
-          </a:p>
-        </p:txBody>
-      </p:sp>
-      <p:grpSp>
-        <p:nvGrpSpPr>
-          <p:cNvPr id="25" name="Group 24">
-            <a:extLst>
-              <a:ext uri="{FF2B5EF4-FFF2-40B4-BE49-F238E27FC236}">
-                <a16:creationId xmlns:a16="http://schemas.microsoft.com/office/drawing/2014/main" id="{1DE889C7-FAD6-4397-98E2-05D503484459}"/>
+                <a16:creationId xmlns:a16="http://schemas.microsoft.com/office/drawing/2014/main" id="{1C559108-BBAE-426C-8564-051D2BA6DDC8}"/>
               </a:ext>
               <a:ext uri="{C183D7F6-B498-43B3-948B-1728B52AA6E4}">
                 <adec:decorative xmlns:adec="http://schemas.microsoft.com/office/drawing/2017/decorative" val="1"/>
@@ -11043,19 +11491,22 @@
           </p:nvPr>
         </p:nvGrpSpPr>
         <p:grpSpPr>
-          <a:xfrm>
-            <a:off x="0" y="1083484"/>
-            <a:ext cx="355196" cy="673460"/>
-            <a:chOff x="0" y="823811"/>
-            <a:chExt cx="355196" cy="673460"/>
+          <a:xfrm rot="5400000">
+            <a:off x="-2340441" y="2666183"/>
+            <a:ext cx="5860051" cy="527712"/>
+            <a:chOff x="6081624" y="1998368"/>
+            <a:chExt cx="5613457" cy="782175"/>
           </a:xfrm>
+          <a:solidFill>
+            <a:schemeClr val="accent4"/>
+          </a:solidFill>
         </p:grpSpPr>
         <p:sp>
           <p:nvSpPr>
-            <p:cNvPr id="26" name="Rectangle 25">
+            <p:cNvPr id="63" name="Rectangle 62">
               <a:extLst>
                 <a:ext uri="{FF2B5EF4-FFF2-40B4-BE49-F238E27FC236}">
-                  <a16:creationId xmlns:a16="http://schemas.microsoft.com/office/drawing/2014/main" id="{F399A70F-F8CD-4992-9EF5-6CF15472E73F}"/>
+                  <a16:creationId xmlns:a16="http://schemas.microsoft.com/office/drawing/2014/main" id="{42BC35EE-6650-42D2-AEFB-4B7CD1AFC9BD}"/>
                 </a:ext>
                 <a:ext uri="{C183D7F6-B498-43B3-948B-1728B52AA6E4}">
                   <adec:decorative xmlns:adec="http://schemas.microsoft.com/office/drawing/2017/decorative" val="1"/>
@@ -11072,16 +11523,14 @@
             </p:nvPr>
           </p:nvSpPr>
           <p:spPr>
-            <a:xfrm>
-              <a:off x="0" y="823811"/>
-              <a:ext cx="87363" cy="673460"/>
+            <a:xfrm rot="5400000">
+              <a:off x="11228040" y="2313027"/>
+              <a:ext cx="781700" cy="152382"/>
             </a:xfrm>
             <a:prstGeom prst="rect">
               <a:avLst/>
             </a:prstGeom>
-            <a:solidFill>
-              <a:schemeClr val="accent4"/>
-            </a:solidFill>
+            <a:grpFill/>
             <a:ln>
               <a:noFill/>
             </a:ln>
@@ -11113,10 +11562,10 @@
         </p:sp>
         <p:sp>
           <p:nvSpPr>
-            <p:cNvPr id="27" name="Rectangle 26">
+            <p:cNvPr id="64" name="Rectangle 63">
               <a:extLst>
                 <a:ext uri="{FF2B5EF4-FFF2-40B4-BE49-F238E27FC236}">
-                  <a16:creationId xmlns:a16="http://schemas.microsoft.com/office/drawing/2014/main" id="{48F4FEDC-6D80-458C-A665-075D9B9500FD}"/>
+                  <a16:creationId xmlns:a16="http://schemas.microsoft.com/office/drawing/2014/main" id="{0952C743-9049-4DFB-878B-2AB07B6E4FD1}"/>
                 </a:ext>
                 <a:ext uri="{C183D7F6-B498-43B3-948B-1728B52AA6E4}">
                   <adec:decorative xmlns:adec="http://schemas.microsoft.com/office/drawing/2017/decorative" val="1"/>
@@ -11133,16 +11582,14 @@
             </p:nvPr>
           </p:nvSpPr>
           <p:spPr>
-            <a:xfrm>
-              <a:off x="159341" y="823811"/>
-              <a:ext cx="195855" cy="673460"/>
+            <a:xfrm flipH="1" flipV="1">
+              <a:off x="6081624" y="1998844"/>
+              <a:ext cx="5372968" cy="781699"/>
             </a:xfrm>
             <a:prstGeom prst="rect">
               <a:avLst/>
             </a:prstGeom>
-            <a:solidFill>
-              <a:schemeClr val="accent4"/>
-            </a:solidFill>
+            <a:grpFill/>
             <a:ln>
               <a:noFill/>
             </a:ln>
@@ -11175,290 +11622,10 @@
       </p:grpSp>
       <p:sp>
         <p:nvSpPr>
-          <p:cNvPr id="29" name="Rectangle 28">
+          <p:cNvPr id="66" name="Rectangle 65">
             <a:extLst>
               <a:ext uri="{FF2B5EF4-FFF2-40B4-BE49-F238E27FC236}">
-                <a16:creationId xmlns:a16="http://schemas.microsoft.com/office/drawing/2014/main" id="{3873B707-463F-40B0-8227-E8CC6C67EB25}"/>
-              </a:ext>
-              <a:ext uri="{C183D7F6-B498-43B3-948B-1728B52AA6E4}">
-                <adec:decorative xmlns:adec="http://schemas.microsoft.com/office/drawing/2017/decorative" val="1"/>
-              </a:ext>
-            </a:extLst>
-          </p:cNvPr>
-          <p:cNvSpPr>
-            <a:spLocks noGrp="1" noRot="1" noChangeAspect="1" noMove="1" noResize="1" noEditPoints="1" noAdjustHandles="1" noChangeArrowheads="1" noChangeShapeType="1" noTextEdit="1"/>
-          </p:cNvSpPr>
-          <p:nvPr>
-            <p:extLst>
-              <p:ext uri="{386F3935-93C4-4BCD-93E2-E3B085C9AB24}">
-                <p16:designElem xmlns:p16="http://schemas.microsoft.com/office/powerpoint/2015/main" val="1"/>
-              </p:ext>
-            </p:extLst>
-          </p:nvPr>
-        </p:nvSpPr>
-        <p:spPr>
-          <a:xfrm flipH="1">
-            <a:off x="665085" y="2090569"/>
-            <a:ext cx="4297680" cy="27432"/>
-          </a:xfrm>
-          <a:prstGeom prst="rect">
-            <a:avLst/>
-          </a:prstGeom>
-          <a:solidFill>
-            <a:schemeClr val="accent4"/>
-          </a:solidFill>
-          <a:ln>
-            <a:noFill/>
-          </a:ln>
-        </p:spPr>
-        <p:style>
-          <a:lnRef idx="2">
-            <a:schemeClr val="accent1">
-              <a:shade val="50000"/>
-            </a:schemeClr>
-          </a:lnRef>
-          <a:fillRef idx="1">
-            <a:schemeClr val="accent1"/>
-          </a:fillRef>
-          <a:effectRef idx="0">
-            <a:schemeClr val="accent1"/>
-          </a:effectRef>
-          <a:fontRef idx="minor">
-            <a:schemeClr val="lt1"/>
-          </a:fontRef>
-        </p:style>
-        <p:txBody>
-          <a:bodyPr rtlCol="0" anchor="ctr"/>
-          <a:lstStyle/>
-          <a:p>
-            <a:pPr algn="ctr"/>
-            <a:endParaRPr lang="en-US"/>
-          </a:p>
-        </p:txBody>
-      </p:sp>
-      <p:sp>
-        <p:nvSpPr>
-          <p:cNvPr id="3" name="Content Placeholder 2">
-            <a:extLst>
-              <a:ext uri="{FF2B5EF4-FFF2-40B4-BE49-F238E27FC236}">
-                <a16:creationId xmlns:a16="http://schemas.microsoft.com/office/drawing/2014/main" id="{1052C69E-F9FD-C41B-D5C3-DE7535BDA7C4}"/>
-              </a:ext>
-            </a:extLst>
-          </p:cNvPr>
-          <p:cNvSpPr>
-            <a:spLocks noGrp="1"/>
-          </p:cNvSpPr>
-          <p:nvPr>
-            <p:ph idx="1"/>
-          </p:nvPr>
-        </p:nvSpPr>
-        <p:spPr>
-          <a:xfrm>
-            <a:off x="590719" y="2330505"/>
-            <a:ext cx="4559425" cy="3979585"/>
-          </a:xfrm>
-        </p:spPr>
-        <p:txBody>
-          <a:bodyPr anchor="ctr">
-            <a:normAutofit/>
-          </a:bodyPr>
-          <a:lstStyle/>
-          <a:p>
-            <a:r>
-              <a:rPr lang="nb-NO" sz="2000" dirty="0"/>
-              <a:t>R^2 </a:t>
-            </a:r>
-            <a:r>
-              <a:rPr lang="nb-NO" sz="2000"/>
-              <a:t>decreases</a:t>
-            </a:r>
-            <a:r>
-              <a:rPr lang="nb-NO" sz="2000" dirty="0"/>
-              <a:t> </a:t>
-            </a:r>
-            <a:r>
-              <a:rPr lang="nb-NO" sz="2000"/>
-              <a:t>significantly</a:t>
-            </a:r>
-            <a:r>
-              <a:rPr lang="nb-NO" sz="2000" dirty="0"/>
-              <a:t> </a:t>
-            </a:r>
-            <a:r>
-              <a:rPr lang="nb-NO" sz="2000"/>
-              <a:t>after</a:t>
-            </a:r>
-            <a:r>
-              <a:rPr lang="nb-NO" sz="2000" dirty="0"/>
-              <a:t> </a:t>
-            </a:r>
-            <a:r>
-              <a:rPr lang="nb-NO" sz="2000"/>
-              <a:t>removing</a:t>
-            </a:r>
-            <a:r>
-              <a:rPr lang="nb-NO" sz="2000" dirty="0"/>
-              <a:t> </a:t>
-            </a:r>
-            <a:r>
-              <a:rPr lang="nb-NO" sz="2000"/>
-              <a:t>the</a:t>
-            </a:r>
-            <a:r>
-              <a:rPr lang="nb-NO" sz="2000" dirty="0"/>
-              <a:t> 4 </a:t>
-            </a:r>
-            <a:r>
-              <a:rPr lang="nb-NO" sz="2000"/>
-              <a:t>largest</a:t>
-            </a:r>
-            <a:r>
-              <a:rPr lang="nb-NO" sz="2000" dirty="0"/>
-              <a:t> </a:t>
-            </a:r>
-            <a:r>
-              <a:rPr lang="nb-NO" sz="2000"/>
-              <a:t>cities</a:t>
-            </a:r>
-            <a:endParaRPr lang="nb-NO" sz="2000" dirty="0"/>
-          </a:p>
-          <a:p>
-            <a:r>
-              <a:rPr lang="nb-NO" sz="2000" dirty="0"/>
-              <a:t>Variables </a:t>
-            </a:r>
-            <a:r>
-              <a:rPr lang="nb-NO" sz="2000"/>
-              <a:t>other</a:t>
-            </a:r>
-            <a:r>
-              <a:rPr lang="nb-NO" sz="2000" dirty="0"/>
-              <a:t> </a:t>
-            </a:r>
-            <a:r>
-              <a:rPr lang="nb-NO" sz="2000"/>
-              <a:t>than</a:t>
-            </a:r>
-            <a:r>
-              <a:rPr lang="nb-NO" sz="2000" dirty="0"/>
-              <a:t> </a:t>
-            </a:r>
-            <a:r>
-              <a:rPr lang="nb-NO" sz="2000"/>
-              <a:t>population</a:t>
-            </a:r>
-            <a:r>
-              <a:rPr lang="nb-NO" sz="2000" dirty="0"/>
-              <a:t> </a:t>
-            </a:r>
-            <a:r>
-              <a:rPr lang="nb-NO" sz="2000"/>
-              <a:t>can</a:t>
-            </a:r>
-            <a:r>
-              <a:rPr lang="nb-NO" sz="2000" dirty="0"/>
-              <a:t> have an </a:t>
-            </a:r>
-            <a:r>
-              <a:rPr lang="nb-NO" sz="2000"/>
-              <a:t>effect</a:t>
-            </a:r>
-            <a:endParaRPr lang="nb-NO" sz="2000" dirty="0"/>
-          </a:p>
-          <a:p>
-            <a:r>
-              <a:rPr lang="nb-NO" sz="2000"/>
-              <a:t>Tourism</a:t>
-            </a:r>
-            <a:r>
-              <a:rPr lang="nb-NO" sz="2000" dirty="0"/>
-              <a:t> has a positive </a:t>
-            </a:r>
-            <a:r>
-              <a:rPr lang="nb-NO" sz="2000"/>
-              <a:t>significant</a:t>
-            </a:r>
-            <a:r>
-              <a:rPr lang="nb-NO" sz="2000" dirty="0"/>
-              <a:t> </a:t>
-            </a:r>
-            <a:r>
-              <a:rPr lang="nb-NO" sz="2000" dirty="0" err="1"/>
-              <a:t>effect</a:t>
-            </a:r>
-            <a:endParaRPr lang="nb-NO" sz="2000" dirty="0"/>
-          </a:p>
-        </p:txBody>
-      </p:sp>
-      <p:sp>
-        <p:nvSpPr>
-          <p:cNvPr id="31" name="Rectangle 30">
-            <a:extLst>
-              <a:ext uri="{FF2B5EF4-FFF2-40B4-BE49-F238E27FC236}">
-                <a16:creationId xmlns:a16="http://schemas.microsoft.com/office/drawing/2014/main" id="{C13237C8-E62C-4F0D-A318-BD6FB6C2D138}"/>
-              </a:ext>
-              <a:ext uri="{C183D7F6-B498-43B3-948B-1728B52AA6E4}">
-                <adec:decorative xmlns:adec="http://schemas.microsoft.com/office/drawing/2017/decorative" val="1"/>
-              </a:ext>
-            </a:extLst>
-          </p:cNvPr>
-          <p:cNvSpPr>
-            <a:spLocks noGrp="1" noRot="1" noChangeAspect="1" noMove="1" noResize="1" noEditPoints="1" noAdjustHandles="1" noChangeArrowheads="1" noChangeShapeType="1" noTextEdit="1"/>
-          </p:cNvSpPr>
-          <p:nvPr>
-            <p:extLst>
-              <p:ext uri="{386F3935-93C4-4BCD-93E2-E3B085C9AB24}">
-                <p16:designElem xmlns:p16="http://schemas.microsoft.com/office/powerpoint/2015/main" val="1"/>
-              </p:ext>
-            </p:extLst>
-          </p:nvPr>
-        </p:nvSpPr>
-        <p:spPr>
-          <a:xfrm flipH="1">
-            <a:off x="10697670" y="0"/>
-            <a:ext cx="1494330" cy="6858000"/>
-          </a:xfrm>
-          <a:prstGeom prst="rect">
-            <a:avLst/>
-          </a:prstGeom>
-          <a:solidFill>
-            <a:schemeClr val="accent4"/>
-          </a:solidFill>
-          <a:ln>
-            <a:noFill/>
-          </a:ln>
-        </p:spPr>
-        <p:style>
-          <a:lnRef idx="2">
-            <a:schemeClr val="accent1">
-              <a:shade val="50000"/>
-            </a:schemeClr>
-          </a:lnRef>
-          <a:fillRef idx="1">
-            <a:schemeClr val="accent1"/>
-          </a:fillRef>
-          <a:effectRef idx="0">
-            <a:schemeClr val="accent1"/>
-          </a:effectRef>
-          <a:fontRef idx="minor">
-            <a:schemeClr val="lt1"/>
-          </a:fontRef>
-        </p:style>
-        <p:txBody>
-          <a:bodyPr rtlCol="0" anchor="ctr"/>
-          <a:lstStyle/>
-          <a:p>
-            <a:pPr algn="ctr"/>
-            <a:endParaRPr lang="en-US"/>
-          </a:p>
-        </p:txBody>
-      </p:sp>
-      <p:sp>
-        <p:nvSpPr>
-          <p:cNvPr id="33" name="Rectangle 32">
-            <a:extLst>
-              <a:ext uri="{FF2B5EF4-FFF2-40B4-BE49-F238E27FC236}">
-                <a16:creationId xmlns:a16="http://schemas.microsoft.com/office/drawing/2014/main" id="{19C9EAEA-39D0-4B0E-A0EB-51E7B26740B1}"/>
+                <a16:creationId xmlns:a16="http://schemas.microsoft.com/office/drawing/2014/main" id="{CBC4F608-B4B8-48C3-9572-C0F061B1CD99}"/>
               </a:ext>
               <a:ext uri="{C183D7F6-B498-43B3-948B-1728B52AA6E4}">
                 <adec:decorative xmlns:adec="http://schemas.microsoft.com/office/drawing/2017/decorative" val="1"/>
@@ -11478,8 +11645,8 @@
         </p:nvSpPr>
         <p:spPr>
           <a:xfrm>
-            <a:off x="5685810" y="513853"/>
-            <a:ext cx="6009366" cy="5834577"/>
+            <a:off x="579528" y="922919"/>
+            <a:ext cx="11111729" cy="5461252"/>
           </a:xfrm>
           <a:prstGeom prst="rect">
             <a:avLst/>
@@ -11523,12 +11690,290 @@
           </a:p>
         </p:txBody>
       </p:sp>
+      <p:sp>
+        <p:nvSpPr>
+          <p:cNvPr id="2" name="Title 1">
+            <a:extLst>
+              <a:ext uri="{FF2B5EF4-FFF2-40B4-BE49-F238E27FC236}">
+                <a16:creationId xmlns:a16="http://schemas.microsoft.com/office/drawing/2014/main" id="{DA83A18E-F38B-FEA7-A82C-9FDADD548F88}"/>
+              </a:ext>
+            </a:extLst>
+          </p:cNvPr>
+          <p:cNvSpPr>
+            <a:spLocks noGrp="1"/>
+          </p:cNvSpPr>
+          <p:nvPr>
+            <p:ph type="title"/>
+          </p:nvPr>
+        </p:nvSpPr>
+        <p:spPr>
+          <a:xfrm>
+            <a:off x="1099425" y="1238081"/>
+            <a:ext cx="4709345" cy="962953"/>
+          </a:xfrm>
+        </p:spPr>
+        <p:txBody>
+          <a:bodyPr anchor="b">
+            <a:normAutofit/>
+          </a:bodyPr>
+          <a:lstStyle/>
+          <a:p>
+            <a:r>
+              <a:rPr lang="nb-NO" sz="2900" dirty="0"/>
+              <a:t>Linear </a:t>
+            </a:r>
+            <a:r>
+              <a:rPr lang="nb-NO" sz="2900" dirty="0" err="1"/>
+              <a:t>regression</a:t>
+            </a:r>
+            <a:r>
+              <a:rPr lang="nb-NO" sz="2900" dirty="0"/>
+              <a:t>, full and </a:t>
+            </a:r>
+            <a:r>
+              <a:rPr lang="nb-NO" sz="2900" dirty="0" err="1"/>
+              <a:t>constricted</a:t>
+            </a:r>
+            <a:r>
+              <a:rPr lang="nb-NO" sz="2900" dirty="0"/>
+              <a:t> data</a:t>
+            </a:r>
+          </a:p>
+        </p:txBody>
+      </p:sp>
+      <p:sp>
+        <p:nvSpPr>
+          <p:cNvPr id="68" name="Rectangle 67">
+            <a:extLst>
+              <a:ext uri="{FF2B5EF4-FFF2-40B4-BE49-F238E27FC236}">
+                <a16:creationId xmlns:a16="http://schemas.microsoft.com/office/drawing/2014/main" id="{1382A32C-5B0C-4B1C-A074-76C6DBCC9F87}"/>
+              </a:ext>
+              <a:ext uri="{C183D7F6-B498-43B3-948B-1728B52AA6E4}">
+                <adec:decorative xmlns:adec="http://schemas.microsoft.com/office/drawing/2017/decorative" val="1"/>
+              </a:ext>
+            </a:extLst>
+          </p:cNvPr>
+          <p:cNvSpPr>
+            <a:spLocks noGrp="1" noRot="1" noChangeAspect="1" noMove="1" noResize="1" noEditPoints="1" noAdjustHandles="1" noChangeArrowheads="1" noChangeShapeType="1" noTextEdit="1"/>
+          </p:cNvSpPr>
+          <p:nvPr>
+            <p:extLst>
+              <p:ext uri="{386F3935-93C4-4BCD-93E2-E3B085C9AB24}">
+                <p16:designElem xmlns:p16="http://schemas.microsoft.com/office/powerpoint/2015/main" val="1"/>
+              </p:ext>
+            </p:extLst>
+          </p:nvPr>
+        </p:nvSpPr>
+        <p:spPr>
+          <a:xfrm flipH="1">
+            <a:off x="1139885" y="2372170"/>
+            <a:ext cx="4389120" cy="27432"/>
+          </a:xfrm>
+          <a:prstGeom prst="rect">
+            <a:avLst/>
+          </a:prstGeom>
+          <a:solidFill>
+            <a:schemeClr val="accent4"/>
+          </a:solidFill>
+          <a:ln>
+            <a:noFill/>
+          </a:ln>
+        </p:spPr>
+        <p:style>
+          <a:lnRef idx="2">
+            <a:schemeClr val="accent1">
+              <a:shade val="50000"/>
+            </a:schemeClr>
+          </a:lnRef>
+          <a:fillRef idx="1">
+            <a:schemeClr val="accent1"/>
+          </a:fillRef>
+          <a:effectRef idx="0">
+            <a:schemeClr val="accent1"/>
+          </a:effectRef>
+          <a:fontRef idx="minor">
+            <a:schemeClr val="lt1"/>
+          </a:fontRef>
+        </p:style>
+        <p:txBody>
+          <a:bodyPr rtlCol="0" anchor="ctr"/>
+          <a:lstStyle/>
+          <a:p>
+            <a:pPr algn="ctr"/>
+            <a:endParaRPr lang="en-US"/>
+          </a:p>
+        </p:txBody>
+      </p:sp>
+      <p:sp>
+        <p:nvSpPr>
+          <p:cNvPr id="3" name="Content Placeholder 2">
+            <a:extLst>
+              <a:ext uri="{FF2B5EF4-FFF2-40B4-BE49-F238E27FC236}">
+                <a16:creationId xmlns:a16="http://schemas.microsoft.com/office/drawing/2014/main" id="{1052C69E-F9FD-C41B-D5C3-DE7535BDA7C4}"/>
+              </a:ext>
+            </a:extLst>
+          </p:cNvPr>
+          <p:cNvSpPr>
+            <a:spLocks noGrp="1"/>
+          </p:cNvSpPr>
+          <p:nvPr>
+            <p:ph idx="1"/>
+          </p:nvPr>
+        </p:nvSpPr>
+        <p:spPr>
+          <a:xfrm>
+            <a:off x="1100736" y="2508105"/>
+            <a:ext cx="4709345" cy="3632493"/>
+          </a:xfrm>
+        </p:spPr>
+        <p:txBody>
+          <a:bodyPr anchor="ctr">
+            <a:normAutofit/>
+          </a:bodyPr>
+          <a:lstStyle/>
+          <a:p>
+            <a:r>
+              <a:rPr lang="nb-NO" sz="2000" dirty="0"/>
+              <a:t>R^2 </a:t>
+            </a:r>
+            <a:r>
+              <a:rPr lang="nb-NO" sz="2000" dirty="0" err="1"/>
+              <a:t>decreases</a:t>
+            </a:r>
+            <a:r>
+              <a:rPr lang="nb-NO" sz="2000" dirty="0"/>
+              <a:t> </a:t>
+            </a:r>
+            <a:r>
+              <a:rPr lang="nb-NO" sz="2000" dirty="0" err="1"/>
+              <a:t>significantly</a:t>
+            </a:r>
+            <a:r>
+              <a:rPr lang="nb-NO" sz="2000" dirty="0"/>
+              <a:t> </a:t>
+            </a:r>
+            <a:r>
+              <a:rPr lang="nb-NO" sz="2000" dirty="0" err="1"/>
+              <a:t>after</a:t>
+            </a:r>
+            <a:r>
+              <a:rPr lang="nb-NO" sz="2000" dirty="0"/>
+              <a:t> </a:t>
+            </a:r>
+            <a:r>
+              <a:rPr lang="nb-NO" sz="2000" dirty="0" err="1"/>
+              <a:t>removing</a:t>
+            </a:r>
+            <a:r>
+              <a:rPr lang="nb-NO" sz="2000" dirty="0"/>
+              <a:t> </a:t>
+            </a:r>
+            <a:r>
+              <a:rPr lang="nb-NO" sz="2000" dirty="0" err="1"/>
+              <a:t>the</a:t>
+            </a:r>
+            <a:r>
+              <a:rPr lang="nb-NO" sz="2000" dirty="0"/>
+              <a:t> 4 </a:t>
+            </a:r>
+            <a:r>
+              <a:rPr lang="nb-NO" sz="2000" dirty="0" err="1"/>
+              <a:t>largest</a:t>
+            </a:r>
+            <a:r>
+              <a:rPr lang="nb-NO" sz="2000" dirty="0"/>
+              <a:t> </a:t>
+            </a:r>
+            <a:r>
+              <a:rPr lang="nb-NO" sz="2000" dirty="0" err="1"/>
+              <a:t>cities</a:t>
+            </a:r>
+            <a:endParaRPr lang="nb-NO" sz="2000" dirty="0"/>
+          </a:p>
+          <a:p>
+            <a:r>
+              <a:rPr lang="nb-NO" sz="2000" dirty="0"/>
+              <a:t>Variables </a:t>
+            </a:r>
+            <a:r>
+              <a:rPr lang="nb-NO" sz="2000" dirty="0" err="1"/>
+              <a:t>other</a:t>
+            </a:r>
+            <a:r>
+              <a:rPr lang="nb-NO" sz="2000" dirty="0"/>
+              <a:t> </a:t>
+            </a:r>
+            <a:r>
+              <a:rPr lang="nb-NO" sz="2000" dirty="0" err="1"/>
+              <a:t>than</a:t>
+            </a:r>
+            <a:r>
+              <a:rPr lang="nb-NO" sz="2000" dirty="0"/>
+              <a:t> </a:t>
+            </a:r>
+            <a:r>
+              <a:rPr lang="nb-NO" sz="2000" dirty="0" err="1"/>
+              <a:t>population</a:t>
+            </a:r>
+            <a:r>
+              <a:rPr lang="nb-NO" sz="2000" dirty="0"/>
+              <a:t> </a:t>
+            </a:r>
+            <a:r>
+              <a:rPr lang="nb-NO" sz="2000" dirty="0" err="1"/>
+              <a:t>can</a:t>
+            </a:r>
+            <a:r>
+              <a:rPr lang="nb-NO" sz="2000" dirty="0"/>
+              <a:t> have an </a:t>
+            </a:r>
+            <a:r>
+              <a:rPr lang="nb-NO" sz="2000" dirty="0" err="1"/>
+              <a:t>effect</a:t>
+            </a:r>
+            <a:endParaRPr lang="nb-NO" sz="2000" dirty="0"/>
+          </a:p>
+          <a:p>
+            <a:r>
+              <a:rPr lang="nb-NO" sz="2000" dirty="0" err="1"/>
+              <a:t>Tourism</a:t>
+            </a:r>
+            <a:r>
+              <a:rPr lang="nb-NO" sz="2000" dirty="0"/>
+              <a:t> has a positive </a:t>
+            </a:r>
+            <a:r>
+              <a:rPr lang="nb-NO" sz="2000" dirty="0" err="1"/>
+              <a:t>significant</a:t>
+            </a:r>
+            <a:r>
+              <a:rPr lang="nb-NO" sz="2000" dirty="0"/>
+              <a:t> </a:t>
+            </a:r>
+            <a:r>
+              <a:rPr lang="nb-NO" sz="2000" dirty="0" err="1"/>
+              <a:t>effect</a:t>
+            </a:r>
+            <a:endParaRPr lang="nb-NO" sz="2000" dirty="0"/>
+          </a:p>
+          <a:p>
+            <a:r>
+              <a:rPr lang="nb-NO" sz="2000" dirty="0" err="1"/>
+              <a:t>Scale</a:t>
+            </a:r>
+            <a:r>
+              <a:rPr lang="nb-NO" sz="2000" dirty="0"/>
+              <a:t> data?</a:t>
+            </a:r>
+          </a:p>
+        </p:txBody>
+      </p:sp>
       <p:pic>
         <p:nvPicPr>
-          <p:cNvPr id="5" name="Picture 4" descr="A screenshot of a computer screen&#10;&#10;AI-generated content may be incorrect.">
+          <p:cNvPr id="8" name="Picture 7">
             <a:extLst>
               <a:ext uri="{FF2B5EF4-FFF2-40B4-BE49-F238E27FC236}">
-                <a16:creationId xmlns:a16="http://schemas.microsoft.com/office/drawing/2014/main" id="{74116548-A549-AE85-4D6F-DBBFE4A50B2F}"/>
+                <a16:creationId xmlns:a16="http://schemas.microsoft.com/office/drawing/2014/main" id="{A277001E-0B3D-7535-8820-C747854E9D1A}"/>
               </a:ext>
             </a:extLst>
           </p:cNvPr>
@@ -11539,13 +11984,13 @@
         </p:nvPicPr>
         <p:blipFill>
           <a:blip r:embed="rId2"/>
-          <a:srcRect l="511"/>
+          <a:srcRect l="979" r="309" b="1"/>
           <a:stretch/>
         </p:blipFill>
         <p:spPr>
           <a:xfrm>
-            <a:off x="5977788" y="799352"/>
-            <a:ext cx="5425410" cy="5259296"/>
+            <a:off x="6538366" y="1383738"/>
+            <a:ext cx="4929098" cy="4756870"/>
           </a:xfrm>
           <a:prstGeom prst="rect">
             <a:avLst/>
@@ -11568,6 +12013,458 @@
 <file path=ppt/slides/slide15.xml><?xml version="1.0" encoding="utf-8"?>
 <p:sld xmlns:a="http://schemas.openxmlformats.org/drawingml/2006/main" xmlns:r="http://schemas.openxmlformats.org/officeDocument/2006/relationships" xmlns:p="http://schemas.openxmlformats.org/presentationml/2006/main">
   <p:cSld>
+    <p:bg>
+      <p:bgPr>
+        <a:solidFill>
+          <a:schemeClr val="bg1"/>
+        </a:solidFill>
+        <a:effectLst/>
+      </p:bgPr>
+    </p:bg>
+    <p:spTree>
+      <p:nvGrpSpPr>
+        <p:cNvPr id="1" name=""/>
+        <p:cNvGrpSpPr/>
+        <p:nvPr/>
+      </p:nvGrpSpPr>
+      <p:grpSpPr>
+        <a:xfrm>
+          <a:off x="0" y="0"/>
+          <a:ext cx="0" cy="0"/>
+          <a:chOff x="0" y="0"/>
+          <a:chExt cx="0" cy="0"/>
+        </a:xfrm>
+      </p:grpSpPr>
+      <p:pic>
+        <p:nvPicPr>
+          <p:cNvPr id="9" name="Picture 8">
+            <a:extLst>
+              <a:ext uri="{FF2B5EF4-FFF2-40B4-BE49-F238E27FC236}">
+                <a16:creationId xmlns:a16="http://schemas.microsoft.com/office/drawing/2014/main" id="{E1FF8A9B-4CFB-9C90-C5F4-95B4D5ED0691}"/>
+              </a:ext>
+            </a:extLst>
+          </p:cNvPr>
+          <p:cNvPicPr>
+            <a:picLocks noChangeAspect="1"/>
+          </p:cNvPicPr>
+          <p:nvPr/>
+        </p:nvPicPr>
+        <p:blipFill>
+          <a:blip r:embed="rId2"/>
+          <a:stretch>
+            <a:fillRect/>
+          </a:stretch>
+        </p:blipFill>
+        <p:spPr>
+          <a:xfrm>
+            <a:off x="6153897" y="4071505"/>
+            <a:ext cx="5199904" cy="2140648"/>
+          </a:xfrm>
+          <a:prstGeom prst="rect">
+            <a:avLst/>
+          </a:prstGeom>
+        </p:spPr>
+      </p:pic>
+      <p:pic>
+        <p:nvPicPr>
+          <p:cNvPr id="5" name="Content Placeholder 4">
+            <a:extLst>
+              <a:ext uri="{FF2B5EF4-FFF2-40B4-BE49-F238E27FC236}">
+                <a16:creationId xmlns:a16="http://schemas.microsoft.com/office/drawing/2014/main" id="{7BFE482F-5D53-EF29-102A-F9A4912C0AD2}"/>
+              </a:ext>
+            </a:extLst>
+          </p:cNvPr>
+          <p:cNvPicPr>
+            <a:picLocks noChangeAspect="1"/>
+          </p:cNvPicPr>
+          <p:nvPr/>
+        </p:nvPicPr>
+        <p:blipFill>
+          <a:blip r:embed="rId3"/>
+          <a:stretch>
+            <a:fillRect/>
+          </a:stretch>
+        </p:blipFill>
+        <p:spPr>
+          <a:xfrm>
+            <a:off x="838199" y="1825624"/>
+            <a:ext cx="5315697" cy="4386529"/>
+          </a:xfrm>
+          <a:prstGeom prst="rect">
+            <a:avLst/>
+          </a:prstGeom>
+        </p:spPr>
+      </p:pic>
+      <p:sp>
+        <p:nvSpPr>
+          <p:cNvPr id="2" name="Title 1">
+            <a:extLst>
+              <a:ext uri="{FF2B5EF4-FFF2-40B4-BE49-F238E27FC236}">
+                <a16:creationId xmlns:a16="http://schemas.microsoft.com/office/drawing/2014/main" id="{586468F2-1082-7B9D-3FF3-8F6403F0C13C}"/>
+              </a:ext>
+            </a:extLst>
+          </p:cNvPr>
+          <p:cNvSpPr>
+            <a:spLocks noGrp="1"/>
+          </p:cNvSpPr>
+          <p:nvPr>
+            <p:ph type="title"/>
+          </p:nvPr>
+        </p:nvSpPr>
+        <p:spPr/>
+        <p:txBody>
+          <a:bodyPr>
+            <a:normAutofit/>
+          </a:bodyPr>
+          <a:lstStyle/>
+          <a:p>
+            <a:r>
+              <a:rPr lang="nb-NO" sz="5400"/>
+              <a:t>Model 1</a:t>
+            </a:r>
+          </a:p>
+        </p:txBody>
+      </p:sp>
+      <p:pic>
+        <p:nvPicPr>
+          <p:cNvPr id="11" name="Picture 10">
+            <a:extLst>
+              <a:ext uri="{FF2B5EF4-FFF2-40B4-BE49-F238E27FC236}">
+                <a16:creationId xmlns:a16="http://schemas.microsoft.com/office/drawing/2014/main" id="{579F6FF7-EE8F-7858-5FD1-32AB11BB8B20}"/>
+              </a:ext>
+            </a:extLst>
+          </p:cNvPr>
+          <p:cNvPicPr>
+            <a:picLocks noChangeAspect="1"/>
+          </p:cNvPicPr>
+          <p:nvPr/>
+        </p:nvPicPr>
+        <p:blipFill>
+          <a:blip r:embed="rId4"/>
+          <a:stretch>
+            <a:fillRect/>
+          </a:stretch>
+        </p:blipFill>
+        <p:spPr>
+          <a:xfrm>
+            <a:off x="6096001" y="1825624"/>
+            <a:ext cx="5257800" cy="2245881"/>
+          </a:xfrm>
+          <a:prstGeom prst="rect">
+            <a:avLst/>
+          </a:prstGeom>
+        </p:spPr>
+      </p:pic>
+    </p:spTree>
+    <p:extLst>
+      <p:ext uri="{BB962C8B-B14F-4D97-AF65-F5344CB8AC3E}">
+        <p14:creationId xmlns:p14="http://schemas.microsoft.com/office/powerpoint/2010/main" val="1551153413"/>
+      </p:ext>
+    </p:extLst>
+  </p:cSld>
+  <p:clrMapOvr>
+    <a:masterClrMapping/>
+  </p:clrMapOvr>
+</p:sld>
+</file>
+
+<file path=ppt/slides/slide16.xml><?xml version="1.0" encoding="utf-8"?>
+<p:sld xmlns:a="http://schemas.openxmlformats.org/drawingml/2006/main" xmlns:r="http://schemas.openxmlformats.org/officeDocument/2006/relationships" xmlns:p="http://schemas.openxmlformats.org/presentationml/2006/main">
+  <p:cSld>
+    <p:spTree>
+      <p:nvGrpSpPr>
+        <p:cNvPr id="1" name=""/>
+        <p:cNvGrpSpPr/>
+        <p:nvPr/>
+      </p:nvGrpSpPr>
+      <p:grpSpPr>
+        <a:xfrm>
+          <a:off x="0" y="0"/>
+          <a:ext cx="0" cy="0"/>
+          <a:chOff x="0" y="0"/>
+          <a:chExt cx="0" cy="0"/>
+        </a:xfrm>
+      </p:grpSpPr>
+      <p:sp>
+        <p:nvSpPr>
+          <p:cNvPr id="2" name="Title 1">
+            <a:extLst>
+              <a:ext uri="{FF2B5EF4-FFF2-40B4-BE49-F238E27FC236}">
+                <a16:creationId xmlns:a16="http://schemas.microsoft.com/office/drawing/2014/main" id="{5FACCF24-4C9F-5722-7036-7DF1AB4EBB30}"/>
+              </a:ext>
+            </a:extLst>
+          </p:cNvPr>
+          <p:cNvSpPr>
+            <a:spLocks noGrp="1"/>
+          </p:cNvSpPr>
+          <p:nvPr>
+            <p:ph type="title"/>
+          </p:nvPr>
+        </p:nvSpPr>
+        <p:spPr/>
+        <p:txBody>
+          <a:bodyPr/>
+          <a:lstStyle/>
+          <a:p>
+            <a:r>
+              <a:rPr lang="nb-NO" dirty="0"/>
+              <a:t>Model 2</a:t>
+            </a:r>
+          </a:p>
+        </p:txBody>
+      </p:sp>
+      <p:pic>
+        <p:nvPicPr>
+          <p:cNvPr id="7" name="Content Placeholder 6">
+            <a:extLst>
+              <a:ext uri="{FF2B5EF4-FFF2-40B4-BE49-F238E27FC236}">
+                <a16:creationId xmlns:a16="http://schemas.microsoft.com/office/drawing/2014/main" id="{971C3772-577C-4EE3-EB00-E5D63DB46D60}"/>
+              </a:ext>
+            </a:extLst>
+          </p:cNvPr>
+          <p:cNvPicPr>
+            <a:picLocks noGrp="1" noChangeAspect="1"/>
+          </p:cNvPicPr>
+          <p:nvPr>
+            <p:ph idx="1"/>
+          </p:nvPr>
+        </p:nvPicPr>
+        <p:blipFill>
+          <a:blip r:embed="rId2"/>
+          <a:stretch>
+            <a:fillRect/>
+          </a:stretch>
+        </p:blipFill>
+        <p:spPr>
+          <a:xfrm>
+            <a:off x="838200" y="4662903"/>
+            <a:ext cx="5257800" cy="1760423"/>
+          </a:xfrm>
+        </p:spPr>
+      </p:pic>
+      <p:pic>
+        <p:nvPicPr>
+          <p:cNvPr id="5" name="Picture 4">
+            <a:extLst>
+              <a:ext uri="{FF2B5EF4-FFF2-40B4-BE49-F238E27FC236}">
+                <a16:creationId xmlns:a16="http://schemas.microsoft.com/office/drawing/2014/main" id="{5A15F497-98C6-6B4A-D96A-4F8C4D7D4437}"/>
+              </a:ext>
+            </a:extLst>
+          </p:cNvPr>
+          <p:cNvPicPr>
+            <a:picLocks noChangeAspect="1"/>
+          </p:cNvPicPr>
+          <p:nvPr/>
+        </p:nvPicPr>
+        <p:blipFill>
+          <a:blip r:embed="rId3"/>
+          <a:stretch>
+            <a:fillRect/>
+          </a:stretch>
+        </p:blipFill>
+        <p:spPr>
+          <a:xfrm>
+            <a:off x="838200" y="1690688"/>
+            <a:ext cx="10515600" cy="2972215"/>
+          </a:xfrm>
+          <a:prstGeom prst="rect">
+            <a:avLst/>
+          </a:prstGeom>
+        </p:spPr>
+      </p:pic>
+      <p:pic>
+        <p:nvPicPr>
+          <p:cNvPr id="9" name="Picture 8">
+            <a:extLst>
+              <a:ext uri="{FF2B5EF4-FFF2-40B4-BE49-F238E27FC236}">
+                <a16:creationId xmlns:a16="http://schemas.microsoft.com/office/drawing/2014/main" id="{B071E38B-6570-1A31-AA4A-42620735A41D}"/>
+              </a:ext>
+            </a:extLst>
+          </p:cNvPr>
+          <p:cNvPicPr>
+            <a:picLocks noChangeAspect="1"/>
+          </p:cNvPicPr>
+          <p:nvPr/>
+        </p:nvPicPr>
+        <p:blipFill>
+          <a:blip r:embed="rId4"/>
+          <a:stretch>
+            <a:fillRect/>
+          </a:stretch>
+        </p:blipFill>
+        <p:spPr>
+          <a:xfrm>
+            <a:off x="6096000" y="4662903"/>
+            <a:ext cx="5257800" cy="1760423"/>
+          </a:xfrm>
+          <a:prstGeom prst="rect">
+            <a:avLst/>
+          </a:prstGeom>
+        </p:spPr>
+      </p:pic>
+    </p:spTree>
+    <p:extLst>
+      <p:ext uri="{BB962C8B-B14F-4D97-AF65-F5344CB8AC3E}">
+        <p14:creationId xmlns:p14="http://schemas.microsoft.com/office/powerpoint/2010/main" val="4284492900"/>
+      </p:ext>
+    </p:extLst>
+  </p:cSld>
+  <p:clrMapOvr>
+    <a:masterClrMapping/>
+  </p:clrMapOvr>
+</p:sld>
+</file>
+
+<file path=ppt/slides/slide17.xml><?xml version="1.0" encoding="utf-8"?>
+<p:sld xmlns:a="http://schemas.openxmlformats.org/drawingml/2006/main" xmlns:r="http://schemas.openxmlformats.org/officeDocument/2006/relationships" xmlns:p="http://schemas.openxmlformats.org/presentationml/2006/main">
+  <p:cSld>
+    <p:spTree>
+      <p:nvGrpSpPr>
+        <p:cNvPr id="1" name=""/>
+        <p:cNvGrpSpPr/>
+        <p:nvPr/>
+      </p:nvGrpSpPr>
+      <p:grpSpPr>
+        <a:xfrm>
+          <a:off x="0" y="0"/>
+          <a:ext cx="0" cy="0"/>
+          <a:chOff x="0" y="0"/>
+          <a:chExt cx="0" cy="0"/>
+        </a:xfrm>
+      </p:grpSpPr>
+      <p:sp>
+        <p:nvSpPr>
+          <p:cNvPr id="2" name="Title 1">
+            <a:extLst>
+              <a:ext uri="{FF2B5EF4-FFF2-40B4-BE49-F238E27FC236}">
+                <a16:creationId xmlns:a16="http://schemas.microsoft.com/office/drawing/2014/main" id="{D0162F17-AD87-36F4-DAA8-106CA8DA08EB}"/>
+              </a:ext>
+            </a:extLst>
+          </p:cNvPr>
+          <p:cNvSpPr>
+            <a:spLocks noGrp="1"/>
+          </p:cNvSpPr>
+          <p:nvPr>
+            <p:ph type="title"/>
+          </p:nvPr>
+        </p:nvSpPr>
+        <p:spPr/>
+        <p:txBody>
+          <a:bodyPr/>
+          <a:lstStyle/>
+          <a:p>
+            <a:r>
+              <a:rPr lang="nb-NO" dirty="0"/>
+              <a:t>Model 3</a:t>
+            </a:r>
+          </a:p>
+        </p:txBody>
+      </p:sp>
+      <p:pic>
+        <p:nvPicPr>
+          <p:cNvPr id="5" name="Content Placeholder 4">
+            <a:extLst>
+              <a:ext uri="{FF2B5EF4-FFF2-40B4-BE49-F238E27FC236}">
+                <a16:creationId xmlns:a16="http://schemas.microsoft.com/office/drawing/2014/main" id="{E5BBA3B7-9629-A0AE-699F-C89144F6B6CC}"/>
+              </a:ext>
+            </a:extLst>
+          </p:cNvPr>
+          <p:cNvPicPr>
+            <a:picLocks noGrp="1" noChangeAspect="1"/>
+          </p:cNvPicPr>
+          <p:nvPr>
+            <p:ph idx="1"/>
+          </p:nvPr>
+        </p:nvPicPr>
+        <p:blipFill>
+          <a:blip r:embed="rId2"/>
+          <a:stretch>
+            <a:fillRect/>
+          </a:stretch>
+        </p:blipFill>
+        <p:spPr>
+          <a:xfrm>
+            <a:off x="838200" y="1484210"/>
+            <a:ext cx="10515600" cy="3667637"/>
+          </a:xfrm>
+        </p:spPr>
+      </p:pic>
+      <p:pic>
+        <p:nvPicPr>
+          <p:cNvPr id="7" name="Picture 6">
+            <a:extLst>
+              <a:ext uri="{FF2B5EF4-FFF2-40B4-BE49-F238E27FC236}">
+                <a16:creationId xmlns:a16="http://schemas.microsoft.com/office/drawing/2014/main" id="{68C2923F-9297-15C3-FE89-9AB6F6C39C25}"/>
+              </a:ext>
+            </a:extLst>
+          </p:cNvPr>
+          <p:cNvPicPr>
+            <a:picLocks noChangeAspect="1"/>
+          </p:cNvPicPr>
+          <p:nvPr/>
+        </p:nvPicPr>
+        <p:blipFill>
+          <a:blip r:embed="rId3"/>
+          <a:stretch>
+            <a:fillRect/>
+          </a:stretch>
+        </p:blipFill>
+        <p:spPr>
+          <a:xfrm>
+            <a:off x="838199" y="5151847"/>
+            <a:ext cx="5257800" cy="1504315"/>
+          </a:xfrm>
+          <a:prstGeom prst="rect">
+            <a:avLst/>
+          </a:prstGeom>
+        </p:spPr>
+      </p:pic>
+      <p:pic>
+        <p:nvPicPr>
+          <p:cNvPr id="9" name="Picture 8">
+            <a:extLst>
+              <a:ext uri="{FF2B5EF4-FFF2-40B4-BE49-F238E27FC236}">
+                <a16:creationId xmlns:a16="http://schemas.microsoft.com/office/drawing/2014/main" id="{7E058767-46EB-8C2F-BDDC-55E685DD68D3}"/>
+              </a:ext>
+            </a:extLst>
+          </p:cNvPr>
+          <p:cNvPicPr>
+            <a:picLocks noChangeAspect="1"/>
+          </p:cNvPicPr>
+          <p:nvPr/>
+        </p:nvPicPr>
+        <p:blipFill>
+          <a:blip r:embed="rId4"/>
+          <a:stretch>
+            <a:fillRect/>
+          </a:stretch>
+        </p:blipFill>
+        <p:spPr>
+          <a:xfrm>
+            <a:off x="6096000" y="5151847"/>
+            <a:ext cx="5257800" cy="1502228"/>
+          </a:xfrm>
+          <a:prstGeom prst="rect">
+            <a:avLst/>
+          </a:prstGeom>
+        </p:spPr>
+      </p:pic>
+    </p:spTree>
+    <p:extLst>
+      <p:ext uri="{BB962C8B-B14F-4D97-AF65-F5344CB8AC3E}">
+        <p14:creationId xmlns:p14="http://schemas.microsoft.com/office/powerpoint/2010/main" val="113336720"/>
+      </p:ext>
+    </p:extLst>
+  </p:cSld>
+  <p:clrMapOvr>
+    <a:masterClrMapping/>
+  </p:clrMapOvr>
+</p:sld>
+</file>
+
+<file path=ppt/slides/slide18.xml><?xml version="1.0" encoding="utf-8"?>
+<p:sld xmlns:a="http://schemas.openxmlformats.org/drawingml/2006/main" xmlns:r="http://schemas.openxmlformats.org/officeDocument/2006/relationships" xmlns:p="http://schemas.openxmlformats.org/presentationml/2006/main">
+  <p:cSld>
     <p:spTree>
       <p:nvGrpSpPr>
         <p:cNvPr id="1" name=""/>
@@ -11725,7 +12622,7 @@
 </p:sld>
 </file>
 
-<file path=ppt/slides/slide16.xml><?xml version="1.0" encoding="utf-8"?>
+<file path=ppt/slides/slide19.xml><?xml version="1.0" encoding="utf-8"?>
 <p:sld xmlns:a="http://schemas.openxmlformats.org/drawingml/2006/main" xmlns:r="http://schemas.openxmlformats.org/officeDocument/2006/relationships" xmlns:p="http://schemas.openxmlformats.org/presentationml/2006/main">
   <p:cSld>
     <p:spTree>

</xml_diff>

<commit_message>
Updated presentation and some tests
</commit_message>
<xml_diff>
--- a/BAN440 – Term Paper Idea.pptx
+++ b/BAN440 – Term Paper Idea.pptx
@@ -11,19 +11,20 @@
     <p:sldId id="259" r:id="rId5"/>
     <p:sldId id="258" r:id="rId6"/>
     <p:sldId id="260" r:id="rId7"/>
-    <p:sldId id="268" r:id="rId8"/>
-    <p:sldId id="269" r:id="rId9"/>
-    <p:sldId id="264" r:id="rId10"/>
-    <p:sldId id="261" r:id="rId11"/>
-    <p:sldId id="265" r:id="rId12"/>
-    <p:sldId id="262" r:id="rId13"/>
-    <p:sldId id="266" r:id="rId14"/>
-    <p:sldId id="271" r:id="rId15"/>
-    <p:sldId id="272" r:id="rId16"/>
-    <p:sldId id="273" r:id="rId17"/>
-    <p:sldId id="274" r:id="rId18"/>
-    <p:sldId id="263" r:id="rId19"/>
-    <p:sldId id="267" r:id="rId20"/>
+    <p:sldId id="275" r:id="rId8"/>
+    <p:sldId id="268" r:id="rId9"/>
+    <p:sldId id="269" r:id="rId10"/>
+    <p:sldId id="264" r:id="rId11"/>
+    <p:sldId id="261" r:id="rId12"/>
+    <p:sldId id="265" r:id="rId13"/>
+    <p:sldId id="262" r:id="rId14"/>
+    <p:sldId id="266" r:id="rId15"/>
+    <p:sldId id="271" r:id="rId16"/>
+    <p:sldId id="272" r:id="rId17"/>
+    <p:sldId id="273" r:id="rId18"/>
+    <p:sldId id="274" r:id="rId19"/>
+    <p:sldId id="263" r:id="rId20"/>
+    <p:sldId id="267" r:id="rId21"/>
   </p:sldIdLst>
   <p:sldSz cx="12192000" cy="6858000"/>
   <p:notesSz cx="6858000" cy="9144000"/>
@@ -133,6 +134,7 @@
             <p14:sldId id="259"/>
             <p14:sldId id="258"/>
             <p14:sldId id="260"/>
+            <p14:sldId id="275"/>
             <p14:sldId id="268"/>
             <p14:sldId id="269"/>
             <p14:sldId id="264"/>
@@ -161,6 +163,7 @@
 <p1510:revInfo xmlns:a="http://schemas.openxmlformats.org/drawingml/2006/main" xmlns:r="http://schemas.openxmlformats.org/officeDocument/2006/relationships" xmlns:p1510="http://schemas.microsoft.com/office/powerpoint/2015/10/main">
   <p1510:revLst>
     <p1510:client id="{0E703ED3-66B7-498C-B9F6-DC315DA9A883}" v="5" dt="2025-03-26T10:34:52.938"/>
+    <p1510:client id="{69F880E9-B167-4345-A5E8-21D432C122E3}" v="3" dt="2025-03-27T08:38:53.777"/>
   </p1510:revLst>
 </p1510:revInfo>
 </file>
@@ -169,8 +172,8 @@
 <pc:chgInfo xmlns:a="http://schemas.openxmlformats.org/drawingml/2006/main" xmlns:r="http://schemas.openxmlformats.org/officeDocument/2006/relationships" xmlns:ac="http://schemas.microsoft.com/office/drawing/2013/main/command" xmlns:pc="http://schemas.microsoft.com/office/powerpoint/2013/main/command">
   <pc:docChgLst>
     <pc:chgData name="Sander Sævig Eriksen" userId="2da4b7b7-d8b8-4b75-9017-f672d4ad080d" providerId="ADAL" clId="{69F880E9-B167-4345-A5E8-21D432C122E3}"/>
-    <pc:docChg chg="undo custSel addSld modSld sldOrd addSection delSection modSection">
-      <pc:chgData name="Sander Sævig Eriksen" userId="2da4b7b7-d8b8-4b75-9017-f672d4ad080d" providerId="ADAL" clId="{69F880E9-B167-4345-A5E8-21D432C122E3}" dt="2025-03-26T12:45:58.087" v="2173" actId="14100"/>
+    <pc:docChg chg="undo custSel addSld delSld modSld sldOrd addSection delSection modSection">
+      <pc:chgData name="Sander Sævig Eriksen" userId="2da4b7b7-d8b8-4b75-9017-f672d4ad080d" providerId="ADAL" clId="{69F880E9-B167-4345-A5E8-21D432C122E3}" dt="2025-03-27T08:40:13.265" v="2463" actId="20577"/>
       <pc:docMkLst>
         <pc:docMk/>
       </pc:docMkLst>
@@ -547,13 +550,13 @@
         </pc:picChg>
       </pc:sldChg>
       <pc:sldChg chg="addSp delSp modSp new mod setBg">
-        <pc:chgData name="Sander Sævig Eriksen" userId="2da4b7b7-d8b8-4b75-9017-f672d4ad080d" providerId="ADAL" clId="{69F880E9-B167-4345-A5E8-21D432C122E3}" dt="2025-03-26T12:18:47.482" v="2063" actId="20577"/>
+        <pc:chgData name="Sander Sævig Eriksen" userId="2da4b7b7-d8b8-4b75-9017-f672d4ad080d" providerId="ADAL" clId="{69F880E9-B167-4345-A5E8-21D432C122E3}" dt="2025-03-27T08:08:09.072" v="2176" actId="26606"/>
         <pc:sldMkLst>
           <pc:docMk/>
           <pc:sldMk cId="3591823627" sldId="271"/>
         </pc:sldMkLst>
         <pc:spChg chg="mod">
-          <ac:chgData name="Sander Sævig Eriksen" userId="2da4b7b7-d8b8-4b75-9017-f672d4ad080d" providerId="ADAL" clId="{69F880E9-B167-4345-A5E8-21D432C122E3}" dt="2025-03-26T12:15:37.445" v="2027" actId="26606"/>
+          <ac:chgData name="Sander Sævig Eriksen" userId="2da4b7b7-d8b8-4b75-9017-f672d4ad080d" providerId="ADAL" clId="{69F880E9-B167-4345-A5E8-21D432C122E3}" dt="2025-03-27T08:08:09.072" v="2176" actId="26606"/>
           <ac:spMkLst>
             <pc:docMk/>
             <pc:sldMk cId="3591823627" sldId="271"/>
@@ -561,7 +564,7 @@
           </ac:spMkLst>
         </pc:spChg>
         <pc:spChg chg="mod">
-          <ac:chgData name="Sander Sævig Eriksen" userId="2da4b7b7-d8b8-4b75-9017-f672d4ad080d" providerId="ADAL" clId="{69F880E9-B167-4345-A5E8-21D432C122E3}" dt="2025-03-26T12:18:47.482" v="2063" actId="20577"/>
+          <ac:chgData name="Sander Sævig Eriksen" userId="2da4b7b7-d8b8-4b75-9017-f672d4ad080d" providerId="ADAL" clId="{69F880E9-B167-4345-A5E8-21D432C122E3}" dt="2025-03-27T08:08:09.072" v="2176" actId="26606"/>
           <ac:spMkLst>
             <pc:docMk/>
             <pc:sldMk cId="3591823627" sldId="271"/>
@@ -680,28 +683,44 @@
             <ac:spMk id="55" creationId="{1382A32C-5B0C-4B1C-A074-76C6DBCC9F87}"/>
           </ac:spMkLst>
         </pc:spChg>
-        <pc:spChg chg="add">
-          <ac:chgData name="Sander Sævig Eriksen" userId="2da4b7b7-d8b8-4b75-9017-f672d4ad080d" providerId="ADAL" clId="{69F880E9-B167-4345-A5E8-21D432C122E3}" dt="2025-03-26T12:16:08.647" v="2031" actId="26606"/>
+        <pc:spChg chg="add del">
+          <ac:chgData name="Sander Sævig Eriksen" userId="2da4b7b7-d8b8-4b75-9017-f672d4ad080d" providerId="ADAL" clId="{69F880E9-B167-4345-A5E8-21D432C122E3}" dt="2025-03-27T08:08:09.072" v="2176" actId="26606"/>
           <ac:spMkLst>
             <pc:docMk/>
             <pc:sldMk cId="3591823627" sldId="271"/>
             <ac:spMk id="60" creationId="{6EFC920F-B85A-4068-BD93-41064EDE93D3}"/>
           </ac:spMkLst>
         </pc:spChg>
-        <pc:spChg chg="add">
-          <ac:chgData name="Sander Sævig Eriksen" userId="2da4b7b7-d8b8-4b75-9017-f672d4ad080d" providerId="ADAL" clId="{69F880E9-B167-4345-A5E8-21D432C122E3}" dt="2025-03-26T12:16:08.647" v="2031" actId="26606"/>
+        <pc:spChg chg="add del">
+          <ac:chgData name="Sander Sævig Eriksen" userId="2da4b7b7-d8b8-4b75-9017-f672d4ad080d" providerId="ADAL" clId="{69F880E9-B167-4345-A5E8-21D432C122E3}" dt="2025-03-27T08:08:09.072" v="2176" actId="26606"/>
           <ac:spMkLst>
             <pc:docMk/>
             <pc:sldMk cId="3591823627" sldId="271"/>
             <ac:spMk id="66" creationId="{CBC4F608-B4B8-48C3-9572-C0F061B1CD99}"/>
           </ac:spMkLst>
         </pc:spChg>
-        <pc:spChg chg="add">
-          <ac:chgData name="Sander Sævig Eriksen" userId="2da4b7b7-d8b8-4b75-9017-f672d4ad080d" providerId="ADAL" clId="{69F880E9-B167-4345-A5E8-21D432C122E3}" dt="2025-03-26T12:16:08.647" v="2031" actId="26606"/>
+        <pc:spChg chg="add del">
+          <ac:chgData name="Sander Sævig Eriksen" userId="2da4b7b7-d8b8-4b75-9017-f672d4ad080d" providerId="ADAL" clId="{69F880E9-B167-4345-A5E8-21D432C122E3}" dt="2025-03-27T08:08:09.072" v="2176" actId="26606"/>
           <ac:spMkLst>
             <pc:docMk/>
             <pc:sldMk cId="3591823627" sldId="271"/>
             <ac:spMk id="68" creationId="{1382A32C-5B0C-4B1C-A074-76C6DBCC9F87}"/>
+          </ac:spMkLst>
+        </pc:spChg>
+        <pc:spChg chg="add">
+          <ac:chgData name="Sander Sævig Eriksen" userId="2da4b7b7-d8b8-4b75-9017-f672d4ad080d" providerId="ADAL" clId="{69F880E9-B167-4345-A5E8-21D432C122E3}" dt="2025-03-27T08:08:09.072" v="2176" actId="26606"/>
+          <ac:spMkLst>
+            <pc:docMk/>
+            <pc:sldMk cId="3591823627" sldId="271"/>
+            <ac:spMk id="73" creationId="{743AA782-23D1-4521-8CAD-47662984AA08}"/>
+          </ac:spMkLst>
+        </pc:spChg>
+        <pc:spChg chg="add">
+          <ac:chgData name="Sander Sævig Eriksen" userId="2da4b7b7-d8b8-4b75-9017-f672d4ad080d" providerId="ADAL" clId="{69F880E9-B167-4345-A5E8-21D432C122E3}" dt="2025-03-27T08:08:09.072" v="2176" actId="26606"/>
+          <ac:spMkLst>
+            <pc:docMk/>
+            <pc:sldMk cId="3591823627" sldId="271"/>
+            <ac:spMk id="75" creationId="{650D18FE-0824-4A46-B22C-A86B52E5780A}"/>
           </ac:spMkLst>
         </pc:spChg>
         <pc:grpChg chg="add">
@@ -720,14 +739,22 @@
             <ac:grpSpMk id="51" creationId="{1C559108-BBAE-426C-8564-051D2BA6DDC8}"/>
           </ac:grpSpMkLst>
         </pc:grpChg>
-        <pc:grpChg chg="add">
-          <ac:chgData name="Sander Sævig Eriksen" userId="2da4b7b7-d8b8-4b75-9017-f672d4ad080d" providerId="ADAL" clId="{69F880E9-B167-4345-A5E8-21D432C122E3}" dt="2025-03-26T12:16:08.647" v="2031" actId="26606"/>
+        <pc:grpChg chg="add del">
+          <ac:chgData name="Sander Sævig Eriksen" userId="2da4b7b7-d8b8-4b75-9017-f672d4ad080d" providerId="ADAL" clId="{69F880E9-B167-4345-A5E8-21D432C122E3}" dt="2025-03-27T08:08:09.072" v="2176" actId="26606"/>
           <ac:grpSpMkLst>
             <pc:docMk/>
             <pc:sldMk cId="3591823627" sldId="271"/>
             <ac:grpSpMk id="62" creationId="{1C559108-BBAE-426C-8564-051D2BA6DDC8}"/>
           </ac:grpSpMkLst>
         </pc:grpChg>
+        <pc:picChg chg="add mod">
+          <ac:chgData name="Sander Sævig Eriksen" userId="2da4b7b7-d8b8-4b75-9017-f672d4ad080d" providerId="ADAL" clId="{69F880E9-B167-4345-A5E8-21D432C122E3}" dt="2025-03-27T08:08:09.072" v="2176" actId="26606"/>
+          <ac:picMkLst>
+            <pc:docMk/>
+            <pc:sldMk cId="3591823627" sldId="271"/>
+            <ac:picMk id="5" creationId="{29C30F8D-871E-3A4F-0156-52FB4B83C5F2}"/>
+          </ac:picMkLst>
+        </pc:picChg>
         <pc:picChg chg="add del mod">
           <ac:chgData name="Sander Sævig Eriksen" userId="2da4b7b7-d8b8-4b75-9017-f672d4ad080d" providerId="ADAL" clId="{69F880E9-B167-4345-A5E8-21D432C122E3}" dt="2025-03-26T12:15:31.456" v="2023" actId="478"/>
           <ac:picMkLst>
@@ -744,8 +771,8 @@
             <ac:picMk id="6" creationId="{F04174C5-FD0B-E020-C68D-207D8948F65E}"/>
           </ac:picMkLst>
         </pc:picChg>
-        <pc:picChg chg="add mod">
-          <ac:chgData name="Sander Sævig Eriksen" userId="2da4b7b7-d8b8-4b75-9017-f672d4ad080d" providerId="ADAL" clId="{69F880E9-B167-4345-A5E8-21D432C122E3}" dt="2025-03-26T12:16:08.647" v="2031" actId="26606"/>
+        <pc:picChg chg="add del mod">
+          <ac:chgData name="Sander Sævig Eriksen" userId="2da4b7b7-d8b8-4b75-9017-f672d4ad080d" providerId="ADAL" clId="{69F880E9-B167-4345-A5E8-21D432C122E3}" dt="2025-03-27T08:01:04.705" v="2174" actId="478"/>
           <ac:picMkLst>
             <pc:docMk/>
             <pc:sldMk cId="3591823627" sldId="271"/>
@@ -754,13 +781,13 @@
         </pc:picChg>
       </pc:sldChg>
       <pc:sldChg chg="addSp delSp modSp new mod setBg delDesignElem chgLayout">
-        <pc:chgData name="Sander Sævig Eriksen" userId="2da4b7b7-d8b8-4b75-9017-f672d4ad080d" providerId="ADAL" clId="{69F880E9-B167-4345-A5E8-21D432C122E3}" dt="2025-03-26T12:39:45.934" v="2124" actId="14100"/>
+        <pc:chgData name="Sander Sævig Eriksen" userId="2da4b7b7-d8b8-4b75-9017-f672d4ad080d" providerId="ADAL" clId="{69F880E9-B167-4345-A5E8-21D432C122E3}" dt="2025-03-27T08:14:28.322" v="2195" actId="20577"/>
         <pc:sldMkLst>
           <pc:docMk/>
           <pc:sldMk cId="1551153413" sldId="272"/>
         </pc:sldMkLst>
         <pc:spChg chg="mod ord">
-          <ac:chgData name="Sander Sævig Eriksen" userId="2da4b7b7-d8b8-4b75-9017-f672d4ad080d" providerId="ADAL" clId="{69F880E9-B167-4345-A5E8-21D432C122E3}" dt="2025-03-26T12:38:50.673" v="2113" actId="700"/>
+          <ac:chgData name="Sander Sævig Eriksen" userId="2da4b7b7-d8b8-4b75-9017-f672d4ad080d" providerId="ADAL" clId="{69F880E9-B167-4345-A5E8-21D432C122E3}" dt="2025-03-27T08:14:28.322" v="2195" actId="20577"/>
           <ac:spMkLst>
             <pc:docMk/>
             <pc:sldMk cId="1551153413" sldId="272"/>
@@ -1025,13 +1052,13 @@
         </pc:cxnChg>
       </pc:sldChg>
       <pc:sldChg chg="addSp delSp modSp new mod">
-        <pc:chgData name="Sander Sævig Eriksen" userId="2da4b7b7-d8b8-4b75-9017-f672d4ad080d" providerId="ADAL" clId="{69F880E9-B167-4345-A5E8-21D432C122E3}" dt="2025-03-26T12:43:37.306" v="2152" actId="14100"/>
+        <pc:chgData name="Sander Sævig Eriksen" userId="2da4b7b7-d8b8-4b75-9017-f672d4ad080d" providerId="ADAL" clId="{69F880E9-B167-4345-A5E8-21D432C122E3}" dt="2025-03-27T08:14:37.449" v="2210" actId="20577"/>
         <pc:sldMkLst>
           <pc:docMk/>
           <pc:sldMk cId="4284492900" sldId="273"/>
         </pc:sldMkLst>
         <pc:spChg chg="mod">
-          <ac:chgData name="Sander Sævig Eriksen" userId="2da4b7b7-d8b8-4b75-9017-f672d4ad080d" providerId="ADAL" clId="{69F880E9-B167-4345-A5E8-21D432C122E3}" dt="2025-03-26T12:40:06.088" v="2138" actId="20577"/>
+          <ac:chgData name="Sander Sævig Eriksen" userId="2da4b7b7-d8b8-4b75-9017-f672d4ad080d" providerId="ADAL" clId="{69F880E9-B167-4345-A5E8-21D432C122E3}" dt="2025-03-27T08:14:37.449" v="2210" actId="20577"/>
           <ac:spMkLst>
             <pc:docMk/>
             <pc:sldMk cId="4284492900" sldId="273"/>
@@ -1072,13 +1099,13 @@
         </pc:picChg>
       </pc:sldChg>
       <pc:sldChg chg="addSp delSp modSp new mod">
-        <pc:chgData name="Sander Sævig Eriksen" userId="2da4b7b7-d8b8-4b75-9017-f672d4ad080d" providerId="ADAL" clId="{69F880E9-B167-4345-A5E8-21D432C122E3}" dt="2025-03-26T12:45:58.087" v="2173" actId="14100"/>
+        <pc:chgData name="Sander Sævig Eriksen" userId="2da4b7b7-d8b8-4b75-9017-f672d4ad080d" providerId="ADAL" clId="{69F880E9-B167-4345-A5E8-21D432C122E3}" dt="2025-03-27T08:25:45.335" v="2244" actId="14100"/>
         <pc:sldMkLst>
           <pc:docMk/>
           <pc:sldMk cId="113336720" sldId="274"/>
         </pc:sldMkLst>
         <pc:spChg chg="mod">
-          <ac:chgData name="Sander Sævig Eriksen" userId="2da4b7b7-d8b8-4b75-9017-f672d4ad080d" providerId="ADAL" clId="{69F880E9-B167-4345-A5E8-21D432C122E3}" dt="2025-03-26T12:44:06.230" v="2160" actId="20577"/>
+          <ac:chgData name="Sander Sævig Eriksen" userId="2da4b7b7-d8b8-4b75-9017-f672d4ad080d" providerId="ADAL" clId="{69F880E9-B167-4345-A5E8-21D432C122E3}" dt="2025-03-27T08:14:44.607" v="2227" actId="20577"/>
           <ac:spMkLst>
             <pc:docMk/>
             <pc:sldMk cId="113336720" sldId="274"/>
@@ -1093,16 +1120,24 @@
             <ac:spMk id="3" creationId="{0D690928-3B93-A094-6C54-F2F782C39BBB}"/>
           </ac:spMkLst>
         </pc:spChg>
-        <pc:picChg chg="add mod ord">
-          <ac:chgData name="Sander Sævig Eriksen" userId="2da4b7b7-d8b8-4b75-9017-f672d4ad080d" providerId="ADAL" clId="{69F880E9-B167-4345-A5E8-21D432C122E3}" dt="2025-03-26T12:45:13.911" v="2166" actId="1076"/>
+        <pc:spChg chg="add del mod">
+          <ac:chgData name="Sander Sævig Eriksen" userId="2da4b7b7-d8b8-4b75-9017-f672d4ad080d" providerId="ADAL" clId="{69F880E9-B167-4345-A5E8-21D432C122E3}" dt="2025-03-27T08:25:30.420" v="2238" actId="22"/>
+          <ac:spMkLst>
+            <pc:docMk/>
+            <pc:sldMk cId="113336720" sldId="274"/>
+            <ac:spMk id="4" creationId="{F7828628-90A1-2993-A82A-E412CA9CD3D9}"/>
+          </ac:spMkLst>
+        </pc:spChg>
+        <pc:picChg chg="add del mod ord">
+          <ac:chgData name="Sander Sævig Eriksen" userId="2da4b7b7-d8b8-4b75-9017-f672d4ad080d" providerId="ADAL" clId="{69F880E9-B167-4345-A5E8-21D432C122E3}" dt="2025-03-27T08:24:40.248" v="2228" actId="478"/>
           <ac:picMkLst>
             <pc:docMk/>
             <pc:sldMk cId="113336720" sldId="274"/>
             <ac:picMk id="5" creationId="{E5BBA3B7-9629-A0AE-699F-C89144F6B6CC}"/>
           </ac:picMkLst>
         </pc:picChg>
-        <pc:picChg chg="add mod">
-          <ac:chgData name="Sander Sævig Eriksen" userId="2da4b7b7-d8b8-4b75-9017-f672d4ad080d" providerId="ADAL" clId="{69F880E9-B167-4345-A5E8-21D432C122E3}" dt="2025-03-26T12:45:58.087" v="2173" actId="14100"/>
+        <pc:picChg chg="add del mod">
+          <ac:chgData name="Sander Sævig Eriksen" userId="2da4b7b7-d8b8-4b75-9017-f672d4ad080d" providerId="ADAL" clId="{69F880E9-B167-4345-A5E8-21D432C122E3}" dt="2025-03-27T08:25:04.969" v="2232" actId="478"/>
           <ac:picMkLst>
             <pc:docMk/>
             <pc:sldMk cId="113336720" sldId="274"/>
@@ -1110,11 +1145,209 @@
           </ac:picMkLst>
         </pc:picChg>
         <pc:picChg chg="add mod">
-          <ac:chgData name="Sander Sævig Eriksen" userId="2da4b7b7-d8b8-4b75-9017-f672d4ad080d" providerId="ADAL" clId="{69F880E9-B167-4345-A5E8-21D432C122E3}" dt="2025-03-26T12:45:49.949" v="2171" actId="14100"/>
+          <ac:chgData name="Sander Sævig Eriksen" userId="2da4b7b7-d8b8-4b75-9017-f672d4ad080d" providerId="ADAL" clId="{69F880E9-B167-4345-A5E8-21D432C122E3}" dt="2025-03-27T08:25:40.624" v="2242" actId="1076"/>
+          <ac:picMkLst>
+            <pc:docMk/>
+            <pc:sldMk cId="113336720" sldId="274"/>
+            <ac:picMk id="8" creationId="{07A5D081-E0AA-293D-BA0E-06BB8D84D116}"/>
+          </ac:picMkLst>
+        </pc:picChg>
+        <pc:picChg chg="add del mod">
+          <ac:chgData name="Sander Sævig Eriksen" userId="2da4b7b7-d8b8-4b75-9017-f672d4ad080d" providerId="ADAL" clId="{69F880E9-B167-4345-A5E8-21D432C122E3}" dt="2025-03-27T08:25:14.156" v="2237" actId="478"/>
           <ac:picMkLst>
             <pc:docMk/>
             <pc:sldMk cId="113336720" sldId="274"/>
             <ac:picMk id="9" creationId="{7E058767-46EB-8C2F-BDDC-55E685DD68D3}"/>
+          </ac:picMkLst>
+        </pc:picChg>
+        <pc:picChg chg="add mod">
+          <ac:chgData name="Sander Sævig Eriksen" userId="2da4b7b7-d8b8-4b75-9017-f672d4ad080d" providerId="ADAL" clId="{69F880E9-B167-4345-A5E8-21D432C122E3}" dt="2025-03-27T08:25:12.107" v="2236" actId="14100"/>
+          <ac:picMkLst>
+            <pc:docMk/>
+            <pc:sldMk cId="113336720" sldId="274"/>
+            <ac:picMk id="11" creationId="{1A7DDE10-683D-19C9-8042-6494AF1B204B}"/>
+          </ac:picMkLst>
+        </pc:picChg>
+        <pc:picChg chg="add mod ord">
+          <ac:chgData name="Sander Sævig Eriksen" userId="2da4b7b7-d8b8-4b75-9017-f672d4ad080d" providerId="ADAL" clId="{69F880E9-B167-4345-A5E8-21D432C122E3}" dt="2025-03-27T08:25:45.335" v="2244" actId="14100"/>
+          <ac:picMkLst>
+            <pc:docMk/>
+            <pc:sldMk cId="113336720" sldId="274"/>
+            <ac:picMk id="13" creationId="{F5DE30AB-DCCD-78C7-2DCB-B2D80B73C507}"/>
+          </ac:picMkLst>
+        </pc:picChg>
+      </pc:sldChg>
+      <pc:sldChg chg="modSp new del mod">
+        <pc:chgData name="Sander Sævig Eriksen" userId="2da4b7b7-d8b8-4b75-9017-f672d4ad080d" providerId="ADAL" clId="{69F880E9-B167-4345-A5E8-21D432C122E3}" dt="2025-03-27T08:27:31.041" v="2306" actId="2696"/>
+        <pc:sldMkLst>
+          <pc:docMk/>
+          <pc:sldMk cId="187829488" sldId="275"/>
+        </pc:sldMkLst>
+        <pc:spChg chg="mod">
+          <ac:chgData name="Sander Sævig Eriksen" userId="2da4b7b7-d8b8-4b75-9017-f672d4ad080d" providerId="ADAL" clId="{69F880E9-B167-4345-A5E8-21D432C122E3}" dt="2025-03-27T08:27:13.692" v="2305" actId="20577"/>
+          <ac:spMkLst>
+            <pc:docMk/>
+            <pc:sldMk cId="187829488" sldId="275"/>
+            <ac:spMk id="2" creationId="{94B3F5AB-809A-578A-ECB9-8A1679362573}"/>
+          </ac:spMkLst>
+        </pc:spChg>
+      </pc:sldChg>
+      <pc:sldChg chg="addSp delSp modSp new mod setBg">
+        <pc:chgData name="Sander Sævig Eriksen" userId="2da4b7b7-d8b8-4b75-9017-f672d4ad080d" providerId="ADAL" clId="{69F880E9-B167-4345-A5E8-21D432C122E3}" dt="2025-03-27T08:40:13.265" v="2463" actId="20577"/>
+        <pc:sldMkLst>
+          <pc:docMk/>
+          <pc:sldMk cId="2079565396" sldId="275"/>
+        </pc:sldMkLst>
+        <pc:spChg chg="mod">
+          <ac:chgData name="Sander Sævig Eriksen" userId="2da4b7b7-d8b8-4b75-9017-f672d4ad080d" providerId="ADAL" clId="{69F880E9-B167-4345-A5E8-21D432C122E3}" dt="2025-03-27T08:39:00.930" v="2410" actId="26606"/>
+          <ac:spMkLst>
+            <pc:docMk/>
+            <pc:sldMk cId="2079565396" sldId="275"/>
+            <ac:spMk id="2" creationId="{6A6CD311-2D10-F037-74B5-7FEC8CE8DC00}"/>
+          </ac:spMkLst>
+        </pc:spChg>
+        <pc:spChg chg="del">
+          <ac:chgData name="Sander Sævig Eriksen" userId="2da4b7b7-d8b8-4b75-9017-f672d4ad080d" providerId="ADAL" clId="{69F880E9-B167-4345-A5E8-21D432C122E3}" dt="2025-03-27T08:38:53.777" v="2405"/>
+          <ac:spMkLst>
+            <pc:docMk/>
+            <pc:sldMk cId="2079565396" sldId="275"/>
+            <ac:spMk id="3" creationId="{B4B40CAF-D9B2-35D8-0318-E6B8DB74477B}"/>
+          </ac:spMkLst>
+        </pc:spChg>
+        <pc:spChg chg="add">
+          <ac:chgData name="Sander Sævig Eriksen" userId="2da4b7b7-d8b8-4b75-9017-f672d4ad080d" providerId="ADAL" clId="{69F880E9-B167-4345-A5E8-21D432C122E3}" dt="2025-03-27T08:38:49.200" v="2404"/>
+          <ac:spMkLst>
+            <pc:docMk/>
+            <pc:sldMk cId="2079565396" sldId="275"/>
+            <ac:spMk id="4" creationId="{4A49197B-ED94-4FC2-D319-B7E1F0F67B00}"/>
+          </ac:spMkLst>
+        </pc:spChg>
+        <pc:spChg chg="add del">
+          <ac:chgData name="Sander Sævig Eriksen" userId="2da4b7b7-d8b8-4b75-9017-f672d4ad080d" providerId="ADAL" clId="{69F880E9-B167-4345-A5E8-21D432C122E3}" dt="2025-03-27T08:38:59.500" v="2407" actId="26606"/>
+          <ac:spMkLst>
+            <pc:docMk/>
+            <pc:sldMk cId="2079565396" sldId="275"/>
+            <ac:spMk id="9" creationId="{C20384AB-1C48-9BBE-9906-FCA86CA0FF17}"/>
+          </ac:spMkLst>
+        </pc:spChg>
+        <pc:spChg chg="add del">
+          <ac:chgData name="Sander Sævig Eriksen" userId="2da4b7b7-d8b8-4b75-9017-f672d4ad080d" providerId="ADAL" clId="{69F880E9-B167-4345-A5E8-21D432C122E3}" dt="2025-03-27T08:38:59.500" v="2407" actId="26606"/>
+          <ac:spMkLst>
+            <pc:docMk/>
+            <pc:sldMk cId="2079565396" sldId="275"/>
+            <ac:spMk id="12" creationId="{058A14AF-9FB5-4CC7-BA35-E8E85D3EDF0E}"/>
+          </ac:spMkLst>
+        </pc:spChg>
+        <pc:spChg chg="add del">
+          <ac:chgData name="Sander Sævig Eriksen" userId="2da4b7b7-d8b8-4b75-9017-f672d4ad080d" providerId="ADAL" clId="{69F880E9-B167-4345-A5E8-21D432C122E3}" dt="2025-03-27T08:38:59.500" v="2407" actId="26606"/>
+          <ac:spMkLst>
+            <pc:docMk/>
+            <pc:sldMk cId="2079565396" sldId="275"/>
+            <ac:spMk id="14" creationId="{3A9A4357-BD1D-4622-A4FE-766E6AB8DE84}"/>
+          </ac:spMkLst>
+        </pc:spChg>
+        <pc:spChg chg="add del">
+          <ac:chgData name="Sander Sævig Eriksen" userId="2da4b7b7-d8b8-4b75-9017-f672d4ad080d" providerId="ADAL" clId="{69F880E9-B167-4345-A5E8-21D432C122E3}" dt="2025-03-27T08:38:59.500" v="2407" actId="26606"/>
+          <ac:spMkLst>
+            <pc:docMk/>
+            <pc:sldMk cId="2079565396" sldId="275"/>
+            <ac:spMk id="16" creationId="{E659831F-0D9A-4C63-9EBB-8435B85A440F}"/>
+          </ac:spMkLst>
+        </pc:spChg>
+        <pc:spChg chg="add del">
+          <ac:chgData name="Sander Sævig Eriksen" userId="2da4b7b7-d8b8-4b75-9017-f672d4ad080d" providerId="ADAL" clId="{69F880E9-B167-4345-A5E8-21D432C122E3}" dt="2025-03-27T08:38:59.500" v="2407" actId="26606"/>
+          <ac:spMkLst>
+            <pc:docMk/>
+            <pc:sldMk cId="2079565396" sldId="275"/>
+            <ac:spMk id="18" creationId="{E6995CE5-F890-4ABA-82A2-26507CE8D2A3}"/>
+          </ac:spMkLst>
+        </pc:spChg>
+        <pc:spChg chg="add del">
+          <ac:chgData name="Sander Sævig Eriksen" userId="2da4b7b7-d8b8-4b75-9017-f672d4ad080d" providerId="ADAL" clId="{69F880E9-B167-4345-A5E8-21D432C122E3}" dt="2025-03-27T08:39:00.917" v="2409" actId="26606"/>
+          <ac:spMkLst>
+            <pc:docMk/>
+            <pc:sldMk cId="2079565396" sldId="275"/>
+            <ac:spMk id="20" creationId="{1382A32C-5B0C-4B1C-A074-76C6DBCC9F87}"/>
+          </ac:spMkLst>
+        </pc:spChg>
+        <pc:spChg chg="add del">
+          <ac:chgData name="Sander Sævig Eriksen" userId="2da4b7b7-d8b8-4b75-9017-f672d4ad080d" providerId="ADAL" clId="{69F880E9-B167-4345-A5E8-21D432C122E3}" dt="2025-03-27T08:39:00.917" v="2409" actId="26606"/>
+          <ac:spMkLst>
+            <pc:docMk/>
+            <pc:sldMk cId="2079565396" sldId="275"/>
+            <ac:spMk id="21" creationId="{6EFC920F-B85A-4068-BD93-41064EDE93D3}"/>
+          </ac:spMkLst>
+        </pc:spChg>
+        <pc:spChg chg="add del">
+          <ac:chgData name="Sander Sævig Eriksen" userId="2da4b7b7-d8b8-4b75-9017-f672d4ad080d" providerId="ADAL" clId="{69F880E9-B167-4345-A5E8-21D432C122E3}" dt="2025-03-27T08:39:00.917" v="2409" actId="26606"/>
+          <ac:spMkLst>
+            <pc:docMk/>
+            <pc:sldMk cId="2079565396" sldId="275"/>
+            <ac:spMk id="24" creationId="{CBC4F608-B4B8-48C3-9572-C0F061B1CD99}"/>
+          </ac:spMkLst>
+        </pc:spChg>
+        <pc:spChg chg="add del">
+          <ac:chgData name="Sander Sævig Eriksen" userId="2da4b7b7-d8b8-4b75-9017-f672d4ad080d" providerId="ADAL" clId="{69F880E9-B167-4345-A5E8-21D432C122E3}" dt="2025-03-27T08:39:00.917" v="2409" actId="26606"/>
+          <ac:spMkLst>
+            <pc:docMk/>
+            <pc:sldMk cId="2079565396" sldId="275"/>
+            <ac:spMk id="25" creationId="{40592370-54A9-3893-F5F7-3C69E2037FD2}"/>
+          </ac:spMkLst>
+        </pc:spChg>
+        <pc:spChg chg="add">
+          <ac:chgData name="Sander Sævig Eriksen" userId="2da4b7b7-d8b8-4b75-9017-f672d4ad080d" providerId="ADAL" clId="{69F880E9-B167-4345-A5E8-21D432C122E3}" dt="2025-03-27T08:39:00.930" v="2410" actId="26606"/>
+          <ac:spMkLst>
+            <pc:docMk/>
+            <pc:sldMk cId="2079565396" sldId="275"/>
+            <ac:spMk id="27" creationId="{058A14AF-9FB5-4CC7-BA35-E8E85D3EDF0E}"/>
+          </ac:spMkLst>
+        </pc:spChg>
+        <pc:spChg chg="add">
+          <ac:chgData name="Sander Sævig Eriksen" userId="2da4b7b7-d8b8-4b75-9017-f672d4ad080d" providerId="ADAL" clId="{69F880E9-B167-4345-A5E8-21D432C122E3}" dt="2025-03-27T08:39:00.930" v="2410" actId="26606"/>
+          <ac:spMkLst>
+            <pc:docMk/>
+            <pc:sldMk cId="2079565396" sldId="275"/>
+            <ac:spMk id="28" creationId="{3A9A4357-BD1D-4622-A4FE-766E6AB8DE84}"/>
+          </ac:spMkLst>
+        </pc:spChg>
+        <pc:spChg chg="add">
+          <ac:chgData name="Sander Sævig Eriksen" userId="2da4b7b7-d8b8-4b75-9017-f672d4ad080d" providerId="ADAL" clId="{69F880E9-B167-4345-A5E8-21D432C122E3}" dt="2025-03-27T08:39:00.930" v="2410" actId="26606"/>
+          <ac:spMkLst>
+            <pc:docMk/>
+            <pc:sldMk cId="2079565396" sldId="275"/>
+            <ac:spMk id="29" creationId="{E659831F-0D9A-4C63-9EBB-8435B85A440F}"/>
+          </ac:spMkLst>
+        </pc:spChg>
+        <pc:spChg chg="add mod">
+          <ac:chgData name="Sander Sævig Eriksen" userId="2da4b7b7-d8b8-4b75-9017-f672d4ad080d" providerId="ADAL" clId="{69F880E9-B167-4345-A5E8-21D432C122E3}" dt="2025-03-27T08:40:13.265" v="2463" actId="20577"/>
+          <ac:spMkLst>
+            <pc:docMk/>
+            <pc:sldMk cId="2079565396" sldId="275"/>
+            <ac:spMk id="30" creationId="{C20384AB-1C48-9BBE-9906-FCA86CA0FF17}"/>
+          </ac:spMkLst>
+        </pc:spChg>
+        <pc:spChg chg="add">
+          <ac:chgData name="Sander Sævig Eriksen" userId="2da4b7b7-d8b8-4b75-9017-f672d4ad080d" providerId="ADAL" clId="{69F880E9-B167-4345-A5E8-21D432C122E3}" dt="2025-03-27T08:39:00.930" v="2410" actId="26606"/>
+          <ac:spMkLst>
+            <pc:docMk/>
+            <pc:sldMk cId="2079565396" sldId="275"/>
+            <ac:spMk id="31" creationId="{E6995CE5-F890-4ABA-82A2-26507CE8D2A3}"/>
+          </ac:spMkLst>
+        </pc:spChg>
+        <pc:grpChg chg="add del">
+          <ac:chgData name="Sander Sævig Eriksen" userId="2da4b7b7-d8b8-4b75-9017-f672d4ad080d" providerId="ADAL" clId="{69F880E9-B167-4345-A5E8-21D432C122E3}" dt="2025-03-27T08:39:00.917" v="2409" actId="26606"/>
+          <ac:grpSpMkLst>
+            <pc:docMk/>
+            <pc:sldMk cId="2079565396" sldId="275"/>
+            <ac:grpSpMk id="22" creationId="{1C559108-BBAE-426C-8564-051D2BA6DDC8}"/>
+          </ac:grpSpMkLst>
+        </pc:grpChg>
+        <pc:picChg chg="add mod">
+          <ac:chgData name="Sander Sævig Eriksen" userId="2da4b7b7-d8b8-4b75-9017-f672d4ad080d" providerId="ADAL" clId="{69F880E9-B167-4345-A5E8-21D432C122E3}" dt="2025-03-27T08:39:00.930" v="2410" actId="26606"/>
+          <ac:picMkLst>
+            <pc:docMk/>
+            <pc:sldMk cId="2079565396" sldId="275"/>
+            <ac:picMk id="5" creationId="{25DFE567-E935-6DB9-F7A3-7C8F462AE72E}"/>
           </ac:picMkLst>
         </pc:picChg>
       </pc:sldChg>
@@ -7265,7 +7498,7 @@
           <a:p>
             <a:fld id="{978405F1-0311-4C70-9CC8-04C69CB12591}" type="datetimeFigureOut">
               <a:rPr lang="nb-NO" smtClean="0"/>
-              <a:t>26.03.2025</a:t>
+              <a:t>27.03.2025</a:t>
             </a:fld>
             <a:endParaRPr lang="nb-NO"/>
           </a:p>
@@ -7465,7 +7698,7 @@
           <a:p>
             <a:fld id="{978405F1-0311-4C70-9CC8-04C69CB12591}" type="datetimeFigureOut">
               <a:rPr lang="nb-NO" smtClean="0"/>
-              <a:t>26.03.2025</a:t>
+              <a:t>27.03.2025</a:t>
             </a:fld>
             <a:endParaRPr lang="nb-NO"/>
           </a:p>
@@ -7675,7 +7908,7 @@
           <a:p>
             <a:fld id="{978405F1-0311-4C70-9CC8-04C69CB12591}" type="datetimeFigureOut">
               <a:rPr lang="nb-NO" smtClean="0"/>
-              <a:t>26.03.2025</a:t>
+              <a:t>27.03.2025</a:t>
             </a:fld>
             <a:endParaRPr lang="nb-NO"/>
           </a:p>
@@ -7875,7 +8108,7 @@
           <a:p>
             <a:fld id="{978405F1-0311-4C70-9CC8-04C69CB12591}" type="datetimeFigureOut">
               <a:rPr lang="nb-NO" smtClean="0"/>
-              <a:t>26.03.2025</a:t>
+              <a:t>27.03.2025</a:t>
             </a:fld>
             <a:endParaRPr lang="nb-NO"/>
           </a:p>
@@ -8151,7 +8384,7 @@
           <a:p>
             <a:fld id="{978405F1-0311-4C70-9CC8-04C69CB12591}" type="datetimeFigureOut">
               <a:rPr lang="nb-NO" smtClean="0"/>
-              <a:t>26.03.2025</a:t>
+              <a:t>27.03.2025</a:t>
             </a:fld>
             <a:endParaRPr lang="nb-NO"/>
           </a:p>
@@ -8419,7 +8652,7 @@
           <a:p>
             <a:fld id="{978405F1-0311-4C70-9CC8-04C69CB12591}" type="datetimeFigureOut">
               <a:rPr lang="nb-NO" smtClean="0"/>
-              <a:t>26.03.2025</a:t>
+              <a:t>27.03.2025</a:t>
             </a:fld>
             <a:endParaRPr lang="nb-NO"/>
           </a:p>
@@ -8834,7 +9067,7 @@
           <a:p>
             <a:fld id="{978405F1-0311-4C70-9CC8-04C69CB12591}" type="datetimeFigureOut">
               <a:rPr lang="nb-NO" smtClean="0"/>
-              <a:t>26.03.2025</a:t>
+              <a:t>27.03.2025</a:t>
             </a:fld>
             <a:endParaRPr lang="nb-NO"/>
           </a:p>
@@ -8976,7 +9209,7 @@
           <a:p>
             <a:fld id="{978405F1-0311-4C70-9CC8-04C69CB12591}" type="datetimeFigureOut">
               <a:rPr lang="nb-NO" smtClean="0"/>
-              <a:t>26.03.2025</a:t>
+              <a:t>27.03.2025</a:t>
             </a:fld>
             <a:endParaRPr lang="nb-NO"/>
           </a:p>
@@ -9089,7 +9322,7 @@
           <a:p>
             <a:fld id="{978405F1-0311-4C70-9CC8-04C69CB12591}" type="datetimeFigureOut">
               <a:rPr lang="nb-NO" smtClean="0"/>
-              <a:t>26.03.2025</a:t>
+              <a:t>27.03.2025</a:t>
             </a:fld>
             <a:endParaRPr lang="nb-NO"/>
           </a:p>
@@ -9402,7 +9635,7 @@
           <a:p>
             <a:fld id="{978405F1-0311-4C70-9CC8-04C69CB12591}" type="datetimeFigureOut">
               <a:rPr lang="nb-NO" smtClean="0"/>
-              <a:t>26.03.2025</a:t>
+              <a:t>27.03.2025</a:t>
             </a:fld>
             <a:endParaRPr lang="nb-NO"/>
           </a:p>
@@ -9691,7 +9924,7 @@
           <a:p>
             <a:fld id="{978405F1-0311-4C70-9CC8-04C69CB12591}" type="datetimeFigureOut">
               <a:rPr lang="nb-NO" smtClean="0"/>
-              <a:t>26.03.2025</a:t>
+              <a:t>27.03.2025</a:t>
             </a:fld>
             <a:endParaRPr lang="nb-NO"/>
           </a:p>
@@ -9934,7 +10167,7 @@
           <a:p>
             <a:fld id="{978405F1-0311-4C70-9CC8-04C69CB12591}" type="datetimeFigureOut">
               <a:rPr lang="nb-NO" smtClean="0"/>
-              <a:t>26.03.2025</a:t>
+              <a:t>27.03.2025</a:t>
             </a:fld>
             <a:endParaRPr lang="nb-NO"/>
           </a:p>
@@ -10661,10 +10894,10 @@
       </p:grpSpPr>
       <p:sp>
         <p:nvSpPr>
-          <p:cNvPr id="2" name="Title 1">
+          <p:cNvPr id="4" name="Title 3">
             <a:extLst>
               <a:ext uri="{FF2B5EF4-FFF2-40B4-BE49-F238E27FC236}">
-                <a16:creationId xmlns:a16="http://schemas.microsoft.com/office/drawing/2014/main" id="{D6E08181-FD15-78CC-D56A-C3D5B4331E16}"/>
+                <a16:creationId xmlns:a16="http://schemas.microsoft.com/office/drawing/2014/main" id="{EA752597-B865-FB65-BB6A-954488D04043}"/>
               </a:ext>
             </a:extLst>
           </p:cNvPr>
@@ -10672,7 +10905,7 @@
             <a:spLocks noGrp="1"/>
           </p:cNvSpPr>
           <p:nvPr>
-            <p:ph type="title"/>
+            <p:ph type="ctrTitle"/>
           </p:nvPr>
         </p:nvSpPr>
         <p:spPr/>
@@ -10681,26 +10914,27 @@
           <a:lstStyle/>
           <a:p>
             <a:r>
+              <a:rPr lang="nb-NO" dirty="0" err="1"/>
+              <a:t>Topic</a:t>
+            </a:r>
+            <a:r>
               <a:rPr lang="nb-NO" dirty="0"/>
-              <a:t>Research </a:t>
+              <a:t> / Research </a:t>
             </a:r>
             <a:r>
               <a:rPr lang="nb-NO" dirty="0" err="1"/>
-              <a:t>question</a:t>
-            </a:r>
-            <a:r>
-              <a:rPr lang="nb-NO" dirty="0"/>
-              <a:t> </a:t>
-            </a:r>
+              <a:t>Question</a:t>
+            </a:r>
+            <a:endParaRPr lang="nb-NO" dirty="0"/>
           </a:p>
         </p:txBody>
       </p:sp>
       <p:sp>
         <p:nvSpPr>
-          <p:cNvPr id="3" name="Content Placeholder 2">
+          <p:cNvPr id="5" name="Subtitle 4">
             <a:extLst>
               <a:ext uri="{FF2B5EF4-FFF2-40B4-BE49-F238E27FC236}">
-                <a16:creationId xmlns:a16="http://schemas.microsoft.com/office/drawing/2014/main" id="{7A4AB9B8-0D4F-4050-030E-6769AC5A4B93}"/>
+                <a16:creationId xmlns:a16="http://schemas.microsoft.com/office/drawing/2014/main" id="{98927FA5-0387-B270-4DFC-5F99766521CF}"/>
               </a:ext>
             </a:extLst>
           </p:cNvPr>
@@ -10708,7 +10942,7 @@
             <a:spLocks noGrp="1"/>
           </p:cNvSpPr>
           <p:nvPr>
-            <p:ph idx="1"/>
+            <p:ph type="subTitle" idx="1"/>
           </p:nvPr>
         </p:nvSpPr>
         <p:spPr/>
@@ -10716,178 +10950,14 @@
           <a:bodyPr/>
           <a:lstStyle/>
           <a:p>
-            <a:r>
-              <a:rPr lang="nb-NO" dirty="0" err="1"/>
-              <a:t>We</a:t>
-            </a:r>
-            <a:r>
-              <a:rPr lang="nb-NO" dirty="0"/>
-              <a:t> </a:t>
-            </a:r>
-            <a:r>
-              <a:rPr lang="nb-NO" dirty="0" err="1"/>
-              <a:t>need</a:t>
-            </a:r>
-            <a:r>
-              <a:rPr lang="nb-NO" dirty="0"/>
-              <a:t> feedback </a:t>
-            </a:r>
-            <a:r>
-              <a:rPr lang="nb-NO" dirty="0" err="1"/>
-              <a:t>on</a:t>
-            </a:r>
-            <a:r>
-              <a:rPr lang="nb-NO" dirty="0"/>
-              <a:t> </a:t>
-            </a:r>
-            <a:r>
-              <a:rPr lang="nb-NO" dirty="0" err="1"/>
-              <a:t>this</a:t>
-            </a:r>
-            <a:r>
-              <a:rPr lang="nb-NO" dirty="0"/>
-              <a:t>, </a:t>
-            </a:r>
-            <a:r>
-              <a:rPr lang="nb-NO" dirty="0" err="1"/>
-              <a:t>but</a:t>
-            </a:r>
-            <a:r>
-              <a:rPr lang="nb-NO" dirty="0"/>
-              <a:t> </a:t>
-            </a:r>
-            <a:r>
-              <a:rPr lang="nb-NO" dirty="0" err="1"/>
-              <a:t>we</a:t>
-            </a:r>
-            <a:r>
-              <a:rPr lang="nb-NO" dirty="0"/>
-              <a:t> have </a:t>
-            </a:r>
-            <a:r>
-              <a:rPr lang="nb-NO" dirty="0" err="1"/>
-              <a:t>some</a:t>
-            </a:r>
-            <a:r>
-              <a:rPr lang="nb-NO" dirty="0"/>
-              <a:t> </a:t>
-            </a:r>
-            <a:r>
-              <a:rPr lang="nb-NO" dirty="0" err="1"/>
-              <a:t>suggestions</a:t>
-            </a:r>
-            <a:r>
-              <a:rPr lang="nb-NO" dirty="0"/>
-              <a:t>:</a:t>
-            </a:r>
-          </a:p>
-          <a:p>
-            <a:pPr lvl="1"/>
-            <a:r>
-              <a:rPr lang="nb-NO" dirty="0" err="1"/>
-              <a:t>Can</a:t>
-            </a:r>
-            <a:r>
-              <a:rPr lang="nb-NO" dirty="0"/>
-              <a:t> </a:t>
-            </a:r>
-            <a:r>
-              <a:rPr lang="nb-NO" dirty="0" err="1"/>
-              <a:t>market</a:t>
-            </a:r>
-            <a:r>
-              <a:rPr lang="nb-NO" dirty="0"/>
-              <a:t> </a:t>
-            </a:r>
-            <a:r>
-              <a:rPr lang="nb-NO" dirty="0" err="1"/>
-              <a:t>entry</a:t>
-            </a:r>
-            <a:r>
-              <a:rPr lang="nb-NO" dirty="0"/>
-              <a:t> </a:t>
-            </a:r>
-            <a:r>
-              <a:rPr lang="nb-NO" dirty="0" err="1"/>
-              <a:t>models</a:t>
-            </a:r>
-            <a:r>
-              <a:rPr lang="nb-NO" dirty="0"/>
-              <a:t> assist Vinmonopolet in </a:t>
-            </a:r>
-            <a:r>
-              <a:rPr lang="nb-NO" dirty="0" err="1"/>
-              <a:t>deciding</a:t>
-            </a:r>
-            <a:r>
-              <a:rPr lang="nb-NO" dirty="0"/>
-              <a:t> </a:t>
-            </a:r>
-            <a:r>
-              <a:rPr lang="nb-NO" dirty="0" err="1"/>
-              <a:t>on</a:t>
-            </a:r>
-            <a:r>
-              <a:rPr lang="nb-NO" dirty="0"/>
-              <a:t> </a:t>
-            </a:r>
-            <a:r>
-              <a:rPr lang="nb-NO" dirty="0" err="1"/>
-              <a:t>their</a:t>
-            </a:r>
-            <a:r>
-              <a:rPr lang="nb-NO" dirty="0"/>
-              <a:t> </a:t>
-            </a:r>
-            <a:r>
-              <a:rPr lang="nb-NO" dirty="0" err="1"/>
-              <a:t>next</a:t>
-            </a:r>
-            <a:r>
-              <a:rPr lang="nb-NO" dirty="0"/>
-              <a:t> store location?</a:t>
-            </a:r>
-          </a:p>
-          <a:p>
-            <a:pPr lvl="1"/>
-            <a:r>
-              <a:rPr lang="en-US" dirty="0"/>
-              <a:t> What is the minimum market size required to support different numbers of </a:t>
-            </a:r>
-            <a:r>
-              <a:rPr lang="en-US" dirty="0" err="1"/>
-              <a:t>Vinmonopolet</a:t>
-            </a:r>
-            <a:r>
-              <a:rPr lang="en-US" dirty="0"/>
-              <a:t> stores, and how do these thresholds change as the number of stores increases?</a:t>
-            </a:r>
-          </a:p>
-          <a:p>
-            <a:pPr lvl="1"/>
-            <a:r>
-              <a:rPr lang="en-US" dirty="0"/>
-              <a:t>To what extent does the presence of cross-border shopping opportunities affect entry thresholds for </a:t>
-            </a:r>
-            <a:r>
-              <a:rPr lang="en-US" dirty="0" err="1"/>
-              <a:t>Vinmonopolet</a:t>
-            </a:r>
-            <a:r>
-              <a:rPr lang="en-US" dirty="0"/>
-              <a:t> stores in border regions, and how should this inform store placement policies?</a:t>
-            </a:r>
-          </a:p>
-          <a:p>
-            <a:pPr lvl="1"/>
-            <a:endParaRPr lang="nb-NO" dirty="0"/>
+            <a:endParaRPr lang="nb-NO"/>
           </a:p>
         </p:txBody>
       </p:sp>
     </p:spTree>
     <p:extLst>
       <p:ext uri="{BB962C8B-B14F-4D97-AF65-F5344CB8AC3E}">
-        <p14:creationId xmlns:p14="http://schemas.microsoft.com/office/powerpoint/2010/main" val="216445117"/>
+        <p14:creationId xmlns:p14="http://schemas.microsoft.com/office/powerpoint/2010/main" val="3088668381"/>
       </p:ext>
     </p:extLst>
   </p:cSld>
@@ -10916,10 +10986,10 @@
       </p:grpSpPr>
       <p:sp>
         <p:nvSpPr>
-          <p:cNvPr id="6" name="Title 5">
+          <p:cNvPr id="2" name="Title 1">
             <a:extLst>
               <a:ext uri="{FF2B5EF4-FFF2-40B4-BE49-F238E27FC236}">
-                <a16:creationId xmlns:a16="http://schemas.microsoft.com/office/drawing/2014/main" id="{4D92AF9F-815E-ADC7-8F68-211BEDD7FA01}"/>
+                <a16:creationId xmlns:a16="http://schemas.microsoft.com/office/drawing/2014/main" id="{D6E08181-FD15-78CC-D56A-C3D5B4331E16}"/>
               </a:ext>
             </a:extLst>
           </p:cNvPr>
@@ -10927,7 +10997,7 @@
             <a:spLocks noGrp="1"/>
           </p:cNvSpPr>
           <p:nvPr>
-            <p:ph type="ctrTitle"/>
+            <p:ph type="title"/>
           </p:nvPr>
         </p:nvSpPr>
         <p:spPr/>
@@ -10936,27 +11006,26 @@
           <a:lstStyle/>
           <a:p>
             <a:r>
+              <a:rPr lang="nb-NO" dirty="0"/>
+              <a:t>Research </a:t>
+            </a:r>
+            <a:r>
               <a:rPr lang="nb-NO" dirty="0" err="1"/>
-              <a:t>Empirical</a:t>
+              <a:t>question</a:t>
             </a:r>
             <a:r>
               <a:rPr lang="nb-NO" dirty="0"/>
               <a:t> </a:t>
             </a:r>
-            <a:r>
-              <a:rPr lang="nb-NO" dirty="0" err="1"/>
-              <a:t>model</a:t>
-            </a:r>
-            <a:endParaRPr lang="nb-NO" dirty="0"/>
           </a:p>
         </p:txBody>
       </p:sp>
       <p:sp>
         <p:nvSpPr>
-          <p:cNvPr id="7" name="Subtitle 6">
+          <p:cNvPr id="3" name="Content Placeholder 2">
             <a:extLst>
               <a:ext uri="{FF2B5EF4-FFF2-40B4-BE49-F238E27FC236}">
-                <a16:creationId xmlns:a16="http://schemas.microsoft.com/office/drawing/2014/main" id="{6804B1B4-4E4B-2487-3EB7-78C16D8E92A6}"/>
+                <a16:creationId xmlns:a16="http://schemas.microsoft.com/office/drawing/2014/main" id="{7A4AB9B8-0D4F-4050-030E-6769AC5A4B93}"/>
               </a:ext>
             </a:extLst>
           </p:cNvPr>
@@ -10964,7 +11033,7 @@
             <a:spLocks noGrp="1"/>
           </p:cNvSpPr>
           <p:nvPr>
-            <p:ph type="subTitle" idx="1"/>
+            <p:ph idx="1"/>
           </p:nvPr>
         </p:nvSpPr>
         <p:spPr/>
@@ -10973,8 +11042,44 @@
           <a:lstStyle/>
           <a:p>
             <a:r>
+              <a:rPr lang="nb-NO" dirty="0" err="1"/>
+              <a:t>We</a:t>
+            </a:r>
+            <a:r>
               <a:rPr lang="nb-NO" dirty="0"/>
-              <a:t>Are </a:t>
+              <a:t> </a:t>
+            </a:r>
+            <a:r>
+              <a:rPr lang="nb-NO" dirty="0" err="1"/>
+              <a:t>need</a:t>
+            </a:r>
+            <a:r>
+              <a:rPr lang="nb-NO" dirty="0"/>
+              <a:t> feedback </a:t>
+            </a:r>
+            <a:r>
+              <a:rPr lang="nb-NO" dirty="0" err="1"/>
+              <a:t>on</a:t>
+            </a:r>
+            <a:r>
+              <a:rPr lang="nb-NO" dirty="0"/>
+              <a:t> </a:t>
+            </a:r>
+            <a:r>
+              <a:rPr lang="nb-NO" dirty="0" err="1"/>
+              <a:t>this</a:t>
+            </a:r>
+            <a:r>
+              <a:rPr lang="nb-NO" dirty="0"/>
+              <a:t>, </a:t>
+            </a:r>
+            <a:r>
+              <a:rPr lang="nb-NO" dirty="0" err="1"/>
+              <a:t>but</a:t>
+            </a:r>
+            <a:r>
+              <a:rPr lang="nb-NO" dirty="0"/>
+              <a:t> </a:t>
             </a:r>
             <a:r>
               <a:rPr lang="nb-NO" dirty="0" err="1"/>
@@ -10982,11 +11087,11 @@
             </a:r>
             <a:r>
               <a:rPr lang="nb-NO" dirty="0"/>
-              <a:t> </a:t>
+              <a:t> have </a:t>
             </a:r>
             <a:r>
               <a:rPr lang="nb-NO" dirty="0" err="1"/>
-              <a:t>using</a:t>
+              <a:t>some</a:t>
             </a:r>
             <a:r>
               <a:rPr lang="nb-NO" dirty="0"/>
@@ -10994,27 +11099,120 @@
             </a:r>
             <a:r>
               <a:rPr lang="nb-NO" dirty="0" err="1"/>
-              <a:t>the</a:t>
+              <a:t>suggestions</a:t>
             </a:r>
             <a:r>
               <a:rPr lang="nb-NO" dirty="0"/>
-              <a:t> right </a:t>
-            </a:r>
+              <a:t>:</a:t>
+            </a:r>
+          </a:p>
+          <a:p>
+            <a:pPr lvl="1"/>
             <a:r>
               <a:rPr lang="nb-NO" dirty="0" err="1"/>
-              <a:t>one</a:t>
+              <a:t>Can</a:t>
             </a:r>
             <a:r>
               <a:rPr lang="nb-NO" dirty="0"/>
-              <a:t>?</a:t>
-            </a:r>
+              <a:t> </a:t>
+            </a:r>
+            <a:r>
+              <a:rPr lang="nb-NO" dirty="0" err="1"/>
+              <a:t>market</a:t>
+            </a:r>
+            <a:r>
+              <a:rPr lang="nb-NO" dirty="0"/>
+              <a:t> </a:t>
+            </a:r>
+            <a:r>
+              <a:rPr lang="nb-NO" dirty="0" err="1"/>
+              <a:t>entry</a:t>
+            </a:r>
+            <a:r>
+              <a:rPr lang="nb-NO" dirty="0"/>
+              <a:t> </a:t>
+            </a:r>
+            <a:r>
+              <a:rPr lang="nb-NO" dirty="0" err="1"/>
+              <a:t>models</a:t>
+            </a:r>
+            <a:r>
+              <a:rPr lang="nb-NO" dirty="0"/>
+              <a:t> assist Vinmonopolet in </a:t>
+            </a:r>
+            <a:r>
+              <a:rPr lang="nb-NO" dirty="0" err="1"/>
+              <a:t>deciding</a:t>
+            </a:r>
+            <a:r>
+              <a:rPr lang="nb-NO" dirty="0"/>
+              <a:t> </a:t>
+            </a:r>
+            <a:r>
+              <a:rPr lang="nb-NO" dirty="0" err="1"/>
+              <a:t>on</a:t>
+            </a:r>
+            <a:r>
+              <a:rPr lang="nb-NO" dirty="0"/>
+              <a:t> </a:t>
+            </a:r>
+            <a:r>
+              <a:rPr lang="nb-NO" dirty="0" err="1"/>
+              <a:t>their</a:t>
+            </a:r>
+            <a:r>
+              <a:rPr lang="nb-NO" dirty="0"/>
+              <a:t> </a:t>
+            </a:r>
+            <a:r>
+              <a:rPr lang="nb-NO" dirty="0" err="1"/>
+              <a:t>next</a:t>
+            </a:r>
+            <a:r>
+              <a:rPr lang="nb-NO" dirty="0"/>
+              <a:t> store location?</a:t>
+            </a:r>
+          </a:p>
+          <a:p>
+            <a:pPr lvl="1"/>
+            <a:r>
+              <a:rPr lang="en-US" dirty="0"/>
+              <a:t> What is the minimum market size required to support different numbers of </a:t>
+            </a:r>
+            <a:r>
+              <a:rPr lang="en-US" dirty="0" err="1"/>
+              <a:t>Vinmonopolet</a:t>
+            </a:r>
+            <a:r>
+              <a:rPr lang="en-US" dirty="0"/>
+              <a:t> stores, and how do these thresholds change as the number of stores increases?</a:t>
+            </a:r>
+          </a:p>
+          <a:p>
+            <a:pPr lvl="1"/>
+            <a:r>
+              <a:rPr lang="en-US" dirty="0"/>
+              <a:t>To what extent does the presence of cross-border shopping opportunities affect entry thresholds for </a:t>
+            </a:r>
+            <a:r>
+              <a:rPr lang="en-US" dirty="0" err="1"/>
+              <a:t>Vinmonopolet</a:t>
+            </a:r>
+            <a:r>
+              <a:rPr lang="en-US" dirty="0"/>
+              <a:t> stores in border regions, and how should this inform store placement policies?</a:t>
+            </a:r>
+          </a:p>
+          <a:p>
+            <a:pPr lvl="1"/>
+            <a:endParaRPr lang="nb-NO" dirty="0"/>
           </a:p>
         </p:txBody>
       </p:sp>
     </p:spTree>
     <p:extLst>
       <p:ext uri="{BB962C8B-B14F-4D97-AF65-F5344CB8AC3E}">
-        <p14:creationId xmlns:p14="http://schemas.microsoft.com/office/powerpoint/2010/main" val="2984399082"/>
+        <p14:creationId xmlns:p14="http://schemas.microsoft.com/office/powerpoint/2010/main" val="216445117"/>
       </p:ext>
     </p:extLst>
   </p:cSld>
@@ -11043,10 +11241,10 @@
       </p:grpSpPr>
       <p:sp>
         <p:nvSpPr>
-          <p:cNvPr id="2" name="Title 1">
+          <p:cNvPr id="6" name="Title 5">
             <a:extLst>
               <a:ext uri="{FF2B5EF4-FFF2-40B4-BE49-F238E27FC236}">
-                <a16:creationId xmlns:a16="http://schemas.microsoft.com/office/drawing/2014/main" id="{EDEC6D8A-B3ED-C6D2-8995-11FFFA77FFB4}"/>
+                <a16:creationId xmlns:a16="http://schemas.microsoft.com/office/drawing/2014/main" id="{4D92AF9F-815E-ADC7-8F68-211BEDD7FA01}"/>
               </a:ext>
             </a:extLst>
           </p:cNvPr>
@@ -11054,7 +11252,7 @@
             <a:spLocks noGrp="1"/>
           </p:cNvSpPr>
           <p:nvPr>
-            <p:ph type="title"/>
+            <p:ph type="ctrTitle"/>
           </p:nvPr>
         </p:nvSpPr>
         <p:spPr/>
@@ -11074,27 +11272,16 @@
               <a:rPr lang="nb-NO" dirty="0" err="1"/>
               <a:t>model</a:t>
             </a:r>
-            <a:r>
-              <a:rPr lang="nb-NO" dirty="0"/>
-              <a:t>: </a:t>
-            </a:r>
-            <a:r>
-              <a:rPr lang="nb-NO" dirty="0" err="1"/>
-              <a:t>Bresnahan</a:t>
-            </a:r>
-            <a:r>
-              <a:rPr lang="nb-NO" dirty="0"/>
-              <a:t> &amp; Reiss</a:t>
-            </a:r>
+            <a:endParaRPr lang="nb-NO" dirty="0"/>
           </a:p>
         </p:txBody>
       </p:sp>
       <p:sp>
         <p:nvSpPr>
-          <p:cNvPr id="3" name="Content Placeholder 2">
+          <p:cNvPr id="7" name="Subtitle 6">
             <a:extLst>
               <a:ext uri="{FF2B5EF4-FFF2-40B4-BE49-F238E27FC236}">
-                <a16:creationId xmlns:a16="http://schemas.microsoft.com/office/drawing/2014/main" id="{CE41D449-0059-29E8-257A-B1EEA512E592}"/>
+                <a16:creationId xmlns:a16="http://schemas.microsoft.com/office/drawing/2014/main" id="{6804B1B4-4E4B-2487-3EB7-78C16D8E92A6}"/>
               </a:ext>
             </a:extLst>
           </p:cNvPr>
@@ -11102,7 +11289,7 @@
             <a:spLocks noGrp="1"/>
           </p:cNvSpPr>
           <p:nvPr>
-            <p:ph idx="1"/>
+            <p:ph type="subTitle" idx="1"/>
           </p:nvPr>
         </p:nvSpPr>
         <p:spPr/>
@@ -11112,11 +11299,11 @@
           <a:p>
             <a:r>
               <a:rPr lang="nb-NO" dirty="0"/>
-              <a:t>The </a:t>
+              <a:t>Are </a:t>
             </a:r>
             <a:r>
               <a:rPr lang="nb-NO" dirty="0" err="1"/>
-              <a:t>alcohol</a:t>
+              <a:t>we</a:t>
             </a:r>
             <a:r>
               <a:rPr lang="nb-NO" dirty="0"/>
@@ -11124,15 +11311,7 @@
             </a:r>
             <a:r>
               <a:rPr lang="nb-NO" dirty="0" err="1"/>
-              <a:t>market</a:t>
-            </a:r>
-            <a:r>
-              <a:rPr lang="nb-NO" dirty="0"/>
-              <a:t> in Norway </a:t>
-            </a:r>
-            <a:r>
-              <a:rPr lang="nb-NO" dirty="0" err="1"/>
-              <a:t>violates</a:t>
+              <a:t>using</a:t>
             </a:r>
             <a:r>
               <a:rPr lang="nb-NO" dirty="0"/>
@@ -11140,139 +11319,27 @@
             </a:r>
             <a:r>
               <a:rPr lang="nb-NO" dirty="0" err="1"/>
-              <a:t>some</a:t>
+              <a:t>the</a:t>
             </a:r>
             <a:r>
               <a:rPr lang="nb-NO" dirty="0"/>
-              <a:t> </a:t>
+              <a:t> right </a:t>
             </a:r>
             <a:r>
               <a:rPr lang="nb-NO" dirty="0" err="1"/>
-              <a:t>of</a:t>
+              <a:t>one</a:t>
             </a:r>
             <a:r>
               <a:rPr lang="nb-NO" dirty="0"/>
-              <a:t> </a:t>
-            </a:r>
-            <a:r>
-              <a:rPr lang="nb-NO" dirty="0" err="1"/>
-              <a:t>the</a:t>
-            </a:r>
-            <a:r>
-              <a:rPr lang="nb-NO" dirty="0"/>
-              <a:t> </a:t>
-            </a:r>
-            <a:r>
-              <a:rPr lang="nb-NO" dirty="0" err="1"/>
-              <a:t>assumptions</a:t>
-            </a:r>
-            <a:r>
-              <a:rPr lang="nb-NO" dirty="0"/>
-              <a:t> </a:t>
-            </a:r>
-            <a:r>
-              <a:rPr lang="nb-NO" dirty="0" err="1"/>
-              <a:t>of</a:t>
-            </a:r>
-            <a:r>
-              <a:rPr lang="nb-NO" dirty="0"/>
-              <a:t> </a:t>
-            </a:r>
-            <a:r>
-              <a:rPr lang="nb-NO" dirty="0" err="1"/>
-              <a:t>the</a:t>
-            </a:r>
-            <a:r>
-              <a:rPr lang="nb-NO" dirty="0"/>
-              <a:t> B&amp;R </a:t>
-            </a:r>
-            <a:r>
-              <a:rPr lang="nb-NO" dirty="0" err="1"/>
-              <a:t>framework</a:t>
-            </a:r>
-            <a:endParaRPr lang="nb-NO" dirty="0"/>
-          </a:p>
-          <a:p>
-            <a:pPr lvl="1"/>
-            <a:r>
-              <a:rPr lang="nb-NO" dirty="0" err="1"/>
-              <a:t>Could</a:t>
-            </a:r>
-            <a:r>
-              <a:rPr lang="nb-NO" dirty="0"/>
-              <a:t> </a:t>
-            </a:r>
-            <a:r>
-              <a:rPr lang="nb-NO" dirty="0" err="1"/>
-              <a:t>we</a:t>
-            </a:r>
-            <a:r>
-              <a:rPr lang="nb-NO" dirty="0"/>
-              <a:t> still </a:t>
-            </a:r>
-            <a:r>
-              <a:rPr lang="nb-NO" dirty="0" err="1"/>
-              <a:t>use</a:t>
-            </a:r>
-            <a:r>
-              <a:rPr lang="nb-NO" dirty="0"/>
-              <a:t> it, or parts </a:t>
-            </a:r>
-            <a:r>
-              <a:rPr lang="nb-NO" dirty="0" err="1"/>
-              <a:t>of</a:t>
-            </a:r>
-            <a:r>
-              <a:rPr lang="nb-NO" dirty="0"/>
-              <a:t> it?</a:t>
-            </a:r>
-          </a:p>
-          <a:p>
-            <a:pPr lvl="1"/>
-            <a:r>
-              <a:rPr lang="nb-NO" dirty="0" err="1"/>
-              <a:t>Modify</a:t>
-            </a:r>
-            <a:r>
-              <a:rPr lang="nb-NO" dirty="0"/>
-              <a:t> to </a:t>
-            </a:r>
-            <a:r>
-              <a:rPr lang="nb-NO" dirty="0" err="1"/>
-              <a:t>reflect</a:t>
-            </a:r>
-            <a:r>
-              <a:rPr lang="nb-NO" dirty="0"/>
-              <a:t> policy </a:t>
-            </a:r>
-            <a:r>
-              <a:rPr lang="nb-NO" dirty="0" err="1"/>
-              <a:t>instead</a:t>
-            </a:r>
-            <a:r>
-              <a:rPr lang="nb-NO" dirty="0"/>
-              <a:t> </a:t>
-            </a:r>
-            <a:r>
-              <a:rPr lang="nb-NO" dirty="0" err="1"/>
-              <a:t>of</a:t>
-            </a:r>
-            <a:r>
-              <a:rPr lang="nb-NO" dirty="0"/>
-              <a:t> </a:t>
-            </a:r>
-            <a:r>
-              <a:rPr lang="nb-NO" dirty="0" err="1"/>
-              <a:t>profit</a:t>
-            </a:r>
-            <a:endParaRPr lang="nb-NO" dirty="0"/>
+              <a:t>?</a:t>
+            </a:r>
           </a:p>
         </p:txBody>
       </p:sp>
     </p:spTree>
     <p:extLst>
       <p:ext uri="{BB962C8B-B14F-4D97-AF65-F5344CB8AC3E}">
-        <p14:creationId xmlns:p14="http://schemas.microsoft.com/office/powerpoint/2010/main" val="1617147414"/>
+        <p14:creationId xmlns:p14="http://schemas.microsoft.com/office/powerpoint/2010/main" val="2984399082"/>
       </p:ext>
     </p:extLst>
   </p:cSld>
@@ -11304,7 +11371,7 @@
           <p:cNvPr id="2" name="Title 1">
             <a:extLst>
               <a:ext uri="{FF2B5EF4-FFF2-40B4-BE49-F238E27FC236}">
-                <a16:creationId xmlns:a16="http://schemas.microsoft.com/office/drawing/2014/main" id="{8F7DE2C9-4028-BD3B-031A-5F24D0CFF9FD}"/>
+                <a16:creationId xmlns:a16="http://schemas.microsoft.com/office/drawing/2014/main" id="{EDEC6D8A-B3ED-C6D2-8995-11FFFA77FFB4}"/>
               </a:ext>
             </a:extLst>
           </p:cNvPr>
@@ -11312,7 +11379,7 @@
             <a:spLocks noGrp="1"/>
           </p:cNvSpPr>
           <p:nvPr>
-            <p:ph type="ctrTitle"/>
+            <p:ph type="title"/>
           </p:nvPr>
         </p:nvSpPr>
         <p:spPr/>
@@ -11322,7 +11389,7 @@
           <a:p>
             <a:r>
               <a:rPr lang="nb-NO" dirty="0" err="1"/>
-              <a:t>Showcasing</a:t>
+              <a:t>Empirical</a:t>
             </a:r>
             <a:r>
               <a:rPr lang="nb-NO" dirty="0"/>
@@ -11330,26 +11397,29 @@
             </a:r>
             <a:r>
               <a:rPr lang="nb-NO" dirty="0" err="1"/>
-              <a:t>some</a:t>
+              <a:t>model</a:t>
             </a:r>
             <a:r>
               <a:rPr lang="nb-NO" dirty="0"/>
-              <a:t> </a:t>
+              <a:t>: </a:t>
             </a:r>
             <a:r>
               <a:rPr lang="nb-NO" dirty="0" err="1"/>
-              <a:t>results</a:t>
-            </a:r>
-            <a:endParaRPr lang="nb-NO" dirty="0"/>
+              <a:t>Bresnahan</a:t>
+            </a:r>
+            <a:r>
+              <a:rPr lang="nb-NO" dirty="0"/>
+              <a:t> &amp; Reiss</a:t>
+            </a:r>
           </a:p>
         </p:txBody>
       </p:sp>
       <p:sp>
         <p:nvSpPr>
-          <p:cNvPr id="5" name="Subtitle 4">
+          <p:cNvPr id="3" name="Content Placeholder 2">
             <a:extLst>
               <a:ext uri="{FF2B5EF4-FFF2-40B4-BE49-F238E27FC236}">
-                <a16:creationId xmlns:a16="http://schemas.microsoft.com/office/drawing/2014/main" id="{48FD0C09-8EFC-4C06-622E-779371764896}"/>
+                <a16:creationId xmlns:a16="http://schemas.microsoft.com/office/drawing/2014/main" id="{CE41D449-0059-29E8-257A-B1EEA512E592}"/>
               </a:ext>
             </a:extLst>
           </p:cNvPr>
@@ -11357,7 +11427,7 @@
             <a:spLocks noGrp="1"/>
           </p:cNvSpPr>
           <p:nvPr>
-            <p:ph type="subTitle" idx="1"/>
+            <p:ph idx="1"/>
           </p:nvPr>
         </p:nvSpPr>
         <p:spPr/>
@@ -11365,14 +11435,169 @@
           <a:bodyPr/>
           <a:lstStyle/>
           <a:p>
-            <a:endParaRPr lang="nb-NO"/>
+            <a:r>
+              <a:rPr lang="nb-NO" dirty="0"/>
+              <a:t>The </a:t>
+            </a:r>
+            <a:r>
+              <a:rPr lang="nb-NO" dirty="0" err="1"/>
+              <a:t>alcohol</a:t>
+            </a:r>
+            <a:r>
+              <a:rPr lang="nb-NO" dirty="0"/>
+              <a:t> </a:t>
+            </a:r>
+            <a:r>
+              <a:rPr lang="nb-NO" dirty="0" err="1"/>
+              <a:t>market</a:t>
+            </a:r>
+            <a:r>
+              <a:rPr lang="nb-NO" dirty="0"/>
+              <a:t> in Norway </a:t>
+            </a:r>
+            <a:r>
+              <a:rPr lang="nb-NO" dirty="0" err="1"/>
+              <a:t>violates</a:t>
+            </a:r>
+            <a:r>
+              <a:rPr lang="nb-NO" dirty="0"/>
+              <a:t> </a:t>
+            </a:r>
+            <a:r>
+              <a:rPr lang="nb-NO" dirty="0" err="1"/>
+              <a:t>some</a:t>
+            </a:r>
+            <a:r>
+              <a:rPr lang="nb-NO" dirty="0"/>
+              <a:t> </a:t>
+            </a:r>
+            <a:r>
+              <a:rPr lang="nb-NO" dirty="0" err="1"/>
+              <a:t>of</a:t>
+            </a:r>
+            <a:r>
+              <a:rPr lang="nb-NO" dirty="0"/>
+              <a:t> </a:t>
+            </a:r>
+            <a:r>
+              <a:rPr lang="nb-NO" dirty="0" err="1"/>
+              <a:t>the</a:t>
+            </a:r>
+            <a:r>
+              <a:rPr lang="nb-NO" dirty="0"/>
+              <a:t> </a:t>
+            </a:r>
+            <a:r>
+              <a:rPr lang="nb-NO" dirty="0" err="1"/>
+              <a:t>assumptions</a:t>
+            </a:r>
+            <a:r>
+              <a:rPr lang="nb-NO" dirty="0"/>
+              <a:t> </a:t>
+            </a:r>
+            <a:r>
+              <a:rPr lang="nb-NO" dirty="0" err="1"/>
+              <a:t>of</a:t>
+            </a:r>
+            <a:r>
+              <a:rPr lang="nb-NO" dirty="0"/>
+              <a:t> </a:t>
+            </a:r>
+            <a:r>
+              <a:rPr lang="nb-NO" dirty="0" err="1"/>
+              <a:t>the</a:t>
+            </a:r>
+            <a:r>
+              <a:rPr lang="nb-NO" dirty="0"/>
+              <a:t> B&amp;R </a:t>
+            </a:r>
+            <a:r>
+              <a:rPr lang="nb-NO" dirty="0" err="1"/>
+              <a:t>framework</a:t>
+            </a:r>
+            <a:endParaRPr lang="nb-NO" dirty="0"/>
+          </a:p>
+          <a:p>
+            <a:pPr lvl="1"/>
+            <a:r>
+              <a:rPr lang="nb-NO" dirty="0" err="1"/>
+              <a:t>Could</a:t>
+            </a:r>
+            <a:r>
+              <a:rPr lang="nb-NO" dirty="0"/>
+              <a:t> </a:t>
+            </a:r>
+            <a:r>
+              <a:rPr lang="nb-NO" dirty="0" err="1"/>
+              <a:t>we</a:t>
+            </a:r>
+            <a:r>
+              <a:rPr lang="nb-NO" dirty="0"/>
+              <a:t> still </a:t>
+            </a:r>
+            <a:r>
+              <a:rPr lang="nb-NO" dirty="0" err="1"/>
+              <a:t>use</a:t>
+            </a:r>
+            <a:r>
+              <a:rPr lang="nb-NO" dirty="0"/>
+              <a:t> it, or parts </a:t>
+            </a:r>
+            <a:r>
+              <a:rPr lang="nb-NO" dirty="0" err="1"/>
+              <a:t>of</a:t>
+            </a:r>
+            <a:r>
+              <a:rPr lang="nb-NO" dirty="0"/>
+              <a:t> it?</a:t>
+            </a:r>
+          </a:p>
+          <a:p>
+            <a:pPr lvl="1"/>
+            <a:r>
+              <a:rPr lang="nb-NO" dirty="0" err="1"/>
+              <a:t>Modify</a:t>
+            </a:r>
+            <a:r>
+              <a:rPr lang="nb-NO" dirty="0"/>
+              <a:t> to </a:t>
+            </a:r>
+            <a:r>
+              <a:rPr lang="nb-NO" dirty="0" err="1"/>
+              <a:t>reflect</a:t>
+            </a:r>
+            <a:r>
+              <a:rPr lang="nb-NO" dirty="0"/>
+              <a:t> policy </a:t>
+            </a:r>
+            <a:r>
+              <a:rPr lang="nb-NO" dirty="0" err="1"/>
+              <a:t>instead</a:t>
+            </a:r>
+            <a:r>
+              <a:rPr lang="nb-NO" dirty="0"/>
+              <a:t> </a:t>
+            </a:r>
+            <a:r>
+              <a:rPr lang="nb-NO" dirty="0" err="1"/>
+              <a:t>of</a:t>
+            </a:r>
+            <a:r>
+              <a:rPr lang="nb-NO" dirty="0"/>
+              <a:t> </a:t>
+            </a:r>
+            <a:r>
+              <a:rPr lang="nb-NO" dirty="0" err="1"/>
+              <a:t>profit</a:t>
+            </a:r>
+            <a:endParaRPr lang="nb-NO" dirty="0"/>
           </a:p>
         </p:txBody>
       </p:sp>
     </p:spTree>
     <p:extLst>
       <p:ext uri="{BB962C8B-B14F-4D97-AF65-F5344CB8AC3E}">
-        <p14:creationId xmlns:p14="http://schemas.microsoft.com/office/powerpoint/2010/main" val="2354535279"/>
+        <p14:creationId xmlns:p14="http://schemas.microsoft.com/office/powerpoint/2010/main" val="1617147414"/>
       </p:ext>
     </p:extLst>
   </p:cSld>
@@ -11385,14 +11610,6 @@
 <file path=ppt/slides/slide14.xml><?xml version="1.0" encoding="utf-8"?>
 <p:sld xmlns:a="http://schemas.openxmlformats.org/drawingml/2006/main" xmlns:r="http://schemas.openxmlformats.org/officeDocument/2006/relationships" xmlns:p="http://schemas.openxmlformats.org/presentationml/2006/main">
   <p:cSld>
-    <p:bg>
-      <p:bgPr>
-        <a:solidFill>
-          <a:schemeClr val="bg1"/>
-        </a:solidFill>
-        <a:effectLst/>
-      </p:bgPr>
-    </p:bg>
     <p:spTree>
       <p:nvGrpSpPr>
         <p:cNvPr id="1" name=""/>
@@ -11407,295 +11624,12 @@
           <a:chExt cx="0" cy="0"/>
         </a:xfrm>
       </p:grpSpPr>
-      <p:sp useBgFill="1">
-        <p:nvSpPr>
-          <p:cNvPr id="60" name="Rectangle 59">
-            <a:extLst>
-              <a:ext uri="{FF2B5EF4-FFF2-40B4-BE49-F238E27FC236}">
-                <a16:creationId xmlns:a16="http://schemas.microsoft.com/office/drawing/2014/main" id="{6EFC920F-B85A-4068-BD93-41064EDE93D3}"/>
-              </a:ext>
-              <a:ext uri="{C183D7F6-B498-43B3-948B-1728B52AA6E4}">
-                <adec:decorative xmlns:adec="http://schemas.microsoft.com/office/drawing/2017/decorative" val="1"/>
-              </a:ext>
-            </a:extLst>
-          </p:cNvPr>
-          <p:cNvSpPr>
-            <a:spLocks noGrp="1" noRot="1" noChangeAspect="1" noMove="1" noResize="1" noEditPoints="1" noAdjustHandles="1" noChangeArrowheads="1" noChangeShapeType="1" noTextEdit="1"/>
-          </p:cNvSpPr>
-          <p:nvPr>
-            <p:extLst>
-              <p:ext uri="{386F3935-93C4-4BCD-93E2-E3B085C9AB24}">
-                <p16:designElem xmlns:p16="http://schemas.microsoft.com/office/powerpoint/2015/main" val="1"/>
-              </p:ext>
-            </p:extLst>
-          </p:nvPr>
-        </p:nvSpPr>
-        <p:spPr>
-          <a:xfrm>
-            <a:off x="0" y="0"/>
-            <a:ext cx="12191999" cy="6857365"/>
-          </a:xfrm>
-          <a:prstGeom prst="rect">
-            <a:avLst/>
-          </a:prstGeom>
-          <a:ln>
-            <a:noFill/>
-          </a:ln>
-        </p:spPr>
-        <p:style>
-          <a:lnRef idx="2">
-            <a:schemeClr val="accent1">
-              <a:shade val="50000"/>
-            </a:schemeClr>
-          </a:lnRef>
-          <a:fillRef idx="1">
-            <a:schemeClr val="accent1"/>
-          </a:fillRef>
-          <a:effectRef idx="0">
-            <a:schemeClr val="accent1"/>
-          </a:effectRef>
-          <a:fontRef idx="minor">
-            <a:schemeClr val="lt1"/>
-          </a:fontRef>
-        </p:style>
-        <p:txBody>
-          <a:bodyPr rtlCol="0" anchor="ctr"/>
-          <a:lstStyle/>
-          <a:p>
-            <a:pPr algn="ctr"/>
-            <a:endParaRPr lang="en-US"/>
-          </a:p>
-        </p:txBody>
-      </p:sp>
-      <p:grpSp>
-        <p:nvGrpSpPr>
-          <p:cNvPr id="62" name="Group 61">
-            <a:extLst>
-              <a:ext uri="{FF2B5EF4-FFF2-40B4-BE49-F238E27FC236}">
-                <a16:creationId xmlns:a16="http://schemas.microsoft.com/office/drawing/2014/main" id="{1C559108-BBAE-426C-8564-051D2BA6DDC8}"/>
-              </a:ext>
-              <a:ext uri="{C183D7F6-B498-43B3-948B-1728B52AA6E4}">
-                <adec:decorative xmlns:adec="http://schemas.microsoft.com/office/drawing/2017/decorative" val="1"/>
-              </a:ext>
-            </a:extLst>
-          </p:cNvPr>
-          <p:cNvGrpSpPr>
-            <a:grpSpLocks noGrp="1" noUngrp="1" noRot="1" noChangeAspect="1" noMove="1" noResize="1"/>
-          </p:cNvGrpSpPr>
-          <p:nvPr>
-            <p:extLst>
-              <p:ext uri="{386F3935-93C4-4BCD-93E2-E3B085C9AB24}">
-                <p16:designElem xmlns:p16="http://schemas.microsoft.com/office/powerpoint/2015/main" val="1"/>
-              </p:ext>
-            </p:extLst>
-          </p:nvPr>
-        </p:nvGrpSpPr>
-        <p:grpSpPr>
-          <a:xfrm rot="5400000">
-            <a:off x="-2340441" y="2666183"/>
-            <a:ext cx="5860051" cy="527712"/>
-            <a:chOff x="6081624" y="1998368"/>
-            <a:chExt cx="5613457" cy="782175"/>
-          </a:xfrm>
-          <a:solidFill>
-            <a:schemeClr val="accent4"/>
-          </a:solidFill>
-        </p:grpSpPr>
-        <p:sp>
-          <p:nvSpPr>
-            <p:cNvPr id="63" name="Rectangle 62">
-              <a:extLst>
-                <a:ext uri="{FF2B5EF4-FFF2-40B4-BE49-F238E27FC236}">
-                  <a16:creationId xmlns:a16="http://schemas.microsoft.com/office/drawing/2014/main" id="{42BC35EE-6650-42D2-AEFB-4B7CD1AFC9BD}"/>
-                </a:ext>
-                <a:ext uri="{C183D7F6-B498-43B3-948B-1728B52AA6E4}">
-                  <adec:decorative xmlns:adec="http://schemas.microsoft.com/office/drawing/2017/decorative" val="1"/>
-                </a:ext>
-              </a:extLst>
-            </p:cNvPr>
-            <p:cNvSpPr/>
-            <p:nvPr>
-              <p:extLst>
-                <p:ext uri="{386F3935-93C4-4BCD-93E2-E3B085C9AB24}">
-                  <p16:designElem xmlns:p16="http://schemas.microsoft.com/office/powerpoint/2015/main" val="1"/>
-                </p:ext>
-              </p:extLst>
-            </p:nvPr>
-          </p:nvSpPr>
-          <p:spPr>
-            <a:xfrm rot="5400000">
-              <a:off x="11228040" y="2313027"/>
-              <a:ext cx="781700" cy="152382"/>
-            </a:xfrm>
-            <a:prstGeom prst="rect">
-              <a:avLst/>
-            </a:prstGeom>
-            <a:grpFill/>
-            <a:ln>
-              <a:noFill/>
-            </a:ln>
-          </p:spPr>
-          <p:style>
-            <a:lnRef idx="2">
-              <a:schemeClr val="accent1">
-                <a:shade val="50000"/>
-              </a:schemeClr>
-            </a:lnRef>
-            <a:fillRef idx="1">
-              <a:schemeClr val="accent1"/>
-            </a:fillRef>
-            <a:effectRef idx="0">
-              <a:schemeClr val="accent1"/>
-            </a:effectRef>
-            <a:fontRef idx="minor">
-              <a:schemeClr val="lt1"/>
-            </a:fontRef>
-          </p:style>
-          <p:txBody>
-            <a:bodyPr rtlCol="0" anchor="ctr"/>
-            <a:lstStyle/>
-            <a:p>
-              <a:pPr algn="ctr"/>
-              <a:endParaRPr lang="en-US"/>
-            </a:p>
-          </p:txBody>
-        </p:sp>
-        <p:sp>
-          <p:nvSpPr>
-            <p:cNvPr id="64" name="Rectangle 63">
-              <a:extLst>
-                <a:ext uri="{FF2B5EF4-FFF2-40B4-BE49-F238E27FC236}">
-                  <a16:creationId xmlns:a16="http://schemas.microsoft.com/office/drawing/2014/main" id="{0952C743-9049-4DFB-878B-2AB07B6E4FD1}"/>
-                </a:ext>
-                <a:ext uri="{C183D7F6-B498-43B3-948B-1728B52AA6E4}">
-                  <adec:decorative xmlns:adec="http://schemas.microsoft.com/office/drawing/2017/decorative" val="1"/>
-                </a:ext>
-              </a:extLst>
-            </p:cNvPr>
-            <p:cNvSpPr/>
-            <p:nvPr>
-              <p:extLst>
-                <p:ext uri="{386F3935-93C4-4BCD-93E2-E3B085C9AB24}">
-                  <p16:designElem xmlns:p16="http://schemas.microsoft.com/office/powerpoint/2015/main" val="1"/>
-                </p:ext>
-              </p:extLst>
-            </p:nvPr>
-          </p:nvSpPr>
-          <p:spPr>
-            <a:xfrm flipH="1" flipV="1">
-              <a:off x="6081624" y="1998844"/>
-              <a:ext cx="5372968" cy="781699"/>
-            </a:xfrm>
-            <a:prstGeom prst="rect">
-              <a:avLst/>
-            </a:prstGeom>
-            <a:grpFill/>
-            <a:ln>
-              <a:noFill/>
-            </a:ln>
-          </p:spPr>
-          <p:style>
-            <a:lnRef idx="2">
-              <a:schemeClr val="accent1">
-                <a:shade val="50000"/>
-              </a:schemeClr>
-            </a:lnRef>
-            <a:fillRef idx="1">
-              <a:schemeClr val="accent1"/>
-            </a:fillRef>
-            <a:effectRef idx="0">
-              <a:schemeClr val="accent1"/>
-            </a:effectRef>
-            <a:fontRef idx="minor">
-              <a:schemeClr val="lt1"/>
-            </a:fontRef>
-          </p:style>
-          <p:txBody>
-            <a:bodyPr rtlCol="0" anchor="ctr"/>
-            <a:lstStyle/>
-            <a:p>
-              <a:pPr algn="ctr"/>
-              <a:endParaRPr lang="en-US"/>
-            </a:p>
-          </p:txBody>
-        </p:sp>
-      </p:grpSp>
-      <p:sp>
-        <p:nvSpPr>
-          <p:cNvPr id="66" name="Rectangle 65">
-            <a:extLst>
-              <a:ext uri="{FF2B5EF4-FFF2-40B4-BE49-F238E27FC236}">
-                <a16:creationId xmlns:a16="http://schemas.microsoft.com/office/drawing/2014/main" id="{CBC4F608-B4B8-48C3-9572-C0F061B1CD99}"/>
-              </a:ext>
-              <a:ext uri="{C183D7F6-B498-43B3-948B-1728B52AA6E4}">
-                <adec:decorative xmlns:adec="http://schemas.microsoft.com/office/drawing/2017/decorative" val="1"/>
-              </a:ext>
-            </a:extLst>
-          </p:cNvPr>
-          <p:cNvSpPr>
-            <a:spLocks noGrp="1" noRot="1" noChangeAspect="1" noMove="1" noResize="1" noEditPoints="1" noAdjustHandles="1" noChangeArrowheads="1" noChangeShapeType="1" noTextEdit="1"/>
-          </p:cNvSpPr>
-          <p:nvPr>
-            <p:extLst>
-              <p:ext uri="{386F3935-93C4-4BCD-93E2-E3B085C9AB24}">
-                <p16:designElem xmlns:p16="http://schemas.microsoft.com/office/powerpoint/2015/main" val="1"/>
-              </p:ext>
-            </p:extLst>
-          </p:nvPr>
-        </p:nvSpPr>
-        <p:spPr>
-          <a:xfrm>
-            <a:off x="579528" y="922919"/>
-            <a:ext cx="11111729" cy="5461252"/>
-          </a:xfrm>
-          <a:prstGeom prst="rect">
-            <a:avLst/>
-          </a:prstGeom>
-          <a:solidFill>
-            <a:schemeClr val="bg1"/>
-          </a:solidFill>
-          <a:ln>
-            <a:noFill/>
-          </a:ln>
-          <a:effectLst>
-            <a:outerShdw blurRad="139700" dist="127000" dir="5400000" algn="t" rotWithShape="0">
-              <a:prstClr val="black">
-                <a:alpha val="15000"/>
-              </a:prstClr>
-            </a:outerShdw>
-          </a:effectLst>
-        </p:spPr>
-        <p:style>
-          <a:lnRef idx="2">
-            <a:schemeClr val="accent1">
-              <a:shade val="50000"/>
-            </a:schemeClr>
-          </a:lnRef>
-          <a:fillRef idx="1">
-            <a:schemeClr val="accent1"/>
-          </a:fillRef>
-          <a:effectRef idx="0">
-            <a:schemeClr val="accent1"/>
-          </a:effectRef>
-          <a:fontRef idx="minor">
-            <a:schemeClr val="lt1"/>
-          </a:fontRef>
-        </p:style>
-        <p:txBody>
-          <a:bodyPr rtlCol="0" anchor="ctr"/>
-          <a:lstStyle/>
-          <a:p>
-            <a:pPr algn="ctr"/>
-            <a:endParaRPr lang="en-US"/>
-          </a:p>
-        </p:txBody>
-      </p:sp>
       <p:sp>
         <p:nvSpPr>
           <p:cNvPr id="2" name="Title 1">
             <a:extLst>
               <a:ext uri="{FF2B5EF4-FFF2-40B4-BE49-F238E27FC236}">
-                <a16:creationId xmlns:a16="http://schemas.microsoft.com/office/drawing/2014/main" id="{DA83A18E-F38B-FEA7-A82C-9FDADD548F88}"/>
+                <a16:creationId xmlns:a16="http://schemas.microsoft.com/office/drawing/2014/main" id="{8F7DE2C9-4028-BD3B-031A-5F24D0CFF9FD}"/>
               </a:ext>
             </a:extLst>
           </p:cNvPr>
@@ -11703,113 +11637,44 @@
             <a:spLocks noGrp="1"/>
           </p:cNvSpPr>
           <p:nvPr>
-            <p:ph type="title"/>
+            <p:ph type="ctrTitle"/>
           </p:nvPr>
         </p:nvSpPr>
-        <p:spPr>
-          <a:xfrm>
-            <a:off x="1099425" y="1238081"/>
-            <a:ext cx="4709345" cy="962953"/>
-          </a:xfrm>
-        </p:spPr>
+        <p:spPr/>
         <p:txBody>
-          <a:bodyPr anchor="b">
-            <a:normAutofit/>
-          </a:bodyPr>
+          <a:bodyPr/>
           <a:lstStyle/>
           <a:p>
             <a:r>
-              <a:rPr lang="nb-NO" sz="2900" dirty="0"/>
-              <a:t>Linear </a:t>
-            </a:r>
-            <a:r>
-              <a:rPr lang="nb-NO" sz="2900" dirty="0" err="1"/>
-              <a:t>regression</a:t>
-            </a:r>
-            <a:r>
-              <a:rPr lang="nb-NO" sz="2900" dirty="0"/>
-              <a:t>, full and </a:t>
-            </a:r>
-            <a:r>
-              <a:rPr lang="nb-NO" sz="2900" dirty="0" err="1"/>
-              <a:t>constricted</a:t>
-            </a:r>
-            <a:r>
-              <a:rPr lang="nb-NO" sz="2900" dirty="0"/>
-              <a:t> data</a:t>
-            </a:r>
+              <a:rPr lang="nb-NO" dirty="0" err="1"/>
+              <a:t>Showcasing</a:t>
+            </a:r>
+            <a:r>
+              <a:rPr lang="nb-NO" dirty="0"/>
+              <a:t> </a:t>
+            </a:r>
+            <a:r>
+              <a:rPr lang="nb-NO" dirty="0" err="1"/>
+              <a:t>some</a:t>
+            </a:r>
+            <a:r>
+              <a:rPr lang="nb-NO" dirty="0"/>
+              <a:t> </a:t>
+            </a:r>
+            <a:r>
+              <a:rPr lang="nb-NO" dirty="0" err="1"/>
+              <a:t>results</a:t>
+            </a:r>
+            <a:endParaRPr lang="nb-NO" dirty="0"/>
           </a:p>
         </p:txBody>
       </p:sp>
       <p:sp>
         <p:nvSpPr>
-          <p:cNvPr id="68" name="Rectangle 67">
+          <p:cNvPr id="5" name="Subtitle 4">
             <a:extLst>
               <a:ext uri="{FF2B5EF4-FFF2-40B4-BE49-F238E27FC236}">
-                <a16:creationId xmlns:a16="http://schemas.microsoft.com/office/drawing/2014/main" id="{1382A32C-5B0C-4B1C-A074-76C6DBCC9F87}"/>
-              </a:ext>
-              <a:ext uri="{C183D7F6-B498-43B3-948B-1728B52AA6E4}">
-                <adec:decorative xmlns:adec="http://schemas.microsoft.com/office/drawing/2017/decorative" val="1"/>
-              </a:ext>
-            </a:extLst>
-          </p:cNvPr>
-          <p:cNvSpPr>
-            <a:spLocks noGrp="1" noRot="1" noChangeAspect="1" noMove="1" noResize="1" noEditPoints="1" noAdjustHandles="1" noChangeArrowheads="1" noChangeShapeType="1" noTextEdit="1"/>
-          </p:cNvSpPr>
-          <p:nvPr>
-            <p:extLst>
-              <p:ext uri="{386F3935-93C4-4BCD-93E2-E3B085C9AB24}">
-                <p16:designElem xmlns:p16="http://schemas.microsoft.com/office/powerpoint/2015/main" val="1"/>
-              </p:ext>
-            </p:extLst>
-          </p:nvPr>
-        </p:nvSpPr>
-        <p:spPr>
-          <a:xfrm flipH="1">
-            <a:off x="1139885" y="2372170"/>
-            <a:ext cx="4389120" cy="27432"/>
-          </a:xfrm>
-          <a:prstGeom prst="rect">
-            <a:avLst/>
-          </a:prstGeom>
-          <a:solidFill>
-            <a:schemeClr val="accent4"/>
-          </a:solidFill>
-          <a:ln>
-            <a:noFill/>
-          </a:ln>
-        </p:spPr>
-        <p:style>
-          <a:lnRef idx="2">
-            <a:schemeClr val="accent1">
-              <a:shade val="50000"/>
-            </a:schemeClr>
-          </a:lnRef>
-          <a:fillRef idx="1">
-            <a:schemeClr val="accent1"/>
-          </a:fillRef>
-          <a:effectRef idx="0">
-            <a:schemeClr val="accent1"/>
-          </a:effectRef>
-          <a:fontRef idx="minor">
-            <a:schemeClr val="lt1"/>
-          </a:fontRef>
-        </p:style>
-        <p:txBody>
-          <a:bodyPr rtlCol="0" anchor="ctr"/>
-          <a:lstStyle/>
-          <a:p>
-            <a:pPr algn="ctr"/>
-            <a:endParaRPr lang="en-US"/>
-          </a:p>
-        </p:txBody>
-      </p:sp>
-      <p:sp>
-        <p:nvSpPr>
-          <p:cNvPr id="3" name="Content Placeholder 2">
-            <a:extLst>
-              <a:ext uri="{FF2B5EF4-FFF2-40B4-BE49-F238E27FC236}">
-                <a16:creationId xmlns:a16="http://schemas.microsoft.com/office/drawing/2014/main" id="{1052C69E-F9FD-C41B-D5C3-DE7535BDA7C4}"/>
+                <a16:creationId xmlns:a16="http://schemas.microsoft.com/office/drawing/2014/main" id="{48FD0C09-8EFC-4C06-622E-779371764896}"/>
               </a:ext>
             </a:extLst>
           </p:cNvPr>
@@ -11817,190 +11682,22 @@
             <a:spLocks noGrp="1"/>
           </p:cNvSpPr>
           <p:nvPr>
-            <p:ph idx="1"/>
+            <p:ph type="subTitle" idx="1"/>
           </p:nvPr>
         </p:nvSpPr>
-        <p:spPr>
-          <a:xfrm>
-            <a:off x="1100736" y="2508105"/>
-            <a:ext cx="4709345" cy="3632493"/>
-          </a:xfrm>
-        </p:spPr>
+        <p:spPr/>
         <p:txBody>
-          <a:bodyPr anchor="ctr">
-            <a:normAutofit/>
-          </a:bodyPr>
+          <a:bodyPr/>
           <a:lstStyle/>
           <a:p>
-            <a:r>
-              <a:rPr lang="nb-NO" sz="2000" dirty="0"/>
-              <a:t>R^2 </a:t>
-            </a:r>
-            <a:r>
-              <a:rPr lang="nb-NO" sz="2000" dirty="0" err="1"/>
-              <a:t>decreases</a:t>
-            </a:r>
-            <a:r>
-              <a:rPr lang="nb-NO" sz="2000" dirty="0"/>
-              <a:t> </a:t>
-            </a:r>
-            <a:r>
-              <a:rPr lang="nb-NO" sz="2000" dirty="0" err="1"/>
-              <a:t>significantly</a:t>
-            </a:r>
-            <a:r>
-              <a:rPr lang="nb-NO" sz="2000" dirty="0"/>
-              <a:t> </a:t>
-            </a:r>
-            <a:r>
-              <a:rPr lang="nb-NO" sz="2000" dirty="0" err="1"/>
-              <a:t>after</a:t>
-            </a:r>
-            <a:r>
-              <a:rPr lang="nb-NO" sz="2000" dirty="0"/>
-              <a:t> </a:t>
-            </a:r>
-            <a:r>
-              <a:rPr lang="nb-NO" sz="2000" dirty="0" err="1"/>
-              <a:t>removing</a:t>
-            </a:r>
-            <a:r>
-              <a:rPr lang="nb-NO" sz="2000" dirty="0"/>
-              <a:t> </a:t>
-            </a:r>
-            <a:r>
-              <a:rPr lang="nb-NO" sz="2000" dirty="0" err="1"/>
-              <a:t>the</a:t>
-            </a:r>
-            <a:r>
-              <a:rPr lang="nb-NO" sz="2000" dirty="0"/>
-              <a:t> 4 </a:t>
-            </a:r>
-            <a:r>
-              <a:rPr lang="nb-NO" sz="2000" dirty="0" err="1"/>
-              <a:t>largest</a:t>
-            </a:r>
-            <a:r>
-              <a:rPr lang="nb-NO" sz="2000" dirty="0"/>
-              <a:t> </a:t>
-            </a:r>
-            <a:r>
-              <a:rPr lang="nb-NO" sz="2000" dirty="0" err="1"/>
-              <a:t>cities</a:t>
-            </a:r>
-            <a:endParaRPr lang="nb-NO" sz="2000" dirty="0"/>
-          </a:p>
-          <a:p>
-            <a:r>
-              <a:rPr lang="nb-NO" sz="2000" dirty="0"/>
-              <a:t>Variables </a:t>
-            </a:r>
-            <a:r>
-              <a:rPr lang="nb-NO" sz="2000" dirty="0" err="1"/>
-              <a:t>other</a:t>
-            </a:r>
-            <a:r>
-              <a:rPr lang="nb-NO" sz="2000" dirty="0"/>
-              <a:t> </a:t>
-            </a:r>
-            <a:r>
-              <a:rPr lang="nb-NO" sz="2000" dirty="0" err="1"/>
-              <a:t>than</a:t>
-            </a:r>
-            <a:r>
-              <a:rPr lang="nb-NO" sz="2000" dirty="0"/>
-              <a:t> </a:t>
-            </a:r>
-            <a:r>
-              <a:rPr lang="nb-NO" sz="2000" dirty="0" err="1"/>
-              <a:t>population</a:t>
-            </a:r>
-            <a:r>
-              <a:rPr lang="nb-NO" sz="2000" dirty="0"/>
-              <a:t> </a:t>
-            </a:r>
-            <a:r>
-              <a:rPr lang="nb-NO" sz="2000" dirty="0" err="1"/>
-              <a:t>can</a:t>
-            </a:r>
-            <a:r>
-              <a:rPr lang="nb-NO" sz="2000" dirty="0"/>
-              <a:t> have an </a:t>
-            </a:r>
-            <a:r>
-              <a:rPr lang="nb-NO" sz="2000" dirty="0" err="1"/>
-              <a:t>effect</a:t>
-            </a:r>
-            <a:endParaRPr lang="nb-NO" sz="2000" dirty="0"/>
-          </a:p>
-          <a:p>
-            <a:r>
-              <a:rPr lang="nb-NO" sz="2000" dirty="0" err="1"/>
-              <a:t>Tourism</a:t>
-            </a:r>
-            <a:r>
-              <a:rPr lang="nb-NO" sz="2000" dirty="0"/>
-              <a:t> has a positive </a:t>
-            </a:r>
-            <a:r>
-              <a:rPr lang="nb-NO" sz="2000" dirty="0" err="1"/>
-              <a:t>significant</a:t>
-            </a:r>
-            <a:r>
-              <a:rPr lang="nb-NO" sz="2000" dirty="0"/>
-              <a:t> </a:t>
-            </a:r>
-            <a:r>
-              <a:rPr lang="nb-NO" sz="2000" dirty="0" err="1"/>
-              <a:t>effect</a:t>
-            </a:r>
-            <a:endParaRPr lang="nb-NO" sz="2000" dirty="0"/>
-          </a:p>
-          <a:p>
-            <a:r>
-              <a:rPr lang="nb-NO" sz="2000" dirty="0" err="1"/>
-              <a:t>Scale</a:t>
-            </a:r>
-            <a:r>
-              <a:rPr lang="nb-NO" sz="2000" dirty="0"/>
-              <a:t> data?</a:t>
-            </a:r>
+            <a:endParaRPr lang="nb-NO"/>
           </a:p>
         </p:txBody>
       </p:sp>
-      <p:pic>
-        <p:nvPicPr>
-          <p:cNvPr id="8" name="Picture 7">
-            <a:extLst>
-              <a:ext uri="{FF2B5EF4-FFF2-40B4-BE49-F238E27FC236}">
-                <a16:creationId xmlns:a16="http://schemas.microsoft.com/office/drawing/2014/main" id="{A277001E-0B3D-7535-8820-C747854E9D1A}"/>
-              </a:ext>
-            </a:extLst>
-          </p:cNvPr>
-          <p:cNvPicPr>
-            <a:picLocks noChangeAspect="1"/>
-          </p:cNvPicPr>
-          <p:nvPr/>
-        </p:nvPicPr>
-        <p:blipFill>
-          <a:blip r:embed="rId2"/>
-          <a:srcRect l="979" r="309" b="1"/>
-          <a:stretch/>
-        </p:blipFill>
-        <p:spPr>
-          <a:xfrm>
-            <a:off x="6538366" y="1383738"/>
-            <a:ext cx="4929098" cy="4756870"/>
-          </a:xfrm>
-          <a:prstGeom prst="rect">
-            <a:avLst/>
-          </a:prstGeom>
-        </p:spPr>
-      </p:pic>
     </p:spTree>
     <p:extLst>
       <p:ext uri="{BB962C8B-B14F-4D97-AF65-F5344CB8AC3E}">
-        <p14:creationId xmlns:p14="http://schemas.microsoft.com/office/powerpoint/2010/main" val="3591823627"/>
+        <p14:creationId xmlns:p14="http://schemas.microsoft.com/office/powerpoint/2010/main" val="2354535279"/>
       </p:ext>
     </p:extLst>
   </p:cSld>
@@ -12035,6 +11732,495 @@
           <a:chExt cx="0" cy="0"/>
         </a:xfrm>
       </p:grpSpPr>
+      <p:sp useBgFill="1">
+        <p:nvSpPr>
+          <p:cNvPr id="73" name="Rectangle 72">
+            <a:extLst>
+              <a:ext uri="{FF2B5EF4-FFF2-40B4-BE49-F238E27FC236}">
+                <a16:creationId xmlns:a16="http://schemas.microsoft.com/office/drawing/2014/main" id="{743AA782-23D1-4521-8CAD-47662984AA08}"/>
+              </a:ext>
+              <a:ext uri="{C183D7F6-B498-43B3-948B-1728B52AA6E4}">
+                <adec:decorative xmlns:adec="http://schemas.microsoft.com/office/drawing/2017/decorative" val="1"/>
+              </a:ext>
+            </a:extLst>
+          </p:cNvPr>
+          <p:cNvSpPr>
+            <a:spLocks noGrp="1" noRot="1" noChangeAspect="1" noMove="1" noResize="1" noEditPoints="1" noAdjustHandles="1" noChangeArrowheads="1" noChangeShapeType="1" noTextEdit="1"/>
+          </p:cNvSpPr>
+          <p:nvPr>
+            <p:extLst>
+              <p:ext uri="{386F3935-93C4-4BCD-93E2-E3B085C9AB24}">
+                <p16:designElem xmlns:p16="http://schemas.microsoft.com/office/powerpoint/2015/main" val="1"/>
+              </p:ext>
+            </p:extLst>
+          </p:nvPr>
+        </p:nvSpPr>
+        <p:spPr>
+          <a:xfrm>
+            <a:off x="0" y="0"/>
+            <a:ext cx="12192000" cy="6858000"/>
+          </a:xfrm>
+          <a:prstGeom prst="rect">
+            <a:avLst/>
+          </a:prstGeom>
+          <a:ln>
+            <a:noFill/>
+          </a:ln>
+        </p:spPr>
+        <p:style>
+          <a:lnRef idx="2">
+            <a:schemeClr val="accent1">
+              <a:shade val="50000"/>
+            </a:schemeClr>
+          </a:lnRef>
+          <a:fillRef idx="1">
+            <a:schemeClr val="accent1"/>
+          </a:fillRef>
+          <a:effectRef idx="0">
+            <a:schemeClr val="accent1"/>
+          </a:effectRef>
+          <a:fontRef idx="minor">
+            <a:schemeClr val="lt1"/>
+          </a:fontRef>
+        </p:style>
+        <p:txBody>
+          <a:bodyPr rtlCol="0" anchor="ctr"/>
+          <a:lstStyle/>
+          <a:p>
+            <a:pPr algn="ctr"/>
+            <a:endParaRPr lang="en-US"/>
+          </a:p>
+        </p:txBody>
+      </p:sp>
+      <p:sp>
+        <p:nvSpPr>
+          <p:cNvPr id="2" name="Title 1">
+            <a:extLst>
+              <a:ext uri="{FF2B5EF4-FFF2-40B4-BE49-F238E27FC236}">
+                <a16:creationId xmlns:a16="http://schemas.microsoft.com/office/drawing/2014/main" id="{DA83A18E-F38B-FEA7-A82C-9FDADD548F88}"/>
+              </a:ext>
+            </a:extLst>
+          </p:cNvPr>
+          <p:cNvSpPr>
+            <a:spLocks noGrp="1"/>
+          </p:cNvSpPr>
+          <p:nvPr>
+            <p:ph type="title"/>
+          </p:nvPr>
+        </p:nvSpPr>
+        <p:spPr>
+          <a:xfrm>
+            <a:off x="630936" y="640080"/>
+            <a:ext cx="4818888" cy="1481328"/>
+          </a:xfrm>
+        </p:spPr>
+        <p:txBody>
+          <a:bodyPr anchor="b">
+            <a:normAutofit/>
+          </a:bodyPr>
+          <a:lstStyle/>
+          <a:p>
+            <a:r>
+              <a:rPr lang="nb-NO" sz="4200"/>
+              <a:t>Linear regression, full and constricted data</a:t>
+            </a:r>
+          </a:p>
+        </p:txBody>
+      </p:sp>
+      <p:sp>
+        <p:nvSpPr>
+          <p:cNvPr id="75" name="sketch line">
+            <a:extLst>
+              <a:ext uri="{FF2B5EF4-FFF2-40B4-BE49-F238E27FC236}">
+                <a16:creationId xmlns:a16="http://schemas.microsoft.com/office/drawing/2014/main" id="{650D18FE-0824-4A46-B22C-A86B52E5780A}"/>
+              </a:ext>
+              <a:ext uri="{C183D7F6-B498-43B3-948B-1728B52AA6E4}">
+                <adec:decorative xmlns:adec="http://schemas.microsoft.com/office/drawing/2017/decorative" val="1"/>
+              </a:ext>
+            </a:extLst>
+          </p:cNvPr>
+          <p:cNvSpPr>
+            <a:spLocks noGrp="1" noRot="1" noChangeAspect="1" noMove="1" noResize="1" noEditPoints="1" noAdjustHandles="1" noChangeArrowheads="1" noChangeShapeType="1" noTextEdit="1"/>
+          </p:cNvSpPr>
+          <p:nvPr>
+            <p:extLst>
+              <p:ext uri="{386F3935-93C4-4BCD-93E2-E3B085C9AB24}">
+                <p16:designElem xmlns:p16="http://schemas.microsoft.com/office/powerpoint/2015/main" val="1"/>
+              </p:ext>
+            </p:extLst>
+          </p:nvPr>
+        </p:nvSpPr>
+        <p:spPr>
+          <a:xfrm>
+            <a:off x="643278" y="2372868"/>
+            <a:ext cx="3255095" cy="18288"/>
+          </a:xfrm>
+          <a:custGeom>
+            <a:avLst/>
+            <a:gdLst>
+              <a:gd name="connsiteX0" fmla="*/ 0 w 3255095"/>
+              <a:gd name="connsiteY0" fmla="*/ 0 h 18288"/>
+              <a:gd name="connsiteX1" fmla="*/ 618468 w 3255095"/>
+              <a:gd name="connsiteY1" fmla="*/ 0 h 18288"/>
+              <a:gd name="connsiteX2" fmla="*/ 1269487 w 3255095"/>
+              <a:gd name="connsiteY2" fmla="*/ 0 h 18288"/>
+              <a:gd name="connsiteX3" fmla="*/ 1953057 w 3255095"/>
+              <a:gd name="connsiteY3" fmla="*/ 0 h 18288"/>
+              <a:gd name="connsiteX4" fmla="*/ 2636627 w 3255095"/>
+              <a:gd name="connsiteY4" fmla="*/ 0 h 18288"/>
+              <a:gd name="connsiteX5" fmla="*/ 3255095 w 3255095"/>
+              <a:gd name="connsiteY5" fmla="*/ 0 h 18288"/>
+              <a:gd name="connsiteX6" fmla="*/ 3255095 w 3255095"/>
+              <a:gd name="connsiteY6" fmla="*/ 18288 h 18288"/>
+              <a:gd name="connsiteX7" fmla="*/ 2538974 w 3255095"/>
+              <a:gd name="connsiteY7" fmla="*/ 18288 h 18288"/>
+              <a:gd name="connsiteX8" fmla="*/ 1822853 w 3255095"/>
+              <a:gd name="connsiteY8" fmla="*/ 18288 h 18288"/>
+              <a:gd name="connsiteX9" fmla="*/ 1171834 w 3255095"/>
+              <a:gd name="connsiteY9" fmla="*/ 18288 h 18288"/>
+              <a:gd name="connsiteX10" fmla="*/ 0 w 3255095"/>
+              <a:gd name="connsiteY10" fmla="*/ 18288 h 18288"/>
+              <a:gd name="connsiteX11" fmla="*/ 0 w 3255095"/>
+              <a:gd name="connsiteY11" fmla="*/ 0 h 18288"/>
+            </a:gdLst>
+            <a:ahLst/>
+            <a:cxnLst>
+              <a:cxn ang="0">
+                <a:pos x="connsiteX0" y="connsiteY0"/>
+              </a:cxn>
+              <a:cxn ang="0">
+                <a:pos x="connsiteX1" y="connsiteY1"/>
+              </a:cxn>
+              <a:cxn ang="0">
+                <a:pos x="connsiteX2" y="connsiteY2"/>
+              </a:cxn>
+              <a:cxn ang="0">
+                <a:pos x="connsiteX3" y="connsiteY3"/>
+              </a:cxn>
+              <a:cxn ang="0">
+                <a:pos x="connsiteX4" y="connsiteY4"/>
+              </a:cxn>
+              <a:cxn ang="0">
+                <a:pos x="connsiteX5" y="connsiteY5"/>
+              </a:cxn>
+              <a:cxn ang="0">
+                <a:pos x="connsiteX6" y="connsiteY6"/>
+              </a:cxn>
+              <a:cxn ang="0">
+                <a:pos x="connsiteX7" y="connsiteY7"/>
+              </a:cxn>
+              <a:cxn ang="0">
+                <a:pos x="connsiteX8" y="connsiteY8"/>
+              </a:cxn>
+              <a:cxn ang="0">
+                <a:pos x="connsiteX9" y="connsiteY9"/>
+              </a:cxn>
+              <a:cxn ang="0">
+                <a:pos x="connsiteX10" y="connsiteY10"/>
+              </a:cxn>
+              <a:cxn ang="0">
+                <a:pos x="connsiteX11" y="connsiteY11"/>
+              </a:cxn>
+            </a:cxnLst>
+            <a:rect l="l" t="t" r="r" b="b"/>
+            <a:pathLst>
+              <a:path w="3255095" h="18288" fill="none" extrusionOk="0">
+                <a:moveTo>
+                  <a:pt x="0" y="0"/>
+                </a:moveTo>
+                <a:cubicBezTo>
+                  <a:pt x="240201" y="-22123"/>
+                  <a:pt x="462021" y="-19623"/>
+                  <a:pt x="618468" y="0"/>
+                </a:cubicBezTo>
+                <a:cubicBezTo>
+                  <a:pt x="774915" y="19623"/>
+                  <a:pt x="974734" y="2035"/>
+                  <a:pt x="1269487" y="0"/>
+                </a:cubicBezTo>
+                <a:cubicBezTo>
+                  <a:pt x="1564240" y="-2035"/>
+                  <a:pt x="1733579" y="10639"/>
+                  <a:pt x="1953057" y="0"/>
+                </a:cubicBezTo>
+                <a:cubicBezTo>
+                  <a:pt x="2172535" y="-10639"/>
+                  <a:pt x="2453962" y="14018"/>
+                  <a:pt x="2636627" y="0"/>
+                </a:cubicBezTo>
+                <a:cubicBezTo>
+                  <a:pt x="2819292" y="-14018"/>
+                  <a:pt x="3121375" y="5399"/>
+                  <a:pt x="3255095" y="0"/>
+                </a:cubicBezTo>
+                <a:cubicBezTo>
+                  <a:pt x="3254386" y="8157"/>
+                  <a:pt x="3254682" y="12125"/>
+                  <a:pt x="3255095" y="18288"/>
+                </a:cubicBezTo>
+                <a:cubicBezTo>
+                  <a:pt x="3088545" y="23203"/>
+                  <a:pt x="2687475" y="7419"/>
+                  <a:pt x="2538974" y="18288"/>
+                </a:cubicBezTo>
+                <a:cubicBezTo>
+                  <a:pt x="2390473" y="29157"/>
+                  <a:pt x="2137381" y="-8959"/>
+                  <a:pt x="1822853" y="18288"/>
+                </a:cubicBezTo>
+                <a:cubicBezTo>
+                  <a:pt x="1508325" y="45535"/>
+                  <a:pt x="1466437" y="20385"/>
+                  <a:pt x="1171834" y="18288"/>
+                </a:cubicBezTo>
+                <a:cubicBezTo>
+                  <a:pt x="877231" y="16191"/>
+                  <a:pt x="561097" y="37643"/>
+                  <a:pt x="0" y="18288"/>
+                </a:cubicBezTo>
+                <a:cubicBezTo>
+                  <a:pt x="-46" y="12483"/>
+                  <a:pt x="-203" y="6491"/>
+                  <a:pt x="0" y="0"/>
+                </a:cubicBezTo>
+                <a:close/>
+              </a:path>
+              <a:path w="3255095" h="18288" stroke="0" extrusionOk="0">
+                <a:moveTo>
+                  <a:pt x="0" y="0"/>
+                </a:moveTo>
+                <a:cubicBezTo>
+                  <a:pt x="291965" y="19429"/>
+                  <a:pt x="363155" y="8568"/>
+                  <a:pt x="618468" y="0"/>
+                </a:cubicBezTo>
+                <a:cubicBezTo>
+                  <a:pt x="873781" y="-8568"/>
+                  <a:pt x="904459" y="-19505"/>
+                  <a:pt x="1171834" y="0"/>
+                </a:cubicBezTo>
+                <a:cubicBezTo>
+                  <a:pt x="1439209" y="19505"/>
+                  <a:pt x="1744369" y="9790"/>
+                  <a:pt x="1887955" y="0"/>
+                </a:cubicBezTo>
+                <a:cubicBezTo>
+                  <a:pt x="2031541" y="-9790"/>
+                  <a:pt x="2346378" y="21240"/>
+                  <a:pt x="2506423" y="0"/>
+                </a:cubicBezTo>
+                <a:cubicBezTo>
+                  <a:pt x="2666468" y="-21240"/>
+                  <a:pt x="2990257" y="30414"/>
+                  <a:pt x="3255095" y="0"/>
+                </a:cubicBezTo>
+                <a:cubicBezTo>
+                  <a:pt x="3254831" y="4493"/>
+                  <a:pt x="3255479" y="9472"/>
+                  <a:pt x="3255095" y="18288"/>
+                </a:cubicBezTo>
+                <a:cubicBezTo>
+                  <a:pt x="3120743" y="16690"/>
+                  <a:pt x="2759628" y="42462"/>
+                  <a:pt x="2604076" y="18288"/>
+                </a:cubicBezTo>
+                <a:cubicBezTo>
+                  <a:pt x="2448524" y="-5886"/>
+                  <a:pt x="2184336" y="19599"/>
+                  <a:pt x="1887955" y="18288"/>
+                </a:cubicBezTo>
+                <a:cubicBezTo>
+                  <a:pt x="1591574" y="16977"/>
+                  <a:pt x="1548845" y="6870"/>
+                  <a:pt x="1334589" y="18288"/>
+                </a:cubicBezTo>
+                <a:cubicBezTo>
+                  <a:pt x="1120333" y="29706"/>
+                  <a:pt x="996014" y="9662"/>
+                  <a:pt x="683570" y="18288"/>
+                </a:cubicBezTo>
+                <a:cubicBezTo>
+                  <a:pt x="371126" y="26914"/>
+                  <a:pt x="198687" y="16167"/>
+                  <a:pt x="0" y="18288"/>
+                </a:cubicBezTo>
+                <a:cubicBezTo>
+                  <a:pt x="843" y="9577"/>
+                  <a:pt x="371" y="6900"/>
+                  <a:pt x="0" y="0"/>
+                </a:cubicBezTo>
+                <a:close/>
+              </a:path>
+            </a:pathLst>
+          </a:custGeom>
+          <a:solidFill>
+            <a:schemeClr val="accent2"/>
+          </a:solidFill>
+          <a:ln w="38100" cap="rnd">
+            <a:solidFill>
+              <a:schemeClr val="accent2"/>
+            </a:solidFill>
+            <a:round/>
+            <a:extLst>
+              <a:ext uri="{C807C97D-BFC1-408E-A445-0C87EB9F89A2}">
+                <ask:lineSketchStyleProps xmlns:ask="http://schemas.microsoft.com/office/drawing/2018/sketchyshapes" sd="1219033472">
+                  <a:prstGeom prst="rect">
+                    <a:avLst/>
+                  </a:prstGeom>
+                  <ask:type>
+                    <ask:lineSketchFreehand/>
+                  </ask:type>
+                </ask:lineSketchStyleProps>
+              </a:ext>
+            </a:extLst>
+          </a:ln>
+        </p:spPr>
+        <p:style>
+          <a:lnRef idx="2">
+            <a:schemeClr val="accent1">
+              <a:shade val="50000"/>
+            </a:schemeClr>
+          </a:lnRef>
+          <a:fillRef idx="1">
+            <a:schemeClr val="accent1"/>
+          </a:fillRef>
+          <a:effectRef idx="0">
+            <a:schemeClr val="accent1"/>
+          </a:effectRef>
+          <a:fontRef idx="minor">
+            <a:schemeClr val="lt1"/>
+          </a:fontRef>
+        </p:style>
+        <p:txBody>
+          <a:bodyPr rtlCol="0" anchor="ctr"/>
+          <a:lstStyle/>
+          <a:p>
+            <a:pPr algn="ctr"/>
+            <a:endParaRPr lang="en-US"/>
+          </a:p>
+        </p:txBody>
+      </p:sp>
+      <p:sp>
+        <p:nvSpPr>
+          <p:cNvPr id="3" name="Content Placeholder 2">
+            <a:extLst>
+              <a:ext uri="{FF2B5EF4-FFF2-40B4-BE49-F238E27FC236}">
+                <a16:creationId xmlns:a16="http://schemas.microsoft.com/office/drawing/2014/main" id="{1052C69E-F9FD-C41B-D5C3-DE7535BDA7C4}"/>
+              </a:ext>
+            </a:extLst>
+          </p:cNvPr>
+          <p:cNvSpPr>
+            <a:spLocks noGrp="1"/>
+          </p:cNvSpPr>
+          <p:nvPr>
+            <p:ph idx="1"/>
+          </p:nvPr>
+        </p:nvSpPr>
+        <p:spPr>
+          <a:xfrm>
+            <a:off x="630936" y="2660904"/>
+            <a:ext cx="4818888" cy="3547872"/>
+          </a:xfrm>
+        </p:spPr>
+        <p:txBody>
+          <a:bodyPr anchor="t">
+            <a:normAutofit/>
+          </a:bodyPr>
+          <a:lstStyle/>
+          <a:p>
+            <a:r>
+              <a:rPr lang="nb-NO" sz="2200"/>
+              <a:t>R^2 decreases significantly after removing the 4 largest cities</a:t>
+            </a:r>
+          </a:p>
+          <a:p>
+            <a:r>
+              <a:rPr lang="nb-NO" sz="2200"/>
+              <a:t>Variables other than population can have an effect</a:t>
+            </a:r>
+          </a:p>
+          <a:p>
+            <a:r>
+              <a:rPr lang="nb-NO" sz="2200"/>
+              <a:t>Tourism has a positive significant effect</a:t>
+            </a:r>
+          </a:p>
+          <a:p>
+            <a:r>
+              <a:rPr lang="nb-NO" sz="2200"/>
+              <a:t>Scale data?</a:t>
+            </a:r>
+          </a:p>
+        </p:txBody>
+      </p:sp>
+      <p:pic>
+        <p:nvPicPr>
+          <p:cNvPr id="5" name="Picture 4">
+            <a:extLst>
+              <a:ext uri="{FF2B5EF4-FFF2-40B4-BE49-F238E27FC236}">
+                <a16:creationId xmlns:a16="http://schemas.microsoft.com/office/drawing/2014/main" id="{29C30F8D-871E-3A4F-0156-52FB4B83C5F2}"/>
+              </a:ext>
+            </a:extLst>
+          </p:cNvPr>
+          <p:cNvPicPr>
+            <a:picLocks noChangeAspect="1"/>
+          </p:cNvPicPr>
+          <p:nvPr/>
+        </p:nvPicPr>
+        <p:blipFill>
+          <a:blip r:embed="rId2"/>
+          <a:stretch>
+            <a:fillRect/>
+          </a:stretch>
+        </p:blipFill>
+        <p:spPr>
+          <a:xfrm>
+            <a:off x="6119816" y="640080"/>
+            <a:ext cx="5417431" cy="5577840"/>
+          </a:xfrm>
+          <a:prstGeom prst="rect">
+            <a:avLst/>
+          </a:prstGeom>
+        </p:spPr>
+      </p:pic>
+    </p:spTree>
+    <p:extLst>
+      <p:ext uri="{BB962C8B-B14F-4D97-AF65-F5344CB8AC3E}">
+        <p14:creationId xmlns:p14="http://schemas.microsoft.com/office/powerpoint/2010/main" val="3591823627"/>
+      </p:ext>
+    </p:extLst>
+  </p:cSld>
+  <p:clrMapOvr>
+    <a:masterClrMapping/>
+  </p:clrMapOvr>
+</p:sld>
+</file>
+
+<file path=ppt/slides/slide16.xml><?xml version="1.0" encoding="utf-8"?>
+<p:sld xmlns:a="http://schemas.openxmlformats.org/drawingml/2006/main" xmlns:r="http://schemas.openxmlformats.org/officeDocument/2006/relationships" xmlns:p="http://schemas.openxmlformats.org/presentationml/2006/main">
+  <p:cSld>
+    <p:bg>
+      <p:bgPr>
+        <a:solidFill>
+          <a:schemeClr val="bg1"/>
+        </a:solidFill>
+        <a:effectLst/>
+      </p:bgPr>
+    </p:bg>
+    <p:spTree>
+      <p:nvGrpSpPr>
+        <p:cNvPr id="1" name=""/>
+        <p:cNvGrpSpPr/>
+        <p:nvPr/>
+      </p:nvGrpSpPr>
+      <p:grpSpPr>
+        <a:xfrm>
+          <a:off x="0" y="0"/>
+          <a:ext cx="0" cy="0"/>
+          <a:chOff x="0" y="0"/>
+          <a:chExt cx="0" cy="0"/>
+        </a:xfrm>
+      </p:grpSpPr>
       <p:pic>
         <p:nvPicPr>
           <p:cNvPr id="9" name="Picture 8">
@@ -12119,8 +12305,8 @@
           <a:lstStyle/>
           <a:p>
             <a:r>
-              <a:rPr lang="nb-NO" sz="5400"/>
-              <a:t>Model 1</a:t>
+              <a:rPr lang="nb-NO" sz="5400" dirty="0"/>
+              <a:t>Model 1: pop &lt; 150 000</a:t>
             </a:r>
           </a:p>
         </p:txBody>
@@ -12168,7 +12354,7 @@
 </p:sld>
 </file>
 
-<file path=ppt/slides/slide16.xml><?xml version="1.0" encoding="utf-8"?>
+<file path=ppt/slides/slide17.xml><?xml version="1.0" encoding="utf-8"?>
 <p:sld xmlns:a="http://schemas.openxmlformats.org/drawingml/2006/main" xmlns:r="http://schemas.openxmlformats.org/officeDocument/2006/relationships" xmlns:p="http://schemas.openxmlformats.org/presentationml/2006/main">
   <p:cSld>
     <p:spTree>
@@ -12208,7 +12394,7 @@
           <a:p>
             <a:r>
               <a:rPr lang="nb-NO" dirty="0"/>
-              <a:t>Model 2</a:t>
+              <a:t>Model 2: pop &lt; 150 000</a:t>
             </a:r>
           </a:p>
         </p:txBody>
@@ -12315,7 +12501,7 @@
 </p:sld>
 </file>
 
-<file path=ppt/slides/slide17.xml><?xml version="1.0" encoding="utf-8"?>
+<file path=ppt/slides/slide18.xml><?xml version="1.0" encoding="utf-8"?>
 <p:sld xmlns:a="http://schemas.openxmlformats.org/drawingml/2006/main" xmlns:r="http://schemas.openxmlformats.org/officeDocument/2006/relationships" xmlns:p="http://schemas.openxmlformats.org/presentationml/2006/main">
   <p:cSld>
     <p:spTree>
@@ -12355,17 +12541,17 @@
           <a:p>
             <a:r>
               <a:rPr lang="nb-NO" dirty="0"/>
-              <a:t>Model 3</a:t>
+              <a:t>Model 3: pop &lt; 150 000</a:t>
             </a:r>
           </a:p>
         </p:txBody>
       </p:sp>
       <p:pic>
         <p:nvPicPr>
-          <p:cNvPr id="5" name="Content Placeholder 4">
+          <p:cNvPr id="13" name="Content Placeholder 12">
             <a:extLst>
               <a:ext uri="{FF2B5EF4-FFF2-40B4-BE49-F238E27FC236}">
-                <a16:creationId xmlns:a16="http://schemas.microsoft.com/office/drawing/2014/main" id="{E5BBA3B7-9629-A0AE-699F-C89144F6B6CC}"/>
+                <a16:creationId xmlns:a16="http://schemas.microsoft.com/office/drawing/2014/main" id="{F5DE30AB-DCCD-78C7-2DCB-B2D80B73C507}"/>
               </a:ext>
             </a:extLst>
           </p:cNvPr>
@@ -12384,17 +12570,17 @@
         </p:blipFill>
         <p:spPr>
           <a:xfrm>
-            <a:off x="838200" y="1484210"/>
-            <a:ext cx="10515600" cy="3667637"/>
+            <a:off x="6095997" y="5149759"/>
+            <a:ext cx="5257799" cy="1502227"/>
           </a:xfrm>
         </p:spPr>
       </p:pic>
       <p:pic>
         <p:nvPicPr>
-          <p:cNvPr id="7" name="Picture 6">
+          <p:cNvPr id="8" name="Picture 7">
             <a:extLst>
               <a:ext uri="{FF2B5EF4-FFF2-40B4-BE49-F238E27FC236}">
-                <a16:creationId xmlns:a16="http://schemas.microsoft.com/office/drawing/2014/main" id="{68C2923F-9297-15C3-FE89-9AB6F6C39C25}"/>
+                <a16:creationId xmlns:a16="http://schemas.microsoft.com/office/drawing/2014/main" id="{07A5D081-E0AA-293D-BA0E-06BB8D84D116}"/>
               </a:ext>
             </a:extLst>
           </p:cNvPr>
@@ -12411,8 +12597,8 @@
         </p:blipFill>
         <p:spPr>
           <a:xfrm>
-            <a:off x="838199" y="5151847"/>
-            <a:ext cx="5257800" cy="1504315"/>
+            <a:off x="838200" y="1444018"/>
+            <a:ext cx="10515600" cy="3705742"/>
           </a:xfrm>
           <a:prstGeom prst="rect">
             <a:avLst/>
@@ -12421,10 +12607,10 @@
       </p:pic>
       <p:pic>
         <p:nvPicPr>
-          <p:cNvPr id="9" name="Picture 8">
+          <p:cNvPr id="11" name="Picture 10">
             <a:extLst>
               <a:ext uri="{FF2B5EF4-FFF2-40B4-BE49-F238E27FC236}">
-                <a16:creationId xmlns:a16="http://schemas.microsoft.com/office/drawing/2014/main" id="{7E058767-46EB-8C2F-BDDC-55E685DD68D3}"/>
+                <a16:creationId xmlns:a16="http://schemas.microsoft.com/office/drawing/2014/main" id="{1A7DDE10-683D-19C9-8042-6494AF1B204B}"/>
               </a:ext>
             </a:extLst>
           </p:cNvPr>
@@ -12441,7 +12627,7 @@
         </p:blipFill>
         <p:spPr>
           <a:xfrm>
-            <a:off x="6096000" y="5151847"/>
+            <a:off x="838198" y="5149760"/>
             <a:ext cx="5257800" cy="1502228"/>
           </a:xfrm>
           <a:prstGeom prst="rect">
@@ -12453,166 +12639,6 @@
     <p:extLst>
       <p:ext uri="{BB962C8B-B14F-4D97-AF65-F5344CB8AC3E}">
         <p14:creationId xmlns:p14="http://schemas.microsoft.com/office/powerpoint/2010/main" val="113336720"/>
-      </p:ext>
-    </p:extLst>
-  </p:cSld>
-  <p:clrMapOvr>
-    <a:masterClrMapping/>
-  </p:clrMapOvr>
-</p:sld>
-</file>
-
-<file path=ppt/slides/slide18.xml><?xml version="1.0" encoding="utf-8"?>
-<p:sld xmlns:a="http://schemas.openxmlformats.org/drawingml/2006/main" xmlns:r="http://schemas.openxmlformats.org/officeDocument/2006/relationships" xmlns:p="http://schemas.openxmlformats.org/presentationml/2006/main">
-  <p:cSld>
-    <p:spTree>
-      <p:nvGrpSpPr>
-        <p:cNvPr id="1" name=""/>
-        <p:cNvGrpSpPr/>
-        <p:nvPr/>
-      </p:nvGrpSpPr>
-      <p:grpSpPr>
-        <a:xfrm>
-          <a:off x="0" y="0"/>
-          <a:ext cx="0" cy="0"/>
-          <a:chOff x="0" y="0"/>
-          <a:chExt cx="0" cy="0"/>
-        </a:xfrm>
-      </p:grpSpPr>
-      <p:sp>
-        <p:nvSpPr>
-          <p:cNvPr id="2" name="Title 1">
-            <a:extLst>
-              <a:ext uri="{FF2B5EF4-FFF2-40B4-BE49-F238E27FC236}">
-                <a16:creationId xmlns:a16="http://schemas.microsoft.com/office/drawing/2014/main" id="{10397AED-9578-36B3-9AF2-2B41FB4267AA}"/>
-              </a:ext>
-            </a:extLst>
-          </p:cNvPr>
-          <p:cNvSpPr>
-            <a:spLocks noGrp="1"/>
-          </p:cNvSpPr>
-          <p:nvPr>
-            <p:ph type="title"/>
-          </p:nvPr>
-        </p:nvSpPr>
-        <p:spPr/>
-        <p:txBody>
-          <a:bodyPr/>
-          <a:lstStyle/>
-          <a:p>
-            <a:r>
-              <a:rPr lang="nb-NO" dirty="0" err="1"/>
-              <a:t>Difficulties</a:t>
-            </a:r>
-            <a:endParaRPr lang="nb-NO" dirty="0"/>
-          </a:p>
-        </p:txBody>
-      </p:sp>
-      <p:sp>
-        <p:nvSpPr>
-          <p:cNvPr id="3" name="Content Placeholder 2">
-            <a:extLst>
-              <a:ext uri="{FF2B5EF4-FFF2-40B4-BE49-F238E27FC236}">
-                <a16:creationId xmlns:a16="http://schemas.microsoft.com/office/drawing/2014/main" id="{9002EC8C-0190-0E7F-9FDD-D53728E56142}"/>
-              </a:ext>
-            </a:extLst>
-          </p:cNvPr>
-          <p:cNvSpPr>
-            <a:spLocks noGrp="1"/>
-          </p:cNvSpPr>
-          <p:nvPr>
-            <p:ph idx="1"/>
-          </p:nvPr>
-        </p:nvSpPr>
-        <p:spPr/>
-        <p:txBody>
-          <a:bodyPr/>
-          <a:lstStyle/>
-          <a:p>
-            <a:r>
-              <a:rPr lang="nb-NO" dirty="0" err="1"/>
-              <a:t>Population</a:t>
-            </a:r>
-            <a:r>
-              <a:rPr lang="nb-NO" dirty="0"/>
-              <a:t> as an </a:t>
-            </a:r>
-            <a:r>
-              <a:rPr lang="nb-NO" dirty="0" err="1"/>
-              <a:t>indepentendt</a:t>
-            </a:r>
-            <a:r>
-              <a:rPr lang="nb-NO" dirty="0"/>
-              <a:t> variable is </a:t>
-            </a:r>
-            <a:r>
-              <a:rPr lang="nb-NO" dirty="0" err="1"/>
-              <a:t>too</a:t>
-            </a:r>
-            <a:r>
-              <a:rPr lang="nb-NO" dirty="0"/>
-              <a:t> </a:t>
-            </a:r>
-            <a:r>
-              <a:rPr lang="nb-NO" dirty="0" err="1"/>
-              <a:t>powerful</a:t>
-            </a:r>
-            <a:endParaRPr lang="nb-NO" dirty="0"/>
-          </a:p>
-          <a:p>
-            <a:pPr lvl="1"/>
-            <a:r>
-              <a:rPr lang="nb-NO" dirty="0" err="1"/>
-              <a:t>Almost</a:t>
-            </a:r>
-            <a:r>
-              <a:rPr lang="nb-NO" dirty="0"/>
-              <a:t> 97% in </a:t>
-            </a:r>
-            <a:r>
-              <a:rPr lang="nb-NO" dirty="0" err="1"/>
-              <a:t>raw</a:t>
-            </a:r>
-            <a:r>
-              <a:rPr lang="nb-NO" dirty="0"/>
-              <a:t> </a:t>
-            </a:r>
-            <a:r>
-              <a:rPr lang="nb-NO" dirty="0" err="1"/>
-              <a:t>correlation</a:t>
-            </a:r>
-            <a:r>
-              <a:rPr lang="nb-NO" dirty="0"/>
-              <a:t> </a:t>
-            </a:r>
-            <a:r>
-              <a:rPr lang="nb-NO" dirty="0" err="1"/>
-              <a:t>between</a:t>
-            </a:r>
-            <a:r>
-              <a:rPr lang="nb-NO" dirty="0"/>
-              <a:t> </a:t>
-            </a:r>
-            <a:r>
-              <a:rPr lang="nb-NO" dirty="0" err="1"/>
-              <a:t>n_stores</a:t>
-            </a:r>
-            <a:r>
-              <a:rPr lang="nb-NO" dirty="0"/>
-              <a:t> and </a:t>
-            </a:r>
-            <a:r>
-              <a:rPr lang="nb-NO" dirty="0" err="1"/>
-              <a:t>population</a:t>
-            </a:r>
-            <a:endParaRPr lang="nb-NO" dirty="0"/>
-          </a:p>
-        </p:txBody>
-      </p:sp>
-    </p:spTree>
-    <p:extLst>
-      <p:ext uri="{BB962C8B-B14F-4D97-AF65-F5344CB8AC3E}">
-        <p14:creationId xmlns:p14="http://schemas.microsoft.com/office/powerpoint/2010/main" val="6333379"/>
       </p:ext>
     </p:extLst>
   </p:cSld>
@@ -12644,7 +12670,7 @@
           <p:cNvPr id="2" name="Title 1">
             <a:extLst>
               <a:ext uri="{FF2B5EF4-FFF2-40B4-BE49-F238E27FC236}">
-                <a16:creationId xmlns:a16="http://schemas.microsoft.com/office/drawing/2014/main" id="{330AB463-FB59-F3D6-B8AD-F6D0CC3619E7}"/>
+                <a16:creationId xmlns:a16="http://schemas.microsoft.com/office/drawing/2014/main" id="{10397AED-9578-36B3-9AF2-2B41FB4267AA}"/>
               </a:ext>
             </a:extLst>
           </p:cNvPr>
@@ -12661,9 +12687,10 @@
           <a:lstStyle/>
           <a:p>
             <a:r>
-              <a:rPr lang="nb-NO" dirty="0"/>
-              <a:t>Questions</a:t>
-            </a:r>
+              <a:rPr lang="nb-NO" dirty="0" err="1"/>
+              <a:t>Difficulties</a:t>
+            </a:r>
+            <a:endParaRPr lang="nb-NO" dirty="0"/>
           </a:p>
         </p:txBody>
       </p:sp>
@@ -12672,7 +12699,7 @@
           <p:cNvPr id="3" name="Content Placeholder 2">
             <a:extLst>
               <a:ext uri="{FF2B5EF4-FFF2-40B4-BE49-F238E27FC236}">
-                <a16:creationId xmlns:a16="http://schemas.microsoft.com/office/drawing/2014/main" id="{1F65876D-FF8F-FEE5-2E3F-BE52B30FE241}"/>
+                <a16:creationId xmlns:a16="http://schemas.microsoft.com/office/drawing/2014/main" id="{9002EC8C-0190-0E7F-9FDD-D53728E56142}"/>
               </a:ext>
             </a:extLst>
           </p:cNvPr>
@@ -12689,20 +12716,24 @@
           <a:lstStyle/>
           <a:p>
             <a:r>
+              <a:rPr lang="nb-NO" dirty="0" err="1"/>
+              <a:t>Population</a:t>
+            </a:r>
+            <a:r>
               <a:rPr lang="nb-NO" dirty="0"/>
-              <a:t>Is </a:t>
+              <a:t> as an </a:t>
             </a:r>
             <a:r>
               <a:rPr lang="nb-NO" dirty="0" err="1"/>
-              <a:t>the</a:t>
+              <a:t>indepentendt</a:t>
             </a:r>
             <a:r>
               <a:rPr lang="nb-NO" dirty="0"/>
-              <a:t> B&amp;R </a:t>
+              <a:t> variable is </a:t>
             </a:r>
             <a:r>
               <a:rPr lang="nb-NO" dirty="0" err="1"/>
-              <a:t>framework</a:t>
+              <a:t>too</a:t>
             </a:r>
             <a:r>
               <a:rPr lang="nb-NO" dirty="0"/>
@@ -12710,26 +12741,23 @@
             </a:r>
             <a:r>
               <a:rPr lang="nb-NO" dirty="0" err="1"/>
-              <a:t>feasible</a:t>
+              <a:t>powerful</a:t>
+            </a:r>
+            <a:endParaRPr lang="nb-NO" dirty="0"/>
+          </a:p>
+          <a:p>
+            <a:pPr lvl="1"/>
+            <a:r>
+              <a:rPr lang="nb-NO" dirty="0" err="1"/>
+              <a:t>Almost</a:t>
             </a:r>
             <a:r>
               <a:rPr lang="nb-NO" dirty="0"/>
-              <a:t>?</a:t>
-            </a:r>
-          </a:p>
-          <a:p>
-            <a:pPr lvl="1"/>
+              <a:t> 97% in </a:t>
+            </a:r>
             <a:r>
               <a:rPr lang="nb-NO" dirty="0" err="1"/>
-              <a:t>Would</a:t>
-            </a:r>
-            <a:r>
-              <a:rPr lang="nb-NO" dirty="0"/>
-              <a:t> it be </a:t>
-            </a:r>
-            <a:r>
-              <a:rPr lang="nb-NO" dirty="0" err="1"/>
-              <a:t>better</a:t>
+              <a:t>raw</a:t>
             </a:r>
             <a:r>
               <a:rPr lang="nb-NO" dirty="0"/>
@@ -12737,49 +12765,7 @@
             </a:r>
             <a:r>
               <a:rPr lang="nb-NO" dirty="0" err="1"/>
-              <a:t>with</a:t>
-            </a:r>
-            <a:r>
-              <a:rPr lang="nb-NO" dirty="0"/>
-              <a:t> a different </a:t>
-            </a:r>
-            <a:r>
-              <a:rPr lang="nb-NO" dirty="0" err="1"/>
-              <a:t>approach</a:t>
-            </a:r>
-            <a:r>
-              <a:rPr lang="nb-NO" dirty="0"/>
-              <a:t>?</a:t>
-            </a:r>
-          </a:p>
-          <a:p>
-            <a:r>
-              <a:rPr lang="nb-NO" dirty="0" err="1"/>
-              <a:t>What</a:t>
-            </a:r>
-            <a:r>
-              <a:rPr lang="nb-NO" dirty="0"/>
-              <a:t> is </a:t>
-            </a:r>
-            <a:r>
-              <a:rPr lang="nb-NO" dirty="0" err="1"/>
-              <a:t>the</a:t>
-            </a:r>
-            <a:r>
-              <a:rPr lang="nb-NO" dirty="0"/>
-              <a:t> best </a:t>
-            </a:r>
-            <a:r>
-              <a:rPr lang="nb-NO" dirty="0" err="1"/>
-              <a:t>way</a:t>
-            </a:r>
-            <a:r>
-              <a:rPr lang="nb-NO" dirty="0"/>
-              <a:t> to make </a:t>
-            </a:r>
-            <a:r>
-              <a:rPr lang="nb-NO" dirty="0" err="1"/>
-              <a:t>use</a:t>
+              <a:t>correlation</a:t>
             </a:r>
             <a:r>
               <a:rPr lang="nb-NO" dirty="0"/>
@@ -12787,7 +12773,7 @@
             </a:r>
             <a:r>
               <a:rPr lang="nb-NO" dirty="0" err="1"/>
-              <a:t>of</a:t>
+              <a:t>between</a:t>
             </a:r>
             <a:r>
               <a:rPr lang="nb-NO" dirty="0"/>
@@ -12795,109 +12781,16 @@
             </a:r>
             <a:r>
               <a:rPr lang="nb-NO" dirty="0" err="1"/>
-              <a:t>the</a:t>
+              <a:t>n_stores</a:t>
             </a:r>
             <a:r>
               <a:rPr lang="nb-NO" dirty="0"/>
-              <a:t> </a:t>
+              <a:t> and </a:t>
             </a:r>
             <a:r>
               <a:rPr lang="nb-NO" dirty="0" err="1"/>
-              <a:t>estimated</a:t>
-            </a:r>
-            <a:r>
-              <a:rPr lang="nb-NO" dirty="0"/>
-              <a:t> </a:t>
-            </a:r>
-            <a:r>
-              <a:rPr lang="nb-NO" dirty="0" err="1"/>
-              <a:t>entry</a:t>
-            </a:r>
-            <a:r>
-              <a:rPr lang="nb-NO" dirty="0"/>
-              <a:t> </a:t>
-            </a:r>
-            <a:r>
-              <a:rPr lang="nb-NO" dirty="0" err="1"/>
-              <a:t>thresholds</a:t>
-            </a:r>
-            <a:r>
-              <a:rPr lang="nb-NO" dirty="0"/>
-              <a:t>?</a:t>
-            </a:r>
-          </a:p>
-          <a:p>
-            <a:pPr lvl="1"/>
-            <a:r>
-              <a:rPr lang="nb-NO" dirty="0" err="1"/>
-              <a:t>Heavily</a:t>
-            </a:r>
-            <a:r>
-              <a:rPr lang="nb-NO" dirty="0"/>
-              <a:t> </a:t>
-            </a:r>
-            <a:r>
-              <a:rPr lang="nb-NO" dirty="0" err="1"/>
-              <a:t>linked</a:t>
-            </a:r>
-            <a:r>
-              <a:rPr lang="nb-NO" dirty="0"/>
-              <a:t> to </a:t>
-            </a:r>
-            <a:r>
-              <a:rPr lang="nb-NO" dirty="0" err="1"/>
-              <a:t>research</a:t>
-            </a:r>
-            <a:r>
-              <a:rPr lang="nb-NO" dirty="0"/>
-              <a:t> </a:t>
-            </a:r>
-            <a:r>
-              <a:rPr lang="nb-NO" dirty="0" err="1"/>
-              <a:t>question</a:t>
-            </a:r>
-            <a:endParaRPr lang="nb-NO" dirty="0"/>
-          </a:p>
-          <a:p>
-            <a:r>
-              <a:rPr lang="nb-NO" dirty="0"/>
-              <a:t>Are </a:t>
-            </a:r>
-            <a:r>
-              <a:rPr lang="nb-NO" dirty="0" err="1"/>
-              <a:t>there</a:t>
-            </a:r>
-            <a:r>
-              <a:rPr lang="nb-NO" dirty="0"/>
-              <a:t> </a:t>
-            </a:r>
-            <a:r>
-              <a:rPr lang="nb-NO" dirty="0" err="1"/>
-              <a:t>better</a:t>
-            </a:r>
-            <a:r>
-              <a:rPr lang="nb-NO" dirty="0"/>
-              <a:t> variables for </a:t>
-            </a:r>
-            <a:r>
-              <a:rPr lang="nb-NO" dirty="0" err="1"/>
-              <a:t>our</a:t>
-            </a:r>
-            <a:r>
-              <a:rPr lang="nb-NO" dirty="0"/>
-              <a:t> </a:t>
-            </a:r>
-            <a:r>
-              <a:rPr lang="nb-NO" dirty="0" err="1"/>
-              <a:t>model</a:t>
-            </a:r>
-            <a:r>
-              <a:rPr lang="nb-NO"/>
-              <a:t>?</a:t>
-            </a:r>
-            <a:endParaRPr lang="nb-NO" dirty="0"/>
-          </a:p>
-          <a:p>
+              <a:t>population</a:t>
+            </a:r>
             <a:endParaRPr lang="nb-NO" dirty="0"/>
           </a:p>
         </p:txBody>
@@ -12905,7 +12798,7 @@
     </p:spTree>
     <p:extLst>
       <p:ext uri="{BB962C8B-B14F-4D97-AF65-F5344CB8AC3E}">
-        <p14:creationId xmlns:p14="http://schemas.microsoft.com/office/powerpoint/2010/main" val="3153854413"/>
+        <p14:creationId xmlns:p14="http://schemas.microsoft.com/office/powerpoint/2010/main" val="6333379"/>
       </p:ext>
     </p:extLst>
   </p:cSld>
@@ -13316,6 +13209,299 @@
     <p:extLst>
       <p:ext uri="{BB962C8B-B14F-4D97-AF65-F5344CB8AC3E}">
         <p14:creationId xmlns:p14="http://schemas.microsoft.com/office/powerpoint/2010/main" val="3310188062"/>
+      </p:ext>
+    </p:extLst>
+  </p:cSld>
+  <p:clrMapOvr>
+    <a:masterClrMapping/>
+  </p:clrMapOvr>
+</p:sld>
+</file>
+
+<file path=ppt/slides/slide20.xml><?xml version="1.0" encoding="utf-8"?>
+<p:sld xmlns:a="http://schemas.openxmlformats.org/drawingml/2006/main" xmlns:r="http://schemas.openxmlformats.org/officeDocument/2006/relationships" xmlns:p="http://schemas.openxmlformats.org/presentationml/2006/main">
+  <p:cSld>
+    <p:spTree>
+      <p:nvGrpSpPr>
+        <p:cNvPr id="1" name=""/>
+        <p:cNvGrpSpPr/>
+        <p:nvPr/>
+      </p:nvGrpSpPr>
+      <p:grpSpPr>
+        <a:xfrm>
+          <a:off x="0" y="0"/>
+          <a:ext cx="0" cy="0"/>
+          <a:chOff x="0" y="0"/>
+          <a:chExt cx="0" cy="0"/>
+        </a:xfrm>
+      </p:grpSpPr>
+      <p:sp>
+        <p:nvSpPr>
+          <p:cNvPr id="2" name="Title 1">
+            <a:extLst>
+              <a:ext uri="{FF2B5EF4-FFF2-40B4-BE49-F238E27FC236}">
+                <a16:creationId xmlns:a16="http://schemas.microsoft.com/office/drawing/2014/main" id="{330AB463-FB59-F3D6-B8AD-F6D0CC3619E7}"/>
+              </a:ext>
+            </a:extLst>
+          </p:cNvPr>
+          <p:cNvSpPr>
+            <a:spLocks noGrp="1"/>
+          </p:cNvSpPr>
+          <p:nvPr>
+            <p:ph type="title"/>
+          </p:nvPr>
+        </p:nvSpPr>
+        <p:spPr/>
+        <p:txBody>
+          <a:bodyPr/>
+          <a:lstStyle/>
+          <a:p>
+            <a:r>
+              <a:rPr lang="nb-NO" dirty="0"/>
+              <a:t>Questions</a:t>
+            </a:r>
+          </a:p>
+        </p:txBody>
+      </p:sp>
+      <p:sp>
+        <p:nvSpPr>
+          <p:cNvPr id="3" name="Content Placeholder 2">
+            <a:extLst>
+              <a:ext uri="{FF2B5EF4-FFF2-40B4-BE49-F238E27FC236}">
+                <a16:creationId xmlns:a16="http://schemas.microsoft.com/office/drawing/2014/main" id="{1F65876D-FF8F-FEE5-2E3F-BE52B30FE241}"/>
+              </a:ext>
+            </a:extLst>
+          </p:cNvPr>
+          <p:cNvSpPr>
+            <a:spLocks noGrp="1"/>
+          </p:cNvSpPr>
+          <p:nvPr>
+            <p:ph idx="1"/>
+          </p:nvPr>
+        </p:nvSpPr>
+        <p:spPr/>
+        <p:txBody>
+          <a:bodyPr/>
+          <a:lstStyle/>
+          <a:p>
+            <a:r>
+              <a:rPr lang="nb-NO" dirty="0"/>
+              <a:t>Is </a:t>
+            </a:r>
+            <a:r>
+              <a:rPr lang="nb-NO" dirty="0" err="1"/>
+              <a:t>the</a:t>
+            </a:r>
+            <a:r>
+              <a:rPr lang="nb-NO" dirty="0"/>
+              <a:t> B&amp;R </a:t>
+            </a:r>
+            <a:r>
+              <a:rPr lang="nb-NO" dirty="0" err="1"/>
+              <a:t>framework</a:t>
+            </a:r>
+            <a:r>
+              <a:rPr lang="nb-NO" dirty="0"/>
+              <a:t> </a:t>
+            </a:r>
+            <a:r>
+              <a:rPr lang="nb-NO" dirty="0" err="1"/>
+              <a:t>feasible</a:t>
+            </a:r>
+            <a:r>
+              <a:rPr lang="nb-NO" dirty="0"/>
+              <a:t>?</a:t>
+            </a:r>
+          </a:p>
+          <a:p>
+            <a:pPr lvl="1"/>
+            <a:r>
+              <a:rPr lang="nb-NO" dirty="0" err="1"/>
+              <a:t>Would</a:t>
+            </a:r>
+            <a:r>
+              <a:rPr lang="nb-NO" dirty="0"/>
+              <a:t> it be </a:t>
+            </a:r>
+            <a:r>
+              <a:rPr lang="nb-NO" dirty="0" err="1"/>
+              <a:t>better</a:t>
+            </a:r>
+            <a:r>
+              <a:rPr lang="nb-NO" dirty="0"/>
+              <a:t> </a:t>
+            </a:r>
+            <a:r>
+              <a:rPr lang="nb-NO" dirty="0" err="1"/>
+              <a:t>with</a:t>
+            </a:r>
+            <a:r>
+              <a:rPr lang="nb-NO" dirty="0"/>
+              <a:t> a different </a:t>
+            </a:r>
+            <a:r>
+              <a:rPr lang="nb-NO" dirty="0" err="1"/>
+              <a:t>approach</a:t>
+            </a:r>
+            <a:r>
+              <a:rPr lang="nb-NO" dirty="0"/>
+              <a:t>?</a:t>
+            </a:r>
+          </a:p>
+          <a:p>
+            <a:r>
+              <a:rPr lang="nb-NO" dirty="0" err="1"/>
+              <a:t>What</a:t>
+            </a:r>
+            <a:r>
+              <a:rPr lang="nb-NO" dirty="0"/>
+              <a:t> is </a:t>
+            </a:r>
+            <a:r>
+              <a:rPr lang="nb-NO" dirty="0" err="1"/>
+              <a:t>the</a:t>
+            </a:r>
+            <a:r>
+              <a:rPr lang="nb-NO" dirty="0"/>
+              <a:t> best </a:t>
+            </a:r>
+            <a:r>
+              <a:rPr lang="nb-NO" dirty="0" err="1"/>
+              <a:t>way</a:t>
+            </a:r>
+            <a:r>
+              <a:rPr lang="nb-NO" dirty="0"/>
+              <a:t> to make </a:t>
+            </a:r>
+            <a:r>
+              <a:rPr lang="nb-NO" dirty="0" err="1"/>
+              <a:t>use</a:t>
+            </a:r>
+            <a:r>
+              <a:rPr lang="nb-NO" dirty="0"/>
+              <a:t> </a:t>
+            </a:r>
+            <a:r>
+              <a:rPr lang="nb-NO" dirty="0" err="1"/>
+              <a:t>of</a:t>
+            </a:r>
+            <a:r>
+              <a:rPr lang="nb-NO" dirty="0"/>
+              <a:t> </a:t>
+            </a:r>
+            <a:r>
+              <a:rPr lang="nb-NO" dirty="0" err="1"/>
+              <a:t>the</a:t>
+            </a:r>
+            <a:r>
+              <a:rPr lang="nb-NO" dirty="0"/>
+              <a:t> </a:t>
+            </a:r>
+            <a:r>
+              <a:rPr lang="nb-NO" dirty="0" err="1"/>
+              <a:t>estimated</a:t>
+            </a:r>
+            <a:r>
+              <a:rPr lang="nb-NO" dirty="0"/>
+              <a:t> </a:t>
+            </a:r>
+            <a:r>
+              <a:rPr lang="nb-NO" dirty="0" err="1"/>
+              <a:t>entry</a:t>
+            </a:r>
+            <a:r>
+              <a:rPr lang="nb-NO" dirty="0"/>
+              <a:t> </a:t>
+            </a:r>
+            <a:r>
+              <a:rPr lang="nb-NO" dirty="0" err="1"/>
+              <a:t>thresholds</a:t>
+            </a:r>
+            <a:r>
+              <a:rPr lang="nb-NO" dirty="0"/>
+              <a:t>?</a:t>
+            </a:r>
+          </a:p>
+          <a:p>
+            <a:pPr lvl="1"/>
+            <a:r>
+              <a:rPr lang="nb-NO" dirty="0" err="1"/>
+              <a:t>Heavily</a:t>
+            </a:r>
+            <a:r>
+              <a:rPr lang="nb-NO" dirty="0"/>
+              <a:t> </a:t>
+            </a:r>
+            <a:r>
+              <a:rPr lang="nb-NO" dirty="0" err="1"/>
+              <a:t>linked</a:t>
+            </a:r>
+            <a:r>
+              <a:rPr lang="nb-NO" dirty="0"/>
+              <a:t> to </a:t>
+            </a:r>
+            <a:r>
+              <a:rPr lang="nb-NO" dirty="0" err="1"/>
+              <a:t>research</a:t>
+            </a:r>
+            <a:r>
+              <a:rPr lang="nb-NO" dirty="0"/>
+              <a:t> </a:t>
+            </a:r>
+            <a:r>
+              <a:rPr lang="nb-NO" dirty="0" err="1"/>
+              <a:t>question</a:t>
+            </a:r>
+            <a:endParaRPr lang="nb-NO" dirty="0"/>
+          </a:p>
+          <a:p>
+            <a:r>
+              <a:rPr lang="nb-NO" dirty="0"/>
+              <a:t>Are </a:t>
+            </a:r>
+            <a:r>
+              <a:rPr lang="nb-NO" dirty="0" err="1"/>
+              <a:t>there</a:t>
+            </a:r>
+            <a:r>
+              <a:rPr lang="nb-NO" dirty="0"/>
+              <a:t> </a:t>
+            </a:r>
+            <a:r>
+              <a:rPr lang="nb-NO" dirty="0" err="1"/>
+              <a:t>better</a:t>
+            </a:r>
+            <a:r>
+              <a:rPr lang="nb-NO" dirty="0"/>
+              <a:t> variables for </a:t>
+            </a:r>
+            <a:r>
+              <a:rPr lang="nb-NO" dirty="0" err="1"/>
+              <a:t>our</a:t>
+            </a:r>
+            <a:r>
+              <a:rPr lang="nb-NO" dirty="0"/>
+              <a:t> </a:t>
+            </a:r>
+            <a:r>
+              <a:rPr lang="nb-NO" dirty="0" err="1"/>
+              <a:t>model</a:t>
+            </a:r>
+            <a:r>
+              <a:rPr lang="nb-NO"/>
+              <a:t>?</a:t>
+            </a:r>
+            <a:endParaRPr lang="nb-NO" dirty="0"/>
+          </a:p>
+          <a:p>
+            <a:endParaRPr lang="nb-NO" dirty="0"/>
+          </a:p>
+        </p:txBody>
+      </p:sp>
+    </p:spTree>
+    <p:extLst>
+      <p:ext uri="{BB962C8B-B14F-4D97-AF65-F5344CB8AC3E}">
+        <p14:creationId xmlns:p14="http://schemas.microsoft.com/office/powerpoint/2010/main" val="3153854413"/>
       </p:ext>
     </p:extLst>
   </p:cSld>
@@ -15122,6 +15308,409 @@
       </p:grpSpPr>
       <p:sp useBgFill="1">
         <p:nvSpPr>
+          <p:cNvPr id="27" name="Rectangle 26">
+            <a:extLst>
+              <a:ext uri="{FF2B5EF4-FFF2-40B4-BE49-F238E27FC236}">
+                <a16:creationId xmlns:a16="http://schemas.microsoft.com/office/drawing/2014/main" id="{058A14AF-9FB5-4CC7-BA35-E8E85D3EDF0E}"/>
+              </a:ext>
+              <a:ext uri="{C183D7F6-B498-43B3-948B-1728B52AA6E4}">
+                <adec:decorative xmlns:adec="http://schemas.microsoft.com/office/drawing/2017/decorative" val="1"/>
+              </a:ext>
+            </a:extLst>
+          </p:cNvPr>
+          <p:cNvSpPr>
+            <a:spLocks noGrp="1" noRot="1" noChangeAspect="1" noMove="1" noResize="1" noEditPoints="1" noAdjustHandles="1" noChangeArrowheads="1" noChangeShapeType="1" noTextEdit="1"/>
+          </p:cNvSpPr>
+          <p:nvPr>
+            <p:extLst>
+              <p:ext uri="{386F3935-93C4-4BCD-93E2-E3B085C9AB24}">
+                <p16:designElem xmlns:p16="http://schemas.microsoft.com/office/powerpoint/2015/main" val="1"/>
+              </p:ext>
+            </p:extLst>
+          </p:nvPr>
+        </p:nvSpPr>
+        <p:spPr>
+          <a:xfrm>
+            <a:off x="0" y="0"/>
+            <a:ext cx="12191999" cy="6857365"/>
+          </a:xfrm>
+          <a:prstGeom prst="rect">
+            <a:avLst/>
+          </a:prstGeom>
+          <a:ln>
+            <a:noFill/>
+          </a:ln>
+        </p:spPr>
+        <p:style>
+          <a:lnRef idx="2">
+            <a:schemeClr val="accent1">
+              <a:shade val="50000"/>
+            </a:schemeClr>
+          </a:lnRef>
+          <a:fillRef idx="1">
+            <a:schemeClr val="accent1"/>
+          </a:fillRef>
+          <a:effectRef idx="0">
+            <a:schemeClr val="accent1"/>
+          </a:effectRef>
+          <a:fontRef idx="minor">
+            <a:schemeClr val="lt1"/>
+          </a:fontRef>
+        </p:style>
+        <p:txBody>
+          <a:bodyPr rtlCol="0" anchor="ctr"/>
+          <a:lstStyle/>
+          <a:p>
+            <a:pPr algn="ctr"/>
+            <a:endParaRPr lang="en-US"/>
+          </a:p>
+        </p:txBody>
+      </p:sp>
+      <p:sp>
+        <p:nvSpPr>
+          <p:cNvPr id="2" name="Title 1">
+            <a:extLst>
+              <a:ext uri="{FF2B5EF4-FFF2-40B4-BE49-F238E27FC236}">
+                <a16:creationId xmlns:a16="http://schemas.microsoft.com/office/drawing/2014/main" id="{6A6CD311-2D10-F037-74B5-7FEC8CE8DC00}"/>
+              </a:ext>
+            </a:extLst>
+          </p:cNvPr>
+          <p:cNvSpPr>
+            <a:spLocks noGrp="1"/>
+          </p:cNvSpPr>
+          <p:nvPr>
+            <p:ph type="title"/>
+          </p:nvPr>
+        </p:nvSpPr>
+        <p:spPr>
+          <a:xfrm>
+            <a:off x="793662" y="386930"/>
+            <a:ext cx="10066122" cy="1298448"/>
+          </a:xfrm>
+        </p:spPr>
+        <p:txBody>
+          <a:bodyPr anchor="b">
+            <a:normAutofit/>
+          </a:bodyPr>
+          <a:lstStyle/>
+          <a:p>
+            <a:r>
+              <a:rPr lang="nb-NO" sz="4100"/>
+              <a:t>Population distribution (except 4 largest cities)</a:t>
+            </a:r>
+          </a:p>
+        </p:txBody>
+      </p:sp>
+      <p:sp>
+        <p:nvSpPr>
+          <p:cNvPr id="28" name="Rectangle 27">
+            <a:extLst>
+              <a:ext uri="{FF2B5EF4-FFF2-40B4-BE49-F238E27FC236}">
+                <a16:creationId xmlns:a16="http://schemas.microsoft.com/office/drawing/2014/main" id="{3A9A4357-BD1D-4622-A4FE-766E6AB8DE84}"/>
+              </a:ext>
+              <a:ext uri="{C183D7F6-B498-43B3-948B-1728B52AA6E4}">
+                <adec:decorative xmlns:adec="http://schemas.microsoft.com/office/drawing/2017/decorative" val="1"/>
+              </a:ext>
+            </a:extLst>
+          </p:cNvPr>
+          <p:cNvSpPr>
+            <a:spLocks noGrp="1" noRot="1" noChangeAspect="1" noMove="1" noResize="1" noEditPoints="1" noAdjustHandles="1" noChangeArrowheads="1" noChangeShapeType="1" noTextEdit="1"/>
+          </p:cNvSpPr>
+          <p:nvPr>
+            <p:extLst>
+              <p:ext uri="{386F3935-93C4-4BCD-93E2-E3B085C9AB24}">
+                <p16:designElem xmlns:p16="http://schemas.microsoft.com/office/powerpoint/2015/main" val="1"/>
+              </p:ext>
+            </p:extLst>
+          </p:nvPr>
+        </p:nvSpPr>
+        <p:spPr>
+          <a:xfrm flipH="1" flipV="1">
+            <a:off x="-2" y="1998845"/>
+            <a:ext cx="11454595" cy="781699"/>
+          </a:xfrm>
+          <a:prstGeom prst="rect">
+            <a:avLst/>
+          </a:prstGeom>
+          <a:solidFill>
+            <a:schemeClr val="accent4"/>
+          </a:solidFill>
+          <a:ln>
+            <a:noFill/>
+          </a:ln>
+        </p:spPr>
+        <p:style>
+          <a:lnRef idx="2">
+            <a:schemeClr val="accent1">
+              <a:shade val="50000"/>
+            </a:schemeClr>
+          </a:lnRef>
+          <a:fillRef idx="1">
+            <a:schemeClr val="accent1"/>
+          </a:fillRef>
+          <a:effectRef idx="0">
+            <a:schemeClr val="accent1"/>
+          </a:effectRef>
+          <a:fontRef idx="minor">
+            <a:schemeClr val="lt1"/>
+          </a:fontRef>
+        </p:style>
+        <p:txBody>
+          <a:bodyPr rtlCol="0" anchor="ctr"/>
+          <a:lstStyle/>
+          <a:p>
+            <a:pPr algn="ctr"/>
+            <a:endParaRPr lang="en-US"/>
+          </a:p>
+        </p:txBody>
+      </p:sp>
+      <p:sp>
+        <p:nvSpPr>
+          <p:cNvPr id="29" name="Rectangle 28">
+            <a:extLst>
+              <a:ext uri="{FF2B5EF4-FFF2-40B4-BE49-F238E27FC236}">
+                <a16:creationId xmlns:a16="http://schemas.microsoft.com/office/drawing/2014/main" id="{E659831F-0D9A-4C63-9EBB-8435B85A440F}"/>
+              </a:ext>
+              <a:ext uri="{C183D7F6-B498-43B3-948B-1728B52AA6E4}">
+                <adec:decorative xmlns:adec="http://schemas.microsoft.com/office/drawing/2017/decorative" val="1"/>
+              </a:ext>
+            </a:extLst>
+          </p:cNvPr>
+          <p:cNvSpPr>
+            <a:spLocks noGrp="1" noRot="1" noChangeAspect="1" noMove="1" noResize="1" noEditPoints="1" noAdjustHandles="1" noChangeArrowheads="1" noChangeShapeType="1" noTextEdit="1"/>
+          </p:cNvSpPr>
+          <p:nvPr>
+            <p:extLst>
+              <p:ext uri="{386F3935-93C4-4BCD-93E2-E3B085C9AB24}">
+                <p16:designElem xmlns:p16="http://schemas.microsoft.com/office/powerpoint/2015/main" val="1"/>
+              </p:ext>
+            </p:extLst>
+          </p:nvPr>
+        </p:nvSpPr>
+        <p:spPr>
+          <a:xfrm>
+            <a:off x="0" y="2203079"/>
+            <a:ext cx="11383362" cy="4267991"/>
+          </a:xfrm>
+          <a:prstGeom prst="rect">
+            <a:avLst/>
+          </a:prstGeom>
+          <a:solidFill>
+            <a:schemeClr val="bg1"/>
+          </a:solidFill>
+          <a:ln>
+            <a:noFill/>
+          </a:ln>
+          <a:effectLst>
+            <a:outerShdw blurRad="139700" dist="127000" dir="5400000" algn="t" rotWithShape="0">
+              <a:prstClr val="black">
+                <a:alpha val="15000"/>
+              </a:prstClr>
+            </a:outerShdw>
+          </a:effectLst>
+        </p:spPr>
+        <p:style>
+          <a:lnRef idx="2">
+            <a:schemeClr val="accent1">
+              <a:shade val="50000"/>
+            </a:schemeClr>
+          </a:lnRef>
+          <a:fillRef idx="1">
+            <a:schemeClr val="accent1"/>
+          </a:fillRef>
+          <a:effectRef idx="0">
+            <a:schemeClr val="accent1"/>
+          </a:effectRef>
+          <a:fontRef idx="minor">
+            <a:schemeClr val="lt1"/>
+          </a:fontRef>
+        </p:style>
+        <p:txBody>
+          <a:bodyPr rtlCol="0" anchor="ctr"/>
+          <a:lstStyle/>
+          <a:p>
+            <a:pPr algn="ctr"/>
+            <a:endParaRPr lang="en-US"/>
+          </a:p>
+        </p:txBody>
+      </p:sp>
+      <p:sp>
+        <p:nvSpPr>
+          <p:cNvPr id="30" name="Content Placeholder 8">
+            <a:extLst>
+              <a:ext uri="{FF2B5EF4-FFF2-40B4-BE49-F238E27FC236}">
+                <a16:creationId xmlns:a16="http://schemas.microsoft.com/office/drawing/2014/main" id="{C20384AB-1C48-9BBE-9906-FCA86CA0FF17}"/>
+              </a:ext>
+            </a:extLst>
+          </p:cNvPr>
+          <p:cNvSpPr>
+            <a:spLocks noGrp="1"/>
+          </p:cNvSpPr>
+          <p:nvPr>
+            <p:ph idx="1"/>
+          </p:nvPr>
+        </p:nvSpPr>
+        <p:spPr>
+          <a:xfrm>
+            <a:off x="793661" y="2599509"/>
+            <a:ext cx="4530898" cy="3639450"/>
+          </a:xfrm>
+        </p:spPr>
+        <p:txBody>
+          <a:bodyPr anchor="ctr">
+            <a:normAutofit/>
+          </a:bodyPr>
+          <a:lstStyle/>
+          <a:p>
+            <a:r>
+              <a:rPr lang="en-US" sz="2000" dirty="0"/>
+              <a:t>Which limit should we set?</a:t>
+            </a:r>
+          </a:p>
+          <a:p>
+            <a:r>
+              <a:rPr lang="en-US" sz="2000" dirty="0"/>
+              <a:t>150 000? 100 000? 80 000?</a:t>
+            </a:r>
+          </a:p>
+          <a:p>
+            <a:endParaRPr lang="en-US" sz="2000" dirty="0"/>
+          </a:p>
+        </p:txBody>
+      </p:sp>
+      <p:pic>
+        <p:nvPicPr>
+          <p:cNvPr id="5" name="Content Placeholder 4">
+            <a:extLst>
+              <a:ext uri="{FF2B5EF4-FFF2-40B4-BE49-F238E27FC236}">
+                <a16:creationId xmlns:a16="http://schemas.microsoft.com/office/drawing/2014/main" id="{25DFE567-E935-6DB9-F7A3-7C8F462AE72E}"/>
+              </a:ext>
+            </a:extLst>
+          </p:cNvPr>
+          <p:cNvPicPr>
+            <a:picLocks noChangeAspect="1"/>
+          </p:cNvPicPr>
+          <p:nvPr/>
+        </p:nvPicPr>
+        <p:blipFill>
+          <a:blip r:embed="rId2"/>
+          <a:stretch>
+            <a:fillRect/>
+          </a:stretch>
+        </p:blipFill>
+        <p:spPr>
+          <a:xfrm>
+            <a:off x="5911532" y="2680413"/>
+            <a:ext cx="5150277" cy="3321928"/>
+          </a:xfrm>
+          <a:prstGeom prst="rect">
+            <a:avLst/>
+          </a:prstGeom>
+        </p:spPr>
+      </p:pic>
+      <p:sp>
+        <p:nvSpPr>
+          <p:cNvPr id="31" name="Rectangle 30">
+            <a:extLst>
+              <a:ext uri="{FF2B5EF4-FFF2-40B4-BE49-F238E27FC236}">
+                <a16:creationId xmlns:a16="http://schemas.microsoft.com/office/drawing/2014/main" id="{E6995CE5-F890-4ABA-82A2-26507CE8D2A3}"/>
+              </a:ext>
+              <a:ext uri="{C183D7F6-B498-43B3-948B-1728B52AA6E4}">
+                <adec:decorative xmlns:adec="http://schemas.microsoft.com/office/drawing/2017/decorative" val="1"/>
+              </a:ext>
+            </a:extLst>
+          </p:cNvPr>
+          <p:cNvSpPr>
+            <a:spLocks noGrp="1" noRot="1" noChangeAspect="1" noMove="1" noResize="1" noEditPoints="1" noAdjustHandles="1" noChangeArrowheads="1" noChangeShapeType="1" noTextEdit="1"/>
+          </p:cNvSpPr>
+          <p:nvPr>
+            <p:extLst>
+              <p:ext uri="{386F3935-93C4-4BCD-93E2-E3B085C9AB24}">
+                <p16:designElem xmlns:p16="http://schemas.microsoft.com/office/powerpoint/2015/main" val="1"/>
+              </p:ext>
+            </p:extLst>
+          </p:nvPr>
+        </p:nvSpPr>
+        <p:spPr>
+          <a:xfrm rot="5400000">
+            <a:off x="11228040" y="2313027"/>
+            <a:ext cx="781700" cy="152382"/>
+          </a:xfrm>
+          <a:prstGeom prst="rect">
+            <a:avLst/>
+          </a:prstGeom>
+          <a:solidFill>
+            <a:schemeClr val="accent4"/>
+          </a:solidFill>
+          <a:ln>
+            <a:noFill/>
+          </a:ln>
+        </p:spPr>
+        <p:style>
+          <a:lnRef idx="2">
+            <a:schemeClr val="accent1">
+              <a:shade val="50000"/>
+            </a:schemeClr>
+          </a:lnRef>
+          <a:fillRef idx="1">
+            <a:schemeClr val="accent1"/>
+          </a:fillRef>
+          <a:effectRef idx="0">
+            <a:schemeClr val="accent1"/>
+          </a:effectRef>
+          <a:fontRef idx="minor">
+            <a:schemeClr val="lt1"/>
+          </a:fontRef>
+        </p:style>
+        <p:txBody>
+          <a:bodyPr rtlCol="0" anchor="ctr"/>
+          <a:lstStyle/>
+          <a:p>
+            <a:pPr algn="ctr"/>
+            <a:endParaRPr lang="en-US"/>
+          </a:p>
+        </p:txBody>
+      </p:sp>
+    </p:spTree>
+    <p:extLst>
+      <p:ext uri="{BB962C8B-B14F-4D97-AF65-F5344CB8AC3E}">
+        <p14:creationId xmlns:p14="http://schemas.microsoft.com/office/powerpoint/2010/main" val="2079565396"/>
+      </p:ext>
+    </p:extLst>
+  </p:cSld>
+  <p:clrMapOvr>
+    <a:masterClrMapping/>
+  </p:clrMapOvr>
+</p:sld>
+</file>
+
+<file path=ppt/slides/slide8.xml><?xml version="1.0" encoding="utf-8"?>
+<p:sld xmlns:a="http://schemas.openxmlformats.org/drawingml/2006/main" xmlns:r="http://schemas.openxmlformats.org/officeDocument/2006/relationships" xmlns:p="http://schemas.openxmlformats.org/presentationml/2006/main">
+  <p:cSld>
+    <p:bg>
+      <p:bgPr>
+        <a:solidFill>
+          <a:schemeClr val="bg1"/>
+        </a:solidFill>
+        <a:effectLst/>
+      </p:bgPr>
+    </p:bg>
+    <p:spTree>
+      <p:nvGrpSpPr>
+        <p:cNvPr id="1" name=""/>
+        <p:cNvGrpSpPr/>
+        <p:nvPr/>
+      </p:nvGrpSpPr>
+      <p:grpSpPr>
+        <a:xfrm>
+          <a:off x="0" y="0"/>
+          <a:ext cx="0" cy="0"/>
+          <a:chOff x="0" y="0"/>
+          <a:chExt cx="0" cy="0"/>
+        </a:xfrm>
+      </p:grpSpPr>
+      <p:sp useBgFill="1">
+        <p:nvSpPr>
           <p:cNvPr id="18" name="Rectangle 12">
             <a:extLst>
               <a:ext uri="{FF2B5EF4-FFF2-40B4-BE49-F238E27FC236}">
@@ -15603,7 +16192,7 @@
 </p:sld>
 </file>
 
-<file path=ppt/slides/slide8.xml><?xml version="1.0" encoding="utf-8"?>
+<file path=ppt/slides/slide9.xml><?xml version="1.0" encoding="utf-8"?>
 <p:sld xmlns:a="http://schemas.openxmlformats.org/drawingml/2006/main" xmlns:r="http://schemas.openxmlformats.org/officeDocument/2006/relationships" xmlns:p="http://schemas.openxmlformats.org/presentationml/2006/main">
   <p:cSld>
     <p:bg>
@@ -15774,98 +16363,6 @@
     <p:extLst>
       <p:ext uri="{BB962C8B-B14F-4D97-AF65-F5344CB8AC3E}">
         <p14:creationId xmlns:p14="http://schemas.microsoft.com/office/powerpoint/2010/main" val="2604389372"/>
-      </p:ext>
-    </p:extLst>
-  </p:cSld>
-  <p:clrMapOvr>
-    <a:masterClrMapping/>
-  </p:clrMapOvr>
-</p:sld>
-</file>
-
-<file path=ppt/slides/slide9.xml><?xml version="1.0" encoding="utf-8"?>
-<p:sld xmlns:a="http://schemas.openxmlformats.org/drawingml/2006/main" xmlns:r="http://schemas.openxmlformats.org/officeDocument/2006/relationships" xmlns:p="http://schemas.openxmlformats.org/presentationml/2006/main">
-  <p:cSld>
-    <p:spTree>
-      <p:nvGrpSpPr>
-        <p:cNvPr id="1" name=""/>
-        <p:cNvGrpSpPr/>
-        <p:nvPr/>
-      </p:nvGrpSpPr>
-      <p:grpSpPr>
-        <a:xfrm>
-          <a:off x="0" y="0"/>
-          <a:ext cx="0" cy="0"/>
-          <a:chOff x="0" y="0"/>
-          <a:chExt cx="0" cy="0"/>
-        </a:xfrm>
-      </p:grpSpPr>
-      <p:sp>
-        <p:nvSpPr>
-          <p:cNvPr id="4" name="Title 3">
-            <a:extLst>
-              <a:ext uri="{FF2B5EF4-FFF2-40B4-BE49-F238E27FC236}">
-                <a16:creationId xmlns:a16="http://schemas.microsoft.com/office/drawing/2014/main" id="{EA752597-B865-FB65-BB6A-954488D04043}"/>
-              </a:ext>
-            </a:extLst>
-          </p:cNvPr>
-          <p:cNvSpPr>
-            <a:spLocks noGrp="1"/>
-          </p:cNvSpPr>
-          <p:nvPr>
-            <p:ph type="ctrTitle"/>
-          </p:nvPr>
-        </p:nvSpPr>
-        <p:spPr/>
-        <p:txBody>
-          <a:bodyPr/>
-          <a:lstStyle/>
-          <a:p>
-            <a:r>
-              <a:rPr lang="nb-NO" dirty="0" err="1"/>
-              <a:t>Topic</a:t>
-            </a:r>
-            <a:r>
-              <a:rPr lang="nb-NO" dirty="0"/>
-              <a:t> / Research </a:t>
-            </a:r>
-            <a:r>
-              <a:rPr lang="nb-NO" dirty="0" err="1"/>
-              <a:t>Question</a:t>
-            </a:r>
-            <a:endParaRPr lang="nb-NO" dirty="0"/>
-          </a:p>
-        </p:txBody>
-      </p:sp>
-      <p:sp>
-        <p:nvSpPr>
-          <p:cNvPr id="5" name="Subtitle 4">
-            <a:extLst>
-              <a:ext uri="{FF2B5EF4-FFF2-40B4-BE49-F238E27FC236}">
-                <a16:creationId xmlns:a16="http://schemas.microsoft.com/office/drawing/2014/main" id="{98927FA5-0387-B270-4DFC-5F99766521CF}"/>
-              </a:ext>
-            </a:extLst>
-          </p:cNvPr>
-          <p:cNvSpPr>
-            <a:spLocks noGrp="1"/>
-          </p:cNvSpPr>
-          <p:nvPr>
-            <p:ph type="subTitle" idx="1"/>
-          </p:nvPr>
-        </p:nvSpPr>
-        <p:spPr/>
-        <p:txBody>
-          <a:bodyPr/>
-          <a:lstStyle/>
-          <a:p>
-            <a:endParaRPr lang="nb-NO"/>
-          </a:p>
-        </p:txBody>
-      </p:sp>
-    </p:spTree>
-    <p:extLst>
-      <p:ext uri="{BB962C8B-B14F-4D97-AF65-F5344CB8AC3E}">
-        <p14:creationId xmlns:p14="http://schemas.microsoft.com/office/powerpoint/2010/main" val="3088668381"/>
       </p:ext>
     </p:extLst>
   </p:cSld>

</xml_diff>